<commit_message>
writing BBD-Ops Deployment Structure
</commit_message>
<xml_diff>
--- a/Big Brother Driver Diagrams.pptx
+++ b/Big Brother Driver Diagrams.pptx
@@ -3786,10 +3786,10 @@
       </p:sp>
       <p:sp>
         <p:nvSpPr>
-          <p:cNvPr id="14" name="Rectangle 13">
-            <a:extLst>
-              <a:ext uri="{FF2B5EF4-FFF2-40B4-BE49-F238E27FC236}">
-                <a16:creationId xmlns:a16="http://schemas.microsoft.com/office/drawing/2014/main" id="{580441EA-41A7-4651-8937-4B0DB45BE1A1}"/>
+          <p:cNvPr id="15" name="Rectangle 14">
+            <a:extLst>
+              <a:ext uri="{FF2B5EF4-FFF2-40B4-BE49-F238E27FC236}">
+                <a16:creationId xmlns:a16="http://schemas.microsoft.com/office/drawing/2014/main" id="{26137DFE-F287-42A8-BA3F-8332F1C4708A}"/>
               </a:ext>
             </a:extLst>
           </p:cNvPr>
@@ -3798,8 +3798,8 @@
         </p:nvSpPr>
         <p:spPr>
           <a:xfrm>
-            <a:off x="271046" y="99389"/>
-            <a:ext cx="1540565" cy="377688"/>
+            <a:off x="229729" y="172552"/>
+            <a:ext cx="2213111" cy="571809"/>
           </a:xfrm>
           <a:prstGeom prst="rect">
             <a:avLst/>
@@ -3827,18 +3827,18 @@
           <a:p>
             <a:pPr algn="ctr"/>
             <a:r>
-              <a:rPr lang="en-NZ" dirty="0"/>
-              <a:t>Deployment</a:t>
-            </a:r>
-          </a:p>
-        </p:txBody>
-      </p:sp>
-      <p:sp>
-        <p:nvSpPr>
-          <p:cNvPr id="15" name="Rectangle 14">
-            <a:extLst>
-              <a:ext uri="{FF2B5EF4-FFF2-40B4-BE49-F238E27FC236}">
-                <a16:creationId xmlns:a16="http://schemas.microsoft.com/office/drawing/2014/main" id="{26137DFE-F287-42A8-BA3F-8332F1C4708A}"/>
+              <a:rPr lang="en-NZ" sz="1000" dirty="0"/>
+              <a:t>BBD-V Deployment Structure</a:t>
+            </a:r>
+          </a:p>
+        </p:txBody>
+      </p:sp>
+      <p:sp>
+        <p:nvSpPr>
+          <p:cNvPr id="17" name="Rectangle: Rounded Corners 16">
+            <a:extLst>
+              <a:ext uri="{FF2B5EF4-FFF2-40B4-BE49-F238E27FC236}">
+                <a16:creationId xmlns:a16="http://schemas.microsoft.com/office/drawing/2014/main" id="{28FDD41E-633D-44B5-8B3A-7ACF2D3F5969}"/>
               </a:ext>
             </a:extLst>
           </p:cNvPr>
@@ -3847,56 +3847,7 @@
         </p:nvSpPr>
         <p:spPr>
           <a:xfrm>
-            <a:off x="357809" y="636104"/>
-            <a:ext cx="2213111" cy="278296"/>
-          </a:xfrm>
-          <a:prstGeom prst="rect">
-            <a:avLst/>
-          </a:prstGeom>
-        </p:spPr>
-        <p:style>
-          <a:lnRef idx="2">
-            <a:schemeClr val="accent1">
-              <a:shade val="50000"/>
-            </a:schemeClr>
-          </a:lnRef>
-          <a:fillRef idx="1">
-            <a:schemeClr val="accent1"/>
-          </a:fillRef>
-          <a:effectRef idx="0">
-            <a:schemeClr val="accent1"/>
-          </a:effectRef>
-          <a:fontRef idx="minor">
-            <a:schemeClr val="lt1"/>
-          </a:fontRef>
-        </p:style>
-        <p:txBody>
-          <a:bodyPr rtlCol="0" anchor="ctr"/>
-          <a:lstStyle/>
-          <a:p>
-            <a:pPr algn="ctr"/>
-            <a:r>
-              <a:rPr lang="en-NZ" dirty="0"/>
-              <a:t>BBD-V</a:t>
-            </a:r>
-          </a:p>
-        </p:txBody>
-      </p:sp>
-      <p:sp>
-        <p:nvSpPr>
-          <p:cNvPr id="17" name="Rectangle: Rounded Corners 16">
-            <a:extLst>
-              <a:ext uri="{FF2B5EF4-FFF2-40B4-BE49-F238E27FC236}">
-                <a16:creationId xmlns:a16="http://schemas.microsoft.com/office/drawing/2014/main" id="{28FDD41E-633D-44B5-8B3A-7ACF2D3F5969}"/>
-              </a:ext>
-            </a:extLst>
-          </p:cNvPr>
-          <p:cNvSpPr/>
-          <p:nvPr/>
-        </p:nvSpPr>
-        <p:spPr>
-          <a:xfrm>
-            <a:off x="301583" y="2674245"/>
+            <a:off x="301583" y="3114258"/>
             <a:ext cx="1739349" cy="546653"/>
           </a:xfrm>
           <a:prstGeom prst="roundRect">
@@ -4033,7 +3984,7 @@
         </p:nvCxnSpPr>
         <p:spPr>
           <a:xfrm>
-            <a:off x="2040932" y="2947572"/>
+            <a:off x="2040932" y="3387585"/>
             <a:ext cx="724835" cy="14289"/>
           </a:xfrm>
           <a:prstGeom prst="straightConnector1">
@@ -4113,8 +4064,8 @@
         </p:nvGrpSpPr>
         <p:grpSpPr>
           <a:xfrm>
-            <a:off x="10217012" y="198783"/>
-            <a:ext cx="1714453" cy="1544778"/>
+            <a:off x="3299168" y="5277678"/>
+            <a:ext cx="1714453" cy="1440000"/>
             <a:chOff x="10217012" y="198783"/>
             <a:chExt cx="1714453" cy="1544778"/>
           </a:xfrm>
@@ -4178,6 +4129,178 @@
           </p:spPr>
         </p:pic>
       </p:grpSp>
+      <p:sp>
+        <p:nvSpPr>
+          <p:cNvPr id="28" name="TextBox 27">
+            <a:extLst>
+              <a:ext uri="{FF2B5EF4-FFF2-40B4-BE49-F238E27FC236}">
+                <a16:creationId xmlns:a16="http://schemas.microsoft.com/office/drawing/2014/main" id="{88DBBDAA-8A16-4638-9019-BAA435748B96}"/>
+              </a:ext>
+            </a:extLst>
+          </p:cNvPr>
+          <p:cNvSpPr txBox="1"/>
+          <p:nvPr/>
+        </p:nvSpPr>
+        <p:spPr>
+          <a:xfrm>
+            <a:off x="301583" y="1156159"/>
+            <a:ext cx="2069404" cy="369332"/>
+          </a:xfrm>
+          <a:prstGeom prst="rect">
+            <a:avLst/>
+          </a:prstGeom>
+          <a:noFill/>
+        </p:spPr>
+        <p:txBody>
+          <a:bodyPr wrap="square" rtlCol="0">
+            <a:spAutoFit/>
+          </a:bodyPr>
+          <a:lstStyle/>
+          <a:p>
+            <a:r>
+              <a:rPr lang="en-NZ" dirty="0"/>
+              <a:t>In each car</a:t>
+            </a:r>
+          </a:p>
+        </p:txBody>
+      </p:sp>
+      <p:sp>
+        <p:nvSpPr>
+          <p:cNvPr id="29" name="Rectangle: Rounded Corners 28">
+            <a:extLst>
+              <a:ext uri="{FF2B5EF4-FFF2-40B4-BE49-F238E27FC236}">
+                <a16:creationId xmlns:a16="http://schemas.microsoft.com/office/drawing/2014/main" id="{5D8A2F5D-2E33-469D-A3D2-367579FC2FCE}"/>
+              </a:ext>
+            </a:extLst>
+          </p:cNvPr>
+          <p:cNvSpPr/>
+          <p:nvPr/>
+        </p:nvSpPr>
+        <p:spPr>
+          <a:xfrm>
+            <a:off x="188843" y="1525491"/>
+            <a:ext cx="2047461" cy="730692"/>
+          </a:xfrm>
+          <a:prstGeom prst="roundRect">
+            <a:avLst/>
+          </a:prstGeom>
+          <a:noFill/>
+        </p:spPr>
+        <p:style>
+          <a:lnRef idx="2">
+            <a:schemeClr val="dk1"/>
+          </a:lnRef>
+          <a:fillRef idx="1">
+            <a:schemeClr val="lt1"/>
+          </a:fillRef>
+          <a:effectRef idx="0">
+            <a:schemeClr val="dk1"/>
+          </a:effectRef>
+          <a:fontRef idx="minor">
+            <a:schemeClr val="dk1"/>
+          </a:fontRef>
+        </p:style>
+        <p:txBody>
+          <a:bodyPr rtlCol="0" anchor="ctr"/>
+          <a:lstStyle/>
+          <a:p>
+            <a:pPr algn="ctr"/>
+            <a:endParaRPr lang="en-NZ"/>
+          </a:p>
+        </p:txBody>
+      </p:sp>
+      <p:sp>
+        <p:nvSpPr>
+          <p:cNvPr id="30" name="Rectangle: Rounded Corners 29">
+            <a:extLst>
+              <a:ext uri="{FF2B5EF4-FFF2-40B4-BE49-F238E27FC236}">
+                <a16:creationId xmlns:a16="http://schemas.microsoft.com/office/drawing/2014/main" id="{2593E276-8C04-4F00-93AF-21C7E4E33D1B}"/>
+              </a:ext>
+            </a:extLst>
+          </p:cNvPr>
+          <p:cNvSpPr/>
+          <p:nvPr/>
+        </p:nvSpPr>
+        <p:spPr>
+          <a:xfrm>
+            <a:off x="188843" y="2862470"/>
+            <a:ext cx="2182144" cy="1997765"/>
+          </a:xfrm>
+          <a:prstGeom prst="roundRect">
+            <a:avLst/>
+          </a:prstGeom>
+          <a:noFill/>
+        </p:spPr>
+        <p:style>
+          <a:lnRef idx="2">
+            <a:schemeClr val="dk1"/>
+          </a:lnRef>
+          <a:fillRef idx="1">
+            <a:schemeClr val="lt1"/>
+          </a:fillRef>
+          <a:effectRef idx="0">
+            <a:schemeClr val="dk1"/>
+          </a:effectRef>
+          <a:fontRef idx="minor">
+            <a:schemeClr val="dk1"/>
+          </a:fontRef>
+        </p:style>
+        <p:txBody>
+          <a:bodyPr rtlCol="0" anchor="ctr"/>
+          <a:lstStyle/>
+          <a:p>
+            <a:pPr algn="ctr"/>
+            <a:endParaRPr lang="en-NZ"/>
+          </a:p>
+        </p:txBody>
+      </p:sp>
+      <p:sp>
+        <p:nvSpPr>
+          <p:cNvPr id="31" name="Rectangle: Rounded Corners 30">
+            <a:extLst>
+              <a:ext uri="{FF2B5EF4-FFF2-40B4-BE49-F238E27FC236}">
+                <a16:creationId xmlns:a16="http://schemas.microsoft.com/office/drawing/2014/main" id="{64E78AF7-D3D2-46BB-AC06-DBB98CA4C533}"/>
+              </a:ext>
+            </a:extLst>
+          </p:cNvPr>
+          <p:cNvSpPr/>
+          <p:nvPr/>
+        </p:nvSpPr>
+        <p:spPr>
+          <a:xfrm>
+            <a:off x="3633785" y="1977886"/>
+            <a:ext cx="1047546" cy="536714"/>
+          </a:xfrm>
+          <a:prstGeom prst="roundRect">
+            <a:avLst/>
+          </a:prstGeom>
+        </p:spPr>
+        <p:style>
+          <a:lnRef idx="2">
+            <a:schemeClr val="dk1"/>
+          </a:lnRef>
+          <a:fillRef idx="1">
+            <a:schemeClr val="lt1"/>
+          </a:fillRef>
+          <a:effectRef idx="0">
+            <a:schemeClr val="dk1"/>
+          </a:effectRef>
+          <a:fontRef idx="minor">
+            <a:schemeClr val="dk1"/>
+          </a:fontRef>
+        </p:style>
+        <p:txBody>
+          <a:bodyPr rtlCol="0" anchor="ctr"/>
+          <a:lstStyle/>
+          <a:p>
+            <a:pPr algn="ctr"/>
+            <a:r>
+              <a:rPr lang="en-NZ" sz="1000" dirty="0"/>
+              <a:t>BBD-Ops</a:t>
+            </a:r>
+          </a:p>
+        </p:txBody>
+      </p:sp>
     </p:spTree>
     <p:extLst>
       <p:ext uri="{BB962C8B-B14F-4D97-AF65-F5344CB8AC3E}">
@@ -4222,7 +4345,7 @@
         </p:nvSpPr>
         <p:spPr>
           <a:xfrm>
-            <a:off x="7960620" y="0"/>
+            <a:off x="7165790" y="0"/>
             <a:ext cx="338554" cy="6858000"/>
           </a:xfrm>
           <a:prstGeom prst="rect">
@@ -4296,10 +4419,10 @@
       </p:sp>
       <p:sp>
         <p:nvSpPr>
-          <p:cNvPr id="10" name="Cylinder 9">
-            <a:extLst>
-              <a:ext uri="{FF2B5EF4-FFF2-40B4-BE49-F238E27FC236}">
-                <a16:creationId xmlns:a16="http://schemas.microsoft.com/office/drawing/2014/main" id="{A5814B17-7D96-4BDE-AD08-76032F9F0C28}"/>
+          <p:cNvPr id="15" name="Rectangle 14">
+            <a:extLst>
+              <a:ext uri="{FF2B5EF4-FFF2-40B4-BE49-F238E27FC236}">
+                <a16:creationId xmlns:a16="http://schemas.microsoft.com/office/drawing/2014/main" id="{26137DFE-F287-42A8-BA3F-8332F1C4708A}"/>
               </a:ext>
             </a:extLst>
           </p:cNvPr>
@@ -4308,184 +4431,8 @@
         </p:nvSpPr>
         <p:spPr>
           <a:xfrm>
-            <a:off x="8666922" y="417443"/>
-            <a:ext cx="834887" cy="661987"/>
-          </a:xfrm>
-          <a:prstGeom prst="can">
-            <a:avLst/>
-          </a:prstGeom>
-        </p:spPr>
-        <p:style>
-          <a:lnRef idx="2">
-            <a:schemeClr val="dk1"/>
-          </a:lnRef>
-          <a:fillRef idx="1">
-            <a:schemeClr val="lt1"/>
-          </a:fillRef>
-          <a:effectRef idx="0">
-            <a:schemeClr val="dk1"/>
-          </a:effectRef>
-          <a:fontRef idx="minor">
-            <a:schemeClr val="dk1"/>
-          </a:fontRef>
-        </p:style>
-        <p:txBody>
-          <a:bodyPr rtlCol="0" anchor="ctr"/>
-          <a:lstStyle/>
-          <a:p>
-            <a:pPr algn="ctr"/>
-            <a:endParaRPr lang="en-NZ"/>
-          </a:p>
-        </p:txBody>
-      </p:sp>
-      <p:sp>
-        <p:nvSpPr>
-          <p:cNvPr id="11" name="Cylinder 10">
-            <a:extLst>
-              <a:ext uri="{FF2B5EF4-FFF2-40B4-BE49-F238E27FC236}">
-                <a16:creationId xmlns:a16="http://schemas.microsoft.com/office/drawing/2014/main" id="{4AF9C66C-429B-4CD3-AEAB-138F79B56B07}"/>
-              </a:ext>
-            </a:extLst>
-          </p:cNvPr>
-          <p:cNvSpPr/>
-          <p:nvPr/>
-        </p:nvSpPr>
-        <p:spPr>
-          <a:xfrm>
-            <a:off x="8666922" y="1848988"/>
-            <a:ext cx="834887" cy="661987"/>
-          </a:xfrm>
-          <a:prstGeom prst="can">
-            <a:avLst/>
-          </a:prstGeom>
-        </p:spPr>
-        <p:style>
-          <a:lnRef idx="2">
-            <a:schemeClr val="dk1"/>
-          </a:lnRef>
-          <a:fillRef idx="1">
-            <a:schemeClr val="lt1"/>
-          </a:fillRef>
-          <a:effectRef idx="0">
-            <a:schemeClr val="dk1"/>
-          </a:effectRef>
-          <a:fontRef idx="minor">
-            <a:schemeClr val="dk1"/>
-          </a:fontRef>
-        </p:style>
-        <p:txBody>
-          <a:bodyPr rtlCol="0" anchor="ctr"/>
-          <a:lstStyle/>
-          <a:p>
-            <a:pPr algn="ctr"/>
-            <a:endParaRPr lang="en-NZ"/>
-          </a:p>
-        </p:txBody>
-      </p:sp>
-      <p:sp>
-        <p:nvSpPr>
-          <p:cNvPr id="12" name="Cylinder 11">
-            <a:extLst>
-              <a:ext uri="{FF2B5EF4-FFF2-40B4-BE49-F238E27FC236}">
-                <a16:creationId xmlns:a16="http://schemas.microsoft.com/office/drawing/2014/main" id="{6CAD29B7-BCC8-4596-9A12-89F9C09A83EA}"/>
-              </a:ext>
-            </a:extLst>
-          </p:cNvPr>
-          <p:cNvSpPr/>
-          <p:nvPr/>
-        </p:nvSpPr>
-        <p:spPr>
-          <a:xfrm>
-            <a:off x="8941904" y="3286539"/>
-            <a:ext cx="834887" cy="661987"/>
-          </a:xfrm>
-          <a:prstGeom prst="can">
-            <a:avLst/>
-          </a:prstGeom>
-        </p:spPr>
-        <p:style>
-          <a:lnRef idx="2">
-            <a:schemeClr val="dk1"/>
-          </a:lnRef>
-          <a:fillRef idx="1">
-            <a:schemeClr val="lt1"/>
-          </a:fillRef>
-          <a:effectRef idx="0">
-            <a:schemeClr val="dk1"/>
-          </a:effectRef>
-          <a:fontRef idx="minor">
-            <a:schemeClr val="dk1"/>
-          </a:fontRef>
-        </p:style>
-        <p:txBody>
-          <a:bodyPr rtlCol="0" anchor="ctr"/>
-          <a:lstStyle/>
-          <a:p>
-            <a:pPr algn="ctr"/>
-            <a:endParaRPr lang="en-NZ"/>
-          </a:p>
-        </p:txBody>
-      </p:sp>
-      <p:sp>
-        <p:nvSpPr>
-          <p:cNvPr id="13" name="Cylinder 12">
-            <a:extLst>
-              <a:ext uri="{FF2B5EF4-FFF2-40B4-BE49-F238E27FC236}">
-                <a16:creationId xmlns:a16="http://schemas.microsoft.com/office/drawing/2014/main" id="{E048EF44-13C0-44C1-A7FA-A26D46800789}"/>
-              </a:ext>
-            </a:extLst>
-          </p:cNvPr>
-          <p:cNvSpPr/>
-          <p:nvPr/>
-        </p:nvSpPr>
-        <p:spPr>
-          <a:xfrm>
-            <a:off x="8971721" y="5049078"/>
-            <a:ext cx="834887" cy="661987"/>
-          </a:xfrm>
-          <a:prstGeom prst="can">
-            <a:avLst/>
-          </a:prstGeom>
-        </p:spPr>
-        <p:style>
-          <a:lnRef idx="2">
-            <a:schemeClr val="dk1"/>
-          </a:lnRef>
-          <a:fillRef idx="1">
-            <a:schemeClr val="lt1"/>
-          </a:fillRef>
-          <a:effectRef idx="0">
-            <a:schemeClr val="dk1"/>
-          </a:effectRef>
-          <a:fontRef idx="minor">
-            <a:schemeClr val="dk1"/>
-          </a:fontRef>
-        </p:style>
-        <p:txBody>
-          <a:bodyPr rtlCol="0" anchor="ctr"/>
-          <a:lstStyle/>
-          <a:p>
-            <a:pPr algn="ctr"/>
-            <a:endParaRPr lang="en-NZ"/>
-          </a:p>
-        </p:txBody>
-      </p:sp>
-      <p:sp>
-        <p:nvSpPr>
-          <p:cNvPr id="14" name="Rectangle 13">
-            <a:extLst>
-              <a:ext uri="{FF2B5EF4-FFF2-40B4-BE49-F238E27FC236}">
-                <a16:creationId xmlns:a16="http://schemas.microsoft.com/office/drawing/2014/main" id="{580441EA-41A7-4651-8937-4B0DB45BE1A1}"/>
-              </a:ext>
-            </a:extLst>
-          </p:cNvPr>
-          <p:cNvSpPr/>
-          <p:nvPr/>
-        </p:nvSpPr>
-        <p:spPr>
-          <a:xfrm>
-            <a:off x="271046" y="99389"/>
-            <a:ext cx="1540565" cy="377688"/>
+            <a:off x="147657" y="149084"/>
+            <a:ext cx="2213111" cy="526774"/>
           </a:xfrm>
           <a:prstGeom prst="rect">
             <a:avLst/>
@@ -4513,18 +4460,18 @@
           <a:p>
             <a:pPr algn="ctr"/>
             <a:r>
-              <a:rPr lang="en-NZ" dirty="0"/>
-              <a:t>Deployment</a:t>
-            </a:r>
-          </a:p>
-        </p:txBody>
-      </p:sp>
-      <p:sp>
-        <p:nvSpPr>
-          <p:cNvPr id="15" name="Rectangle 14">
-            <a:extLst>
-              <a:ext uri="{FF2B5EF4-FFF2-40B4-BE49-F238E27FC236}">
-                <a16:creationId xmlns:a16="http://schemas.microsoft.com/office/drawing/2014/main" id="{26137DFE-F287-42A8-BA3F-8332F1C4708A}"/>
+              <a:rPr lang="en-NZ" sz="1000" dirty="0"/>
+              <a:t>BBD-Ops Deployment Structure</a:t>
+            </a:r>
+          </a:p>
+        </p:txBody>
+      </p:sp>
+      <p:sp>
+        <p:nvSpPr>
+          <p:cNvPr id="17" name="Rectangle: Rounded Corners 16">
+            <a:extLst>
+              <a:ext uri="{FF2B5EF4-FFF2-40B4-BE49-F238E27FC236}">
+                <a16:creationId xmlns:a16="http://schemas.microsoft.com/office/drawing/2014/main" id="{56EBF5EC-2E10-4799-ADB5-A183AF811D01}"/>
               </a:ext>
             </a:extLst>
           </p:cNvPr>
@@ -4533,59 +4480,10 @@
         </p:nvSpPr>
         <p:spPr>
           <a:xfrm>
-            <a:off x="357809" y="636104"/>
-            <a:ext cx="2213111" cy="278296"/>
-          </a:xfrm>
-          <a:prstGeom prst="rect">
-            <a:avLst/>
-          </a:prstGeom>
-        </p:spPr>
-        <p:style>
-          <a:lnRef idx="2">
-            <a:schemeClr val="accent1">
-              <a:shade val="50000"/>
-            </a:schemeClr>
-          </a:lnRef>
-          <a:fillRef idx="1">
-            <a:schemeClr val="accent1"/>
-          </a:fillRef>
-          <a:effectRef idx="0">
-            <a:schemeClr val="accent1"/>
-          </a:effectRef>
-          <a:fontRef idx="minor">
-            <a:schemeClr val="lt1"/>
-          </a:fontRef>
-        </p:style>
-        <p:txBody>
-          <a:bodyPr rtlCol="0" anchor="ctr"/>
-          <a:lstStyle/>
-          <a:p>
-            <a:pPr algn="ctr"/>
-            <a:r>
-              <a:rPr lang="en-NZ" dirty="0"/>
-              <a:t>BBD-Ops</a:t>
-            </a:r>
-          </a:p>
-        </p:txBody>
-      </p:sp>
-      <p:sp>
-        <p:nvSpPr>
-          <p:cNvPr id="16" name="Cylinder 15">
-            <a:extLst>
-              <a:ext uri="{FF2B5EF4-FFF2-40B4-BE49-F238E27FC236}">
-                <a16:creationId xmlns:a16="http://schemas.microsoft.com/office/drawing/2014/main" id="{1900FD86-DE5E-440F-9BC5-F9EE4675171C}"/>
-              </a:ext>
-            </a:extLst>
-          </p:cNvPr>
-          <p:cNvSpPr/>
-          <p:nvPr/>
-        </p:nvSpPr>
-        <p:spPr>
-          <a:xfrm>
-            <a:off x="8819322" y="569843"/>
-            <a:ext cx="834887" cy="661987"/>
-          </a:xfrm>
-          <a:prstGeom prst="can">
+            <a:off x="4964895" y="288233"/>
+            <a:ext cx="1041161" cy="1021021"/>
+          </a:xfrm>
+          <a:prstGeom prst="roundRect">
             <a:avLst/>
           </a:prstGeom>
         </p:spPr>
@@ -4608,16 +4506,19 @@
           <a:lstStyle/>
           <a:p>
             <a:pPr algn="ctr"/>
-            <a:endParaRPr lang="en-NZ"/>
-          </a:p>
-        </p:txBody>
-      </p:sp>
-      <p:sp>
-        <p:nvSpPr>
-          <p:cNvPr id="17" name="Rectangle: Rounded Corners 16">
-            <a:extLst>
-              <a:ext uri="{FF2B5EF4-FFF2-40B4-BE49-F238E27FC236}">
-                <a16:creationId xmlns:a16="http://schemas.microsoft.com/office/drawing/2014/main" id="{56EBF5EC-2E10-4799-ADB5-A183AF811D01}"/>
+            <a:r>
+              <a:rPr lang="en-NZ" sz="1000" dirty="0"/>
+              <a:t>on-line driver registration processing</a:t>
+            </a:r>
+          </a:p>
+        </p:txBody>
+      </p:sp>
+      <p:sp>
+        <p:nvSpPr>
+          <p:cNvPr id="19" name="Rectangle: Rounded Corners 18">
+            <a:extLst>
+              <a:ext uri="{FF2B5EF4-FFF2-40B4-BE49-F238E27FC236}">
+                <a16:creationId xmlns:a16="http://schemas.microsoft.com/office/drawing/2014/main" id="{2AEE6840-29AE-4C50-819C-E290FB908BD1}"/>
               </a:ext>
             </a:extLst>
           </p:cNvPr>
@@ -4626,8 +4527,8 @@
         </p:nvSpPr>
         <p:spPr>
           <a:xfrm>
-            <a:off x="3570415" y="1854358"/>
-            <a:ext cx="1434303" cy="1021021"/>
+            <a:off x="4795484" y="1572981"/>
+            <a:ext cx="1014240" cy="536348"/>
           </a:xfrm>
           <a:prstGeom prst="roundRect">
             <a:avLst/>
@@ -4654,17 +4555,17 @@
             <a:pPr algn="ctr"/>
             <a:r>
               <a:rPr lang="en-NZ" sz="1000" dirty="0"/>
-              <a:t>on-line driver registration processing</a:t>
-            </a:r>
-          </a:p>
-        </p:txBody>
-      </p:sp>
-      <p:sp>
-        <p:nvSpPr>
-          <p:cNvPr id="18" name="Cylinder 17">
-            <a:extLst>
-              <a:ext uri="{FF2B5EF4-FFF2-40B4-BE49-F238E27FC236}">
-                <a16:creationId xmlns:a16="http://schemas.microsoft.com/office/drawing/2014/main" id="{3793B93E-A898-41FF-B5C2-10B8C6DDBA9A}"/>
+              <a:t>Driver Monitor</a:t>
+            </a:r>
+          </a:p>
+        </p:txBody>
+      </p:sp>
+      <p:sp>
+        <p:nvSpPr>
+          <p:cNvPr id="20" name="Rectangle: Rounded Corners 19">
+            <a:extLst>
+              <a:ext uri="{FF2B5EF4-FFF2-40B4-BE49-F238E27FC236}">
+                <a16:creationId xmlns:a16="http://schemas.microsoft.com/office/drawing/2014/main" id="{DB508EB3-9462-44C6-AE59-8C9A0248EE55}"/>
               </a:ext>
             </a:extLst>
           </p:cNvPr>
@@ -4673,10 +4574,10 @@
         </p:nvSpPr>
         <p:spPr>
           <a:xfrm>
-            <a:off x="357809" y="5693167"/>
-            <a:ext cx="1737813" cy="785192"/>
-          </a:xfrm>
-          <a:prstGeom prst="can">
+            <a:off x="3711096" y="5101775"/>
+            <a:ext cx="1152939" cy="556591"/>
+          </a:xfrm>
+          <a:prstGeom prst="roundRect">
             <a:avLst/>
           </a:prstGeom>
         </p:spPr>
@@ -4701,17 +4602,17 @@
             <a:pPr algn="ctr"/>
             <a:r>
               <a:rPr lang="en-NZ" sz="1000" dirty="0"/>
-              <a:t>Persist on-line driver registration</a:t>
-            </a:r>
-          </a:p>
-        </p:txBody>
-      </p:sp>
-      <p:sp>
-        <p:nvSpPr>
-          <p:cNvPr id="19" name="Rectangle: Rounded Corners 18">
-            <a:extLst>
-              <a:ext uri="{FF2B5EF4-FFF2-40B4-BE49-F238E27FC236}">
-                <a16:creationId xmlns:a16="http://schemas.microsoft.com/office/drawing/2014/main" id="{2AEE6840-29AE-4C50-819C-E290FB908BD1}"/>
+              <a:t>Realtime tracking process</a:t>
+            </a:r>
+          </a:p>
+        </p:txBody>
+      </p:sp>
+      <p:sp>
+        <p:nvSpPr>
+          <p:cNvPr id="21" name="Rectangle: Rounded Corners 20">
+            <a:extLst>
+              <a:ext uri="{FF2B5EF4-FFF2-40B4-BE49-F238E27FC236}">
+                <a16:creationId xmlns:a16="http://schemas.microsoft.com/office/drawing/2014/main" id="{CE96D565-5EA7-4E67-B133-293D2FDA5E37}"/>
               </a:ext>
             </a:extLst>
           </p:cNvPr>
@@ -4720,8 +4621,8 @@
         </p:nvSpPr>
         <p:spPr>
           <a:xfrm>
-            <a:off x="3745658" y="4162483"/>
-            <a:ext cx="1014240" cy="536348"/>
+            <a:off x="3778974" y="5771930"/>
+            <a:ext cx="983824" cy="506368"/>
           </a:xfrm>
           <a:prstGeom prst="roundRect">
             <a:avLst/>
@@ -4748,17 +4649,17 @@
             <a:pPr algn="ctr"/>
             <a:r>
               <a:rPr lang="en-NZ" sz="1000" dirty="0"/>
-              <a:t>Driver Monitor</a:t>
-            </a:r>
-          </a:p>
-        </p:txBody>
-      </p:sp>
-      <p:sp>
-        <p:nvSpPr>
-          <p:cNvPr id="20" name="Rectangle: Rounded Corners 19">
-            <a:extLst>
-              <a:ext uri="{FF2B5EF4-FFF2-40B4-BE49-F238E27FC236}">
-                <a16:creationId xmlns:a16="http://schemas.microsoft.com/office/drawing/2014/main" id="{DB508EB3-9462-44C6-AE59-8C9A0248EE55}"/>
+              <a:t>Reporting to Police process</a:t>
+            </a:r>
+          </a:p>
+        </p:txBody>
+      </p:sp>
+      <p:sp>
+        <p:nvSpPr>
+          <p:cNvPr id="22" name="Rectangle: Rounded Corners 21">
+            <a:extLst>
+              <a:ext uri="{FF2B5EF4-FFF2-40B4-BE49-F238E27FC236}">
+                <a16:creationId xmlns:a16="http://schemas.microsoft.com/office/drawing/2014/main" id="{A32A147D-9C02-4FAE-A19E-BDF7A300DAE2}"/>
               </a:ext>
             </a:extLst>
           </p:cNvPr>
@@ -4767,8 +4668,8 @@
         </p:nvSpPr>
         <p:spPr>
           <a:xfrm>
-            <a:off x="5601395" y="6005001"/>
-            <a:ext cx="1152939" cy="964096"/>
+            <a:off x="3682574" y="2604105"/>
+            <a:ext cx="1050184" cy="685686"/>
           </a:xfrm>
           <a:prstGeom prst="roundRect">
             <a:avLst/>
@@ -4795,17 +4696,17 @@
             <a:pPr algn="ctr"/>
             <a:r>
               <a:rPr lang="en-NZ" sz="1000" dirty="0"/>
-              <a:t>Realtime tracking process</a:t>
-            </a:r>
-          </a:p>
-        </p:txBody>
-      </p:sp>
-      <p:sp>
-        <p:nvSpPr>
-          <p:cNvPr id="21" name="Rectangle: Rounded Corners 20">
-            <a:extLst>
-              <a:ext uri="{FF2B5EF4-FFF2-40B4-BE49-F238E27FC236}">
-                <a16:creationId xmlns:a16="http://schemas.microsoft.com/office/drawing/2014/main" id="{CE96D565-5EA7-4E67-B133-293D2FDA5E37}"/>
+              <a:t>Processing report</a:t>
+            </a:r>
+          </a:p>
+        </p:txBody>
+      </p:sp>
+      <p:sp>
+        <p:nvSpPr>
+          <p:cNvPr id="24" name="Cylinder 23">
+            <a:extLst>
+              <a:ext uri="{FF2B5EF4-FFF2-40B4-BE49-F238E27FC236}">
+                <a16:creationId xmlns:a16="http://schemas.microsoft.com/office/drawing/2014/main" id="{471E0036-001E-4715-A6A7-0F53DA07F5FF}"/>
               </a:ext>
             </a:extLst>
           </p:cNvPr>
@@ -4814,10 +4715,10 @@
         </p:nvSpPr>
         <p:spPr>
           <a:xfrm>
-            <a:off x="6800073" y="5824621"/>
-            <a:ext cx="1282147" cy="1085536"/>
-          </a:xfrm>
-          <a:prstGeom prst="roundRect">
+            <a:off x="8721298" y="4387682"/>
+            <a:ext cx="1237771" cy="655980"/>
+          </a:xfrm>
+          <a:prstGeom prst="can">
             <a:avLst/>
           </a:prstGeom>
         </p:spPr>
@@ -4842,17 +4743,17 @@
             <a:pPr algn="ctr"/>
             <a:r>
               <a:rPr lang="en-NZ" sz="1000" dirty="0"/>
-              <a:t>Reporting to Police process</a:t>
-            </a:r>
-          </a:p>
-        </p:txBody>
-      </p:sp>
-      <p:sp>
-        <p:nvSpPr>
-          <p:cNvPr id="22" name="Rectangle: Rounded Corners 21">
-            <a:extLst>
-              <a:ext uri="{FF2B5EF4-FFF2-40B4-BE49-F238E27FC236}">
-                <a16:creationId xmlns:a16="http://schemas.microsoft.com/office/drawing/2014/main" id="{A32A147D-9C02-4FAE-A19E-BDF7A300DAE2}"/>
+              <a:t>Journey report DB</a:t>
+            </a:r>
+          </a:p>
+        </p:txBody>
+      </p:sp>
+      <p:sp>
+        <p:nvSpPr>
+          <p:cNvPr id="25" name="Cylinder 24">
+            <a:extLst>
+              <a:ext uri="{FF2B5EF4-FFF2-40B4-BE49-F238E27FC236}">
+                <a16:creationId xmlns:a16="http://schemas.microsoft.com/office/drawing/2014/main" id="{3F1B1B22-8F91-45C0-804D-E2EE2B4A745B}"/>
               </a:ext>
             </a:extLst>
           </p:cNvPr>
@@ -4861,10 +4762,10 @@
         </p:nvSpPr>
         <p:spPr>
           <a:xfrm>
-            <a:off x="5271898" y="3425541"/>
-            <a:ext cx="1050184" cy="685686"/>
-          </a:xfrm>
-          <a:prstGeom prst="roundRect">
+            <a:off x="8691611" y="5734012"/>
+            <a:ext cx="1176079" cy="902569"/>
+          </a:xfrm>
+          <a:prstGeom prst="can">
             <a:avLst/>
           </a:prstGeom>
         </p:spPr>
@@ -4889,17 +4790,17 @@
             <a:pPr algn="ctr"/>
             <a:r>
               <a:rPr lang="en-NZ" sz="1000" dirty="0"/>
-              <a:t>Processing report</a:t>
-            </a:r>
-          </a:p>
-        </p:txBody>
-      </p:sp>
-      <p:sp>
-        <p:nvSpPr>
-          <p:cNvPr id="24" name="Cylinder 23">
-            <a:extLst>
-              <a:ext uri="{FF2B5EF4-FFF2-40B4-BE49-F238E27FC236}">
-                <a16:creationId xmlns:a16="http://schemas.microsoft.com/office/drawing/2014/main" id="{471E0036-001E-4715-A6A7-0F53DA07F5FF}"/>
+              <a:t>Unauthorised report requests DB</a:t>
+            </a:r>
+          </a:p>
+        </p:txBody>
+      </p:sp>
+      <p:sp>
+        <p:nvSpPr>
+          <p:cNvPr id="27" name="Rectangle: Rounded Corners 26">
+            <a:extLst>
+              <a:ext uri="{FF2B5EF4-FFF2-40B4-BE49-F238E27FC236}">
+                <a16:creationId xmlns:a16="http://schemas.microsoft.com/office/drawing/2014/main" id="{22CE1059-E877-4BED-B241-AA1333C5EA04}"/>
               </a:ext>
             </a:extLst>
           </p:cNvPr>
@@ -4908,10 +4809,10 @@
         </p:nvSpPr>
         <p:spPr>
           <a:xfrm>
-            <a:off x="7953012" y="5816564"/>
-            <a:ext cx="1600200" cy="1172739"/>
-          </a:xfrm>
-          <a:prstGeom prst="can">
+            <a:off x="3381183" y="416843"/>
+            <a:ext cx="1230393" cy="876981"/>
+          </a:xfrm>
+          <a:prstGeom prst="roundRect">
             <a:avLst/>
           </a:prstGeom>
         </p:spPr>
@@ -4936,17 +4837,17 @@
             <a:pPr algn="ctr"/>
             <a:r>
               <a:rPr lang="en-NZ" sz="1000" dirty="0"/>
-              <a:t>Persist journey report</a:t>
-            </a:r>
-          </a:p>
-        </p:txBody>
-      </p:sp>
-      <p:sp>
-        <p:nvSpPr>
-          <p:cNvPr id="25" name="Cylinder 24">
-            <a:extLst>
-              <a:ext uri="{FF2B5EF4-FFF2-40B4-BE49-F238E27FC236}">
-                <a16:creationId xmlns:a16="http://schemas.microsoft.com/office/drawing/2014/main" id="{3F1B1B22-8F91-45C0-804D-E2EE2B4A745B}"/>
+              <a:t>on-line vehicle registration processing</a:t>
+            </a:r>
+          </a:p>
+        </p:txBody>
+      </p:sp>
+      <p:sp>
+        <p:nvSpPr>
+          <p:cNvPr id="30" name="Rectangle: Rounded Corners 29">
+            <a:extLst>
+              <a:ext uri="{FF2B5EF4-FFF2-40B4-BE49-F238E27FC236}">
+                <a16:creationId xmlns:a16="http://schemas.microsoft.com/office/drawing/2014/main" id="{3770DC01-95D6-49E1-AA81-337766233B8A}"/>
               </a:ext>
             </a:extLst>
           </p:cNvPr>
@@ -4955,10 +4856,10 @@
         </p:nvSpPr>
         <p:spPr>
           <a:xfrm>
-            <a:off x="9737086" y="5824621"/>
-            <a:ext cx="1600200" cy="1172739"/>
-          </a:xfrm>
-          <a:prstGeom prst="can">
+            <a:off x="3378462" y="1555392"/>
+            <a:ext cx="1159759" cy="606512"/>
+          </a:xfrm>
+          <a:prstGeom prst="roundRect">
             <a:avLst/>
           </a:prstGeom>
         </p:spPr>
@@ -4983,57 +4884,17 @@
             <a:pPr algn="ctr"/>
             <a:r>
               <a:rPr lang="en-NZ" sz="1000" dirty="0"/>
-              <a:t>Persist unauthorised report requests</a:t>
-            </a:r>
-          </a:p>
-        </p:txBody>
-      </p:sp>
-      <p:cxnSp>
-        <p:nvCxnSpPr>
-          <p:cNvPr id="26" name="Straight Arrow Connector 25">
-            <a:extLst>
-              <a:ext uri="{FF2B5EF4-FFF2-40B4-BE49-F238E27FC236}">
-                <a16:creationId xmlns:a16="http://schemas.microsoft.com/office/drawing/2014/main" id="{91345E19-D257-41DD-86DB-4AB19F6D37B0}"/>
-              </a:ext>
-            </a:extLst>
-          </p:cNvPr>
-          <p:cNvCxnSpPr/>
-          <p:nvPr/>
-        </p:nvCxnSpPr>
-        <p:spPr>
-          <a:xfrm flipH="1">
-            <a:off x="1226716" y="5235453"/>
-            <a:ext cx="45119" cy="457714"/>
-          </a:xfrm>
-          <a:prstGeom prst="straightConnector1">
-            <a:avLst/>
-          </a:prstGeom>
-          <a:ln>
-            <a:headEnd type="triangle"/>
-            <a:tailEnd type="triangle"/>
-          </a:ln>
-        </p:spPr>
-        <p:style>
-          <a:lnRef idx="1">
-            <a:schemeClr val="dk1"/>
-          </a:lnRef>
-          <a:fillRef idx="0">
-            <a:schemeClr val="dk1"/>
-          </a:fillRef>
-          <a:effectRef idx="0">
-            <a:schemeClr val="dk1"/>
-          </a:effectRef>
-          <a:fontRef idx="minor">
-            <a:schemeClr val="tx1"/>
-          </a:fontRef>
-        </p:style>
-      </p:cxnSp>
-      <p:sp>
-        <p:nvSpPr>
-          <p:cNvPr id="27" name="Rectangle: Rounded Corners 26">
-            <a:extLst>
-              <a:ext uri="{FF2B5EF4-FFF2-40B4-BE49-F238E27FC236}">
-                <a16:creationId xmlns:a16="http://schemas.microsoft.com/office/drawing/2014/main" id="{22CE1059-E877-4BED-B241-AA1333C5EA04}"/>
+              <a:t>vehicle speed/location processing</a:t>
+            </a:r>
+          </a:p>
+        </p:txBody>
+      </p:sp>
+      <p:sp>
+        <p:nvSpPr>
+          <p:cNvPr id="7" name="Rectangle: Rounded Corners 6">
+            <a:extLst>
+              <a:ext uri="{FF2B5EF4-FFF2-40B4-BE49-F238E27FC236}">
+                <a16:creationId xmlns:a16="http://schemas.microsoft.com/office/drawing/2014/main" id="{0A728332-88F1-4444-B78A-AC9AAD642A20}"/>
               </a:ext>
             </a:extLst>
           </p:cNvPr>
@@ -5042,12 +4903,13 @@
         </p:nvSpPr>
         <p:spPr>
           <a:xfrm>
-            <a:off x="3553735" y="435617"/>
-            <a:ext cx="1434303" cy="1167475"/>
+            <a:off x="3331474" y="99389"/>
+            <a:ext cx="3651864" cy="1254228"/>
           </a:xfrm>
           <a:prstGeom prst="roundRect">
             <a:avLst/>
           </a:prstGeom>
+          <a:noFill/>
         </p:spPr>
         <p:style>
           <a:lnRef idx="2">
@@ -5068,19 +4930,16 @@
           <a:lstStyle/>
           <a:p>
             <a:pPr algn="ctr"/>
-            <a:r>
-              <a:rPr lang="en-NZ" sz="1000" dirty="0"/>
-              <a:t>on-line vehicle registration processing</a:t>
-            </a:r>
-          </a:p>
-        </p:txBody>
-      </p:sp>
-      <p:sp>
-        <p:nvSpPr>
-          <p:cNvPr id="28" name="Cylinder 27">
-            <a:extLst>
-              <a:ext uri="{FF2B5EF4-FFF2-40B4-BE49-F238E27FC236}">
-                <a16:creationId xmlns:a16="http://schemas.microsoft.com/office/drawing/2014/main" id="{714F6EB2-5CC5-434C-8D6B-295AAA78F885}"/>
+            <a:endParaRPr lang="en-NZ"/>
+          </a:p>
+        </p:txBody>
+      </p:sp>
+      <p:sp>
+        <p:nvSpPr>
+          <p:cNvPr id="51" name="Rectangle: Rounded Corners 50">
+            <a:extLst>
+              <a:ext uri="{FF2B5EF4-FFF2-40B4-BE49-F238E27FC236}">
+                <a16:creationId xmlns:a16="http://schemas.microsoft.com/office/drawing/2014/main" id="{F6468A72-DFEE-471C-8031-9E69F56BF132}"/>
               </a:ext>
             </a:extLst>
           </p:cNvPr>
@@ -5089,10 +4948,10 @@
         </p:nvSpPr>
         <p:spPr>
           <a:xfrm>
-            <a:off x="2237179" y="5677155"/>
-            <a:ext cx="1810456" cy="954157"/>
-          </a:xfrm>
-          <a:prstGeom prst="can">
+            <a:off x="3671377" y="3769338"/>
+            <a:ext cx="1050184" cy="685686"/>
+          </a:xfrm>
+          <a:prstGeom prst="roundRect">
             <a:avLst/>
           </a:prstGeom>
         </p:spPr>
@@ -5117,57 +4976,17 @@
             <a:pPr algn="ctr"/>
             <a:r>
               <a:rPr lang="en-NZ" sz="1000" dirty="0"/>
-              <a:t>Persist on-line vehicle registration</a:t>
-            </a:r>
-          </a:p>
-        </p:txBody>
-      </p:sp>
-      <p:cxnSp>
-        <p:nvCxnSpPr>
-          <p:cNvPr id="29" name="Straight Arrow Connector 28">
-            <a:extLst>
-              <a:ext uri="{FF2B5EF4-FFF2-40B4-BE49-F238E27FC236}">
-                <a16:creationId xmlns:a16="http://schemas.microsoft.com/office/drawing/2014/main" id="{18F82C3E-1396-4726-91E8-DB748C509F04}"/>
-              </a:ext>
-            </a:extLst>
-          </p:cNvPr>
-          <p:cNvCxnSpPr/>
-          <p:nvPr/>
-        </p:nvCxnSpPr>
-        <p:spPr>
-          <a:xfrm>
-            <a:off x="3139585" y="5364411"/>
-            <a:ext cx="2822" cy="312744"/>
-          </a:xfrm>
-          <a:prstGeom prst="straightConnector1">
-            <a:avLst/>
-          </a:prstGeom>
-          <a:ln>
-            <a:headEnd type="triangle"/>
-            <a:tailEnd type="triangle"/>
-          </a:ln>
-        </p:spPr>
-        <p:style>
-          <a:lnRef idx="1">
-            <a:schemeClr val="dk1"/>
-          </a:lnRef>
-          <a:fillRef idx="0">
-            <a:schemeClr val="dk1"/>
-          </a:fillRef>
-          <a:effectRef idx="0">
-            <a:schemeClr val="dk1"/>
-          </a:effectRef>
-          <a:fontRef idx="minor">
-            <a:schemeClr val="tx1"/>
-          </a:fontRef>
-        </p:style>
-      </p:cxnSp>
-      <p:sp>
-        <p:nvSpPr>
-          <p:cNvPr id="30" name="Rectangle: Rounded Corners 29">
-            <a:extLst>
-              <a:ext uri="{FF2B5EF4-FFF2-40B4-BE49-F238E27FC236}">
-                <a16:creationId xmlns:a16="http://schemas.microsoft.com/office/drawing/2014/main" id="{3770DC01-95D6-49E1-AA81-337766233B8A}"/>
+              <a:t>Authorising report requests</a:t>
+            </a:r>
+          </a:p>
+        </p:txBody>
+      </p:sp>
+      <p:sp>
+        <p:nvSpPr>
+          <p:cNvPr id="52" name="Rectangle: Rounded Corners 51">
+            <a:extLst>
+              <a:ext uri="{FF2B5EF4-FFF2-40B4-BE49-F238E27FC236}">
+                <a16:creationId xmlns:a16="http://schemas.microsoft.com/office/drawing/2014/main" id="{A7E794FA-DC36-4E66-9027-156E04102129}"/>
               </a:ext>
             </a:extLst>
           </p:cNvPr>
@@ -5176,12 +4995,13 @@
         </p:nvSpPr>
         <p:spPr>
           <a:xfrm>
-            <a:off x="3696555" y="3286539"/>
-            <a:ext cx="1065173" cy="737720"/>
+            <a:off x="3293762" y="1478248"/>
+            <a:ext cx="3232958" cy="777077"/>
           </a:xfrm>
           <a:prstGeom prst="roundRect">
             <a:avLst/>
           </a:prstGeom>
+          <a:noFill/>
         </p:spPr>
         <p:style>
           <a:lnRef idx="2">
@@ -5202,19 +5022,16 @@
           <a:lstStyle/>
           <a:p>
             <a:pPr algn="ctr"/>
-            <a:r>
-              <a:rPr lang="en-NZ" sz="1000" dirty="0"/>
-              <a:t>vehicle speed/location processing</a:t>
-            </a:r>
-          </a:p>
-        </p:txBody>
-      </p:sp>
-      <p:sp>
-        <p:nvSpPr>
-          <p:cNvPr id="31" name="Cylinder 30">
-            <a:extLst>
-              <a:ext uri="{FF2B5EF4-FFF2-40B4-BE49-F238E27FC236}">
-                <a16:creationId xmlns:a16="http://schemas.microsoft.com/office/drawing/2014/main" id="{9705FDCB-E83A-4CDE-9C03-F6EB10F182B0}"/>
+            <a:endParaRPr lang="en-NZ"/>
+          </a:p>
+        </p:txBody>
+      </p:sp>
+      <p:sp>
+        <p:nvSpPr>
+          <p:cNvPr id="53" name="Rectangle: Rounded Corners 52">
+            <a:extLst>
+              <a:ext uri="{FF2B5EF4-FFF2-40B4-BE49-F238E27FC236}">
+                <a16:creationId xmlns:a16="http://schemas.microsoft.com/office/drawing/2014/main" id="{067A43A6-A65F-422A-B957-64DF8665D0CF}"/>
               </a:ext>
             </a:extLst>
           </p:cNvPr>
@@ -5223,12 +5040,13 @@
         </p:nvSpPr>
         <p:spPr>
           <a:xfrm>
-            <a:off x="4138211" y="5549909"/>
-            <a:ext cx="1600200" cy="1172739"/>
-          </a:xfrm>
-          <a:prstGeom prst="can">
-            <a:avLst/>
-          </a:prstGeom>
+            <a:off x="3543405" y="2420019"/>
+            <a:ext cx="1377164" cy="1053859"/>
+          </a:xfrm>
+          <a:prstGeom prst="roundRect">
+            <a:avLst/>
+          </a:prstGeom>
+          <a:noFill/>
         </p:spPr>
         <p:style>
           <a:lnRef idx="2">
@@ -5249,219 +5067,16 @@
           <a:lstStyle/>
           <a:p>
             <a:pPr algn="ctr"/>
-            <a:r>
-              <a:rPr lang="en-NZ" sz="1000" dirty="0"/>
-              <a:t>Persist vehicle speed/location </a:t>
-            </a:r>
-          </a:p>
-        </p:txBody>
-      </p:sp>
-      <p:cxnSp>
-        <p:nvCxnSpPr>
-          <p:cNvPr id="32" name="Straight Arrow Connector 31">
-            <a:extLst>
-              <a:ext uri="{FF2B5EF4-FFF2-40B4-BE49-F238E27FC236}">
-                <a16:creationId xmlns:a16="http://schemas.microsoft.com/office/drawing/2014/main" id="{DDF94002-8DD6-44E2-8150-7B5BE8BC2CCA}"/>
-              </a:ext>
-            </a:extLst>
-          </p:cNvPr>
-          <p:cNvCxnSpPr/>
-          <p:nvPr/>
-        </p:nvCxnSpPr>
-        <p:spPr>
-          <a:xfrm>
-            <a:off x="4932313" y="5223105"/>
-            <a:ext cx="5998" cy="326804"/>
-          </a:xfrm>
-          <a:prstGeom prst="straightConnector1">
-            <a:avLst/>
-          </a:prstGeom>
-          <a:ln>
-            <a:headEnd type="triangle"/>
-            <a:tailEnd type="triangle"/>
-          </a:ln>
-        </p:spPr>
-        <p:style>
-          <a:lnRef idx="1">
-            <a:schemeClr val="dk1"/>
-          </a:lnRef>
-          <a:fillRef idx="0">
-            <a:schemeClr val="dk1"/>
-          </a:fillRef>
-          <a:effectRef idx="0">
-            <a:schemeClr val="dk1"/>
-          </a:effectRef>
-          <a:fontRef idx="minor">
-            <a:schemeClr val="tx1"/>
-          </a:fontRef>
-        </p:style>
-      </p:cxnSp>
-      <p:cxnSp>
-        <p:nvCxnSpPr>
-          <p:cNvPr id="33" name="Straight Arrow Connector 32">
-            <a:extLst>
-              <a:ext uri="{FF2B5EF4-FFF2-40B4-BE49-F238E27FC236}">
-                <a16:creationId xmlns:a16="http://schemas.microsoft.com/office/drawing/2014/main" id="{E6DECEFE-D6F1-4A77-9356-3A8913CBD604}"/>
-              </a:ext>
-            </a:extLst>
-          </p:cNvPr>
-          <p:cNvCxnSpPr/>
-          <p:nvPr/>
-        </p:nvCxnSpPr>
-        <p:spPr>
-          <a:xfrm flipH="1">
-            <a:off x="6024822" y="5232431"/>
-            <a:ext cx="335797" cy="652910"/>
-          </a:xfrm>
-          <a:prstGeom prst="straightConnector1">
-            <a:avLst/>
-          </a:prstGeom>
-          <a:ln>
-            <a:headEnd type="triangle"/>
-            <a:tailEnd type="triangle"/>
-          </a:ln>
-        </p:spPr>
-        <p:style>
-          <a:lnRef idx="1">
-            <a:schemeClr val="dk1"/>
-          </a:lnRef>
-          <a:fillRef idx="0">
-            <a:schemeClr val="dk1"/>
-          </a:fillRef>
-          <a:effectRef idx="0">
-            <a:schemeClr val="dk1"/>
-          </a:effectRef>
-          <a:fontRef idx="minor">
-            <a:schemeClr val="tx1"/>
-          </a:fontRef>
-        </p:style>
-      </p:cxnSp>
-      <p:cxnSp>
-        <p:nvCxnSpPr>
-          <p:cNvPr id="34" name="Straight Arrow Connector 33">
-            <a:extLst>
-              <a:ext uri="{FF2B5EF4-FFF2-40B4-BE49-F238E27FC236}">
-                <a16:creationId xmlns:a16="http://schemas.microsoft.com/office/drawing/2014/main" id="{4E1630EE-1519-4B21-A2B3-D33244925E20}"/>
-              </a:ext>
-            </a:extLst>
-          </p:cNvPr>
-          <p:cNvCxnSpPr/>
-          <p:nvPr/>
-        </p:nvCxnSpPr>
-        <p:spPr>
-          <a:xfrm>
-            <a:off x="6897332" y="5232431"/>
-            <a:ext cx="543815" cy="592190"/>
-          </a:xfrm>
-          <a:prstGeom prst="straightConnector1">
-            <a:avLst/>
-          </a:prstGeom>
-          <a:ln>
-            <a:headEnd type="triangle"/>
-            <a:tailEnd type="triangle"/>
-          </a:ln>
-        </p:spPr>
-        <p:style>
-          <a:lnRef idx="1">
-            <a:schemeClr val="dk1"/>
-          </a:lnRef>
-          <a:fillRef idx="0">
-            <a:schemeClr val="dk1"/>
-          </a:fillRef>
-          <a:effectRef idx="0">
-            <a:schemeClr val="dk1"/>
-          </a:effectRef>
-          <a:fontRef idx="minor">
-            <a:schemeClr val="tx1"/>
-          </a:fontRef>
-        </p:style>
-      </p:cxnSp>
-      <p:cxnSp>
-        <p:nvCxnSpPr>
-          <p:cNvPr id="35" name="Straight Arrow Connector 34">
-            <a:extLst>
-              <a:ext uri="{FF2B5EF4-FFF2-40B4-BE49-F238E27FC236}">
-                <a16:creationId xmlns:a16="http://schemas.microsoft.com/office/drawing/2014/main" id="{509E1A9B-4EAE-4C56-84B6-D9FB5EF50EE3}"/>
-              </a:ext>
-            </a:extLst>
-          </p:cNvPr>
-          <p:cNvCxnSpPr/>
-          <p:nvPr/>
-        </p:nvCxnSpPr>
-        <p:spPr>
-          <a:xfrm>
-            <a:off x="8753112" y="5223105"/>
-            <a:ext cx="0" cy="593459"/>
-          </a:xfrm>
-          <a:prstGeom prst="straightConnector1">
-            <a:avLst/>
-          </a:prstGeom>
-          <a:ln>
-            <a:headEnd type="triangle"/>
-            <a:tailEnd type="triangle"/>
-          </a:ln>
-        </p:spPr>
-        <p:style>
-          <a:lnRef idx="1">
-            <a:schemeClr val="dk1"/>
-          </a:lnRef>
-          <a:fillRef idx="0">
-            <a:schemeClr val="dk1"/>
-          </a:fillRef>
-          <a:effectRef idx="0">
-            <a:schemeClr val="dk1"/>
-          </a:effectRef>
-          <a:fontRef idx="minor">
-            <a:schemeClr val="tx1"/>
-          </a:fontRef>
-        </p:style>
-      </p:cxnSp>
-      <p:cxnSp>
-        <p:nvCxnSpPr>
-          <p:cNvPr id="36" name="Straight Arrow Connector 35">
-            <a:extLst>
-              <a:ext uri="{FF2B5EF4-FFF2-40B4-BE49-F238E27FC236}">
-                <a16:creationId xmlns:a16="http://schemas.microsoft.com/office/drawing/2014/main" id="{6A197BC6-4169-4074-B312-1F8BBB4DE0FB}"/>
-              </a:ext>
-            </a:extLst>
-          </p:cNvPr>
-          <p:cNvCxnSpPr/>
-          <p:nvPr/>
-        </p:nvCxnSpPr>
-        <p:spPr>
-          <a:xfrm flipH="1">
-            <a:off x="10537186" y="5071917"/>
-            <a:ext cx="293203" cy="752704"/>
-          </a:xfrm>
-          <a:prstGeom prst="straightConnector1">
-            <a:avLst/>
-          </a:prstGeom>
-          <a:ln>
-            <a:headEnd type="triangle"/>
-            <a:tailEnd type="triangle"/>
-          </a:ln>
-        </p:spPr>
-        <p:style>
-          <a:lnRef idx="1">
-            <a:schemeClr val="dk1"/>
-          </a:lnRef>
-          <a:fillRef idx="0">
-            <a:schemeClr val="dk1"/>
-          </a:fillRef>
-          <a:effectRef idx="0">
-            <a:schemeClr val="dk1"/>
-          </a:effectRef>
-          <a:fontRef idx="minor">
-            <a:schemeClr val="tx1"/>
-          </a:fontRef>
-        </p:style>
-      </p:cxnSp>
-      <p:sp>
-        <p:nvSpPr>
-          <p:cNvPr id="37" name="Cylinder 36">
-            <a:extLst>
-              <a:ext uri="{FF2B5EF4-FFF2-40B4-BE49-F238E27FC236}">
-                <a16:creationId xmlns:a16="http://schemas.microsoft.com/office/drawing/2014/main" id="{FB872D28-354F-44E7-A5FE-D52C1BAFD218}"/>
+            <a:endParaRPr lang="en-NZ"/>
+          </a:p>
+        </p:txBody>
+      </p:sp>
+      <p:sp>
+        <p:nvSpPr>
+          <p:cNvPr id="54" name="Rectangle: Rounded Corners 53">
+            <a:extLst>
+              <a:ext uri="{FF2B5EF4-FFF2-40B4-BE49-F238E27FC236}">
+                <a16:creationId xmlns:a16="http://schemas.microsoft.com/office/drawing/2014/main" id="{B38B3CDD-8B7F-43FB-A821-8A265B823F04}"/>
               </a:ext>
             </a:extLst>
           </p:cNvPr>
@@ -5470,451 +5085,7 @@
         </p:nvSpPr>
         <p:spPr>
           <a:xfrm>
-            <a:off x="10892395" y="6857764"/>
-            <a:ext cx="1476187" cy="1103962"/>
-          </a:xfrm>
-          <a:prstGeom prst="can">
-            <a:avLst/>
-          </a:prstGeom>
-        </p:spPr>
-        <p:style>
-          <a:lnRef idx="2">
-            <a:schemeClr val="dk1"/>
-          </a:lnRef>
-          <a:fillRef idx="1">
-            <a:schemeClr val="lt1"/>
-          </a:fillRef>
-          <a:effectRef idx="0">
-            <a:schemeClr val="dk1"/>
-          </a:effectRef>
-          <a:fontRef idx="minor">
-            <a:schemeClr val="dk1"/>
-          </a:fontRef>
-        </p:style>
-        <p:txBody>
-          <a:bodyPr rtlCol="0" anchor="ctr"/>
-          <a:lstStyle/>
-          <a:p>
-            <a:pPr algn="ctr"/>
-            <a:r>
-              <a:rPr lang="en-NZ" sz="1000" dirty="0"/>
-              <a:t>Generate unauthorised access report</a:t>
-            </a:r>
-          </a:p>
-        </p:txBody>
-      </p:sp>
-      <p:cxnSp>
-        <p:nvCxnSpPr>
-          <p:cNvPr id="38" name="Straight Arrow Connector 37">
-            <a:extLst>
-              <a:ext uri="{FF2B5EF4-FFF2-40B4-BE49-F238E27FC236}">
-                <a16:creationId xmlns:a16="http://schemas.microsoft.com/office/drawing/2014/main" id="{71CFD3D4-77AE-45D0-933D-80166B63C048}"/>
-              </a:ext>
-            </a:extLst>
-          </p:cNvPr>
-          <p:cNvCxnSpPr/>
-          <p:nvPr/>
-        </p:nvCxnSpPr>
-        <p:spPr>
-          <a:xfrm>
-            <a:off x="11524698" y="5071917"/>
-            <a:ext cx="105791" cy="1785847"/>
-          </a:xfrm>
-          <a:prstGeom prst="straightConnector1">
-            <a:avLst/>
-          </a:prstGeom>
-          <a:ln>
-            <a:headEnd type="triangle"/>
-            <a:tailEnd type="triangle"/>
-          </a:ln>
-        </p:spPr>
-        <p:style>
-          <a:lnRef idx="1">
-            <a:schemeClr val="dk1"/>
-          </a:lnRef>
-          <a:fillRef idx="0">
-            <a:schemeClr val="dk1"/>
-          </a:fillRef>
-          <a:effectRef idx="0">
-            <a:schemeClr val="dk1"/>
-          </a:effectRef>
-          <a:fontRef idx="minor">
-            <a:schemeClr val="tx1"/>
-          </a:fontRef>
-        </p:style>
-      </p:cxnSp>
-      <p:sp>
-        <p:nvSpPr>
-          <p:cNvPr id="43" name="TextBox 42">
-            <a:extLst>
-              <a:ext uri="{FF2B5EF4-FFF2-40B4-BE49-F238E27FC236}">
-                <a16:creationId xmlns:a16="http://schemas.microsoft.com/office/drawing/2014/main" id="{D3DD8D7A-BEF5-40E2-A523-BCACD95D38A5}"/>
-              </a:ext>
-            </a:extLst>
-          </p:cNvPr>
-          <p:cNvSpPr txBox="1"/>
-          <p:nvPr/>
-        </p:nvSpPr>
-        <p:spPr>
-          <a:xfrm>
-            <a:off x="1215586" y="5339848"/>
-            <a:ext cx="240672" cy="246221"/>
-          </a:xfrm>
-          <a:prstGeom prst="rect">
-            <a:avLst/>
-          </a:prstGeom>
-          <a:noFill/>
-        </p:spPr>
-        <p:txBody>
-          <a:bodyPr wrap="square" rtlCol="0">
-            <a:spAutoFit/>
-          </a:bodyPr>
-          <a:lstStyle/>
-          <a:p>
-            <a:r>
-              <a:rPr lang="en-NZ" sz="1000" dirty="0"/>
-              <a:t>1</a:t>
-            </a:r>
-          </a:p>
-        </p:txBody>
-      </p:sp>
-      <p:sp>
-        <p:nvSpPr>
-          <p:cNvPr id="44" name="TextBox 43">
-            <a:extLst>
-              <a:ext uri="{FF2B5EF4-FFF2-40B4-BE49-F238E27FC236}">
-                <a16:creationId xmlns:a16="http://schemas.microsoft.com/office/drawing/2014/main" id="{292981E6-788F-4D31-AB5C-EF6D3C953067}"/>
-              </a:ext>
-            </a:extLst>
-          </p:cNvPr>
-          <p:cNvSpPr txBox="1"/>
-          <p:nvPr/>
-        </p:nvSpPr>
-        <p:spPr>
-          <a:xfrm>
-            <a:off x="3114885" y="5377595"/>
-            <a:ext cx="240672" cy="246221"/>
-          </a:xfrm>
-          <a:prstGeom prst="rect">
-            <a:avLst/>
-          </a:prstGeom>
-          <a:noFill/>
-        </p:spPr>
-        <p:txBody>
-          <a:bodyPr wrap="square" rtlCol="0">
-            <a:spAutoFit/>
-          </a:bodyPr>
-          <a:lstStyle/>
-          <a:p>
-            <a:r>
-              <a:rPr lang="en-NZ" sz="1000" dirty="0"/>
-              <a:t>1</a:t>
-            </a:r>
-          </a:p>
-        </p:txBody>
-      </p:sp>
-      <p:sp>
-        <p:nvSpPr>
-          <p:cNvPr id="45" name="TextBox 44">
-            <a:extLst>
-              <a:ext uri="{FF2B5EF4-FFF2-40B4-BE49-F238E27FC236}">
-                <a16:creationId xmlns:a16="http://schemas.microsoft.com/office/drawing/2014/main" id="{00E2CE9B-4A6B-4068-8595-FFCE0CA841CE}"/>
-              </a:ext>
-            </a:extLst>
-          </p:cNvPr>
-          <p:cNvSpPr txBox="1"/>
-          <p:nvPr/>
-        </p:nvSpPr>
-        <p:spPr>
-          <a:xfrm>
-            <a:off x="4923301" y="5288271"/>
-            <a:ext cx="240672" cy="246221"/>
-          </a:xfrm>
-          <a:prstGeom prst="rect">
-            <a:avLst/>
-          </a:prstGeom>
-          <a:noFill/>
-        </p:spPr>
-        <p:txBody>
-          <a:bodyPr wrap="square" rtlCol="0">
-            <a:spAutoFit/>
-          </a:bodyPr>
-          <a:lstStyle/>
-          <a:p>
-            <a:r>
-              <a:rPr lang="en-NZ" sz="1000" dirty="0"/>
-              <a:t>1</a:t>
-            </a:r>
-          </a:p>
-        </p:txBody>
-      </p:sp>
-      <p:sp>
-        <p:nvSpPr>
-          <p:cNvPr id="46" name="TextBox 45">
-            <a:extLst>
-              <a:ext uri="{FF2B5EF4-FFF2-40B4-BE49-F238E27FC236}">
-                <a16:creationId xmlns:a16="http://schemas.microsoft.com/office/drawing/2014/main" id="{40682D33-04C2-4568-8D7C-4CEF16742978}"/>
-              </a:ext>
-            </a:extLst>
-          </p:cNvPr>
-          <p:cNvSpPr txBox="1"/>
-          <p:nvPr/>
-        </p:nvSpPr>
-        <p:spPr>
-          <a:xfrm>
-            <a:off x="10537186" y="5562261"/>
-            <a:ext cx="240672" cy="246221"/>
-          </a:xfrm>
-          <a:prstGeom prst="rect">
-            <a:avLst/>
-          </a:prstGeom>
-          <a:noFill/>
-        </p:spPr>
-        <p:txBody>
-          <a:bodyPr wrap="square" rtlCol="0">
-            <a:spAutoFit/>
-          </a:bodyPr>
-          <a:lstStyle/>
-          <a:p>
-            <a:r>
-              <a:rPr lang="en-NZ" sz="1000" dirty="0"/>
-              <a:t>1</a:t>
-            </a:r>
-          </a:p>
-        </p:txBody>
-      </p:sp>
-      <p:sp>
-        <p:nvSpPr>
-          <p:cNvPr id="47" name="TextBox 46">
-            <a:extLst>
-              <a:ext uri="{FF2B5EF4-FFF2-40B4-BE49-F238E27FC236}">
-                <a16:creationId xmlns:a16="http://schemas.microsoft.com/office/drawing/2014/main" id="{8CE72514-EF55-4AF4-A41A-EBB585AF0AB8}"/>
-              </a:ext>
-            </a:extLst>
-          </p:cNvPr>
-          <p:cNvSpPr txBox="1"/>
-          <p:nvPr/>
-        </p:nvSpPr>
-        <p:spPr>
-          <a:xfrm>
-            <a:off x="8761984" y="5542000"/>
-            <a:ext cx="240672" cy="246221"/>
-          </a:xfrm>
-          <a:prstGeom prst="rect">
-            <a:avLst/>
-          </a:prstGeom>
-          <a:noFill/>
-        </p:spPr>
-        <p:txBody>
-          <a:bodyPr wrap="square" rtlCol="0">
-            <a:spAutoFit/>
-          </a:bodyPr>
-          <a:lstStyle/>
-          <a:p>
-            <a:r>
-              <a:rPr lang="en-NZ" sz="1000" dirty="0"/>
-              <a:t>1</a:t>
-            </a:r>
-          </a:p>
-        </p:txBody>
-      </p:sp>
-      <p:sp>
-        <p:nvSpPr>
-          <p:cNvPr id="7" name="Rectangle: Rounded Corners 6">
-            <a:extLst>
-              <a:ext uri="{FF2B5EF4-FFF2-40B4-BE49-F238E27FC236}">
-                <a16:creationId xmlns:a16="http://schemas.microsoft.com/office/drawing/2014/main" id="{0A728332-88F1-4444-B78A-AC9AAD642A20}"/>
-              </a:ext>
-            </a:extLst>
-          </p:cNvPr>
-          <p:cNvSpPr/>
-          <p:nvPr/>
-        </p:nvSpPr>
-        <p:spPr>
-          <a:xfrm>
-            <a:off x="3305543" y="337847"/>
-            <a:ext cx="1873369" cy="2717517"/>
-          </a:xfrm>
-          <a:prstGeom prst="roundRect">
-            <a:avLst/>
-          </a:prstGeom>
-          <a:noFill/>
-        </p:spPr>
-        <p:style>
-          <a:lnRef idx="2">
-            <a:schemeClr val="dk1"/>
-          </a:lnRef>
-          <a:fillRef idx="1">
-            <a:schemeClr val="lt1"/>
-          </a:fillRef>
-          <a:effectRef idx="0">
-            <a:schemeClr val="dk1"/>
-          </a:effectRef>
-          <a:fontRef idx="minor">
-            <a:schemeClr val="dk1"/>
-          </a:fontRef>
-        </p:style>
-        <p:txBody>
-          <a:bodyPr rtlCol="0" anchor="ctr"/>
-          <a:lstStyle/>
-          <a:p>
-            <a:pPr algn="ctr"/>
-            <a:endParaRPr lang="en-NZ"/>
-          </a:p>
-        </p:txBody>
-      </p:sp>
-      <p:sp>
-        <p:nvSpPr>
-          <p:cNvPr id="51" name="Rectangle: Rounded Corners 50">
-            <a:extLst>
-              <a:ext uri="{FF2B5EF4-FFF2-40B4-BE49-F238E27FC236}">
-                <a16:creationId xmlns:a16="http://schemas.microsoft.com/office/drawing/2014/main" id="{F6468A72-DFEE-471C-8031-9E69F56BF132}"/>
-              </a:ext>
-            </a:extLst>
-          </p:cNvPr>
-          <p:cNvSpPr/>
-          <p:nvPr/>
-        </p:nvSpPr>
-        <p:spPr>
-          <a:xfrm>
-            <a:off x="6690978" y="3286539"/>
-            <a:ext cx="1050184" cy="685686"/>
-          </a:xfrm>
-          <a:prstGeom prst="roundRect">
-            <a:avLst/>
-          </a:prstGeom>
-        </p:spPr>
-        <p:style>
-          <a:lnRef idx="2">
-            <a:schemeClr val="dk1"/>
-          </a:lnRef>
-          <a:fillRef idx="1">
-            <a:schemeClr val="lt1"/>
-          </a:fillRef>
-          <a:effectRef idx="0">
-            <a:schemeClr val="dk1"/>
-          </a:effectRef>
-          <a:fontRef idx="minor">
-            <a:schemeClr val="dk1"/>
-          </a:fontRef>
-        </p:style>
-        <p:txBody>
-          <a:bodyPr rtlCol="0" anchor="ctr"/>
-          <a:lstStyle/>
-          <a:p>
-            <a:pPr algn="ctr"/>
-            <a:r>
-              <a:rPr lang="en-NZ" sz="1000" dirty="0"/>
-              <a:t>Authorising report requests</a:t>
-            </a:r>
-          </a:p>
-        </p:txBody>
-      </p:sp>
-      <p:sp>
-        <p:nvSpPr>
-          <p:cNvPr id="52" name="Rectangle: Rounded Corners 51">
-            <a:extLst>
-              <a:ext uri="{FF2B5EF4-FFF2-40B4-BE49-F238E27FC236}">
-                <a16:creationId xmlns:a16="http://schemas.microsoft.com/office/drawing/2014/main" id="{A7E794FA-DC36-4E66-9027-156E04102129}"/>
-              </a:ext>
-            </a:extLst>
-          </p:cNvPr>
-          <p:cNvSpPr/>
-          <p:nvPr/>
-        </p:nvSpPr>
-        <p:spPr>
-          <a:xfrm>
-            <a:off x="3603173" y="3189421"/>
-            <a:ext cx="1377164" cy="1647634"/>
-          </a:xfrm>
-          <a:prstGeom prst="roundRect">
-            <a:avLst/>
-          </a:prstGeom>
-          <a:noFill/>
-        </p:spPr>
-        <p:style>
-          <a:lnRef idx="2">
-            <a:schemeClr val="dk1"/>
-          </a:lnRef>
-          <a:fillRef idx="1">
-            <a:schemeClr val="lt1"/>
-          </a:fillRef>
-          <a:effectRef idx="0">
-            <a:schemeClr val="dk1"/>
-          </a:effectRef>
-          <a:fontRef idx="minor">
-            <a:schemeClr val="dk1"/>
-          </a:fontRef>
-        </p:style>
-        <p:txBody>
-          <a:bodyPr rtlCol="0" anchor="ctr"/>
-          <a:lstStyle/>
-          <a:p>
-            <a:pPr algn="ctr"/>
-            <a:endParaRPr lang="en-NZ"/>
-          </a:p>
-        </p:txBody>
-      </p:sp>
-      <p:sp>
-        <p:nvSpPr>
-          <p:cNvPr id="53" name="Rectangle: Rounded Corners 52">
-            <a:extLst>
-              <a:ext uri="{FF2B5EF4-FFF2-40B4-BE49-F238E27FC236}">
-                <a16:creationId xmlns:a16="http://schemas.microsoft.com/office/drawing/2014/main" id="{067A43A6-A65F-422A-B957-64DF8665D0CF}"/>
-              </a:ext>
-            </a:extLst>
-          </p:cNvPr>
-          <p:cNvSpPr/>
-          <p:nvPr/>
-        </p:nvSpPr>
-        <p:spPr>
-          <a:xfrm>
-            <a:off x="5132729" y="3241455"/>
-            <a:ext cx="1377164" cy="1053859"/>
-          </a:xfrm>
-          <a:prstGeom prst="roundRect">
-            <a:avLst/>
-          </a:prstGeom>
-          <a:noFill/>
-        </p:spPr>
-        <p:style>
-          <a:lnRef idx="2">
-            <a:schemeClr val="dk1"/>
-          </a:lnRef>
-          <a:fillRef idx="1">
-            <a:schemeClr val="lt1"/>
-          </a:fillRef>
-          <a:effectRef idx="0">
-            <a:schemeClr val="dk1"/>
-          </a:effectRef>
-          <a:fontRef idx="minor">
-            <a:schemeClr val="dk1"/>
-          </a:fontRef>
-        </p:style>
-        <p:txBody>
-          <a:bodyPr rtlCol="0" anchor="ctr"/>
-          <a:lstStyle/>
-          <a:p>
-            <a:pPr algn="ctr"/>
-            <a:endParaRPr lang="en-NZ"/>
-          </a:p>
-        </p:txBody>
-      </p:sp>
-      <p:sp>
-        <p:nvSpPr>
-          <p:cNvPr id="54" name="Rectangle: Rounded Corners 53">
-            <a:extLst>
-              <a:ext uri="{FF2B5EF4-FFF2-40B4-BE49-F238E27FC236}">
-                <a16:creationId xmlns:a16="http://schemas.microsoft.com/office/drawing/2014/main" id="{B38B3CDD-8B7F-43FB-A821-8A265B823F04}"/>
-              </a:ext>
-            </a:extLst>
-          </p:cNvPr>
-          <p:cNvSpPr/>
-          <p:nvPr/>
-        </p:nvSpPr>
-        <p:spPr>
-          <a:xfrm>
-            <a:off x="6544919" y="3188536"/>
+            <a:off x="3525318" y="3671335"/>
             <a:ext cx="1377164" cy="1053859"/>
           </a:xfrm>
           <a:prstGeom prst="roundRect">
@@ -5960,7 +5131,7 @@
         <p:grpSpPr>
           <a:xfrm>
             <a:off x="10217012" y="198783"/>
-            <a:ext cx="1714453" cy="1544778"/>
+            <a:ext cx="1714453" cy="1440000"/>
             <a:chOff x="10217012" y="198783"/>
             <a:chExt cx="1714453" cy="1544778"/>
           </a:xfrm>
@@ -6024,6 +5195,1060 @@
           </p:spPr>
         </p:pic>
       </p:grpSp>
+      <p:sp>
+        <p:nvSpPr>
+          <p:cNvPr id="57" name="TextBox 56">
+            <a:extLst>
+              <a:ext uri="{FF2B5EF4-FFF2-40B4-BE49-F238E27FC236}">
+                <a16:creationId xmlns:a16="http://schemas.microsoft.com/office/drawing/2014/main" id="{E0F686E4-EB15-498C-9601-BAC4B32493F5}"/>
+              </a:ext>
+            </a:extLst>
+          </p:cNvPr>
+          <p:cNvSpPr txBox="1"/>
+          <p:nvPr/>
+        </p:nvSpPr>
+        <p:spPr>
+          <a:xfrm>
+            <a:off x="3603173" y="99389"/>
+            <a:ext cx="1320128" cy="246221"/>
+          </a:xfrm>
+          <a:prstGeom prst="rect">
+            <a:avLst/>
+          </a:prstGeom>
+          <a:noFill/>
+        </p:spPr>
+        <p:txBody>
+          <a:bodyPr wrap="square" rtlCol="0">
+            <a:spAutoFit/>
+          </a:bodyPr>
+          <a:lstStyle/>
+          <a:p>
+            <a:r>
+              <a:rPr lang="en-NZ" sz="1000" dirty="0"/>
+              <a:t>Host</a:t>
+            </a:r>
+          </a:p>
+        </p:txBody>
+      </p:sp>
+      <p:sp>
+        <p:nvSpPr>
+          <p:cNvPr id="58" name="Rectangle: Rounded Corners 57">
+            <a:extLst>
+              <a:ext uri="{FF2B5EF4-FFF2-40B4-BE49-F238E27FC236}">
+                <a16:creationId xmlns:a16="http://schemas.microsoft.com/office/drawing/2014/main" id="{08089FFB-7A17-4943-B6F7-DE15E9E43745}"/>
+              </a:ext>
+            </a:extLst>
+          </p:cNvPr>
+          <p:cNvSpPr/>
+          <p:nvPr/>
+        </p:nvSpPr>
+        <p:spPr>
+          <a:xfrm>
+            <a:off x="3554784" y="4971112"/>
+            <a:ext cx="1433254" cy="1340236"/>
+          </a:xfrm>
+          <a:prstGeom prst="roundRect">
+            <a:avLst/>
+          </a:prstGeom>
+          <a:noFill/>
+        </p:spPr>
+        <p:style>
+          <a:lnRef idx="2">
+            <a:schemeClr val="dk1"/>
+          </a:lnRef>
+          <a:fillRef idx="1">
+            <a:schemeClr val="lt1"/>
+          </a:fillRef>
+          <a:effectRef idx="0">
+            <a:schemeClr val="dk1"/>
+          </a:effectRef>
+          <a:fontRef idx="minor">
+            <a:schemeClr val="dk1"/>
+          </a:fontRef>
+        </p:style>
+        <p:txBody>
+          <a:bodyPr rtlCol="0" anchor="ctr"/>
+          <a:lstStyle/>
+          <a:p>
+            <a:pPr algn="ctr"/>
+            <a:endParaRPr lang="en-NZ"/>
+          </a:p>
+        </p:txBody>
+      </p:sp>
+      <p:sp>
+        <p:nvSpPr>
+          <p:cNvPr id="59" name="Cylinder 58">
+            <a:extLst>
+              <a:ext uri="{FF2B5EF4-FFF2-40B4-BE49-F238E27FC236}">
+                <a16:creationId xmlns:a16="http://schemas.microsoft.com/office/drawing/2014/main" id="{999622D0-9857-4298-A154-1501EAF1343C}"/>
+              </a:ext>
+            </a:extLst>
+          </p:cNvPr>
+          <p:cNvSpPr/>
+          <p:nvPr/>
+        </p:nvSpPr>
+        <p:spPr>
+          <a:xfrm>
+            <a:off x="8572243" y="311103"/>
+            <a:ext cx="1395918" cy="500536"/>
+          </a:xfrm>
+          <a:prstGeom prst="can">
+            <a:avLst/>
+          </a:prstGeom>
+        </p:spPr>
+        <p:style>
+          <a:lnRef idx="2">
+            <a:schemeClr val="dk1"/>
+          </a:lnRef>
+          <a:fillRef idx="1">
+            <a:schemeClr val="lt1"/>
+          </a:fillRef>
+          <a:effectRef idx="0">
+            <a:schemeClr val="dk1"/>
+          </a:effectRef>
+          <a:fontRef idx="minor">
+            <a:schemeClr val="dk1"/>
+          </a:fontRef>
+        </p:style>
+        <p:txBody>
+          <a:bodyPr rtlCol="0" anchor="ctr"/>
+          <a:lstStyle/>
+          <a:p>
+            <a:pPr algn="ctr"/>
+            <a:r>
+              <a:rPr lang="en-NZ" sz="1000" dirty="0"/>
+              <a:t>On-line driver registration DB</a:t>
+            </a:r>
+          </a:p>
+        </p:txBody>
+      </p:sp>
+      <p:sp>
+        <p:nvSpPr>
+          <p:cNvPr id="62" name="Cylinder 61">
+            <a:extLst>
+              <a:ext uri="{FF2B5EF4-FFF2-40B4-BE49-F238E27FC236}">
+                <a16:creationId xmlns:a16="http://schemas.microsoft.com/office/drawing/2014/main" id="{5BE43B2C-AAD1-43EE-9E8B-5C129338DB28}"/>
+              </a:ext>
+            </a:extLst>
+          </p:cNvPr>
+          <p:cNvSpPr/>
+          <p:nvPr/>
+        </p:nvSpPr>
+        <p:spPr>
+          <a:xfrm>
+            <a:off x="8630501" y="1603933"/>
+            <a:ext cx="1395918" cy="748049"/>
+          </a:xfrm>
+          <a:prstGeom prst="can">
+            <a:avLst/>
+          </a:prstGeom>
+        </p:spPr>
+        <p:style>
+          <a:lnRef idx="2">
+            <a:schemeClr val="dk1"/>
+          </a:lnRef>
+          <a:fillRef idx="1">
+            <a:schemeClr val="lt1"/>
+          </a:fillRef>
+          <a:effectRef idx="0">
+            <a:schemeClr val="dk1"/>
+          </a:effectRef>
+          <a:fontRef idx="minor">
+            <a:schemeClr val="dk1"/>
+          </a:fontRef>
+        </p:style>
+        <p:txBody>
+          <a:bodyPr rtlCol="0" anchor="ctr"/>
+          <a:lstStyle/>
+          <a:p>
+            <a:pPr algn="ctr"/>
+            <a:r>
+              <a:rPr lang="en-NZ" sz="1000" dirty="0"/>
+              <a:t>On-line vehicle registration DB</a:t>
+            </a:r>
+          </a:p>
+        </p:txBody>
+      </p:sp>
+      <p:sp>
+        <p:nvSpPr>
+          <p:cNvPr id="63" name="Cylinder 62">
+            <a:extLst>
+              <a:ext uri="{FF2B5EF4-FFF2-40B4-BE49-F238E27FC236}">
+                <a16:creationId xmlns:a16="http://schemas.microsoft.com/office/drawing/2014/main" id="{B7386CF8-6959-4C4C-B48C-40918CD25FF2}"/>
+              </a:ext>
+            </a:extLst>
+          </p:cNvPr>
+          <p:cNvSpPr/>
+          <p:nvPr/>
+        </p:nvSpPr>
+        <p:spPr>
+          <a:xfrm>
+            <a:off x="8613174" y="2888531"/>
+            <a:ext cx="1360151" cy="737062"/>
+          </a:xfrm>
+          <a:prstGeom prst="can">
+            <a:avLst/>
+          </a:prstGeom>
+        </p:spPr>
+        <p:style>
+          <a:lnRef idx="2">
+            <a:schemeClr val="dk1"/>
+          </a:lnRef>
+          <a:fillRef idx="1">
+            <a:schemeClr val="lt1"/>
+          </a:fillRef>
+          <a:effectRef idx="0">
+            <a:schemeClr val="dk1"/>
+          </a:effectRef>
+          <a:fontRef idx="minor">
+            <a:schemeClr val="dk1"/>
+          </a:fontRef>
+        </p:style>
+        <p:txBody>
+          <a:bodyPr rtlCol="0" anchor="ctr"/>
+          <a:lstStyle/>
+          <a:p>
+            <a:pPr algn="ctr"/>
+            <a:r>
+              <a:rPr lang="en-NZ" sz="1000" dirty="0"/>
+              <a:t>Vehicle speed/location DB</a:t>
+            </a:r>
+          </a:p>
+        </p:txBody>
+      </p:sp>
+      <p:sp>
+        <p:nvSpPr>
+          <p:cNvPr id="64" name="TextBox 63">
+            <a:extLst>
+              <a:ext uri="{FF2B5EF4-FFF2-40B4-BE49-F238E27FC236}">
+                <a16:creationId xmlns:a16="http://schemas.microsoft.com/office/drawing/2014/main" id="{EA15A9C3-42AA-43C4-826A-B432969F7F48}"/>
+              </a:ext>
+            </a:extLst>
+          </p:cNvPr>
+          <p:cNvSpPr txBox="1"/>
+          <p:nvPr/>
+        </p:nvSpPr>
+        <p:spPr>
+          <a:xfrm>
+            <a:off x="3785014" y="3401165"/>
+            <a:ext cx="1320128" cy="246221"/>
+          </a:xfrm>
+          <a:prstGeom prst="rect">
+            <a:avLst/>
+          </a:prstGeom>
+          <a:noFill/>
+        </p:spPr>
+        <p:txBody>
+          <a:bodyPr wrap="square" rtlCol="0">
+            <a:spAutoFit/>
+          </a:bodyPr>
+          <a:lstStyle/>
+          <a:p>
+            <a:r>
+              <a:rPr lang="en-NZ" sz="1000" dirty="0"/>
+              <a:t>Host</a:t>
+            </a:r>
+          </a:p>
+        </p:txBody>
+      </p:sp>
+      <p:sp>
+        <p:nvSpPr>
+          <p:cNvPr id="65" name="TextBox 64">
+            <a:extLst>
+              <a:ext uri="{FF2B5EF4-FFF2-40B4-BE49-F238E27FC236}">
+                <a16:creationId xmlns:a16="http://schemas.microsoft.com/office/drawing/2014/main" id="{A2F39D78-ABAE-4CB5-BA5D-268937F85DC1}"/>
+              </a:ext>
+            </a:extLst>
+          </p:cNvPr>
+          <p:cNvSpPr txBox="1"/>
+          <p:nvPr/>
+        </p:nvSpPr>
+        <p:spPr>
+          <a:xfrm>
+            <a:off x="3711096" y="2222445"/>
+            <a:ext cx="1320128" cy="246221"/>
+          </a:xfrm>
+          <a:prstGeom prst="rect">
+            <a:avLst/>
+          </a:prstGeom>
+          <a:noFill/>
+        </p:spPr>
+        <p:txBody>
+          <a:bodyPr wrap="square" rtlCol="0">
+            <a:spAutoFit/>
+          </a:bodyPr>
+          <a:lstStyle/>
+          <a:p>
+            <a:r>
+              <a:rPr lang="en-NZ" sz="1000" dirty="0"/>
+              <a:t>Host</a:t>
+            </a:r>
+          </a:p>
+        </p:txBody>
+      </p:sp>
+      <p:sp>
+        <p:nvSpPr>
+          <p:cNvPr id="66" name="TextBox 65">
+            <a:extLst>
+              <a:ext uri="{FF2B5EF4-FFF2-40B4-BE49-F238E27FC236}">
+                <a16:creationId xmlns:a16="http://schemas.microsoft.com/office/drawing/2014/main" id="{404CBD22-7F1A-4E37-B07A-A68E2A05744F}"/>
+              </a:ext>
+            </a:extLst>
+          </p:cNvPr>
+          <p:cNvSpPr txBox="1"/>
+          <p:nvPr/>
+        </p:nvSpPr>
+        <p:spPr>
+          <a:xfrm>
+            <a:off x="3627501" y="4753240"/>
+            <a:ext cx="1320128" cy="246221"/>
+          </a:xfrm>
+          <a:prstGeom prst="rect">
+            <a:avLst/>
+          </a:prstGeom>
+          <a:noFill/>
+        </p:spPr>
+        <p:txBody>
+          <a:bodyPr wrap="square" rtlCol="0">
+            <a:spAutoFit/>
+          </a:bodyPr>
+          <a:lstStyle/>
+          <a:p>
+            <a:r>
+              <a:rPr lang="en-NZ" sz="1000" dirty="0"/>
+              <a:t>Host</a:t>
+            </a:r>
+          </a:p>
+        </p:txBody>
+      </p:sp>
+      <p:sp>
+        <p:nvSpPr>
+          <p:cNvPr id="67" name="TextBox 66">
+            <a:extLst>
+              <a:ext uri="{FF2B5EF4-FFF2-40B4-BE49-F238E27FC236}">
+                <a16:creationId xmlns:a16="http://schemas.microsoft.com/office/drawing/2014/main" id="{E936198F-9009-4054-ADD6-209F01CC1D0D}"/>
+              </a:ext>
+            </a:extLst>
+          </p:cNvPr>
+          <p:cNvSpPr txBox="1"/>
+          <p:nvPr/>
+        </p:nvSpPr>
+        <p:spPr>
+          <a:xfrm>
+            <a:off x="5850813" y="1605431"/>
+            <a:ext cx="1320128" cy="246221"/>
+          </a:xfrm>
+          <a:prstGeom prst="rect">
+            <a:avLst/>
+          </a:prstGeom>
+          <a:noFill/>
+        </p:spPr>
+        <p:txBody>
+          <a:bodyPr wrap="square" rtlCol="0">
+            <a:spAutoFit/>
+          </a:bodyPr>
+          <a:lstStyle/>
+          <a:p>
+            <a:r>
+              <a:rPr lang="en-NZ" sz="1000" dirty="0"/>
+              <a:t>Host</a:t>
+            </a:r>
+          </a:p>
+        </p:txBody>
+      </p:sp>
+      <p:cxnSp>
+        <p:nvCxnSpPr>
+          <p:cNvPr id="69" name="Straight Arrow Connector 68">
+            <a:extLst>
+              <a:ext uri="{FF2B5EF4-FFF2-40B4-BE49-F238E27FC236}">
+                <a16:creationId xmlns:a16="http://schemas.microsoft.com/office/drawing/2014/main" id="{5293EAB7-A2EC-435A-8F9C-342621DB30E6}"/>
+              </a:ext>
+            </a:extLst>
+          </p:cNvPr>
+          <p:cNvCxnSpPr>
+            <a:cxnSpLocks/>
+            <a:endCxn id="7" idx="1"/>
+          </p:cNvCxnSpPr>
+          <p:nvPr/>
+        </p:nvCxnSpPr>
+        <p:spPr>
+          <a:xfrm>
+            <a:off x="2765767" y="726503"/>
+            <a:ext cx="565707" cy="0"/>
+          </a:xfrm>
+          <a:prstGeom prst="straightConnector1">
+            <a:avLst/>
+          </a:prstGeom>
+          <a:ln>
+            <a:headEnd type="triangle"/>
+            <a:tailEnd type="triangle"/>
+          </a:ln>
+        </p:spPr>
+        <p:style>
+          <a:lnRef idx="1">
+            <a:schemeClr val="dk1"/>
+          </a:lnRef>
+          <a:fillRef idx="0">
+            <a:schemeClr val="dk1"/>
+          </a:fillRef>
+          <a:effectRef idx="0">
+            <a:schemeClr val="dk1"/>
+          </a:effectRef>
+          <a:fontRef idx="minor">
+            <a:schemeClr val="tx1"/>
+          </a:fontRef>
+        </p:style>
+      </p:cxnSp>
+      <p:cxnSp>
+        <p:nvCxnSpPr>
+          <p:cNvPr id="76" name="Straight Arrow Connector 75">
+            <a:extLst>
+              <a:ext uri="{FF2B5EF4-FFF2-40B4-BE49-F238E27FC236}">
+                <a16:creationId xmlns:a16="http://schemas.microsoft.com/office/drawing/2014/main" id="{B8F1BF58-5B57-480A-8CF1-06A553124FBD}"/>
+              </a:ext>
+            </a:extLst>
+          </p:cNvPr>
+          <p:cNvCxnSpPr>
+            <a:endCxn id="52" idx="1"/>
+          </p:cNvCxnSpPr>
+          <p:nvPr/>
+        </p:nvCxnSpPr>
+        <p:spPr>
+          <a:xfrm>
+            <a:off x="2765767" y="1866786"/>
+            <a:ext cx="527995" cy="1"/>
+          </a:xfrm>
+          <a:prstGeom prst="straightConnector1">
+            <a:avLst/>
+          </a:prstGeom>
+          <a:ln>
+            <a:headEnd type="triangle"/>
+            <a:tailEnd type="triangle"/>
+          </a:ln>
+        </p:spPr>
+        <p:style>
+          <a:lnRef idx="1">
+            <a:schemeClr val="dk1"/>
+          </a:lnRef>
+          <a:fillRef idx="0">
+            <a:schemeClr val="dk1"/>
+          </a:fillRef>
+          <a:effectRef idx="0">
+            <a:schemeClr val="dk1"/>
+          </a:effectRef>
+          <a:fontRef idx="minor">
+            <a:schemeClr val="tx1"/>
+          </a:fontRef>
+        </p:style>
+      </p:cxnSp>
+      <p:cxnSp>
+        <p:nvCxnSpPr>
+          <p:cNvPr id="78" name="Straight Arrow Connector 77">
+            <a:extLst>
+              <a:ext uri="{FF2B5EF4-FFF2-40B4-BE49-F238E27FC236}">
+                <a16:creationId xmlns:a16="http://schemas.microsoft.com/office/drawing/2014/main" id="{67A365AD-F72A-4A7E-B79D-997F818C4401}"/>
+              </a:ext>
+            </a:extLst>
+          </p:cNvPr>
+          <p:cNvCxnSpPr/>
+          <p:nvPr/>
+        </p:nvCxnSpPr>
+        <p:spPr>
+          <a:xfrm>
+            <a:off x="2765767" y="2753139"/>
+            <a:ext cx="777638" cy="0"/>
+          </a:xfrm>
+          <a:prstGeom prst="straightConnector1">
+            <a:avLst/>
+          </a:prstGeom>
+          <a:ln>
+            <a:headEnd type="triangle"/>
+            <a:tailEnd type="triangle"/>
+          </a:ln>
+        </p:spPr>
+        <p:style>
+          <a:lnRef idx="1">
+            <a:schemeClr val="dk1"/>
+          </a:lnRef>
+          <a:fillRef idx="0">
+            <a:schemeClr val="dk1"/>
+          </a:fillRef>
+          <a:effectRef idx="0">
+            <a:schemeClr val="dk1"/>
+          </a:effectRef>
+          <a:fontRef idx="minor">
+            <a:schemeClr val="tx1"/>
+          </a:fontRef>
+        </p:style>
+      </p:cxnSp>
+      <p:cxnSp>
+        <p:nvCxnSpPr>
+          <p:cNvPr id="80" name="Straight Arrow Connector 79">
+            <a:extLst>
+              <a:ext uri="{FF2B5EF4-FFF2-40B4-BE49-F238E27FC236}">
+                <a16:creationId xmlns:a16="http://schemas.microsoft.com/office/drawing/2014/main" id="{573D1C30-481F-4E5E-B102-68EFF3F1DF69}"/>
+              </a:ext>
+            </a:extLst>
+          </p:cNvPr>
+          <p:cNvCxnSpPr>
+            <a:endCxn id="54" idx="1"/>
+          </p:cNvCxnSpPr>
+          <p:nvPr/>
+        </p:nvCxnSpPr>
+        <p:spPr>
+          <a:xfrm>
+            <a:off x="2765767" y="4198264"/>
+            <a:ext cx="759551" cy="1"/>
+          </a:xfrm>
+          <a:prstGeom prst="straightConnector1">
+            <a:avLst/>
+          </a:prstGeom>
+          <a:ln>
+            <a:headEnd type="triangle"/>
+            <a:tailEnd type="triangle"/>
+          </a:ln>
+        </p:spPr>
+        <p:style>
+          <a:lnRef idx="1">
+            <a:schemeClr val="dk1"/>
+          </a:lnRef>
+          <a:fillRef idx="0">
+            <a:schemeClr val="dk1"/>
+          </a:fillRef>
+          <a:effectRef idx="0">
+            <a:schemeClr val="dk1"/>
+          </a:effectRef>
+          <a:fontRef idx="minor">
+            <a:schemeClr val="tx1"/>
+          </a:fontRef>
+        </p:style>
+      </p:cxnSp>
+      <p:cxnSp>
+        <p:nvCxnSpPr>
+          <p:cNvPr id="82" name="Straight Arrow Connector 81">
+            <a:extLst>
+              <a:ext uri="{FF2B5EF4-FFF2-40B4-BE49-F238E27FC236}">
+                <a16:creationId xmlns:a16="http://schemas.microsoft.com/office/drawing/2014/main" id="{ED0F0F4C-E602-4BE9-842F-2E26A9270472}"/>
+              </a:ext>
+            </a:extLst>
+          </p:cNvPr>
+          <p:cNvCxnSpPr>
+            <a:endCxn id="58" idx="1"/>
+          </p:cNvCxnSpPr>
+          <p:nvPr/>
+        </p:nvCxnSpPr>
+        <p:spPr>
+          <a:xfrm>
+            <a:off x="2765767" y="5641230"/>
+            <a:ext cx="789017" cy="0"/>
+          </a:xfrm>
+          <a:prstGeom prst="straightConnector1">
+            <a:avLst/>
+          </a:prstGeom>
+          <a:ln>
+            <a:headEnd type="triangle"/>
+            <a:tailEnd type="triangle"/>
+          </a:ln>
+        </p:spPr>
+        <p:style>
+          <a:lnRef idx="1">
+            <a:schemeClr val="dk1"/>
+          </a:lnRef>
+          <a:fillRef idx="0">
+            <a:schemeClr val="dk1"/>
+          </a:fillRef>
+          <a:effectRef idx="0">
+            <a:schemeClr val="dk1"/>
+          </a:effectRef>
+          <a:fontRef idx="minor">
+            <a:schemeClr val="tx1"/>
+          </a:fontRef>
+        </p:style>
+      </p:cxnSp>
+      <p:sp>
+        <p:nvSpPr>
+          <p:cNvPr id="84" name="Rectangle: Rounded Corners 83">
+            <a:extLst>
+              <a:ext uri="{FF2B5EF4-FFF2-40B4-BE49-F238E27FC236}">
+                <a16:creationId xmlns:a16="http://schemas.microsoft.com/office/drawing/2014/main" id="{08C78A88-1AA2-48AA-8B7A-8FFF7EDB2AD4}"/>
+              </a:ext>
+            </a:extLst>
+          </p:cNvPr>
+          <p:cNvSpPr/>
+          <p:nvPr/>
+        </p:nvSpPr>
+        <p:spPr>
+          <a:xfrm>
+            <a:off x="8433889" y="162563"/>
+            <a:ext cx="1718720" cy="2306103"/>
+          </a:xfrm>
+          <a:prstGeom prst="roundRect">
+            <a:avLst/>
+          </a:prstGeom>
+          <a:noFill/>
+        </p:spPr>
+        <p:style>
+          <a:lnRef idx="2">
+            <a:schemeClr val="dk1"/>
+          </a:lnRef>
+          <a:fillRef idx="1">
+            <a:schemeClr val="lt1"/>
+          </a:fillRef>
+          <a:effectRef idx="0">
+            <a:schemeClr val="dk1"/>
+          </a:effectRef>
+          <a:fontRef idx="minor">
+            <a:schemeClr val="dk1"/>
+          </a:fontRef>
+        </p:style>
+        <p:txBody>
+          <a:bodyPr rtlCol="0" anchor="ctr"/>
+          <a:lstStyle/>
+          <a:p>
+            <a:pPr algn="ctr"/>
+            <a:endParaRPr lang="en-NZ"/>
+          </a:p>
+        </p:txBody>
+      </p:sp>
+      <p:sp>
+        <p:nvSpPr>
+          <p:cNvPr id="85" name="Rectangle: Rounded Corners 84">
+            <a:extLst>
+              <a:ext uri="{FF2B5EF4-FFF2-40B4-BE49-F238E27FC236}">
+                <a16:creationId xmlns:a16="http://schemas.microsoft.com/office/drawing/2014/main" id="{1F99CBDF-8DDA-48E9-98E1-36AFC3A29C29}"/>
+              </a:ext>
+            </a:extLst>
+          </p:cNvPr>
+          <p:cNvSpPr/>
+          <p:nvPr/>
+        </p:nvSpPr>
+        <p:spPr>
+          <a:xfrm>
+            <a:off x="8477751" y="2762861"/>
+            <a:ext cx="1680287" cy="1053859"/>
+          </a:xfrm>
+          <a:prstGeom prst="roundRect">
+            <a:avLst/>
+          </a:prstGeom>
+          <a:noFill/>
+        </p:spPr>
+        <p:style>
+          <a:lnRef idx="2">
+            <a:schemeClr val="dk1"/>
+          </a:lnRef>
+          <a:fillRef idx="1">
+            <a:schemeClr val="lt1"/>
+          </a:fillRef>
+          <a:effectRef idx="0">
+            <a:schemeClr val="dk1"/>
+          </a:effectRef>
+          <a:fontRef idx="minor">
+            <a:schemeClr val="dk1"/>
+          </a:fontRef>
+        </p:style>
+        <p:txBody>
+          <a:bodyPr rtlCol="0" anchor="ctr"/>
+          <a:lstStyle/>
+          <a:p>
+            <a:pPr algn="ctr"/>
+            <a:endParaRPr lang="en-NZ"/>
+          </a:p>
+        </p:txBody>
+      </p:sp>
+      <p:sp>
+        <p:nvSpPr>
+          <p:cNvPr id="86" name="Rectangle: Rounded Corners 85">
+            <a:extLst>
+              <a:ext uri="{FF2B5EF4-FFF2-40B4-BE49-F238E27FC236}">
+                <a16:creationId xmlns:a16="http://schemas.microsoft.com/office/drawing/2014/main" id="{22D3C9DD-D276-473F-8640-1930EB7242C7}"/>
+              </a:ext>
+            </a:extLst>
+          </p:cNvPr>
+          <p:cNvSpPr/>
+          <p:nvPr/>
+        </p:nvSpPr>
+        <p:spPr>
+          <a:xfrm>
+            <a:off x="8538846" y="4226310"/>
+            <a:ext cx="1596648" cy="1053859"/>
+          </a:xfrm>
+          <a:prstGeom prst="roundRect">
+            <a:avLst/>
+          </a:prstGeom>
+          <a:noFill/>
+        </p:spPr>
+        <p:style>
+          <a:lnRef idx="2">
+            <a:schemeClr val="dk1"/>
+          </a:lnRef>
+          <a:fillRef idx="1">
+            <a:schemeClr val="lt1"/>
+          </a:fillRef>
+          <a:effectRef idx="0">
+            <a:schemeClr val="dk1"/>
+          </a:effectRef>
+          <a:fontRef idx="minor">
+            <a:schemeClr val="dk1"/>
+          </a:fontRef>
+        </p:style>
+        <p:txBody>
+          <a:bodyPr rtlCol="0" anchor="ctr"/>
+          <a:lstStyle/>
+          <a:p>
+            <a:pPr algn="ctr"/>
+            <a:endParaRPr lang="en-NZ"/>
+          </a:p>
+        </p:txBody>
+      </p:sp>
+      <p:sp>
+        <p:nvSpPr>
+          <p:cNvPr id="87" name="Rectangle: Rounded Corners 86">
+            <a:extLst>
+              <a:ext uri="{FF2B5EF4-FFF2-40B4-BE49-F238E27FC236}">
+                <a16:creationId xmlns:a16="http://schemas.microsoft.com/office/drawing/2014/main" id="{CC246FC3-3FD6-47A7-A41B-895A5BB7EDA5}"/>
+              </a:ext>
+            </a:extLst>
+          </p:cNvPr>
+          <p:cNvSpPr/>
+          <p:nvPr/>
+        </p:nvSpPr>
+        <p:spPr>
+          <a:xfrm>
+            <a:off x="8524574" y="5658366"/>
+            <a:ext cx="1467038" cy="1053859"/>
+          </a:xfrm>
+          <a:prstGeom prst="roundRect">
+            <a:avLst/>
+          </a:prstGeom>
+          <a:noFill/>
+        </p:spPr>
+        <p:style>
+          <a:lnRef idx="2">
+            <a:schemeClr val="dk1"/>
+          </a:lnRef>
+          <a:fillRef idx="1">
+            <a:schemeClr val="lt1"/>
+          </a:fillRef>
+          <a:effectRef idx="0">
+            <a:schemeClr val="dk1"/>
+          </a:effectRef>
+          <a:fontRef idx="minor">
+            <a:schemeClr val="dk1"/>
+          </a:fontRef>
+        </p:style>
+        <p:txBody>
+          <a:bodyPr rtlCol="0" anchor="ctr"/>
+          <a:lstStyle/>
+          <a:p>
+            <a:pPr algn="ctr"/>
+            <a:endParaRPr lang="en-NZ"/>
+          </a:p>
+        </p:txBody>
+      </p:sp>
+      <p:sp>
+        <p:nvSpPr>
+          <p:cNvPr id="88" name="TextBox 87">
+            <a:extLst>
+              <a:ext uri="{FF2B5EF4-FFF2-40B4-BE49-F238E27FC236}">
+                <a16:creationId xmlns:a16="http://schemas.microsoft.com/office/drawing/2014/main" id="{FB4092C1-F1D7-47B9-8E47-D751408253E1}"/>
+              </a:ext>
+            </a:extLst>
+          </p:cNvPr>
+          <p:cNvSpPr txBox="1"/>
+          <p:nvPr/>
+        </p:nvSpPr>
+        <p:spPr>
+          <a:xfrm>
+            <a:off x="7682948" y="1073426"/>
+            <a:ext cx="750941" cy="246221"/>
+          </a:xfrm>
+          <a:prstGeom prst="rect">
+            <a:avLst/>
+          </a:prstGeom>
+          <a:noFill/>
+        </p:spPr>
+        <p:txBody>
+          <a:bodyPr wrap="square" rtlCol="0">
+            <a:spAutoFit/>
+          </a:bodyPr>
+          <a:lstStyle/>
+          <a:p>
+            <a:r>
+              <a:rPr lang="en-NZ" sz="1000" dirty="0"/>
+              <a:t>DB Server</a:t>
+            </a:r>
+          </a:p>
+        </p:txBody>
+      </p:sp>
+      <p:sp>
+        <p:nvSpPr>
+          <p:cNvPr id="89" name="TextBox 88">
+            <a:extLst>
+              <a:ext uri="{FF2B5EF4-FFF2-40B4-BE49-F238E27FC236}">
+                <a16:creationId xmlns:a16="http://schemas.microsoft.com/office/drawing/2014/main" id="{94413753-5287-46C3-96E5-6363D2BE5868}"/>
+              </a:ext>
+            </a:extLst>
+          </p:cNvPr>
+          <p:cNvSpPr txBox="1"/>
+          <p:nvPr/>
+        </p:nvSpPr>
+        <p:spPr>
+          <a:xfrm>
+            <a:off x="10152609" y="3199975"/>
+            <a:ext cx="750941" cy="246221"/>
+          </a:xfrm>
+          <a:prstGeom prst="rect">
+            <a:avLst/>
+          </a:prstGeom>
+          <a:noFill/>
+        </p:spPr>
+        <p:txBody>
+          <a:bodyPr wrap="square" rtlCol="0">
+            <a:spAutoFit/>
+          </a:bodyPr>
+          <a:lstStyle/>
+          <a:p>
+            <a:r>
+              <a:rPr lang="en-NZ" sz="1000" dirty="0"/>
+              <a:t>DB Server</a:t>
+            </a:r>
+          </a:p>
+        </p:txBody>
+      </p:sp>
+      <p:sp>
+        <p:nvSpPr>
+          <p:cNvPr id="90" name="TextBox 89">
+            <a:extLst>
+              <a:ext uri="{FF2B5EF4-FFF2-40B4-BE49-F238E27FC236}">
+                <a16:creationId xmlns:a16="http://schemas.microsoft.com/office/drawing/2014/main" id="{C8284FE6-6EA4-4452-BC4D-E4C088D9CEB6}"/>
+              </a:ext>
+            </a:extLst>
+          </p:cNvPr>
+          <p:cNvSpPr txBox="1"/>
+          <p:nvPr/>
+        </p:nvSpPr>
+        <p:spPr>
+          <a:xfrm>
+            <a:off x="10135494" y="4592561"/>
+            <a:ext cx="750941" cy="246221"/>
+          </a:xfrm>
+          <a:prstGeom prst="rect">
+            <a:avLst/>
+          </a:prstGeom>
+          <a:noFill/>
+        </p:spPr>
+        <p:txBody>
+          <a:bodyPr wrap="square" rtlCol="0">
+            <a:spAutoFit/>
+          </a:bodyPr>
+          <a:lstStyle/>
+          <a:p>
+            <a:r>
+              <a:rPr lang="en-NZ" sz="1000" dirty="0"/>
+              <a:t>DB Server</a:t>
+            </a:r>
+          </a:p>
+        </p:txBody>
+      </p:sp>
+      <p:sp>
+        <p:nvSpPr>
+          <p:cNvPr id="91" name="TextBox 90">
+            <a:extLst>
+              <a:ext uri="{FF2B5EF4-FFF2-40B4-BE49-F238E27FC236}">
+                <a16:creationId xmlns:a16="http://schemas.microsoft.com/office/drawing/2014/main" id="{54B7BCF7-0DCC-4DB1-A8BA-477BF7DE46D8}"/>
+              </a:ext>
+            </a:extLst>
+          </p:cNvPr>
+          <p:cNvSpPr txBox="1"/>
+          <p:nvPr/>
+        </p:nvSpPr>
+        <p:spPr>
+          <a:xfrm>
+            <a:off x="9991612" y="6065127"/>
+            <a:ext cx="750941" cy="246221"/>
+          </a:xfrm>
+          <a:prstGeom prst="rect">
+            <a:avLst/>
+          </a:prstGeom>
+          <a:noFill/>
+        </p:spPr>
+        <p:txBody>
+          <a:bodyPr wrap="square" rtlCol="0">
+            <a:spAutoFit/>
+          </a:bodyPr>
+          <a:lstStyle/>
+          <a:p>
+            <a:r>
+              <a:rPr lang="en-NZ" sz="1000" dirty="0"/>
+              <a:t>DB Server</a:t>
+            </a:r>
+          </a:p>
+        </p:txBody>
+      </p:sp>
+      <p:cxnSp>
+        <p:nvCxnSpPr>
+          <p:cNvPr id="93" name="Straight Arrow Connector 92">
+            <a:extLst>
+              <a:ext uri="{FF2B5EF4-FFF2-40B4-BE49-F238E27FC236}">
+                <a16:creationId xmlns:a16="http://schemas.microsoft.com/office/drawing/2014/main" id="{50A9C085-243E-460F-8160-1DDEF72FC13A}"/>
+              </a:ext>
+            </a:extLst>
+          </p:cNvPr>
+          <p:cNvCxnSpPr/>
+          <p:nvPr/>
+        </p:nvCxnSpPr>
+        <p:spPr>
+          <a:xfrm>
+            <a:off x="7504344" y="1728541"/>
+            <a:ext cx="929545" cy="0"/>
+          </a:xfrm>
+          <a:prstGeom prst="straightConnector1">
+            <a:avLst/>
+          </a:prstGeom>
+          <a:ln>
+            <a:headEnd type="triangle"/>
+            <a:tailEnd type="triangle"/>
+          </a:ln>
+        </p:spPr>
+        <p:style>
+          <a:lnRef idx="1">
+            <a:schemeClr val="dk1"/>
+          </a:lnRef>
+          <a:fillRef idx="0">
+            <a:schemeClr val="dk1"/>
+          </a:fillRef>
+          <a:effectRef idx="0">
+            <a:schemeClr val="dk1"/>
+          </a:effectRef>
+          <a:fontRef idx="minor">
+            <a:schemeClr val="tx1"/>
+          </a:fontRef>
+        </p:style>
+      </p:cxnSp>
+      <p:cxnSp>
+        <p:nvCxnSpPr>
+          <p:cNvPr id="95" name="Straight Arrow Connector 94">
+            <a:extLst>
+              <a:ext uri="{FF2B5EF4-FFF2-40B4-BE49-F238E27FC236}">
+                <a16:creationId xmlns:a16="http://schemas.microsoft.com/office/drawing/2014/main" id="{8ABEC0F9-B0B2-4E13-B0C6-918F7C382DDE}"/>
+              </a:ext>
+            </a:extLst>
+          </p:cNvPr>
+          <p:cNvCxnSpPr/>
+          <p:nvPr/>
+        </p:nvCxnSpPr>
+        <p:spPr>
+          <a:xfrm>
+            <a:off x="7504344" y="3199975"/>
+            <a:ext cx="973407" cy="0"/>
+          </a:xfrm>
+          <a:prstGeom prst="straightConnector1">
+            <a:avLst/>
+          </a:prstGeom>
+          <a:ln>
+            <a:headEnd type="triangle"/>
+            <a:tailEnd type="triangle"/>
+          </a:ln>
+        </p:spPr>
+        <p:style>
+          <a:lnRef idx="1">
+            <a:schemeClr val="dk1"/>
+          </a:lnRef>
+          <a:fillRef idx="0">
+            <a:schemeClr val="dk1"/>
+          </a:fillRef>
+          <a:effectRef idx="0">
+            <a:schemeClr val="dk1"/>
+          </a:effectRef>
+          <a:fontRef idx="minor">
+            <a:schemeClr val="tx1"/>
+          </a:fontRef>
+        </p:style>
+      </p:cxnSp>
+      <p:cxnSp>
+        <p:nvCxnSpPr>
+          <p:cNvPr id="97" name="Straight Arrow Connector 96">
+            <a:extLst>
+              <a:ext uri="{FF2B5EF4-FFF2-40B4-BE49-F238E27FC236}">
+                <a16:creationId xmlns:a16="http://schemas.microsoft.com/office/drawing/2014/main" id="{97CCF0BF-2EC5-494C-A835-ACE4983DF5E0}"/>
+              </a:ext>
+            </a:extLst>
+          </p:cNvPr>
+          <p:cNvCxnSpPr>
+            <a:endCxn id="86" idx="1"/>
+          </p:cNvCxnSpPr>
+          <p:nvPr/>
+        </p:nvCxnSpPr>
+        <p:spPr>
+          <a:xfrm>
+            <a:off x="7504344" y="4753239"/>
+            <a:ext cx="1034502" cy="1"/>
+          </a:xfrm>
+          <a:prstGeom prst="straightConnector1">
+            <a:avLst/>
+          </a:prstGeom>
+          <a:ln>
+            <a:headEnd type="triangle"/>
+            <a:tailEnd type="triangle"/>
+          </a:ln>
+        </p:spPr>
+        <p:style>
+          <a:lnRef idx="1">
+            <a:schemeClr val="dk1"/>
+          </a:lnRef>
+          <a:fillRef idx="0">
+            <a:schemeClr val="dk1"/>
+          </a:fillRef>
+          <a:effectRef idx="0">
+            <a:schemeClr val="dk1"/>
+          </a:effectRef>
+          <a:fontRef idx="minor">
+            <a:schemeClr val="tx1"/>
+          </a:fontRef>
+        </p:style>
+      </p:cxnSp>
+      <p:cxnSp>
+        <p:nvCxnSpPr>
+          <p:cNvPr id="99" name="Straight Arrow Connector 98">
+            <a:extLst>
+              <a:ext uri="{FF2B5EF4-FFF2-40B4-BE49-F238E27FC236}">
+                <a16:creationId xmlns:a16="http://schemas.microsoft.com/office/drawing/2014/main" id="{A91FF50D-5D3A-44D3-9BF1-81D420BA76D9}"/>
+              </a:ext>
+            </a:extLst>
+          </p:cNvPr>
+          <p:cNvCxnSpPr>
+            <a:stCxn id="87" idx="1"/>
+          </p:cNvCxnSpPr>
+          <p:nvPr/>
+        </p:nvCxnSpPr>
+        <p:spPr>
+          <a:xfrm flipH="1" flipV="1">
+            <a:off x="7504344" y="6185295"/>
+            <a:ext cx="1020230" cy="1"/>
+          </a:xfrm>
+          <a:prstGeom prst="straightConnector1">
+            <a:avLst/>
+          </a:prstGeom>
+          <a:ln>
+            <a:headEnd type="triangle"/>
+            <a:tailEnd type="triangle"/>
+          </a:ln>
+        </p:spPr>
+        <p:style>
+          <a:lnRef idx="1">
+            <a:schemeClr val="dk1"/>
+          </a:lnRef>
+          <a:fillRef idx="0">
+            <a:schemeClr val="dk1"/>
+          </a:fillRef>
+          <a:effectRef idx="0">
+            <a:schemeClr val="dk1"/>
+          </a:effectRef>
+          <a:fontRef idx="minor">
+            <a:schemeClr val="tx1"/>
+          </a:fontRef>
+        </p:style>
+      </p:cxnSp>
     </p:spTree>
     <p:extLst>
       <p:ext uri="{BB962C8B-B14F-4D97-AF65-F5344CB8AC3E}">
@@ -6056,10 +6281,10 @@
       </p:grpSpPr>
       <p:sp>
         <p:nvSpPr>
-          <p:cNvPr id="5" name="TextBox 4">
-            <a:extLst>
-              <a:ext uri="{FF2B5EF4-FFF2-40B4-BE49-F238E27FC236}">
-                <a16:creationId xmlns:a16="http://schemas.microsoft.com/office/drawing/2014/main" id="{A6FDDEFF-7CBC-4636-96BC-F2E97EB73F04}"/>
+          <p:cNvPr id="6" name="TextBox 5">
+            <a:extLst>
+              <a:ext uri="{FF2B5EF4-FFF2-40B4-BE49-F238E27FC236}">
+                <a16:creationId xmlns:a16="http://schemas.microsoft.com/office/drawing/2014/main" id="{65F3C743-1BEA-4316-B336-118EC9FCDFC5}"/>
               </a:ext>
             </a:extLst>
           </p:cNvPr>
@@ -6068,7 +6293,7 @@
         </p:nvSpPr>
         <p:spPr>
           <a:xfrm>
-            <a:off x="7960620" y="0"/>
+            <a:off x="2765767" y="0"/>
             <a:ext cx="338554" cy="6858000"/>
           </a:xfrm>
           <a:prstGeom prst="rect">
@@ -6091,7 +6316,7 @@
             <a:pPr algn="ctr"/>
             <a:r>
               <a:rPr lang="en-US" sz="1000" dirty="0"/>
-              <a:t>Local Area Network</a:t>
+              <a:t>Wireless Network</a:t>
             </a:r>
             <a:endParaRPr lang="en-NZ" sz="1000" dirty="0"/>
           </a:p>
@@ -6099,49 +6324,6 @@
       </p:sp>
       <p:sp>
         <p:nvSpPr>
-          <p:cNvPr id="6" name="TextBox 5">
-            <a:extLst>
-              <a:ext uri="{FF2B5EF4-FFF2-40B4-BE49-F238E27FC236}">
-                <a16:creationId xmlns:a16="http://schemas.microsoft.com/office/drawing/2014/main" id="{65F3C743-1BEA-4316-B336-118EC9FCDFC5}"/>
-              </a:ext>
-            </a:extLst>
-          </p:cNvPr>
-          <p:cNvSpPr txBox="1"/>
-          <p:nvPr/>
-        </p:nvSpPr>
-        <p:spPr>
-          <a:xfrm>
-            <a:off x="2765767" y="0"/>
-            <a:ext cx="338554" cy="6858000"/>
-          </a:xfrm>
-          <a:prstGeom prst="rect">
-            <a:avLst/>
-          </a:prstGeom>
-          <a:noFill/>
-          <a:ln>
-            <a:solidFill>
-              <a:schemeClr val="tx1"/>
-            </a:solidFill>
-            <a:prstDash val="dashDot"/>
-          </a:ln>
-        </p:spPr>
-        <p:txBody>
-          <a:bodyPr vert="eaVert" wrap="square" rtlCol="0">
-            <a:spAutoFit/>
-          </a:bodyPr>
-          <a:lstStyle/>
-          <a:p>
-            <a:pPr algn="ctr"/>
-            <a:r>
-              <a:rPr lang="en-US" sz="1000" dirty="0"/>
-              <a:t>Wireless Network</a:t>
-            </a:r>
-            <a:endParaRPr lang="en-NZ" sz="1000" dirty="0"/>
-          </a:p>
-        </p:txBody>
-      </p:sp>
-      <p:sp>
-        <p:nvSpPr>
           <p:cNvPr id="8" name="Rectangle: Rounded Corners 7">
             <a:extLst>
               <a:ext uri="{FF2B5EF4-FFF2-40B4-BE49-F238E27FC236}">
@@ -6154,7 +6336,7 @@
         </p:nvSpPr>
         <p:spPr>
           <a:xfrm>
-            <a:off x="259445" y="1132127"/>
+            <a:off x="536712" y="2179981"/>
             <a:ext cx="1739349" cy="546653"/>
           </a:xfrm>
           <a:prstGeom prst="roundRect">
@@ -6182,17 +6364,17 @@
             <a:pPr algn="ctr"/>
             <a:r>
               <a:rPr lang="en-NZ" sz="1000" dirty="0"/>
-              <a:t>Send Vehicle location/speed</a:t>
-            </a:r>
-          </a:p>
-        </p:txBody>
-      </p:sp>
-      <p:sp>
-        <p:nvSpPr>
-          <p:cNvPr id="10" name="Cylinder 9">
-            <a:extLst>
-              <a:ext uri="{FF2B5EF4-FFF2-40B4-BE49-F238E27FC236}">
-                <a16:creationId xmlns:a16="http://schemas.microsoft.com/office/drawing/2014/main" id="{A5814B17-7D96-4BDE-AD08-76032F9F0C28}"/>
+              <a:t>Request journey report</a:t>
+            </a:r>
+          </a:p>
+        </p:txBody>
+      </p:sp>
+      <p:sp>
+        <p:nvSpPr>
+          <p:cNvPr id="15" name="Rectangle 14">
+            <a:extLst>
+              <a:ext uri="{FF2B5EF4-FFF2-40B4-BE49-F238E27FC236}">
+                <a16:creationId xmlns:a16="http://schemas.microsoft.com/office/drawing/2014/main" id="{26137DFE-F287-42A8-BA3F-8332F1C4708A}"/>
               </a:ext>
             </a:extLst>
           </p:cNvPr>
@@ -6201,184 +6383,8 @@
         </p:nvSpPr>
         <p:spPr>
           <a:xfrm>
-            <a:off x="8666922" y="417443"/>
-            <a:ext cx="834887" cy="661987"/>
-          </a:xfrm>
-          <a:prstGeom prst="can">
-            <a:avLst/>
-          </a:prstGeom>
-        </p:spPr>
-        <p:style>
-          <a:lnRef idx="2">
-            <a:schemeClr val="dk1"/>
-          </a:lnRef>
-          <a:fillRef idx="1">
-            <a:schemeClr val="lt1"/>
-          </a:fillRef>
-          <a:effectRef idx="0">
-            <a:schemeClr val="dk1"/>
-          </a:effectRef>
-          <a:fontRef idx="minor">
-            <a:schemeClr val="dk1"/>
-          </a:fontRef>
-        </p:style>
-        <p:txBody>
-          <a:bodyPr rtlCol="0" anchor="ctr"/>
-          <a:lstStyle/>
-          <a:p>
-            <a:pPr algn="ctr"/>
-            <a:endParaRPr lang="en-NZ"/>
-          </a:p>
-        </p:txBody>
-      </p:sp>
-      <p:sp>
-        <p:nvSpPr>
-          <p:cNvPr id="11" name="Cylinder 10">
-            <a:extLst>
-              <a:ext uri="{FF2B5EF4-FFF2-40B4-BE49-F238E27FC236}">
-                <a16:creationId xmlns:a16="http://schemas.microsoft.com/office/drawing/2014/main" id="{4AF9C66C-429B-4CD3-AEAB-138F79B56B07}"/>
-              </a:ext>
-            </a:extLst>
-          </p:cNvPr>
-          <p:cNvSpPr/>
-          <p:nvPr/>
-        </p:nvSpPr>
-        <p:spPr>
-          <a:xfrm>
-            <a:off x="8666922" y="1848988"/>
-            <a:ext cx="834887" cy="661987"/>
-          </a:xfrm>
-          <a:prstGeom prst="can">
-            <a:avLst/>
-          </a:prstGeom>
-        </p:spPr>
-        <p:style>
-          <a:lnRef idx="2">
-            <a:schemeClr val="dk1"/>
-          </a:lnRef>
-          <a:fillRef idx="1">
-            <a:schemeClr val="lt1"/>
-          </a:fillRef>
-          <a:effectRef idx="0">
-            <a:schemeClr val="dk1"/>
-          </a:effectRef>
-          <a:fontRef idx="minor">
-            <a:schemeClr val="dk1"/>
-          </a:fontRef>
-        </p:style>
-        <p:txBody>
-          <a:bodyPr rtlCol="0" anchor="ctr"/>
-          <a:lstStyle/>
-          <a:p>
-            <a:pPr algn="ctr"/>
-            <a:endParaRPr lang="en-NZ"/>
-          </a:p>
-        </p:txBody>
-      </p:sp>
-      <p:sp>
-        <p:nvSpPr>
-          <p:cNvPr id="12" name="Cylinder 11">
-            <a:extLst>
-              <a:ext uri="{FF2B5EF4-FFF2-40B4-BE49-F238E27FC236}">
-                <a16:creationId xmlns:a16="http://schemas.microsoft.com/office/drawing/2014/main" id="{6CAD29B7-BCC8-4596-9A12-89F9C09A83EA}"/>
-              </a:ext>
-            </a:extLst>
-          </p:cNvPr>
-          <p:cNvSpPr/>
-          <p:nvPr/>
-        </p:nvSpPr>
-        <p:spPr>
-          <a:xfrm>
-            <a:off x="8941904" y="3286539"/>
-            <a:ext cx="834887" cy="661987"/>
-          </a:xfrm>
-          <a:prstGeom prst="can">
-            <a:avLst/>
-          </a:prstGeom>
-        </p:spPr>
-        <p:style>
-          <a:lnRef idx="2">
-            <a:schemeClr val="dk1"/>
-          </a:lnRef>
-          <a:fillRef idx="1">
-            <a:schemeClr val="lt1"/>
-          </a:fillRef>
-          <a:effectRef idx="0">
-            <a:schemeClr val="dk1"/>
-          </a:effectRef>
-          <a:fontRef idx="minor">
-            <a:schemeClr val="dk1"/>
-          </a:fontRef>
-        </p:style>
-        <p:txBody>
-          <a:bodyPr rtlCol="0" anchor="ctr"/>
-          <a:lstStyle/>
-          <a:p>
-            <a:pPr algn="ctr"/>
-            <a:endParaRPr lang="en-NZ"/>
-          </a:p>
-        </p:txBody>
-      </p:sp>
-      <p:sp>
-        <p:nvSpPr>
-          <p:cNvPr id="13" name="Cylinder 12">
-            <a:extLst>
-              <a:ext uri="{FF2B5EF4-FFF2-40B4-BE49-F238E27FC236}">
-                <a16:creationId xmlns:a16="http://schemas.microsoft.com/office/drawing/2014/main" id="{E048EF44-13C0-44C1-A7FA-A26D46800789}"/>
-              </a:ext>
-            </a:extLst>
-          </p:cNvPr>
-          <p:cNvSpPr/>
-          <p:nvPr/>
-        </p:nvSpPr>
-        <p:spPr>
-          <a:xfrm>
-            <a:off x="8971721" y="5049078"/>
-            <a:ext cx="834887" cy="661987"/>
-          </a:xfrm>
-          <a:prstGeom prst="can">
-            <a:avLst/>
-          </a:prstGeom>
-        </p:spPr>
-        <p:style>
-          <a:lnRef idx="2">
-            <a:schemeClr val="dk1"/>
-          </a:lnRef>
-          <a:fillRef idx="1">
-            <a:schemeClr val="lt1"/>
-          </a:fillRef>
-          <a:effectRef idx="0">
-            <a:schemeClr val="dk1"/>
-          </a:effectRef>
-          <a:fontRef idx="minor">
-            <a:schemeClr val="dk1"/>
-          </a:fontRef>
-        </p:style>
-        <p:txBody>
-          <a:bodyPr rtlCol="0" anchor="ctr"/>
-          <a:lstStyle/>
-          <a:p>
-            <a:pPr algn="ctr"/>
-            <a:endParaRPr lang="en-NZ"/>
-          </a:p>
-        </p:txBody>
-      </p:sp>
-      <p:sp>
-        <p:nvSpPr>
-          <p:cNvPr id="14" name="Rectangle 13">
-            <a:extLst>
-              <a:ext uri="{FF2B5EF4-FFF2-40B4-BE49-F238E27FC236}">
-                <a16:creationId xmlns:a16="http://schemas.microsoft.com/office/drawing/2014/main" id="{580441EA-41A7-4651-8937-4B0DB45BE1A1}"/>
-              </a:ext>
-            </a:extLst>
-          </p:cNvPr>
-          <p:cNvSpPr/>
-          <p:nvPr/>
-        </p:nvSpPr>
-        <p:spPr>
-          <a:xfrm>
-            <a:off x="271046" y="99389"/>
-            <a:ext cx="1540565" cy="377688"/>
+            <a:off x="357809" y="636104"/>
+            <a:ext cx="2213111" cy="278296"/>
           </a:xfrm>
           <a:prstGeom prst="rect">
             <a:avLst/>
@@ -6406,102 +6412,9 @@
           <a:p>
             <a:pPr algn="ctr"/>
             <a:r>
-              <a:rPr lang="en-NZ" dirty="0"/>
-              <a:t>Deployment</a:t>
-            </a:r>
-          </a:p>
-        </p:txBody>
-      </p:sp>
-      <p:sp>
-        <p:nvSpPr>
-          <p:cNvPr id="15" name="Rectangle 14">
-            <a:extLst>
-              <a:ext uri="{FF2B5EF4-FFF2-40B4-BE49-F238E27FC236}">
-                <a16:creationId xmlns:a16="http://schemas.microsoft.com/office/drawing/2014/main" id="{26137DFE-F287-42A8-BA3F-8332F1C4708A}"/>
-              </a:ext>
-            </a:extLst>
-          </p:cNvPr>
-          <p:cNvSpPr/>
-          <p:nvPr/>
-        </p:nvSpPr>
-        <p:spPr>
-          <a:xfrm>
-            <a:off x="357809" y="636104"/>
-            <a:ext cx="2213111" cy="278296"/>
-          </a:xfrm>
-          <a:prstGeom prst="rect">
-            <a:avLst/>
-          </a:prstGeom>
-        </p:spPr>
-        <p:style>
-          <a:lnRef idx="2">
-            <a:schemeClr val="accent1">
-              <a:shade val="50000"/>
-            </a:schemeClr>
-          </a:lnRef>
-          <a:fillRef idx="1">
-            <a:schemeClr val="accent1"/>
-          </a:fillRef>
-          <a:effectRef idx="0">
-            <a:schemeClr val="accent1"/>
-          </a:effectRef>
-          <a:fontRef idx="minor">
-            <a:schemeClr val="lt1"/>
-          </a:fontRef>
-        </p:style>
-        <p:txBody>
-          <a:bodyPr rtlCol="0" anchor="ctr"/>
-          <a:lstStyle/>
-          <a:p>
-            <a:pPr algn="ctr"/>
-            <a:r>
-              <a:rPr lang="en-NZ" dirty="0"/>
-              <a:t>BBD-M</a:t>
-            </a:r>
-          </a:p>
-        </p:txBody>
-      </p:sp>
-      <p:sp>
-        <p:nvSpPr>
-          <p:cNvPr id="16" name="Cylinder 15">
-            <a:extLst>
-              <a:ext uri="{FF2B5EF4-FFF2-40B4-BE49-F238E27FC236}">
-                <a16:creationId xmlns:a16="http://schemas.microsoft.com/office/drawing/2014/main" id="{1900FD86-DE5E-440F-9BC5-F9EE4675171C}"/>
-              </a:ext>
-            </a:extLst>
-          </p:cNvPr>
-          <p:cNvSpPr/>
-          <p:nvPr/>
-        </p:nvSpPr>
-        <p:spPr>
-          <a:xfrm>
-            <a:off x="8819322" y="569843"/>
-            <a:ext cx="834887" cy="661987"/>
-          </a:xfrm>
-          <a:prstGeom prst="can">
-            <a:avLst/>
-          </a:prstGeom>
-        </p:spPr>
-        <p:style>
-          <a:lnRef idx="2">
-            <a:schemeClr val="dk1"/>
-          </a:lnRef>
-          <a:fillRef idx="1">
-            <a:schemeClr val="lt1"/>
-          </a:fillRef>
-          <a:effectRef idx="0">
-            <a:schemeClr val="dk1"/>
-          </a:effectRef>
-          <a:fontRef idx="minor">
-            <a:schemeClr val="dk1"/>
-          </a:fontRef>
-        </p:style>
-        <p:txBody>
-          <a:bodyPr rtlCol="0" anchor="ctr"/>
-          <a:lstStyle/>
-          <a:p>
-            <a:pPr algn="ctr"/>
-            <a:endParaRPr lang="en-NZ"/>
+              <a:rPr lang="en-NZ" sz="1000" dirty="0"/>
+              <a:t>BBD-M Deployment Structure</a:t>
+            </a:r>
           </a:p>
         </p:txBody>
       </p:sp>
@@ -6519,8 +6432,8 @@
         </p:nvGrpSpPr>
         <p:grpSpPr>
           <a:xfrm>
-            <a:off x="10217012" y="198783"/>
-            <a:ext cx="1714453" cy="1544778"/>
+            <a:off x="3776870" y="599104"/>
+            <a:ext cx="1714453" cy="1440000"/>
             <a:chOff x="10217012" y="198783"/>
             <a:chExt cx="1714453" cy="1544778"/>
           </a:xfrm>
@@ -6584,6 +6497,223 @@
           </p:spPr>
         </p:pic>
       </p:grpSp>
+      <p:sp>
+        <p:nvSpPr>
+          <p:cNvPr id="2" name="Rectangle: Rounded Corners 1">
+            <a:extLst>
+              <a:ext uri="{FF2B5EF4-FFF2-40B4-BE49-F238E27FC236}">
+                <a16:creationId xmlns:a16="http://schemas.microsoft.com/office/drawing/2014/main" id="{22AABA45-FDC3-4EA9-96EF-8D92BD695518}"/>
+              </a:ext>
+            </a:extLst>
+          </p:cNvPr>
+          <p:cNvSpPr/>
+          <p:nvPr/>
+        </p:nvSpPr>
+        <p:spPr>
+          <a:xfrm>
+            <a:off x="586409" y="2961861"/>
+            <a:ext cx="1639956" cy="417443"/>
+          </a:xfrm>
+          <a:prstGeom prst="roundRect">
+            <a:avLst/>
+          </a:prstGeom>
+        </p:spPr>
+        <p:style>
+          <a:lnRef idx="2">
+            <a:schemeClr val="dk1"/>
+          </a:lnRef>
+          <a:fillRef idx="1">
+            <a:schemeClr val="lt1"/>
+          </a:fillRef>
+          <a:effectRef idx="0">
+            <a:schemeClr val="dk1"/>
+          </a:effectRef>
+          <a:fontRef idx="minor">
+            <a:schemeClr val="dk1"/>
+          </a:fontRef>
+        </p:style>
+        <p:txBody>
+          <a:bodyPr rtlCol="0" anchor="ctr"/>
+          <a:lstStyle/>
+          <a:p>
+            <a:pPr algn="ctr"/>
+            <a:r>
+              <a:rPr lang="en-NZ" sz="1000" dirty="0"/>
+              <a:t>Processing and displaying reports received</a:t>
+            </a:r>
+          </a:p>
+        </p:txBody>
+      </p:sp>
+      <p:sp>
+        <p:nvSpPr>
+          <p:cNvPr id="3" name="Rectangle: Rounded Corners 2">
+            <a:extLst>
+              <a:ext uri="{FF2B5EF4-FFF2-40B4-BE49-F238E27FC236}">
+                <a16:creationId xmlns:a16="http://schemas.microsoft.com/office/drawing/2014/main" id="{48792146-7DCA-4917-AFC2-32BB5CF84F44}"/>
+              </a:ext>
+            </a:extLst>
+          </p:cNvPr>
+          <p:cNvSpPr/>
+          <p:nvPr/>
+        </p:nvSpPr>
+        <p:spPr>
+          <a:xfrm>
+            <a:off x="357810" y="2067339"/>
+            <a:ext cx="2117034" cy="1421296"/>
+          </a:xfrm>
+          <a:prstGeom prst="roundRect">
+            <a:avLst/>
+          </a:prstGeom>
+          <a:noFill/>
+        </p:spPr>
+        <p:style>
+          <a:lnRef idx="2">
+            <a:schemeClr val="dk1"/>
+          </a:lnRef>
+          <a:fillRef idx="1">
+            <a:schemeClr val="lt1"/>
+          </a:fillRef>
+          <a:effectRef idx="0">
+            <a:schemeClr val="dk1"/>
+          </a:effectRef>
+          <a:fontRef idx="minor">
+            <a:schemeClr val="dk1"/>
+          </a:fontRef>
+        </p:style>
+        <p:txBody>
+          <a:bodyPr rtlCol="0" anchor="ctr"/>
+          <a:lstStyle/>
+          <a:p>
+            <a:pPr algn="ctr"/>
+            <a:endParaRPr lang="en-NZ" dirty="0"/>
+          </a:p>
+        </p:txBody>
+      </p:sp>
+      <p:sp>
+        <p:nvSpPr>
+          <p:cNvPr id="4" name="TextBox 3">
+            <a:extLst>
+              <a:ext uri="{FF2B5EF4-FFF2-40B4-BE49-F238E27FC236}">
+                <a16:creationId xmlns:a16="http://schemas.microsoft.com/office/drawing/2014/main" id="{CF4C957F-6876-48A4-B315-60DBEEA24D16}"/>
+              </a:ext>
+            </a:extLst>
+          </p:cNvPr>
+          <p:cNvSpPr txBox="1"/>
+          <p:nvPr/>
+        </p:nvSpPr>
+        <p:spPr>
+          <a:xfrm>
+            <a:off x="437322" y="1669774"/>
+            <a:ext cx="1838739" cy="369332"/>
+          </a:xfrm>
+          <a:prstGeom prst="rect">
+            <a:avLst/>
+          </a:prstGeom>
+          <a:noFill/>
+        </p:spPr>
+        <p:txBody>
+          <a:bodyPr wrap="square" rtlCol="0">
+            <a:spAutoFit/>
+          </a:bodyPr>
+          <a:lstStyle/>
+          <a:p>
+            <a:r>
+              <a:rPr lang="en-NZ" dirty="0"/>
+              <a:t>Each client</a:t>
+            </a:r>
+          </a:p>
+        </p:txBody>
+      </p:sp>
+      <p:cxnSp>
+        <p:nvCxnSpPr>
+          <p:cNvPr id="20" name="Straight Arrow Connector 19">
+            <a:extLst>
+              <a:ext uri="{FF2B5EF4-FFF2-40B4-BE49-F238E27FC236}">
+                <a16:creationId xmlns:a16="http://schemas.microsoft.com/office/drawing/2014/main" id="{3282B31D-E072-4803-BFAA-854B0759E111}"/>
+              </a:ext>
+            </a:extLst>
+          </p:cNvPr>
+          <p:cNvCxnSpPr>
+            <a:cxnSpLocks/>
+            <a:stCxn id="3" idx="3"/>
+          </p:cNvCxnSpPr>
+          <p:nvPr/>
+        </p:nvCxnSpPr>
+        <p:spPr>
+          <a:xfrm>
+            <a:off x="2474844" y="2777987"/>
+            <a:ext cx="934278" cy="0"/>
+          </a:xfrm>
+          <a:prstGeom prst="straightConnector1">
+            <a:avLst/>
+          </a:prstGeom>
+          <a:ln>
+            <a:headEnd type="triangle"/>
+            <a:tailEnd type="triangle"/>
+          </a:ln>
+        </p:spPr>
+        <p:style>
+          <a:lnRef idx="1">
+            <a:schemeClr val="dk1"/>
+          </a:lnRef>
+          <a:fillRef idx="0">
+            <a:schemeClr val="dk1"/>
+          </a:fillRef>
+          <a:effectRef idx="0">
+            <a:schemeClr val="dk1"/>
+          </a:effectRef>
+          <a:fontRef idx="minor">
+            <a:schemeClr val="tx1"/>
+          </a:fontRef>
+        </p:style>
+      </p:cxnSp>
+      <p:sp>
+        <p:nvSpPr>
+          <p:cNvPr id="22" name="Rectangle: Rounded Corners 21">
+            <a:extLst>
+              <a:ext uri="{FF2B5EF4-FFF2-40B4-BE49-F238E27FC236}">
+                <a16:creationId xmlns:a16="http://schemas.microsoft.com/office/drawing/2014/main" id="{9B0A8185-293D-44D3-A74D-663B05A8AF17}"/>
+              </a:ext>
+            </a:extLst>
+          </p:cNvPr>
+          <p:cNvSpPr/>
+          <p:nvPr/>
+        </p:nvSpPr>
+        <p:spPr>
+          <a:xfrm>
+            <a:off x="3776870" y="2509630"/>
+            <a:ext cx="1047546" cy="536714"/>
+          </a:xfrm>
+          <a:prstGeom prst="roundRect">
+            <a:avLst/>
+          </a:prstGeom>
+        </p:spPr>
+        <p:style>
+          <a:lnRef idx="2">
+            <a:schemeClr val="dk1"/>
+          </a:lnRef>
+          <a:fillRef idx="1">
+            <a:schemeClr val="lt1"/>
+          </a:fillRef>
+          <a:effectRef idx="0">
+            <a:schemeClr val="dk1"/>
+          </a:effectRef>
+          <a:fontRef idx="minor">
+            <a:schemeClr val="dk1"/>
+          </a:fontRef>
+        </p:style>
+        <p:txBody>
+          <a:bodyPr rtlCol="0" anchor="ctr"/>
+          <a:lstStyle/>
+          <a:p>
+            <a:pPr algn="ctr"/>
+            <a:r>
+              <a:rPr lang="en-NZ" sz="1000" dirty="0"/>
+              <a:t>BBD-Ops</a:t>
+            </a:r>
+          </a:p>
+        </p:txBody>
+      </p:sp>
     </p:spTree>
     <p:extLst>
       <p:ext uri="{BB962C8B-B14F-4D97-AF65-F5344CB8AC3E}">
@@ -12982,13 +13112,13 @@
         </p:nvPicPr>
         <p:blipFill rotWithShape="1">
           <a:blip r:embed="rId2"/>
-          <a:srcRect b="31881"/>
+          <a:srcRect b="45605"/>
           <a:stretch/>
         </p:blipFill>
         <p:spPr>
           <a:xfrm>
-            <a:off x="5874026" y="118331"/>
-            <a:ext cx="2381348" cy="1850553"/>
+            <a:off x="5811808" y="5380274"/>
+            <a:ext cx="2381348" cy="1477726"/>
           </a:xfrm>
           <a:prstGeom prst="rect">
             <a:avLst/>
@@ -14130,12 +14260,12 @@
         </p:nvPicPr>
         <p:blipFill rotWithShape="1">
           <a:blip r:embed="rId3"/>
-          <a:srcRect b="31881"/>
+          <a:srcRect t="-13628" b="45509"/>
           <a:stretch/>
         </p:blipFill>
         <p:spPr>
           <a:xfrm>
-            <a:off x="9452113" y="3554545"/>
+            <a:off x="74410" y="4996307"/>
             <a:ext cx="2381348" cy="1850553"/>
           </a:xfrm>
           <a:prstGeom prst="rect">
@@ -15497,13 +15627,13 @@
         </p:nvPicPr>
         <p:blipFill rotWithShape="1">
           <a:blip r:embed="rId3"/>
-          <a:srcRect b="31881"/>
+          <a:srcRect b="46230"/>
           <a:stretch/>
         </p:blipFill>
         <p:spPr>
           <a:xfrm>
-            <a:off x="4730729" y="4557634"/>
-            <a:ext cx="2275670" cy="1768430"/>
+            <a:off x="4808725" y="5462095"/>
+            <a:ext cx="2275670" cy="1395905"/>
           </a:xfrm>
           <a:prstGeom prst="rect">
             <a:avLst/>
@@ -16544,13 +16674,13 @@
         </p:nvPicPr>
         <p:blipFill rotWithShape="1">
           <a:blip r:embed="rId3"/>
-          <a:srcRect b="31881"/>
+          <a:srcRect b="45052"/>
           <a:stretch/>
         </p:blipFill>
         <p:spPr>
           <a:xfrm>
-            <a:off x="8458200" y="922465"/>
-            <a:ext cx="2381348" cy="1850553"/>
+            <a:off x="20828" y="5358372"/>
+            <a:ext cx="2381348" cy="1492744"/>
           </a:xfrm>
           <a:prstGeom prst="rect">
             <a:avLst/>
@@ -16881,10 +17011,10 @@
       </p:sp>
       <p:sp>
         <p:nvSpPr>
-          <p:cNvPr id="14" name="Rectangle 13">
-            <a:extLst>
-              <a:ext uri="{FF2B5EF4-FFF2-40B4-BE49-F238E27FC236}">
-                <a16:creationId xmlns:a16="http://schemas.microsoft.com/office/drawing/2014/main" id="{580441EA-41A7-4651-8937-4B0DB45BE1A1}"/>
+          <p:cNvPr id="15" name="Rectangle 14">
+            <a:extLst>
+              <a:ext uri="{FF2B5EF4-FFF2-40B4-BE49-F238E27FC236}">
+                <a16:creationId xmlns:a16="http://schemas.microsoft.com/office/drawing/2014/main" id="{26137DFE-F287-42A8-BA3F-8332F1C4708A}"/>
               </a:ext>
             </a:extLst>
           </p:cNvPr>
@@ -16893,8 +17023,8 @@
         </p:nvSpPr>
         <p:spPr>
           <a:xfrm>
-            <a:off x="271046" y="99389"/>
-            <a:ext cx="1540565" cy="377688"/>
+            <a:off x="357809" y="636104"/>
+            <a:ext cx="2213111" cy="391436"/>
           </a:xfrm>
           <a:prstGeom prst="rect">
             <a:avLst/>
@@ -16922,57 +17052,8 @@
           <a:p>
             <a:pPr algn="ctr"/>
             <a:r>
-              <a:rPr lang="en-NZ" dirty="0"/>
-              <a:t>Deployment</a:t>
-            </a:r>
-          </a:p>
-        </p:txBody>
-      </p:sp>
-      <p:sp>
-        <p:nvSpPr>
-          <p:cNvPr id="15" name="Rectangle 14">
-            <a:extLst>
-              <a:ext uri="{FF2B5EF4-FFF2-40B4-BE49-F238E27FC236}">
-                <a16:creationId xmlns:a16="http://schemas.microsoft.com/office/drawing/2014/main" id="{26137DFE-F287-42A8-BA3F-8332F1C4708A}"/>
-              </a:ext>
-            </a:extLst>
-          </p:cNvPr>
-          <p:cNvSpPr/>
-          <p:nvPr/>
-        </p:nvSpPr>
-        <p:spPr>
-          <a:xfrm>
-            <a:off x="357809" y="636104"/>
-            <a:ext cx="2213111" cy="278296"/>
-          </a:xfrm>
-          <a:prstGeom prst="rect">
-            <a:avLst/>
-          </a:prstGeom>
-        </p:spPr>
-        <p:style>
-          <a:lnRef idx="2">
-            <a:schemeClr val="accent1">
-              <a:shade val="50000"/>
-            </a:schemeClr>
-          </a:lnRef>
-          <a:fillRef idx="1">
-            <a:schemeClr val="accent1"/>
-          </a:fillRef>
-          <a:effectRef idx="0">
-            <a:schemeClr val="accent1"/>
-          </a:effectRef>
-          <a:fontRef idx="minor">
-            <a:schemeClr val="lt1"/>
-          </a:fontRef>
-        </p:style>
-        <p:txBody>
-          <a:bodyPr rtlCol="0" anchor="ctr"/>
-          <a:lstStyle/>
-          <a:p>
-            <a:pPr algn="ctr"/>
-            <a:r>
-              <a:rPr lang="en-NZ" dirty="0"/>
-              <a:t>Overall</a:t>
+              <a:rPr lang="en-NZ" sz="1000" dirty="0"/>
+              <a:t>Overall deployment structure</a:t>
             </a:r>
           </a:p>
         </p:txBody>
@@ -17482,50 +17563,6 @@
           </a:fontRef>
         </p:style>
       </p:cxnSp>
-      <p:sp>
-        <p:nvSpPr>
-          <p:cNvPr id="29" name="Cylinder 28">
-            <a:extLst>
-              <a:ext uri="{FF2B5EF4-FFF2-40B4-BE49-F238E27FC236}">
-                <a16:creationId xmlns:a16="http://schemas.microsoft.com/office/drawing/2014/main" id="{EA96315B-CE60-45BE-ACAF-ECD44F29ADCF}"/>
-              </a:ext>
-            </a:extLst>
-          </p:cNvPr>
-          <p:cNvSpPr/>
-          <p:nvPr/>
-        </p:nvSpPr>
-        <p:spPr>
-          <a:xfrm>
-            <a:off x="9868206" y="4618997"/>
-            <a:ext cx="795131" cy="662199"/>
-          </a:xfrm>
-          <a:prstGeom prst="can">
-            <a:avLst/>
-          </a:prstGeom>
-        </p:spPr>
-        <p:style>
-          <a:lnRef idx="2">
-            <a:schemeClr val="dk1"/>
-          </a:lnRef>
-          <a:fillRef idx="1">
-            <a:schemeClr val="lt1"/>
-          </a:fillRef>
-          <a:effectRef idx="0">
-            <a:schemeClr val="dk1"/>
-          </a:effectRef>
-          <a:fontRef idx="minor">
-            <a:schemeClr val="dk1"/>
-          </a:fontRef>
-        </p:style>
-        <p:txBody>
-          <a:bodyPr rtlCol="0" anchor="ctr"/>
-          <a:lstStyle/>
-          <a:p>
-            <a:pPr algn="ctr"/>
-            <a:endParaRPr lang="en-NZ" dirty="0"/>
-          </a:p>
-        </p:txBody>
-      </p:sp>
       <p:grpSp>
         <p:nvGrpSpPr>
           <p:cNvPr id="30" name="Group 29">

</xml_diff>

<commit_message>
commit before switching to laptop
</commit_message>
<xml_diff>
--- a/Big Brother Driver Diagrams.pptx
+++ b/Big Brother Driver Diagrams.pptx
@@ -3380,8 +3380,8 @@
         </p:nvSpPr>
         <p:spPr>
           <a:xfrm>
-            <a:off x="1311964" y="1043608"/>
-            <a:ext cx="3101009" cy="1441174"/>
+            <a:off x="1311965" y="1742830"/>
+            <a:ext cx="1993944" cy="741951"/>
           </a:xfrm>
           <a:prstGeom prst="rect">
             <a:avLst/>
@@ -3428,8 +3428,8 @@
         </p:nvSpPr>
         <p:spPr>
           <a:xfrm>
-            <a:off x="1311964" y="4754217"/>
-            <a:ext cx="3101009" cy="1441174"/>
+            <a:off x="1163472" y="3479372"/>
+            <a:ext cx="1993945" cy="662099"/>
           </a:xfrm>
           <a:prstGeom prst="rect">
             <a:avLst/>
@@ -3476,7 +3476,7 @@
         </p:nvSpPr>
         <p:spPr>
           <a:xfrm>
-            <a:off x="8395252" y="2902226"/>
+            <a:off x="4516804" y="1949344"/>
             <a:ext cx="3101009" cy="1441174"/>
           </a:xfrm>
           <a:prstGeom prst="rect">
@@ -3519,13 +3519,15 @@
               </a:ext>
             </a:extLst>
           </p:cNvPr>
-          <p:cNvCxnSpPr/>
+          <p:cNvCxnSpPr>
+            <a:stCxn id="4" idx="3"/>
+          </p:cNvCxnSpPr>
           <p:nvPr/>
         </p:nvCxnSpPr>
         <p:spPr>
           <a:xfrm>
-            <a:off x="4412973" y="1977887"/>
-            <a:ext cx="3982279" cy="1212574"/>
+            <a:off x="3305909" y="2113806"/>
+            <a:ext cx="1210895" cy="313766"/>
           </a:xfrm>
           <a:prstGeom prst="straightConnector1">
             <a:avLst/>
@@ -3565,8 +3567,8 @@
         </p:nvCxnSpPr>
         <p:spPr>
           <a:xfrm flipV="1">
-            <a:off x="4412973" y="3796748"/>
-            <a:ext cx="3982279" cy="1678056"/>
+            <a:off x="3157417" y="3166793"/>
+            <a:ext cx="1359387" cy="643629"/>
           </a:xfrm>
           <a:prstGeom prst="straightConnector1">
             <a:avLst/>
@@ -3661,8 +3663,8 @@
         </p:blipFill>
         <p:spPr>
           <a:xfrm>
-            <a:off x="8197850" y="600075"/>
-            <a:ext cx="2705100" cy="1543050"/>
+            <a:off x="4516804" y="367748"/>
+            <a:ext cx="1352550" cy="771525"/>
           </a:xfrm>
           <a:prstGeom prst="rect">
             <a:avLst/>
@@ -4069,8 +4071,8 @@
         </p:nvGrpSpPr>
         <p:grpSpPr>
           <a:xfrm>
-            <a:off x="3299168" y="5277678"/>
-            <a:ext cx="1714453" cy="1440000"/>
+            <a:off x="3299169" y="5752122"/>
+            <a:ext cx="1147786" cy="965555"/>
             <a:chOff x="10217012" y="198783"/>
             <a:chExt cx="1714453" cy="1544778"/>
           </a:xfrm>
@@ -4148,8 +4150,8 @@
         </p:nvSpPr>
         <p:spPr>
           <a:xfrm>
-            <a:off x="301583" y="1156159"/>
-            <a:ext cx="2069404" cy="369332"/>
+            <a:off x="264947" y="1227537"/>
+            <a:ext cx="2069404" cy="246221"/>
           </a:xfrm>
           <a:prstGeom prst="rect">
             <a:avLst/>
@@ -4163,7 +4165,7 @@
           <a:lstStyle/>
           <a:p>
             <a:r>
-              <a:rPr lang="en-NZ" dirty="0"/>
+              <a:rPr lang="en-NZ" sz="1000" dirty="0"/>
               <a:t>In each car</a:t>
             </a:r>
           </a:p>
@@ -4306,6 +4308,42 @@
           </a:p>
         </p:txBody>
       </p:sp>
+      <p:cxnSp>
+        <p:nvCxnSpPr>
+          <p:cNvPr id="3" name="Straight Arrow Connector 2"/>
+          <p:cNvCxnSpPr>
+            <a:endCxn id="31" idx="1"/>
+          </p:cNvCxnSpPr>
+          <p:nvPr/>
+        </p:nvCxnSpPr>
+        <p:spPr>
+          <a:xfrm flipV="1">
+            <a:off x="3104321" y="2246243"/>
+            <a:ext cx="529464" cy="9940"/>
+          </a:xfrm>
+          <a:prstGeom prst="straightConnector1">
+            <a:avLst/>
+          </a:prstGeom>
+          <a:ln>
+            <a:headEnd type="triangle"/>
+            <a:tailEnd type="triangle"/>
+          </a:ln>
+        </p:spPr>
+        <p:style>
+          <a:lnRef idx="1">
+            <a:schemeClr val="dk1"/>
+          </a:lnRef>
+          <a:fillRef idx="0">
+            <a:schemeClr val="dk1"/>
+          </a:fillRef>
+          <a:effectRef idx="0">
+            <a:schemeClr val="dk1"/>
+          </a:effectRef>
+          <a:fontRef idx="minor">
+            <a:schemeClr val="tx1"/>
+          </a:fontRef>
+        </p:style>
+      </p:cxnSp>
     </p:spTree>
     <p:extLst>
       <p:ext uri="{BB962C8B-B14F-4D97-AF65-F5344CB8AC3E}">
@@ -4935,7 +4973,7 @@
           <a:lstStyle/>
           <a:p>
             <a:pPr algn="ctr"/>
-            <a:endParaRPr lang="en-NZ"/>
+            <a:endParaRPr lang="en-NZ" sz="1000"/>
           </a:p>
         </p:txBody>
       </p:sp>
@@ -5027,7 +5065,7 @@
           <a:lstStyle/>
           <a:p>
             <a:pPr algn="ctr"/>
-            <a:endParaRPr lang="en-NZ"/>
+            <a:endParaRPr lang="en-NZ" sz="1000"/>
           </a:p>
         </p:txBody>
       </p:sp>
@@ -5072,7 +5110,7 @@
           <a:lstStyle/>
           <a:p>
             <a:pPr algn="ctr"/>
-            <a:endParaRPr lang="en-NZ"/>
+            <a:endParaRPr lang="en-NZ" sz="1000"/>
           </a:p>
         </p:txBody>
       </p:sp>
@@ -5117,7 +5155,7 @@
           <a:lstStyle/>
           <a:p>
             <a:pPr algn="ctr"/>
-            <a:endParaRPr lang="en-NZ"/>
+            <a:endParaRPr lang="en-NZ" sz="1000"/>
           </a:p>
         </p:txBody>
       </p:sp>
@@ -5135,8 +5173,8 @@
         </p:nvGrpSpPr>
         <p:grpSpPr>
           <a:xfrm>
-            <a:off x="10217012" y="198783"/>
-            <a:ext cx="1714453" cy="1440000"/>
+            <a:off x="10668001" y="149084"/>
+            <a:ext cx="1349434" cy="1095041"/>
             <a:chOff x="10217012" y="198783"/>
             <a:chExt cx="1714453" cy="1544778"/>
           </a:xfrm>
@@ -5276,7 +5314,7 @@
           <a:lstStyle/>
           <a:p>
             <a:pPr algn="ctr"/>
-            <a:endParaRPr lang="en-NZ"/>
+            <a:endParaRPr lang="en-NZ" sz="1000"/>
           </a:p>
         </p:txBody>
       </p:sp>
@@ -5811,7 +5849,7 @@
           <a:lstStyle/>
           <a:p>
             <a:pPr algn="ctr"/>
-            <a:endParaRPr lang="en-NZ"/>
+            <a:endParaRPr lang="en-NZ" sz="1000"/>
           </a:p>
         </p:txBody>
       </p:sp>
@@ -5856,7 +5894,7 @@
           <a:lstStyle/>
           <a:p>
             <a:pPr algn="ctr"/>
-            <a:endParaRPr lang="en-NZ"/>
+            <a:endParaRPr lang="en-NZ" sz="1000"/>
           </a:p>
         </p:txBody>
       </p:sp>
@@ -5901,7 +5939,7 @@
           <a:lstStyle/>
           <a:p>
             <a:pPr algn="ctr"/>
-            <a:endParaRPr lang="en-NZ"/>
+            <a:endParaRPr lang="en-NZ" sz="1000"/>
           </a:p>
         </p:txBody>
       </p:sp>
@@ -5946,7 +5984,7 @@
           <a:lstStyle/>
           <a:p>
             <a:pPr algn="ctr"/>
-            <a:endParaRPr lang="en-NZ"/>
+            <a:endParaRPr lang="en-NZ" sz="1000"/>
           </a:p>
         </p:txBody>
       </p:sp>
@@ -6590,7 +6628,7 @@
           <a:lstStyle/>
           <a:p>
             <a:pPr algn="ctr"/>
-            <a:endParaRPr lang="en-NZ" dirty="0"/>
+            <a:endParaRPr lang="en-NZ" sz="1000" dirty="0"/>
           </a:p>
         </p:txBody>
       </p:sp>
@@ -6608,8 +6646,8 @@
         </p:nvSpPr>
         <p:spPr>
           <a:xfrm>
-            <a:off x="437322" y="1669774"/>
-            <a:ext cx="1838739" cy="369332"/>
+            <a:off x="437322" y="1754329"/>
+            <a:ext cx="1838739" cy="246221"/>
           </a:xfrm>
           <a:prstGeom prst="rect">
             <a:avLst/>
@@ -6623,7 +6661,7 @@
           <a:lstStyle/>
           <a:p>
             <a:r>
-              <a:rPr lang="en-NZ" dirty="0"/>
+              <a:rPr lang="en-NZ" sz="1000" dirty="0"/>
               <a:t>Each client</a:t>
             </a:r>
           </a:p>
@@ -10258,8 +10296,8 @@
         </p:blipFill>
         <p:spPr>
           <a:xfrm>
-            <a:off x="9621076" y="893693"/>
-            <a:ext cx="1726922" cy="985075"/>
+            <a:off x="8890552" y="56520"/>
+            <a:ext cx="1260000" cy="718732"/>
           </a:xfrm>
           <a:prstGeom prst="rect">
             <a:avLst/>
@@ -10352,8 +10390,8 @@
         </p:nvSpPr>
         <p:spPr>
           <a:xfrm>
-            <a:off x="367748" y="337930"/>
-            <a:ext cx="1500809" cy="616227"/>
+            <a:off x="163505" y="195411"/>
+            <a:ext cx="1500809" cy="194834"/>
           </a:xfrm>
           <a:prstGeom prst="rect">
             <a:avLst/>
@@ -11326,8 +11364,8 @@
         </p:blipFill>
         <p:spPr>
           <a:xfrm>
-            <a:off x="10022756" y="5840256"/>
-            <a:ext cx="1566270" cy="893435"/>
+            <a:off x="8287566" y="5704045"/>
+            <a:ext cx="1260000" cy="718732"/>
           </a:xfrm>
           <a:prstGeom prst="rect">
             <a:avLst/>
@@ -11879,8 +11917,8 @@
         </p:nvSpPr>
         <p:spPr>
           <a:xfrm>
-            <a:off x="245035" y="4859220"/>
-            <a:ext cx="1632141" cy="1178958"/>
+            <a:off x="342899" y="4934378"/>
+            <a:ext cx="1142023" cy="497070"/>
           </a:xfrm>
           <a:prstGeom prst="rect">
             <a:avLst/>
@@ -11929,8 +11967,8 @@
         </p:nvCxnSpPr>
         <p:spPr>
           <a:xfrm flipH="1">
-            <a:off x="1877176" y="5172303"/>
-            <a:ext cx="167481" cy="276396"/>
+            <a:off x="1484922" y="5172303"/>
+            <a:ext cx="559735" cy="10610"/>
           </a:xfrm>
           <a:prstGeom prst="straightConnector1">
             <a:avLst/>
@@ -11968,8 +12006,8 @@
         </p:nvSpPr>
         <p:spPr>
           <a:xfrm>
-            <a:off x="6167480" y="4904825"/>
-            <a:ext cx="1632141" cy="1178958"/>
+            <a:off x="6384961" y="4951124"/>
+            <a:ext cx="1112782" cy="442357"/>
           </a:xfrm>
           <a:prstGeom prst="rect">
             <a:avLst/>
@@ -12011,14 +12049,15 @@
             </a:extLst>
           </p:cNvPr>
           <p:cNvCxnSpPr>
+            <a:stCxn id="13" idx="3"/>
             <a:endCxn id="157" idx="1"/>
           </p:cNvCxnSpPr>
           <p:nvPr/>
         </p:nvCxnSpPr>
         <p:spPr>
           <a:xfrm>
-            <a:off x="6106791" y="5172302"/>
-            <a:ext cx="60689" cy="322002"/>
+            <a:off x="6106791" y="5172303"/>
+            <a:ext cx="278170" cy="0"/>
           </a:xfrm>
           <a:prstGeom prst="straightConnector1">
             <a:avLst/>
@@ -12222,6 +12261,563 @@
           </a:fontRef>
         </p:style>
       </p:cxnSp>
+      <p:sp>
+        <p:nvSpPr>
+          <p:cNvPr id="2" name="Rectangle 1"/>
+          <p:cNvSpPr/>
+          <p:nvPr/>
+        </p:nvSpPr>
+        <p:spPr>
+          <a:xfrm>
+            <a:off x="9562112" y="4336181"/>
+            <a:ext cx="838214" cy="1046075"/>
+          </a:xfrm>
+          <a:prstGeom prst="rect">
+            <a:avLst/>
+          </a:prstGeom>
+        </p:spPr>
+        <p:style>
+          <a:lnRef idx="2">
+            <a:schemeClr val="dk1"/>
+          </a:lnRef>
+          <a:fillRef idx="1">
+            <a:schemeClr val="lt1"/>
+          </a:fillRef>
+          <a:effectRef idx="0">
+            <a:schemeClr val="dk1"/>
+          </a:effectRef>
+          <a:fontRef idx="minor">
+            <a:schemeClr val="dk1"/>
+          </a:fontRef>
+        </p:style>
+        <p:txBody>
+          <a:bodyPr rtlCol="0" anchor="ctr"/>
+          <a:lstStyle/>
+          <a:p>
+            <a:pPr algn="ctr"/>
+            <a:r>
+              <a:rPr lang="en-NZ" sz="1000" dirty="0" smtClean="0"/>
+              <a:t>Database Manager</a:t>
+            </a:r>
+            <a:endParaRPr lang="en-NZ" sz="1000" dirty="0"/>
+          </a:p>
+        </p:txBody>
+      </p:sp>
+      <p:sp>
+        <p:nvSpPr>
+          <p:cNvPr id="3" name="Rectangle 2"/>
+          <p:cNvSpPr/>
+          <p:nvPr/>
+        </p:nvSpPr>
+        <p:spPr>
+          <a:xfrm>
+            <a:off x="8336831" y="4583478"/>
+            <a:ext cx="922216" cy="551484"/>
+          </a:xfrm>
+          <a:prstGeom prst="rect">
+            <a:avLst/>
+          </a:prstGeom>
+        </p:spPr>
+        <p:style>
+          <a:lnRef idx="2">
+            <a:schemeClr val="dk1"/>
+          </a:lnRef>
+          <a:fillRef idx="1">
+            <a:schemeClr val="lt1"/>
+          </a:fillRef>
+          <a:effectRef idx="0">
+            <a:schemeClr val="dk1"/>
+          </a:effectRef>
+          <a:fontRef idx="minor">
+            <a:schemeClr val="dk1"/>
+          </a:fontRef>
+        </p:style>
+        <p:txBody>
+          <a:bodyPr rtlCol="0" anchor="ctr"/>
+          <a:lstStyle/>
+          <a:p>
+            <a:pPr algn="ctr"/>
+            <a:r>
+              <a:rPr lang="en-NZ" sz="1000" dirty="0" smtClean="0"/>
+              <a:t>Operations on repositories*</a:t>
+            </a:r>
+            <a:endParaRPr lang="en-NZ" sz="1000" dirty="0"/>
+          </a:p>
+        </p:txBody>
+      </p:sp>
+      <p:cxnSp>
+        <p:nvCxnSpPr>
+          <p:cNvPr id="9" name="Straight Arrow Connector 8"/>
+          <p:cNvCxnSpPr>
+            <a:stCxn id="3" idx="3"/>
+            <a:endCxn id="2" idx="1"/>
+          </p:cNvCxnSpPr>
+          <p:nvPr/>
+        </p:nvCxnSpPr>
+        <p:spPr>
+          <a:xfrm flipV="1">
+            <a:off x="9259047" y="4859219"/>
+            <a:ext cx="303065" cy="1"/>
+          </a:xfrm>
+          <a:prstGeom prst="straightConnector1">
+            <a:avLst/>
+          </a:prstGeom>
+          <a:ln>
+            <a:tailEnd type="triangle"/>
+          </a:ln>
+        </p:spPr>
+        <p:style>
+          <a:lnRef idx="1">
+            <a:schemeClr val="dk1"/>
+          </a:lnRef>
+          <a:fillRef idx="0">
+            <a:schemeClr val="dk1"/>
+          </a:fillRef>
+          <a:effectRef idx="0">
+            <a:schemeClr val="dk1"/>
+          </a:effectRef>
+          <a:fontRef idx="minor">
+            <a:schemeClr val="tx1"/>
+          </a:fontRef>
+        </p:style>
+      </p:cxnSp>
+      <p:sp>
+        <p:nvSpPr>
+          <p:cNvPr id="48" name="Rectangle 47"/>
+          <p:cNvSpPr/>
+          <p:nvPr/>
+        </p:nvSpPr>
+        <p:spPr>
+          <a:xfrm>
+            <a:off x="10703391" y="4718862"/>
+            <a:ext cx="885635" cy="280715"/>
+          </a:xfrm>
+          <a:prstGeom prst="rect">
+            <a:avLst/>
+          </a:prstGeom>
+        </p:spPr>
+        <p:style>
+          <a:lnRef idx="2">
+            <a:schemeClr val="dk1"/>
+          </a:lnRef>
+          <a:fillRef idx="1">
+            <a:schemeClr val="lt1"/>
+          </a:fillRef>
+          <a:effectRef idx="0">
+            <a:schemeClr val="dk1"/>
+          </a:effectRef>
+          <a:fontRef idx="minor">
+            <a:schemeClr val="dk1"/>
+          </a:fontRef>
+        </p:style>
+        <p:txBody>
+          <a:bodyPr rtlCol="0" anchor="ctr"/>
+          <a:lstStyle/>
+          <a:p>
+            <a:pPr algn="ctr"/>
+            <a:r>
+              <a:rPr lang="en-NZ" sz="1000" dirty="0" smtClean="0"/>
+              <a:t>Repositories</a:t>
+            </a:r>
+            <a:endParaRPr lang="en-NZ" sz="1000" dirty="0"/>
+          </a:p>
+        </p:txBody>
+      </p:sp>
+      <p:cxnSp>
+        <p:nvCxnSpPr>
+          <p:cNvPr id="11" name="Straight Arrow Connector 10"/>
+          <p:cNvCxnSpPr>
+            <a:stCxn id="2" idx="3"/>
+            <a:endCxn id="48" idx="1"/>
+          </p:cNvCxnSpPr>
+          <p:nvPr/>
+        </p:nvCxnSpPr>
+        <p:spPr>
+          <a:xfrm>
+            <a:off x="10400326" y="4859219"/>
+            <a:ext cx="303065" cy="1"/>
+          </a:xfrm>
+          <a:prstGeom prst="straightConnector1">
+            <a:avLst/>
+          </a:prstGeom>
+          <a:ln>
+            <a:tailEnd type="triangle"/>
+          </a:ln>
+        </p:spPr>
+        <p:style>
+          <a:lnRef idx="1">
+            <a:schemeClr val="dk1"/>
+          </a:lnRef>
+          <a:fillRef idx="0">
+            <a:schemeClr val="dk1"/>
+          </a:fillRef>
+          <a:effectRef idx="0">
+            <a:schemeClr val="dk1"/>
+          </a:effectRef>
+          <a:fontRef idx="minor">
+            <a:schemeClr val="tx1"/>
+          </a:fontRef>
+        </p:style>
+      </p:cxnSp>
+      <p:sp>
+        <p:nvSpPr>
+          <p:cNvPr id="23" name="Rectangle 22"/>
+          <p:cNvSpPr/>
+          <p:nvPr/>
+        </p:nvSpPr>
+        <p:spPr>
+          <a:xfrm>
+            <a:off x="9638726" y="5083743"/>
+            <a:ext cx="693618" cy="198341"/>
+          </a:xfrm>
+          <a:prstGeom prst="rect">
+            <a:avLst/>
+          </a:prstGeom>
+        </p:spPr>
+        <p:style>
+          <a:lnRef idx="2">
+            <a:schemeClr val="dk1"/>
+          </a:lnRef>
+          <a:fillRef idx="1">
+            <a:schemeClr val="lt1"/>
+          </a:fillRef>
+          <a:effectRef idx="0">
+            <a:schemeClr val="dk1"/>
+          </a:effectRef>
+          <a:fontRef idx="minor">
+            <a:schemeClr val="dk1"/>
+          </a:fontRef>
+        </p:style>
+        <p:txBody>
+          <a:bodyPr rtlCol="0" anchor="ctr"/>
+          <a:lstStyle/>
+          <a:p>
+            <a:pPr algn="ctr"/>
+            <a:r>
+              <a:rPr lang="en-NZ" sz="1000" dirty="0" smtClean="0"/>
+              <a:t>Searching</a:t>
+            </a:r>
+            <a:endParaRPr lang="en-NZ" sz="1000" dirty="0"/>
+          </a:p>
+        </p:txBody>
+      </p:sp>
+      <p:sp>
+        <p:nvSpPr>
+          <p:cNvPr id="25" name="Rectangle 24"/>
+          <p:cNvSpPr/>
+          <p:nvPr/>
+        </p:nvSpPr>
+        <p:spPr>
+          <a:xfrm>
+            <a:off x="9638726" y="4393923"/>
+            <a:ext cx="693618" cy="279000"/>
+          </a:xfrm>
+          <a:prstGeom prst="rect">
+            <a:avLst/>
+          </a:prstGeom>
+        </p:spPr>
+        <p:style>
+          <a:lnRef idx="2">
+            <a:schemeClr val="dk1"/>
+          </a:lnRef>
+          <a:fillRef idx="1">
+            <a:schemeClr val="lt1"/>
+          </a:fillRef>
+          <a:effectRef idx="0">
+            <a:schemeClr val="dk1"/>
+          </a:effectRef>
+          <a:fontRef idx="minor">
+            <a:schemeClr val="dk1"/>
+          </a:fontRef>
+        </p:style>
+        <p:txBody>
+          <a:bodyPr rtlCol="0" anchor="ctr"/>
+          <a:lstStyle/>
+          <a:p>
+            <a:pPr algn="ctr"/>
+            <a:r>
+              <a:rPr lang="en-NZ" sz="1000" dirty="0" smtClean="0"/>
+              <a:t>Updating</a:t>
+            </a:r>
+            <a:endParaRPr lang="en-NZ" sz="1000" dirty="0"/>
+          </a:p>
+        </p:txBody>
+      </p:sp>
+      <p:sp>
+        <p:nvSpPr>
+          <p:cNvPr id="31" name="Rectangle 30"/>
+          <p:cNvSpPr/>
+          <p:nvPr/>
+        </p:nvSpPr>
+        <p:spPr>
+          <a:xfrm>
+            <a:off x="1842989" y="200163"/>
+            <a:ext cx="1097813" cy="281888"/>
+          </a:xfrm>
+          <a:prstGeom prst="rect">
+            <a:avLst/>
+          </a:prstGeom>
+        </p:spPr>
+        <p:style>
+          <a:lnRef idx="2">
+            <a:schemeClr val="dk1"/>
+          </a:lnRef>
+          <a:fillRef idx="1">
+            <a:schemeClr val="lt1"/>
+          </a:fillRef>
+          <a:effectRef idx="0">
+            <a:schemeClr val="dk1"/>
+          </a:effectRef>
+          <a:fontRef idx="minor">
+            <a:schemeClr val="dk1"/>
+          </a:fontRef>
+        </p:style>
+        <p:txBody>
+          <a:bodyPr rtlCol="0" anchor="ctr"/>
+          <a:lstStyle/>
+          <a:p>
+            <a:pPr algn="ctr"/>
+            <a:r>
+              <a:rPr lang="en-NZ" sz="1000" dirty="0" smtClean="0"/>
+              <a:t>Broker Interface</a:t>
+            </a:r>
+          </a:p>
+          <a:p>
+            <a:pPr algn="ctr"/>
+            <a:r>
+              <a:rPr lang="en-NZ" sz="1000" dirty="0" smtClean="0"/>
+              <a:t>(entry point)</a:t>
+            </a:r>
+            <a:endParaRPr lang="en-NZ" sz="1000" dirty="0"/>
+          </a:p>
+        </p:txBody>
+      </p:sp>
+      <p:sp>
+        <p:nvSpPr>
+          <p:cNvPr id="32" name="TextBox 31"/>
+          <p:cNvSpPr txBox="1"/>
+          <p:nvPr/>
+        </p:nvSpPr>
+        <p:spPr>
+          <a:xfrm>
+            <a:off x="3062497" y="5485385"/>
+            <a:ext cx="120128" cy="246221"/>
+          </a:xfrm>
+          <a:prstGeom prst="rect">
+            <a:avLst/>
+          </a:prstGeom>
+          <a:noFill/>
+        </p:spPr>
+        <p:txBody>
+          <a:bodyPr wrap="square" rtlCol="0">
+            <a:spAutoFit/>
+          </a:bodyPr>
+          <a:lstStyle/>
+          <a:p>
+            <a:r>
+              <a:rPr lang="en-NZ" sz="1000" dirty="0" smtClean="0"/>
+              <a:t>*</a:t>
+            </a:r>
+            <a:endParaRPr lang="en-NZ" sz="1000" dirty="0"/>
+          </a:p>
+        </p:txBody>
+      </p:sp>
+      <p:sp>
+        <p:nvSpPr>
+          <p:cNvPr id="67" name="TextBox 66"/>
+          <p:cNvSpPr txBox="1"/>
+          <p:nvPr/>
+        </p:nvSpPr>
+        <p:spPr>
+          <a:xfrm>
+            <a:off x="4935653" y="5503531"/>
+            <a:ext cx="120128" cy="246221"/>
+          </a:xfrm>
+          <a:prstGeom prst="rect">
+            <a:avLst/>
+          </a:prstGeom>
+          <a:noFill/>
+        </p:spPr>
+        <p:txBody>
+          <a:bodyPr wrap="square" rtlCol="0">
+            <a:spAutoFit/>
+          </a:bodyPr>
+          <a:lstStyle/>
+          <a:p>
+            <a:r>
+              <a:rPr lang="en-NZ" sz="1000" dirty="0" smtClean="0"/>
+              <a:t>*</a:t>
+            </a:r>
+            <a:endParaRPr lang="en-NZ" sz="1000" dirty="0"/>
+          </a:p>
+        </p:txBody>
+      </p:sp>
+      <p:sp>
+        <p:nvSpPr>
+          <p:cNvPr id="68" name="TextBox 67"/>
+          <p:cNvSpPr txBox="1"/>
+          <p:nvPr/>
+        </p:nvSpPr>
+        <p:spPr>
+          <a:xfrm>
+            <a:off x="961629" y="3161490"/>
+            <a:ext cx="120128" cy="246221"/>
+          </a:xfrm>
+          <a:prstGeom prst="rect">
+            <a:avLst/>
+          </a:prstGeom>
+          <a:noFill/>
+        </p:spPr>
+        <p:txBody>
+          <a:bodyPr wrap="square" rtlCol="0">
+            <a:spAutoFit/>
+          </a:bodyPr>
+          <a:lstStyle/>
+          <a:p>
+            <a:r>
+              <a:rPr lang="en-NZ" sz="1000" dirty="0" smtClean="0"/>
+              <a:t>*</a:t>
+            </a:r>
+            <a:endParaRPr lang="en-NZ" sz="1000" dirty="0"/>
+          </a:p>
+        </p:txBody>
+      </p:sp>
+      <p:sp>
+        <p:nvSpPr>
+          <p:cNvPr id="69" name="TextBox 68"/>
+          <p:cNvSpPr txBox="1"/>
+          <p:nvPr/>
+        </p:nvSpPr>
+        <p:spPr>
+          <a:xfrm>
+            <a:off x="7031120" y="1379986"/>
+            <a:ext cx="120128" cy="246221"/>
+          </a:xfrm>
+          <a:prstGeom prst="rect">
+            <a:avLst/>
+          </a:prstGeom>
+          <a:noFill/>
+        </p:spPr>
+        <p:txBody>
+          <a:bodyPr wrap="square" rtlCol="0">
+            <a:spAutoFit/>
+          </a:bodyPr>
+          <a:lstStyle/>
+          <a:p>
+            <a:r>
+              <a:rPr lang="en-NZ" sz="1000" dirty="0" smtClean="0"/>
+              <a:t>*</a:t>
+            </a:r>
+            <a:endParaRPr lang="en-NZ" sz="1000" dirty="0"/>
+          </a:p>
+        </p:txBody>
+      </p:sp>
+      <p:sp>
+        <p:nvSpPr>
+          <p:cNvPr id="71" name="TextBox 70"/>
+          <p:cNvSpPr txBox="1"/>
+          <p:nvPr/>
+        </p:nvSpPr>
+        <p:spPr>
+          <a:xfrm>
+            <a:off x="10380135" y="2468680"/>
+            <a:ext cx="120128" cy="246221"/>
+          </a:xfrm>
+          <a:prstGeom prst="rect">
+            <a:avLst/>
+          </a:prstGeom>
+          <a:noFill/>
+        </p:spPr>
+        <p:txBody>
+          <a:bodyPr wrap="square" rtlCol="0">
+            <a:spAutoFit/>
+          </a:bodyPr>
+          <a:lstStyle/>
+          <a:p>
+            <a:r>
+              <a:rPr lang="en-NZ" sz="1000" dirty="0" smtClean="0"/>
+              <a:t>*</a:t>
+            </a:r>
+            <a:endParaRPr lang="en-NZ" sz="1000" dirty="0"/>
+          </a:p>
+        </p:txBody>
+      </p:sp>
+      <p:cxnSp>
+        <p:nvCxnSpPr>
+          <p:cNvPr id="38" name="Straight Arrow Connector 37"/>
+          <p:cNvCxnSpPr/>
+          <p:nvPr/>
+        </p:nvCxnSpPr>
+        <p:spPr>
+          <a:xfrm>
+            <a:off x="2368030" y="482051"/>
+            <a:ext cx="256046" cy="228570"/>
+          </a:xfrm>
+          <a:prstGeom prst="straightConnector1">
+            <a:avLst/>
+          </a:prstGeom>
+          <a:ln>
+            <a:tailEnd type="triangle"/>
+          </a:ln>
+        </p:spPr>
+        <p:style>
+          <a:lnRef idx="1">
+            <a:schemeClr val="dk1"/>
+          </a:lnRef>
+          <a:fillRef idx="0">
+            <a:schemeClr val="dk1"/>
+          </a:fillRef>
+          <a:effectRef idx="0">
+            <a:schemeClr val="dk1"/>
+          </a:effectRef>
+          <a:fontRef idx="minor">
+            <a:schemeClr val="tx1"/>
+          </a:fontRef>
+        </p:style>
+      </p:cxnSp>
+      <p:sp>
+        <p:nvSpPr>
+          <p:cNvPr id="74" name="TextBox 73"/>
+          <p:cNvSpPr txBox="1"/>
+          <p:nvPr/>
+        </p:nvSpPr>
+        <p:spPr>
+          <a:xfrm>
+            <a:off x="2639766" y="596336"/>
+            <a:ext cx="699422" cy="553998"/>
+          </a:xfrm>
+          <a:prstGeom prst="rect">
+            <a:avLst/>
+          </a:prstGeom>
+        </p:spPr>
+        <p:style>
+          <a:lnRef idx="2">
+            <a:schemeClr val="dk1"/>
+          </a:lnRef>
+          <a:fillRef idx="1">
+            <a:schemeClr val="lt1"/>
+          </a:fillRef>
+          <a:effectRef idx="0">
+            <a:schemeClr val="dk1"/>
+          </a:effectRef>
+          <a:fontRef idx="minor">
+            <a:schemeClr val="dk1"/>
+          </a:fontRef>
+        </p:style>
+        <p:txBody>
+          <a:bodyPr wrap="square" rtlCol="0">
+            <a:spAutoFit/>
+          </a:bodyPr>
+          <a:lstStyle/>
+          <a:p>
+            <a:r>
+              <a:rPr lang="en-NZ" sz="1000" dirty="0" smtClean="0"/>
+              <a:t>*The modules below:</a:t>
+            </a:r>
+            <a:endParaRPr lang="en-NZ" sz="1000" dirty="0"/>
+          </a:p>
+        </p:txBody>
+      </p:sp>
     </p:spTree>
     <p:extLst>
       <p:ext uri="{BB962C8B-B14F-4D97-AF65-F5344CB8AC3E}">
@@ -12267,7 +12863,7 @@
         <p:spPr>
           <a:xfrm>
             <a:off x="447261" y="238539"/>
-            <a:ext cx="1540565" cy="606287"/>
+            <a:ext cx="1540565" cy="402323"/>
           </a:xfrm>
           <a:prstGeom prst="rect">
             <a:avLst/>
@@ -12500,7 +13096,7 @@
         <p:spPr>
           <a:xfrm>
             <a:off x="2428461" y="2343979"/>
-            <a:ext cx="1769165" cy="924339"/>
+            <a:ext cx="1769165" cy="430483"/>
           </a:xfrm>
           <a:prstGeom prst="rect">
             <a:avLst/>
@@ -12686,8 +13282,8 @@
         </p:blipFill>
         <p:spPr>
           <a:xfrm>
-            <a:off x="4422748" y="238539"/>
-            <a:ext cx="1949230" cy="1111885"/>
+            <a:off x="4197626" y="161707"/>
+            <a:ext cx="1260000" cy="718733"/>
           </a:xfrm>
           <a:prstGeom prst="rect">
             <a:avLst/>
@@ -13122,8 +13718,8 @@
         </p:blipFill>
         <p:spPr>
           <a:xfrm>
-            <a:off x="5811808" y="5380274"/>
-            <a:ext cx="2381348" cy="1477726"/>
+            <a:off x="5358516" y="5964420"/>
+            <a:ext cx="1440000" cy="893580"/>
           </a:xfrm>
           <a:prstGeom prst="rect">
             <a:avLst/>
@@ -13314,8 +13910,8 @@
         </p:nvSpPr>
         <p:spPr>
           <a:xfrm>
-            <a:off x="214576" y="253990"/>
-            <a:ext cx="1993852" cy="576470"/>
+            <a:off x="214575" y="253990"/>
+            <a:ext cx="2520809" cy="352297"/>
           </a:xfrm>
           <a:prstGeom prst="rect">
             <a:avLst/>
@@ -13343,94 +13939,37 @@
           <a:p>
             <a:pPr algn="ctr"/>
             <a:r>
+              <a:rPr lang="en-NZ" sz="1000" dirty="0" smtClean="0"/>
+              <a:t>BBD-V </a:t>
+            </a:r>
+            <a:r>
               <a:rPr lang="en-NZ" sz="1000" dirty="0">
                 <a:latin typeface="Times New Roman" panose="02020603050405020304" pitchFamily="18" charset="0"/>
               </a:rPr>
-              <a:t>“Process” Structure</a:t>
+              <a:t>P</a:t>
+            </a:r>
+            <a:r>
+              <a:rPr lang="en-NZ" sz="1000" dirty="0" smtClean="0">
+                <a:latin typeface="Times New Roman" panose="02020603050405020304" pitchFamily="18" charset="0"/>
+              </a:rPr>
+              <a:t>rocess </a:t>
+            </a:r>
+            <a:r>
+              <a:rPr lang="en-NZ" sz="1000" dirty="0">
+                <a:latin typeface="Times New Roman" panose="02020603050405020304" pitchFamily="18" charset="0"/>
+              </a:rPr>
+              <a:t>S</a:t>
+            </a:r>
+            <a:r>
+              <a:rPr lang="en-NZ" sz="1000" dirty="0" smtClean="0">
+                <a:latin typeface="Times New Roman" panose="02020603050405020304" pitchFamily="18" charset="0"/>
+              </a:rPr>
+              <a:t>tructure</a:t>
             </a:r>
             <a:endParaRPr lang="en-NZ" sz="1000" dirty="0"/>
           </a:p>
         </p:txBody>
       </p:sp>
-      <p:sp>
-        <p:nvSpPr>
-          <p:cNvPr id="5" name="Rectangle 4">
-            <a:extLst>
-              <a:ext uri="{FF2B5EF4-FFF2-40B4-BE49-F238E27FC236}">
-                <a16:creationId xmlns:a16="http://schemas.microsoft.com/office/drawing/2014/main" xmlns="" id="{2E724CAF-1919-4FDE-B628-C276EA0D5039}"/>
-              </a:ext>
-            </a:extLst>
-          </p:cNvPr>
-          <p:cNvSpPr/>
-          <p:nvPr/>
-        </p:nvSpPr>
-        <p:spPr>
-          <a:xfrm>
-            <a:off x="214576" y="983678"/>
-            <a:ext cx="1659834" cy="417443"/>
-          </a:xfrm>
-          <a:prstGeom prst="rect">
-            <a:avLst/>
-          </a:prstGeom>
-        </p:spPr>
-        <p:style>
-          <a:lnRef idx="2">
-            <a:schemeClr val="accent1">
-              <a:shade val="50000"/>
-            </a:schemeClr>
-          </a:lnRef>
-          <a:fillRef idx="1">
-            <a:schemeClr val="accent1"/>
-          </a:fillRef>
-          <a:effectRef idx="0">
-            <a:schemeClr val="accent1"/>
-          </a:effectRef>
-          <a:fontRef idx="minor">
-            <a:schemeClr val="lt1"/>
-          </a:fontRef>
-        </p:style>
-        <p:txBody>
-          <a:bodyPr rtlCol="0" anchor="ctr"/>
-          <a:lstStyle/>
-          <a:p>
-            <a:pPr algn="ctr"/>
-            <a:r>
-              <a:rPr lang="en-NZ" sz="1000" dirty="0"/>
-              <a:t>BBD-V</a:t>
-            </a:r>
-          </a:p>
-        </p:txBody>
-      </p:sp>
-      <p:pic>
-        <p:nvPicPr>
-          <p:cNvPr id="6" name="Picture 5">
-            <a:extLst>
-              <a:ext uri="{FF2B5EF4-FFF2-40B4-BE49-F238E27FC236}">
-                <a16:creationId xmlns:a16="http://schemas.microsoft.com/office/drawing/2014/main" xmlns="" id="{BB8FB40B-393E-47C8-8A10-B800EDE7F21B}"/>
-              </a:ext>
-            </a:extLst>
-          </p:cNvPr>
-          <p:cNvPicPr>
-            <a:picLocks noChangeAspect="1"/>
-          </p:cNvPicPr>
-          <p:nvPr/>
-        </p:nvPicPr>
-        <p:blipFill>
-          <a:blip r:embed="rId2"/>
-          <a:stretch>
-            <a:fillRect/>
-          </a:stretch>
-        </p:blipFill>
-        <p:spPr>
-          <a:xfrm>
-            <a:off x="74410" y="1814434"/>
-            <a:ext cx="3600000" cy="2025000"/>
-          </a:xfrm>
-          <a:prstGeom prst="rect">
-            <a:avLst/>
-          </a:prstGeom>
-        </p:spPr>
-      </p:pic>
       <p:sp>
         <p:nvSpPr>
           <p:cNvPr id="7" name="Rectangle: Rounded Corners 6">
@@ -13634,7 +14173,7 @@
         <p:spPr>
           <a:xfrm>
             <a:off x="3999333" y="2489622"/>
-            <a:ext cx="1451113" cy="805069"/>
+            <a:ext cx="5574513" cy="805069"/>
           </a:xfrm>
           <a:prstGeom prst="roundRect">
             <a:avLst/>
@@ -13660,103 +14199,10 @@
           <a:p>
             <a:pPr algn="ctr"/>
             <a:r>
-              <a:rPr lang="en-NZ" sz="1000" dirty="0"/>
-              <a:t>Driver information Cache</a:t>
-            </a:r>
-          </a:p>
-        </p:txBody>
-      </p:sp>
-      <p:sp>
-        <p:nvSpPr>
-          <p:cNvPr id="15" name="Rectangle: Rounded Corners 14">
-            <a:extLst>
-              <a:ext uri="{FF2B5EF4-FFF2-40B4-BE49-F238E27FC236}">
-                <a16:creationId xmlns:a16="http://schemas.microsoft.com/office/drawing/2014/main" xmlns="" id="{0AF46E6D-4BC7-4DF3-BB46-3369820B758C}"/>
-              </a:ext>
-            </a:extLst>
-          </p:cNvPr>
-          <p:cNvSpPr/>
-          <p:nvPr/>
-        </p:nvSpPr>
-        <p:spPr>
-          <a:xfrm>
-            <a:off x="5859458" y="2533584"/>
-            <a:ext cx="1451113" cy="805069"/>
-          </a:xfrm>
-          <a:prstGeom prst="roundRect">
-            <a:avLst/>
-          </a:prstGeom>
-        </p:spPr>
-        <p:style>
-          <a:lnRef idx="2">
-            <a:schemeClr val="dk1"/>
-          </a:lnRef>
-          <a:fillRef idx="1">
-            <a:schemeClr val="lt1"/>
-          </a:fillRef>
-          <a:effectRef idx="0">
-            <a:schemeClr val="dk1"/>
-          </a:effectRef>
-          <a:fontRef idx="minor">
-            <a:schemeClr val="dk1"/>
-          </a:fontRef>
-        </p:style>
-        <p:txBody>
-          <a:bodyPr rtlCol="0" anchor="ctr"/>
-          <a:lstStyle/>
-          <a:p>
-            <a:pPr algn="ctr"/>
-            <a:r>
-              <a:rPr lang="en-NZ" sz="1000" dirty="0"/>
-              <a:t>Vehicle information Cache</a:t>
-            </a:r>
-          </a:p>
-        </p:txBody>
-      </p:sp>
-      <p:sp>
-        <p:nvSpPr>
-          <p:cNvPr id="16" name="Rectangle: Rounded Corners 15">
-            <a:extLst>
-              <a:ext uri="{FF2B5EF4-FFF2-40B4-BE49-F238E27FC236}">
-                <a16:creationId xmlns:a16="http://schemas.microsoft.com/office/drawing/2014/main" xmlns="" id="{226FAF3E-E360-46F3-8F0C-44A47FCED432}"/>
-              </a:ext>
-            </a:extLst>
-          </p:cNvPr>
-          <p:cNvSpPr/>
-          <p:nvPr/>
-        </p:nvSpPr>
-        <p:spPr>
-          <a:xfrm>
-            <a:off x="7782971" y="2537982"/>
-            <a:ext cx="1451113" cy="805069"/>
-          </a:xfrm>
-          <a:prstGeom prst="roundRect">
-            <a:avLst/>
-          </a:prstGeom>
-        </p:spPr>
-        <p:style>
-          <a:lnRef idx="2">
-            <a:schemeClr val="dk1"/>
-          </a:lnRef>
-          <a:fillRef idx="1">
-            <a:schemeClr val="lt1"/>
-          </a:fillRef>
-          <a:effectRef idx="0">
-            <a:schemeClr val="dk1"/>
-          </a:effectRef>
-          <a:fontRef idx="minor">
-            <a:schemeClr val="dk1"/>
-          </a:fontRef>
-        </p:style>
-        <p:txBody>
-          <a:bodyPr rtlCol="0" anchor="ctr"/>
-          <a:lstStyle/>
-          <a:p>
-            <a:pPr algn="ctr"/>
-            <a:r>
-              <a:rPr lang="en-NZ" sz="1000" dirty="0"/>
-              <a:t>Journey information Cache</a:t>
-            </a:r>
+              <a:rPr lang="en-NZ" sz="1000" dirty="0" smtClean="0"/>
+              <a:t>Cache manager</a:t>
+            </a:r>
+            <a:endParaRPr lang="en-NZ" sz="1000" dirty="0"/>
           </a:p>
         </p:txBody>
       </p:sp>
@@ -14264,14 +14710,14 @@
           <p:nvPr/>
         </p:nvPicPr>
         <p:blipFill rotWithShape="1">
-          <a:blip r:embed="rId3"/>
+          <a:blip r:embed="rId2"/>
           <a:srcRect t="-13628" b="45509"/>
           <a:stretch/>
         </p:blipFill>
         <p:spPr>
           <a:xfrm>
-            <a:off x="74410" y="4996307"/>
-            <a:ext cx="2381348" cy="1850553"/>
+            <a:off x="285426" y="5878850"/>
+            <a:ext cx="1260000" cy="979150"/>
           </a:xfrm>
           <a:prstGeom prst="rect">
             <a:avLst/>
@@ -14561,8 +15007,8 @@
         </p:nvSpPr>
         <p:spPr>
           <a:xfrm>
-            <a:off x="214576" y="253990"/>
-            <a:ext cx="1993852" cy="576470"/>
+            <a:off x="214575" y="253990"/>
+            <a:ext cx="2093281" cy="519733"/>
           </a:xfrm>
           <a:prstGeom prst="rect">
             <a:avLst/>
@@ -14590,94 +15036,25 @@
           <a:p>
             <a:pPr algn="ctr"/>
             <a:r>
+              <a:rPr lang="en-NZ" sz="1000" dirty="0" smtClean="0"/>
+              <a:t>BBD-Ops </a:t>
+            </a:r>
+            <a:r>
+              <a:rPr lang="en-NZ" sz="1000" dirty="0" smtClean="0">
+                <a:latin typeface="Times New Roman" panose="02020603050405020304" pitchFamily="18" charset="0"/>
+              </a:rPr>
+              <a:t>Process </a:t>
+            </a:r>
+            <a:r>
               <a:rPr lang="en-NZ" sz="1000" dirty="0">
                 <a:latin typeface="Times New Roman" panose="02020603050405020304" pitchFamily="18" charset="0"/>
               </a:rPr>
-              <a:t>“Process” Structure</a:t>
+              <a:t>Structure</a:t>
             </a:r>
             <a:endParaRPr lang="en-NZ" sz="1000" dirty="0"/>
           </a:p>
         </p:txBody>
       </p:sp>
-      <p:sp>
-        <p:nvSpPr>
-          <p:cNvPr id="5" name="Rectangle 4">
-            <a:extLst>
-              <a:ext uri="{FF2B5EF4-FFF2-40B4-BE49-F238E27FC236}">
-                <a16:creationId xmlns:a16="http://schemas.microsoft.com/office/drawing/2014/main" xmlns="" id="{2E724CAF-1919-4FDE-B628-C276EA0D5039}"/>
-              </a:ext>
-            </a:extLst>
-          </p:cNvPr>
-          <p:cNvSpPr/>
-          <p:nvPr/>
-        </p:nvSpPr>
-        <p:spPr>
-          <a:xfrm>
-            <a:off x="214576" y="983678"/>
-            <a:ext cx="1659834" cy="417443"/>
-          </a:xfrm>
-          <a:prstGeom prst="rect">
-            <a:avLst/>
-          </a:prstGeom>
-        </p:spPr>
-        <p:style>
-          <a:lnRef idx="2">
-            <a:schemeClr val="accent1">
-              <a:shade val="50000"/>
-            </a:schemeClr>
-          </a:lnRef>
-          <a:fillRef idx="1">
-            <a:schemeClr val="accent1"/>
-          </a:fillRef>
-          <a:effectRef idx="0">
-            <a:schemeClr val="accent1"/>
-          </a:effectRef>
-          <a:fontRef idx="minor">
-            <a:schemeClr val="lt1"/>
-          </a:fontRef>
-        </p:style>
-        <p:txBody>
-          <a:bodyPr rtlCol="0" anchor="ctr"/>
-          <a:lstStyle/>
-          <a:p>
-            <a:pPr algn="ctr"/>
-            <a:r>
-              <a:rPr lang="en-NZ" sz="1000" dirty="0"/>
-              <a:t>BBD-Ops</a:t>
-            </a:r>
-          </a:p>
-        </p:txBody>
-      </p:sp>
-      <p:pic>
-        <p:nvPicPr>
-          <p:cNvPr id="6" name="Picture 5">
-            <a:extLst>
-              <a:ext uri="{FF2B5EF4-FFF2-40B4-BE49-F238E27FC236}">
-                <a16:creationId xmlns:a16="http://schemas.microsoft.com/office/drawing/2014/main" xmlns="" id="{BB8FB40B-393E-47C8-8A10-B800EDE7F21B}"/>
-              </a:ext>
-            </a:extLst>
-          </p:cNvPr>
-          <p:cNvPicPr>
-            <a:picLocks noChangeAspect="1"/>
-          </p:cNvPicPr>
-          <p:nvPr/>
-        </p:nvPicPr>
-        <p:blipFill>
-          <a:blip r:embed="rId2"/>
-          <a:stretch>
-            <a:fillRect/>
-          </a:stretch>
-        </p:blipFill>
-        <p:spPr>
-          <a:xfrm>
-            <a:off x="621063" y="4557634"/>
-            <a:ext cx="3600000" cy="2025000"/>
-          </a:xfrm>
-          <a:prstGeom prst="rect">
-            <a:avLst/>
-          </a:prstGeom>
-        </p:spPr>
-      </p:pic>
       <p:sp>
         <p:nvSpPr>
           <p:cNvPr id="9" name="Cylinder 8">
@@ -15631,14 +16008,14 @@
           <p:nvPr/>
         </p:nvPicPr>
         <p:blipFill rotWithShape="1">
-          <a:blip r:embed="rId3"/>
+          <a:blip r:embed="rId2"/>
           <a:srcRect b="46230"/>
           <a:stretch/>
         </p:blipFill>
         <p:spPr>
           <a:xfrm>
-            <a:off x="4808725" y="5462095"/>
-            <a:ext cx="2275670" cy="1395905"/>
+            <a:off x="0" y="6085111"/>
+            <a:ext cx="1260000" cy="772889"/>
           </a:xfrm>
           <a:prstGeom prst="rect">
             <a:avLst/>
@@ -16178,94 +16555,21 @@
           <a:p>
             <a:pPr algn="ctr"/>
             <a:r>
+              <a:rPr lang="en-NZ" sz="1000" dirty="0" smtClean="0">
+                <a:latin typeface="Times New Roman" panose="02020603050405020304" pitchFamily="18" charset="0"/>
+              </a:rPr>
+              <a:t>BBD-M Process </a:t>
+            </a:r>
+            <a:r>
               <a:rPr lang="en-NZ" sz="1000" dirty="0">
                 <a:latin typeface="Times New Roman" panose="02020603050405020304" pitchFamily="18" charset="0"/>
               </a:rPr>
-              <a:t>“Process” Structure</a:t>
+              <a:t>Structure</a:t>
             </a:r>
             <a:endParaRPr lang="en-NZ" sz="1000" dirty="0"/>
           </a:p>
         </p:txBody>
       </p:sp>
-      <p:sp>
-        <p:nvSpPr>
-          <p:cNvPr id="5" name="Rectangle 4">
-            <a:extLst>
-              <a:ext uri="{FF2B5EF4-FFF2-40B4-BE49-F238E27FC236}">
-                <a16:creationId xmlns:a16="http://schemas.microsoft.com/office/drawing/2014/main" xmlns="" id="{2E724CAF-1919-4FDE-B628-C276EA0D5039}"/>
-              </a:ext>
-            </a:extLst>
-          </p:cNvPr>
-          <p:cNvSpPr/>
-          <p:nvPr/>
-        </p:nvSpPr>
-        <p:spPr>
-          <a:xfrm>
-            <a:off x="214576" y="983678"/>
-            <a:ext cx="1659834" cy="417443"/>
-          </a:xfrm>
-          <a:prstGeom prst="rect">
-            <a:avLst/>
-          </a:prstGeom>
-        </p:spPr>
-        <p:style>
-          <a:lnRef idx="2">
-            <a:schemeClr val="accent1">
-              <a:shade val="50000"/>
-            </a:schemeClr>
-          </a:lnRef>
-          <a:fillRef idx="1">
-            <a:schemeClr val="accent1"/>
-          </a:fillRef>
-          <a:effectRef idx="0">
-            <a:schemeClr val="accent1"/>
-          </a:effectRef>
-          <a:fontRef idx="minor">
-            <a:schemeClr val="lt1"/>
-          </a:fontRef>
-        </p:style>
-        <p:txBody>
-          <a:bodyPr rtlCol="0" anchor="ctr"/>
-          <a:lstStyle/>
-          <a:p>
-            <a:pPr algn="ctr"/>
-            <a:r>
-              <a:rPr lang="en-NZ" sz="1000" dirty="0"/>
-              <a:t>BBD-M</a:t>
-            </a:r>
-          </a:p>
-        </p:txBody>
-      </p:sp>
-      <p:pic>
-        <p:nvPicPr>
-          <p:cNvPr id="6" name="Picture 5">
-            <a:extLst>
-              <a:ext uri="{FF2B5EF4-FFF2-40B4-BE49-F238E27FC236}">
-                <a16:creationId xmlns:a16="http://schemas.microsoft.com/office/drawing/2014/main" xmlns="" id="{BB8FB40B-393E-47C8-8A10-B800EDE7F21B}"/>
-              </a:ext>
-            </a:extLst>
-          </p:cNvPr>
-          <p:cNvPicPr>
-            <a:picLocks noChangeAspect="1"/>
-          </p:cNvPicPr>
-          <p:nvPr/>
-        </p:nvPicPr>
-        <p:blipFill>
-          <a:blip r:embed="rId2"/>
-          <a:stretch>
-            <a:fillRect/>
-          </a:stretch>
-        </p:blipFill>
-        <p:spPr>
-          <a:xfrm>
-            <a:off x="6226732" y="4333461"/>
-            <a:ext cx="3600000" cy="2025000"/>
-          </a:xfrm>
-          <a:prstGeom prst="rect">
-            <a:avLst/>
-          </a:prstGeom>
-        </p:spPr>
-      </p:pic>
       <p:sp>
         <p:nvSpPr>
           <p:cNvPr id="2" name="Cylinder 1">
@@ -16327,8 +16631,8 @@
         </p:nvSpPr>
         <p:spPr>
           <a:xfrm>
-            <a:off x="521673" y="3021793"/>
-            <a:ext cx="1486032" cy="1123122"/>
+            <a:off x="521672" y="3778635"/>
+            <a:ext cx="3944311" cy="366279"/>
           </a:xfrm>
           <a:prstGeom prst="roundRect">
             <a:avLst/>
@@ -16354,9 +16658,10 @@
           <a:p>
             <a:pPr algn="ctr"/>
             <a:r>
-              <a:rPr lang="en-NZ" sz="1000" dirty="0"/>
-              <a:t>Report requests cache</a:t>
-            </a:r>
+              <a:rPr lang="en-NZ" sz="1000" dirty="0" smtClean="0"/>
+              <a:t>Cache manager</a:t>
+            </a:r>
+            <a:endParaRPr lang="en-NZ" sz="1000" dirty="0"/>
           </a:p>
         </p:txBody>
       </p:sp>
@@ -16403,53 +16708,6 @@
             <a:r>
               <a:rPr lang="en-NZ" sz="1000" dirty="0"/>
               <a:t>Processing and displaying reports received</a:t>
-            </a:r>
-          </a:p>
-        </p:txBody>
-      </p:sp>
-      <p:sp>
-        <p:nvSpPr>
-          <p:cNvPr id="25" name="Rectangle: Rounded Corners 24">
-            <a:extLst>
-              <a:ext uri="{FF2B5EF4-FFF2-40B4-BE49-F238E27FC236}">
-                <a16:creationId xmlns:a16="http://schemas.microsoft.com/office/drawing/2014/main" xmlns="" id="{28759443-DA21-4DF3-B036-A028FD2860F1}"/>
-              </a:ext>
-            </a:extLst>
-          </p:cNvPr>
-          <p:cNvSpPr/>
-          <p:nvPr/>
-        </p:nvSpPr>
-        <p:spPr>
-          <a:xfrm>
-            <a:off x="3014871" y="3262792"/>
-            <a:ext cx="1451113" cy="1070669"/>
-          </a:xfrm>
-          <a:prstGeom prst="roundRect">
-            <a:avLst/>
-          </a:prstGeom>
-        </p:spPr>
-        <p:style>
-          <a:lnRef idx="2">
-            <a:schemeClr val="dk1"/>
-          </a:lnRef>
-          <a:fillRef idx="1">
-            <a:schemeClr val="lt1"/>
-          </a:fillRef>
-          <a:effectRef idx="0">
-            <a:schemeClr val="dk1"/>
-          </a:effectRef>
-          <a:fontRef idx="minor">
-            <a:schemeClr val="dk1"/>
-          </a:fontRef>
-        </p:style>
-        <p:txBody>
-          <a:bodyPr rtlCol="0" anchor="ctr"/>
-          <a:lstStyle/>
-          <a:p>
-            <a:pPr algn="ctr"/>
-            <a:r>
-              <a:rPr lang="en-NZ" sz="1000" dirty="0"/>
-              <a:t>Journey report received Cache</a:t>
             </a:r>
           </a:p>
         </p:txBody>
@@ -16596,9 +16854,9 @@
           <p:nvPr/>
         </p:nvCxnSpPr>
         <p:spPr>
-          <a:xfrm>
-            <a:off x="3722968" y="2892156"/>
-            <a:ext cx="17460" cy="370636"/>
+          <a:xfrm flipH="1">
+            <a:off x="3610708" y="2892156"/>
+            <a:ext cx="112260" cy="796706"/>
           </a:xfrm>
           <a:prstGeom prst="straightConnector1">
             <a:avLst/>
@@ -16638,7 +16896,7 @@
         <p:spPr>
           <a:xfrm>
             <a:off x="1264689" y="2773018"/>
-            <a:ext cx="0" cy="248775"/>
+            <a:ext cx="14227" cy="915844"/>
           </a:xfrm>
           <a:prstGeom prst="straightConnector1">
             <a:avLst/>
@@ -16678,14 +16936,14 @@
           <p:nvPr/>
         </p:nvPicPr>
         <p:blipFill rotWithShape="1">
-          <a:blip r:embed="rId3"/>
+          <a:blip r:embed="rId2"/>
           <a:srcRect b="45052"/>
           <a:stretch/>
         </p:blipFill>
         <p:spPr>
           <a:xfrm>
-            <a:off x="20828" y="5358372"/>
-            <a:ext cx="2381348" cy="1492744"/>
+            <a:off x="18916" y="6068171"/>
+            <a:ext cx="1260000" cy="789829"/>
           </a:xfrm>
           <a:prstGeom prst="rect">
             <a:avLst/>
@@ -16749,15 +17007,13 @@
               </a:ext>
             </a:extLst>
           </p:cNvPr>
-          <p:cNvCxnSpPr>
-            <a:stCxn id="23" idx="2"/>
-          </p:cNvCxnSpPr>
+          <p:cNvCxnSpPr/>
           <p:nvPr/>
         </p:nvCxnSpPr>
         <p:spPr>
           <a:xfrm>
-            <a:off x="1264689" y="4144915"/>
-            <a:ext cx="349516" cy="914102"/>
+            <a:off x="1146984" y="4144914"/>
+            <a:ext cx="467221" cy="961628"/>
           </a:xfrm>
           <a:prstGeom prst="straightConnector1">
             <a:avLst/>
@@ -16791,15 +17047,13 @@
               </a:ext>
             </a:extLst>
           </p:cNvPr>
-          <p:cNvCxnSpPr>
-            <a:stCxn id="25" idx="2"/>
-          </p:cNvCxnSpPr>
+          <p:cNvCxnSpPr/>
           <p:nvPr/>
         </p:nvCxnSpPr>
         <p:spPr>
           <a:xfrm flipH="1">
-            <a:off x="3014871" y="4333461"/>
-            <a:ext cx="725557" cy="646043"/>
+            <a:off x="3034773" y="4144914"/>
+            <a:ext cx="575935" cy="1003065"/>
           </a:xfrm>
           <a:prstGeom prst="straightConnector1">
             <a:avLst/>
@@ -17582,8 +17836,8 @@
         </p:nvGrpSpPr>
         <p:grpSpPr>
           <a:xfrm>
-            <a:off x="9408544" y="288233"/>
-            <a:ext cx="1714453" cy="1544778"/>
+            <a:off x="9111559" y="99389"/>
+            <a:ext cx="1321979" cy="1196907"/>
             <a:chOff x="10217012" y="198783"/>
             <a:chExt cx="1714453" cy="1544778"/>
           </a:xfrm>

</xml_diff>

<commit_message>
commit before going to class
</commit_message>
<xml_diff>
--- a/Big Brother Driver Diagrams.pptx
+++ b/Big Brother Driver Diagrams.pptx
@@ -10152,7 +10152,7 @@
         </p:nvSpPr>
         <p:spPr>
           <a:xfrm>
-            <a:off x="3419888" y="893693"/>
+            <a:off x="3545582" y="914400"/>
             <a:ext cx="1341783" cy="747092"/>
           </a:xfrm>
           <a:prstGeom prst="rect">
@@ -10199,8 +10199,8 @@
         </p:nvSpPr>
         <p:spPr>
           <a:xfrm>
-            <a:off x="2154306" y="914400"/>
-            <a:ext cx="1046922" cy="735495"/>
+            <a:off x="2154305" y="914400"/>
+            <a:ext cx="1135971" cy="735495"/>
           </a:xfrm>
           <a:prstGeom prst="rect">
             <a:avLst/>
@@ -10250,7 +10250,7 @@
         <p:spPr>
           <a:xfrm>
             <a:off x="1871042" y="1282148"/>
-            <a:ext cx="283264" cy="0"/>
+            <a:ext cx="283263" cy="0"/>
           </a:xfrm>
           <a:prstGeom prst="straightConnector1">
             <a:avLst/>
@@ -10320,9 +10320,9 @@
           <p:nvPr/>
         </p:nvCxnSpPr>
         <p:spPr>
-          <a:xfrm flipH="1">
-            <a:off x="3201228" y="1267239"/>
-            <a:ext cx="218660" cy="14909"/>
+          <a:xfrm flipH="1" flipV="1">
+            <a:off x="3290276" y="1282148"/>
+            <a:ext cx="255306" cy="5798"/>
           </a:xfrm>
           <a:prstGeom prst="straightConnector1">
             <a:avLst/>
@@ -10346,6 +10346,48 @@
           </a:fontRef>
         </p:style>
       </p:cxnSp>
+      <p:sp>
+        <p:nvSpPr>
+          <p:cNvPr id="11" name="Rectangle 10"/>
+          <p:cNvSpPr/>
+          <p:nvPr/>
+        </p:nvSpPr>
+        <p:spPr>
+          <a:xfrm>
+            <a:off x="234462" y="3337169"/>
+            <a:ext cx="1524000" cy="640862"/>
+          </a:xfrm>
+          <a:prstGeom prst="rect">
+            <a:avLst/>
+          </a:prstGeom>
+        </p:spPr>
+        <p:style>
+          <a:lnRef idx="2">
+            <a:schemeClr val="dk1"/>
+          </a:lnRef>
+          <a:fillRef idx="1">
+            <a:schemeClr val="lt1"/>
+          </a:fillRef>
+          <a:effectRef idx="0">
+            <a:schemeClr val="dk1"/>
+          </a:effectRef>
+          <a:fontRef idx="minor">
+            <a:schemeClr val="dk1"/>
+          </a:fontRef>
+        </p:style>
+        <p:txBody>
+          <a:bodyPr rtlCol="0" anchor="ctr"/>
+          <a:lstStyle/>
+          <a:p>
+            <a:pPr algn="ctr"/>
+            <a:r>
+              <a:rPr lang="en-NZ" sz="1000" dirty="0" smtClean="0"/>
+              <a:t>Cache Manager</a:t>
+            </a:r>
+            <a:endParaRPr lang="en-NZ" sz="1000" dirty="0"/>
+          </a:p>
+        </p:txBody>
+      </p:sp>
     </p:spTree>
     <p:extLst>
       <p:ext uri="{BB962C8B-B14F-4D97-AF65-F5344CB8AC3E}">
@@ -12745,13 +12787,15 @@
       <p:cxnSp>
         <p:nvCxnSpPr>
           <p:cNvPr id="38" name="Straight Arrow Connector 37"/>
-          <p:cNvCxnSpPr/>
+          <p:cNvCxnSpPr>
+            <a:endCxn id="40" idx="0"/>
+          </p:cNvCxnSpPr>
           <p:nvPr/>
         </p:nvCxnSpPr>
         <p:spPr>
           <a:xfrm>
             <a:off x="2368030" y="482051"/>
-            <a:ext cx="256046" cy="228570"/>
+            <a:ext cx="139250" cy="210982"/>
           </a:xfrm>
           <a:prstGeom prst="straightConnector1">
             <a:avLst/>
@@ -12783,7 +12827,7 @@
         </p:nvSpPr>
         <p:spPr>
           <a:xfrm>
-            <a:off x="2639766" y="596336"/>
+            <a:off x="2812622" y="1049478"/>
             <a:ext cx="699422" cy="553998"/>
           </a:xfrm>
           <a:prstGeom prst="rect">
@@ -12818,6 +12862,84 @@
           </a:p>
         </p:txBody>
       </p:sp>
+      <p:sp>
+        <p:nvSpPr>
+          <p:cNvPr id="40" name="Rectangle 39"/>
+          <p:cNvSpPr/>
+          <p:nvPr/>
+        </p:nvSpPr>
+        <p:spPr>
+          <a:xfrm>
+            <a:off x="2106013" y="693033"/>
+            <a:ext cx="802533" cy="294897"/>
+          </a:xfrm>
+          <a:prstGeom prst="rect">
+            <a:avLst/>
+          </a:prstGeom>
+        </p:spPr>
+        <p:style>
+          <a:lnRef idx="2">
+            <a:schemeClr val="dk1"/>
+          </a:lnRef>
+          <a:fillRef idx="1">
+            <a:schemeClr val="lt1"/>
+          </a:fillRef>
+          <a:effectRef idx="0">
+            <a:schemeClr val="dk1"/>
+          </a:effectRef>
+          <a:fontRef idx="minor">
+            <a:schemeClr val="dk1"/>
+          </a:fontRef>
+        </p:style>
+        <p:txBody>
+          <a:bodyPr rtlCol="0" anchor="ctr"/>
+          <a:lstStyle/>
+          <a:p>
+            <a:pPr algn="ctr"/>
+            <a:r>
+              <a:rPr lang="en-NZ" sz="1000" dirty="0" smtClean="0"/>
+              <a:t>Ops Controller</a:t>
+            </a:r>
+            <a:endParaRPr lang="en-NZ" sz="1000" dirty="0"/>
+          </a:p>
+        </p:txBody>
+      </p:sp>
+      <p:cxnSp>
+        <p:nvCxnSpPr>
+          <p:cNvPr id="44" name="Straight Arrow Connector 43"/>
+          <p:cNvCxnSpPr>
+            <a:stCxn id="40" idx="2"/>
+            <a:endCxn id="74" idx="1"/>
+          </p:cNvCxnSpPr>
+          <p:nvPr/>
+        </p:nvCxnSpPr>
+        <p:spPr>
+          <a:xfrm>
+            <a:off x="2507280" y="987930"/>
+            <a:ext cx="305342" cy="338547"/>
+          </a:xfrm>
+          <a:prstGeom prst="straightConnector1">
+            <a:avLst/>
+          </a:prstGeom>
+          <a:ln>
+            <a:tailEnd type="triangle"/>
+          </a:ln>
+        </p:spPr>
+        <p:style>
+          <a:lnRef idx="1">
+            <a:schemeClr val="dk1"/>
+          </a:lnRef>
+          <a:fillRef idx="0">
+            <a:schemeClr val="dk1"/>
+          </a:fillRef>
+          <a:effectRef idx="0">
+            <a:schemeClr val="dk1"/>
+          </a:effectRef>
+          <a:fontRef idx="minor">
+            <a:schemeClr val="tx1"/>
+          </a:fontRef>
+        </p:style>
+      </p:cxnSp>
     </p:spTree>
     <p:extLst>
       <p:ext uri="{BB962C8B-B14F-4D97-AF65-F5344CB8AC3E}">
@@ -14081,7 +14203,7 @@
             <a:off x="3808053" y="1117228"/>
             <a:ext cx="1780367" cy="1021021"/>
           </a:xfrm>
-          <a:prstGeom prst="can">
+          <a:prstGeom prst="roundRect">
             <a:avLst/>
           </a:prstGeom>
         </p:spPr>
@@ -14128,7 +14250,7 @@
             <a:off x="5879091" y="1065982"/>
             <a:ext cx="1714405" cy="1167475"/>
           </a:xfrm>
-          <a:prstGeom prst="can">
+          <a:prstGeom prst="roundRect">
             <a:avLst/>
           </a:prstGeom>
         </p:spPr>

</xml_diff>

<commit_message>
commit after submitting draft
</commit_message>
<xml_diff>
--- a/Big Brother Driver Diagrams.pptx
+++ b/Big Brother Driver Diagrams.pptx
@@ -153,7 +153,7 @@
           <p:cNvPr id="2" name="Title 1">
             <a:extLst>
               <a:ext uri="{FF2B5EF4-FFF2-40B4-BE49-F238E27FC236}">
-                <a16:creationId xmlns:a16="http://schemas.microsoft.com/office/drawing/2014/main" xmlns="" id="{51AD53CF-7475-41BC-B184-08D054A9B86B}"/>
+                <a16:creationId xmlns:a16="http://schemas.microsoft.com/office/drawing/2014/main" id="{51AD53CF-7475-41BC-B184-08D054A9B86B}"/>
               </a:ext>
             </a:extLst>
           </p:cNvPr>
@@ -191,7 +191,7 @@
           <p:cNvPr id="3" name="Subtitle 2">
             <a:extLst>
               <a:ext uri="{FF2B5EF4-FFF2-40B4-BE49-F238E27FC236}">
-                <a16:creationId xmlns:a16="http://schemas.microsoft.com/office/drawing/2014/main" xmlns="" id="{FEBE8959-B885-496D-AE95-716913EBD854}"/>
+                <a16:creationId xmlns:a16="http://schemas.microsoft.com/office/drawing/2014/main" id="{FEBE8959-B885-496D-AE95-716913EBD854}"/>
               </a:ext>
             </a:extLst>
           </p:cNvPr>
@@ -262,7 +262,7 @@
           <p:cNvPr id="4" name="Date Placeholder 3">
             <a:extLst>
               <a:ext uri="{FF2B5EF4-FFF2-40B4-BE49-F238E27FC236}">
-                <a16:creationId xmlns:a16="http://schemas.microsoft.com/office/drawing/2014/main" xmlns="" id="{AD7B2621-C9E3-45D8-A49F-E7717CB84566}"/>
+                <a16:creationId xmlns:a16="http://schemas.microsoft.com/office/drawing/2014/main" id="{AD7B2621-C9E3-45D8-A49F-E7717CB84566}"/>
               </a:ext>
             </a:extLst>
           </p:cNvPr>
@@ -291,7 +291,7 @@
           <p:cNvPr id="5" name="Footer Placeholder 4">
             <a:extLst>
               <a:ext uri="{FF2B5EF4-FFF2-40B4-BE49-F238E27FC236}">
-                <a16:creationId xmlns:a16="http://schemas.microsoft.com/office/drawing/2014/main" xmlns="" id="{2E8CB1BA-1798-4565-8325-77C529B4EB2A}"/>
+                <a16:creationId xmlns:a16="http://schemas.microsoft.com/office/drawing/2014/main" id="{2E8CB1BA-1798-4565-8325-77C529B4EB2A}"/>
               </a:ext>
             </a:extLst>
           </p:cNvPr>
@@ -316,7 +316,7 @@
           <p:cNvPr id="6" name="Slide Number Placeholder 5">
             <a:extLst>
               <a:ext uri="{FF2B5EF4-FFF2-40B4-BE49-F238E27FC236}">
-                <a16:creationId xmlns:a16="http://schemas.microsoft.com/office/drawing/2014/main" xmlns="" id="{77BB0BC0-1A86-49C1-B320-E845ECFFFA71}"/>
+                <a16:creationId xmlns:a16="http://schemas.microsoft.com/office/drawing/2014/main" id="{77BB0BC0-1A86-49C1-B320-E845ECFFFA71}"/>
               </a:ext>
             </a:extLst>
           </p:cNvPr>
@@ -375,7 +375,7 @@
           <p:cNvPr id="2" name="Title 1">
             <a:extLst>
               <a:ext uri="{FF2B5EF4-FFF2-40B4-BE49-F238E27FC236}">
-                <a16:creationId xmlns:a16="http://schemas.microsoft.com/office/drawing/2014/main" xmlns="" id="{2DF8CBA9-E3FF-413B-8D5F-DB3355CB0549}"/>
+                <a16:creationId xmlns:a16="http://schemas.microsoft.com/office/drawing/2014/main" id="{2DF8CBA9-E3FF-413B-8D5F-DB3355CB0549}"/>
               </a:ext>
             </a:extLst>
           </p:cNvPr>
@@ -404,7 +404,7 @@
           <p:cNvPr id="3" name="Vertical Text Placeholder 2">
             <a:extLst>
               <a:ext uri="{FF2B5EF4-FFF2-40B4-BE49-F238E27FC236}">
-                <a16:creationId xmlns:a16="http://schemas.microsoft.com/office/drawing/2014/main" xmlns="" id="{84FF965F-1682-4319-8489-8F67B4E2E5B0}"/>
+                <a16:creationId xmlns:a16="http://schemas.microsoft.com/office/drawing/2014/main" id="{84FF965F-1682-4319-8489-8F67B4E2E5B0}"/>
               </a:ext>
             </a:extLst>
           </p:cNvPr>
@@ -462,7 +462,7 @@
           <p:cNvPr id="4" name="Date Placeholder 3">
             <a:extLst>
               <a:ext uri="{FF2B5EF4-FFF2-40B4-BE49-F238E27FC236}">
-                <a16:creationId xmlns:a16="http://schemas.microsoft.com/office/drawing/2014/main" xmlns="" id="{B94DE343-AA51-49A8-8949-D2350EF0A7B1}"/>
+                <a16:creationId xmlns:a16="http://schemas.microsoft.com/office/drawing/2014/main" id="{B94DE343-AA51-49A8-8949-D2350EF0A7B1}"/>
               </a:ext>
             </a:extLst>
           </p:cNvPr>
@@ -491,7 +491,7 @@
           <p:cNvPr id="5" name="Footer Placeholder 4">
             <a:extLst>
               <a:ext uri="{FF2B5EF4-FFF2-40B4-BE49-F238E27FC236}">
-                <a16:creationId xmlns:a16="http://schemas.microsoft.com/office/drawing/2014/main" xmlns="" id="{BA2D490F-2921-444F-B3EF-347274421CD7}"/>
+                <a16:creationId xmlns:a16="http://schemas.microsoft.com/office/drawing/2014/main" id="{BA2D490F-2921-444F-B3EF-347274421CD7}"/>
               </a:ext>
             </a:extLst>
           </p:cNvPr>
@@ -516,7 +516,7 @@
           <p:cNvPr id="6" name="Slide Number Placeholder 5">
             <a:extLst>
               <a:ext uri="{FF2B5EF4-FFF2-40B4-BE49-F238E27FC236}">
-                <a16:creationId xmlns:a16="http://schemas.microsoft.com/office/drawing/2014/main" xmlns="" id="{5CC5C82E-6040-4C71-AA47-628AA72AD756}"/>
+                <a16:creationId xmlns:a16="http://schemas.microsoft.com/office/drawing/2014/main" id="{5CC5C82E-6040-4C71-AA47-628AA72AD756}"/>
               </a:ext>
             </a:extLst>
           </p:cNvPr>
@@ -575,7 +575,7 @@
           <p:cNvPr id="2" name="Vertical Title 1">
             <a:extLst>
               <a:ext uri="{FF2B5EF4-FFF2-40B4-BE49-F238E27FC236}">
-                <a16:creationId xmlns:a16="http://schemas.microsoft.com/office/drawing/2014/main" xmlns="" id="{8B7FD60C-0F32-411C-A9E0-477DBABB3787}"/>
+                <a16:creationId xmlns:a16="http://schemas.microsoft.com/office/drawing/2014/main" id="{8B7FD60C-0F32-411C-A9E0-477DBABB3787}"/>
               </a:ext>
             </a:extLst>
           </p:cNvPr>
@@ -609,7 +609,7 @@
           <p:cNvPr id="3" name="Vertical Text Placeholder 2">
             <a:extLst>
               <a:ext uri="{FF2B5EF4-FFF2-40B4-BE49-F238E27FC236}">
-                <a16:creationId xmlns:a16="http://schemas.microsoft.com/office/drawing/2014/main" xmlns="" id="{43687DC3-F264-43CA-B0F3-A2BFE98243F3}"/>
+                <a16:creationId xmlns:a16="http://schemas.microsoft.com/office/drawing/2014/main" id="{43687DC3-F264-43CA-B0F3-A2BFE98243F3}"/>
               </a:ext>
             </a:extLst>
           </p:cNvPr>
@@ -672,7 +672,7 @@
           <p:cNvPr id="4" name="Date Placeholder 3">
             <a:extLst>
               <a:ext uri="{FF2B5EF4-FFF2-40B4-BE49-F238E27FC236}">
-                <a16:creationId xmlns:a16="http://schemas.microsoft.com/office/drawing/2014/main" xmlns="" id="{1367B274-52CC-448C-BB92-8D81A9E730F4}"/>
+                <a16:creationId xmlns:a16="http://schemas.microsoft.com/office/drawing/2014/main" id="{1367B274-52CC-448C-BB92-8D81A9E730F4}"/>
               </a:ext>
             </a:extLst>
           </p:cNvPr>
@@ -701,7 +701,7 @@
           <p:cNvPr id="5" name="Footer Placeholder 4">
             <a:extLst>
               <a:ext uri="{FF2B5EF4-FFF2-40B4-BE49-F238E27FC236}">
-                <a16:creationId xmlns:a16="http://schemas.microsoft.com/office/drawing/2014/main" xmlns="" id="{E85795C9-DD7D-42E5-9BFD-CCB37E5B87B7}"/>
+                <a16:creationId xmlns:a16="http://schemas.microsoft.com/office/drawing/2014/main" id="{E85795C9-DD7D-42E5-9BFD-CCB37E5B87B7}"/>
               </a:ext>
             </a:extLst>
           </p:cNvPr>
@@ -726,7 +726,7 @@
           <p:cNvPr id="6" name="Slide Number Placeholder 5">
             <a:extLst>
               <a:ext uri="{FF2B5EF4-FFF2-40B4-BE49-F238E27FC236}">
-                <a16:creationId xmlns:a16="http://schemas.microsoft.com/office/drawing/2014/main" xmlns="" id="{E6B34B28-6511-4039-8FB3-3D3B46DBF22C}"/>
+                <a16:creationId xmlns:a16="http://schemas.microsoft.com/office/drawing/2014/main" id="{E6B34B28-6511-4039-8FB3-3D3B46DBF22C}"/>
               </a:ext>
             </a:extLst>
           </p:cNvPr>
@@ -785,7 +785,7 @@
           <p:cNvPr id="2" name="Title 1">
             <a:extLst>
               <a:ext uri="{FF2B5EF4-FFF2-40B4-BE49-F238E27FC236}">
-                <a16:creationId xmlns:a16="http://schemas.microsoft.com/office/drawing/2014/main" xmlns="" id="{F8A87052-1CAF-4267-A937-7EFA4666D646}"/>
+                <a16:creationId xmlns:a16="http://schemas.microsoft.com/office/drawing/2014/main" id="{F8A87052-1CAF-4267-A937-7EFA4666D646}"/>
               </a:ext>
             </a:extLst>
           </p:cNvPr>
@@ -814,7 +814,7 @@
           <p:cNvPr id="3" name="Content Placeholder 2">
             <a:extLst>
               <a:ext uri="{FF2B5EF4-FFF2-40B4-BE49-F238E27FC236}">
-                <a16:creationId xmlns:a16="http://schemas.microsoft.com/office/drawing/2014/main" xmlns="" id="{F9A6C6A2-B06F-4E96-9C63-4D238119F58F}"/>
+                <a16:creationId xmlns:a16="http://schemas.microsoft.com/office/drawing/2014/main" id="{F9A6C6A2-B06F-4E96-9C63-4D238119F58F}"/>
               </a:ext>
             </a:extLst>
           </p:cNvPr>
@@ -872,7 +872,7 @@
           <p:cNvPr id="4" name="Date Placeholder 3">
             <a:extLst>
               <a:ext uri="{FF2B5EF4-FFF2-40B4-BE49-F238E27FC236}">
-                <a16:creationId xmlns:a16="http://schemas.microsoft.com/office/drawing/2014/main" xmlns="" id="{FFD31007-8288-43CA-ADF2-10D8FA144EF3}"/>
+                <a16:creationId xmlns:a16="http://schemas.microsoft.com/office/drawing/2014/main" id="{FFD31007-8288-43CA-ADF2-10D8FA144EF3}"/>
               </a:ext>
             </a:extLst>
           </p:cNvPr>
@@ -901,7 +901,7 @@
           <p:cNvPr id="5" name="Footer Placeholder 4">
             <a:extLst>
               <a:ext uri="{FF2B5EF4-FFF2-40B4-BE49-F238E27FC236}">
-                <a16:creationId xmlns:a16="http://schemas.microsoft.com/office/drawing/2014/main" xmlns="" id="{0E1EDE72-2D9F-4248-982B-15C34EEFFA14}"/>
+                <a16:creationId xmlns:a16="http://schemas.microsoft.com/office/drawing/2014/main" id="{0E1EDE72-2D9F-4248-982B-15C34EEFFA14}"/>
               </a:ext>
             </a:extLst>
           </p:cNvPr>
@@ -926,7 +926,7 @@
           <p:cNvPr id="6" name="Slide Number Placeholder 5">
             <a:extLst>
               <a:ext uri="{FF2B5EF4-FFF2-40B4-BE49-F238E27FC236}">
-                <a16:creationId xmlns:a16="http://schemas.microsoft.com/office/drawing/2014/main" xmlns="" id="{32CBA5A9-0E8F-4EE7-B2F9-AAFD77E58704}"/>
+                <a16:creationId xmlns:a16="http://schemas.microsoft.com/office/drawing/2014/main" id="{32CBA5A9-0E8F-4EE7-B2F9-AAFD77E58704}"/>
               </a:ext>
             </a:extLst>
           </p:cNvPr>
@@ -985,7 +985,7 @@
           <p:cNvPr id="2" name="Title 1">
             <a:extLst>
               <a:ext uri="{FF2B5EF4-FFF2-40B4-BE49-F238E27FC236}">
-                <a16:creationId xmlns:a16="http://schemas.microsoft.com/office/drawing/2014/main" xmlns="" id="{0468447F-5876-4DA2-9344-D580B4AAB668}"/>
+                <a16:creationId xmlns:a16="http://schemas.microsoft.com/office/drawing/2014/main" id="{0468447F-5876-4DA2-9344-D580B4AAB668}"/>
               </a:ext>
             </a:extLst>
           </p:cNvPr>
@@ -1023,7 +1023,7 @@
           <p:cNvPr id="3" name="Text Placeholder 2">
             <a:extLst>
               <a:ext uri="{FF2B5EF4-FFF2-40B4-BE49-F238E27FC236}">
-                <a16:creationId xmlns:a16="http://schemas.microsoft.com/office/drawing/2014/main" xmlns="" id="{644C09D7-5D57-49B0-9B08-1F3743843725}"/>
+                <a16:creationId xmlns:a16="http://schemas.microsoft.com/office/drawing/2014/main" id="{644C09D7-5D57-49B0-9B08-1F3743843725}"/>
               </a:ext>
             </a:extLst>
           </p:cNvPr>
@@ -1148,7 +1148,7 @@
           <p:cNvPr id="4" name="Date Placeholder 3">
             <a:extLst>
               <a:ext uri="{FF2B5EF4-FFF2-40B4-BE49-F238E27FC236}">
-                <a16:creationId xmlns:a16="http://schemas.microsoft.com/office/drawing/2014/main" xmlns="" id="{547BE329-46E9-4576-892D-E889529DB38D}"/>
+                <a16:creationId xmlns:a16="http://schemas.microsoft.com/office/drawing/2014/main" id="{547BE329-46E9-4576-892D-E889529DB38D}"/>
               </a:ext>
             </a:extLst>
           </p:cNvPr>
@@ -1177,7 +1177,7 @@
           <p:cNvPr id="5" name="Footer Placeholder 4">
             <a:extLst>
               <a:ext uri="{FF2B5EF4-FFF2-40B4-BE49-F238E27FC236}">
-                <a16:creationId xmlns:a16="http://schemas.microsoft.com/office/drawing/2014/main" xmlns="" id="{E5B1A31C-D14E-427A-977B-6E3B7B2D9C48}"/>
+                <a16:creationId xmlns:a16="http://schemas.microsoft.com/office/drawing/2014/main" id="{E5B1A31C-D14E-427A-977B-6E3B7B2D9C48}"/>
               </a:ext>
             </a:extLst>
           </p:cNvPr>
@@ -1202,7 +1202,7 @@
           <p:cNvPr id="6" name="Slide Number Placeholder 5">
             <a:extLst>
               <a:ext uri="{FF2B5EF4-FFF2-40B4-BE49-F238E27FC236}">
-                <a16:creationId xmlns:a16="http://schemas.microsoft.com/office/drawing/2014/main" xmlns="" id="{17D2798A-F583-43CC-9D65-D07E839A1736}"/>
+                <a16:creationId xmlns:a16="http://schemas.microsoft.com/office/drawing/2014/main" id="{17D2798A-F583-43CC-9D65-D07E839A1736}"/>
               </a:ext>
             </a:extLst>
           </p:cNvPr>
@@ -1261,7 +1261,7 @@
           <p:cNvPr id="2" name="Title 1">
             <a:extLst>
               <a:ext uri="{FF2B5EF4-FFF2-40B4-BE49-F238E27FC236}">
-                <a16:creationId xmlns:a16="http://schemas.microsoft.com/office/drawing/2014/main" xmlns="" id="{B4AAB599-DD2C-4EA1-BA5A-AF5C8B5ADE6C}"/>
+                <a16:creationId xmlns:a16="http://schemas.microsoft.com/office/drawing/2014/main" id="{B4AAB599-DD2C-4EA1-BA5A-AF5C8B5ADE6C}"/>
               </a:ext>
             </a:extLst>
           </p:cNvPr>
@@ -1290,7 +1290,7 @@
           <p:cNvPr id="3" name="Content Placeholder 2">
             <a:extLst>
               <a:ext uri="{FF2B5EF4-FFF2-40B4-BE49-F238E27FC236}">
-                <a16:creationId xmlns:a16="http://schemas.microsoft.com/office/drawing/2014/main" xmlns="" id="{C8209A4F-177C-4A20-A9B5-B3538729BE5C}"/>
+                <a16:creationId xmlns:a16="http://schemas.microsoft.com/office/drawing/2014/main" id="{C8209A4F-177C-4A20-A9B5-B3538729BE5C}"/>
               </a:ext>
             </a:extLst>
           </p:cNvPr>
@@ -1353,7 +1353,7 @@
           <p:cNvPr id="4" name="Content Placeholder 3">
             <a:extLst>
               <a:ext uri="{FF2B5EF4-FFF2-40B4-BE49-F238E27FC236}">
-                <a16:creationId xmlns:a16="http://schemas.microsoft.com/office/drawing/2014/main" xmlns="" id="{A78B8389-7840-401C-9ECB-84F75B877D32}"/>
+                <a16:creationId xmlns:a16="http://schemas.microsoft.com/office/drawing/2014/main" id="{A78B8389-7840-401C-9ECB-84F75B877D32}"/>
               </a:ext>
             </a:extLst>
           </p:cNvPr>
@@ -1416,7 +1416,7 @@
           <p:cNvPr id="5" name="Date Placeholder 4">
             <a:extLst>
               <a:ext uri="{FF2B5EF4-FFF2-40B4-BE49-F238E27FC236}">
-                <a16:creationId xmlns:a16="http://schemas.microsoft.com/office/drawing/2014/main" xmlns="" id="{5504B650-012D-460F-B58A-A4345FA8AAAB}"/>
+                <a16:creationId xmlns:a16="http://schemas.microsoft.com/office/drawing/2014/main" id="{5504B650-012D-460F-B58A-A4345FA8AAAB}"/>
               </a:ext>
             </a:extLst>
           </p:cNvPr>
@@ -1445,7 +1445,7 @@
           <p:cNvPr id="6" name="Footer Placeholder 5">
             <a:extLst>
               <a:ext uri="{FF2B5EF4-FFF2-40B4-BE49-F238E27FC236}">
-                <a16:creationId xmlns:a16="http://schemas.microsoft.com/office/drawing/2014/main" xmlns="" id="{A17F517C-3344-4628-B204-8AA9099F97CF}"/>
+                <a16:creationId xmlns:a16="http://schemas.microsoft.com/office/drawing/2014/main" id="{A17F517C-3344-4628-B204-8AA9099F97CF}"/>
               </a:ext>
             </a:extLst>
           </p:cNvPr>
@@ -1470,7 +1470,7 @@
           <p:cNvPr id="7" name="Slide Number Placeholder 6">
             <a:extLst>
               <a:ext uri="{FF2B5EF4-FFF2-40B4-BE49-F238E27FC236}">
-                <a16:creationId xmlns:a16="http://schemas.microsoft.com/office/drawing/2014/main" xmlns="" id="{7630575D-BE79-4015-AF3A-F976D2DC7C96}"/>
+                <a16:creationId xmlns:a16="http://schemas.microsoft.com/office/drawing/2014/main" id="{7630575D-BE79-4015-AF3A-F976D2DC7C96}"/>
               </a:ext>
             </a:extLst>
           </p:cNvPr>
@@ -1529,7 +1529,7 @@
           <p:cNvPr id="2" name="Title 1">
             <a:extLst>
               <a:ext uri="{FF2B5EF4-FFF2-40B4-BE49-F238E27FC236}">
-                <a16:creationId xmlns:a16="http://schemas.microsoft.com/office/drawing/2014/main" xmlns="" id="{001FAD14-9A6B-41F1-AC52-361AFAB4274C}"/>
+                <a16:creationId xmlns:a16="http://schemas.microsoft.com/office/drawing/2014/main" id="{001FAD14-9A6B-41F1-AC52-361AFAB4274C}"/>
               </a:ext>
             </a:extLst>
           </p:cNvPr>
@@ -1563,7 +1563,7 @@
           <p:cNvPr id="3" name="Text Placeholder 2">
             <a:extLst>
               <a:ext uri="{FF2B5EF4-FFF2-40B4-BE49-F238E27FC236}">
-                <a16:creationId xmlns:a16="http://schemas.microsoft.com/office/drawing/2014/main" xmlns="" id="{BF2DF27E-AFC0-497F-93DE-A9FCDB0500CE}"/>
+                <a16:creationId xmlns:a16="http://schemas.microsoft.com/office/drawing/2014/main" id="{BF2DF27E-AFC0-497F-93DE-A9FCDB0500CE}"/>
               </a:ext>
             </a:extLst>
           </p:cNvPr>
@@ -1634,7 +1634,7 @@
           <p:cNvPr id="4" name="Content Placeholder 3">
             <a:extLst>
               <a:ext uri="{FF2B5EF4-FFF2-40B4-BE49-F238E27FC236}">
-                <a16:creationId xmlns:a16="http://schemas.microsoft.com/office/drawing/2014/main" xmlns="" id="{EFF35F58-CF56-4432-8E90-09919A2A250E}"/>
+                <a16:creationId xmlns:a16="http://schemas.microsoft.com/office/drawing/2014/main" id="{EFF35F58-CF56-4432-8E90-09919A2A250E}"/>
               </a:ext>
             </a:extLst>
           </p:cNvPr>
@@ -1697,7 +1697,7 @@
           <p:cNvPr id="5" name="Text Placeholder 4">
             <a:extLst>
               <a:ext uri="{FF2B5EF4-FFF2-40B4-BE49-F238E27FC236}">
-                <a16:creationId xmlns:a16="http://schemas.microsoft.com/office/drawing/2014/main" xmlns="" id="{B87F44A9-18DA-4E3F-B66E-D9186985E975}"/>
+                <a16:creationId xmlns:a16="http://schemas.microsoft.com/office/drawing/2014/main" id="{B87F44A9-18DA-4E3F-B66E-D9186985E975}"/>
               </a:ext>
             </a:extLst>
           </p:cNvPr>
@@ -1768,7 +1768,7 @@
           <p:cNvPr id="6" name="Content Placeholder 5">
             <a:extLst>
               <a:ext uri="{FF2B5EF4-FFF2-40B4-BE49-F238E27FC236}">
-                <a16:creationId xmlns:a16="http://schemas.microsoft.com/office/drawing/2014/main" xmlns="" id="{35141C0C-9F37-4A04-9C4F-5AA0033B2252}"/>
+                <a16:creationId xmlns:a16="http://schemas.microsoft.com/office/drawing/2014/main" id="{35141C0C-9F37-4A04-9C4F-5AA0033B2252}"/>
               </a:ext>
             </a:extLst>
           </p:cNvPr>
@@ -1831,7 +1831,7 @@
           <p:cNvPr id="7" name="Date Placeholder 6">
             <a:extLst>
               <a:ext uri="{FF2B5EF4-FFF2-40B4-BE49-F238E27FC236}">
-                <a16:creationId xmlns:a16="http://schemas.microsoft.com/office/drawing/2014/main" xmlns="" id="{68180D94-938D-45DD-9468-A82F2A3098BE}"/>
+                <a16:creationId xmlns:a16="http://schemas.microsoft.com/office/drawing/2014/main" id="{68180D94-938D-45DD-9468-A82F2A3098BE}"/>
               </a:ext>
             </a:extLst>
           </p:cNvPr>
@@ -1860,7 +1860,7 @@
           <p:cNvPr id="8" name="Footer Placeholder 7">
             <a:extLst>
               <a:ext uri="{FF2B5EF4-FFF2-40B4-BE49-F238E27FC236}">
-                <a16:creationId xmlns:a16="http://schemas.microsoft.com/office/drawing/2014/main" xmlns="" id="{AF81368B-5AC5-44EE-9CD0-F43515F53E28}"/>
+                <a16:creationId xmlns:a16="http://schemas.microsoft.com/office/drawing/2014/main" id="{AF81368B-5AC5-44EE-9CD0-F43515F53E28}"/>
               </a:ext>
             </a:extLst>
           </p:cNvPr>
@@ -1885,7 +1885,7 @@
           <p:cNvPr id="9" name="Slide Number Placeholder 8">
             <a:extLst>
               <a:ext uri="{FF2B5EF4-FFF2-40B4-BE49-F238E27FC236}">
-                <a16:creationId xmlns:a16="http://schemas.microsoft.com/office/drawing/2014/main" xmlns="" id="{92E665A0-8FC6-4BAB-A0D5-01733AB9486E}"/>
+                <a16:creationId xmlns:a16="http://schemas.microsoft.com/office/drawing/2014/main" id="{92E665A0-8FC6-4BAB-A0D5-01733AB9486E}"/>
               </a:ext>
             </a:extLst>
           </p:cNvPr>
@@ -1944,7 +1944,7 @@
           <p:cNvPr id="2" name="Title 1">
             <a:extLst>
               <a:ext uri="{FF2B5EF4-FFF2-40B4-BE49-F238E27FC236}">
-                <a16:creationId xmlns:a16="http://schemas.microsoft.com/office/drawing/2014/main" xmlns="" id="{7EC30AF7-A49F-4534-8A17-4B2AB98E12E6}"/>
+                <a16:creationId xmlns:a16="http://schemas.microsoft.com/office/drawing/2014/main" id="{7EC30AF7-A49F-4534-8A17-4B2AB98E12E6}"/>
               </a:ext>
             </a:extLst>
           </p:cNvPr>
@@ -1973,7 +1973,7 @@
           <p:cNvPr id="3" name="Date Placeholder 2">
             <a:extLst>
               <a:ext uri="{FF2B5EF4-FFF2-40B4-BE49-F238E27FC236}">
-                <a16:creationId xmlns:a16="http://schemas.microsoft.com/office/drawing/2014/main" xmlns="" id="{DC03021E-AACB-4192-A510-A8450EDE1B20}"/>
+                <a16:creationId xmlns:a16="http://schemas.microsoft.com/office/drawing/2014/main" id="{DC03021E-AACB-4192-A510-A8450EDE1B20}"/>
               </a:ext>
             </a:extLst>
           </p:cNvPr>
@@ -2002,7 +2002,7 @@
           <p:cNvPr id="4" name="Footer Placeholder 3">
             <a:extLst>
               <a:ext uri="{FF2B5EF4-FFF2-40B4-BE49-F238E27FC236}">
-                <a16:creationId xmlns:a16="http://schemas.microsoft.com/office/drawing/2014/main" xmlns="" id="{7D7E48B2-C76A-4C46-A930-5F053E4D2107}"/>
+                <a16:creationId xmlns:a16="http://schemas.microsoft.com/office/drawing/2014/main" id="{7D7E48B2-C76A-4C46-A930-5F053E4D2107}"/>
               </a:ext>
             </a:extLst>
           </p:cNvPr>
@@ -2027,7 +2027,7 @@
           <p:cNvPr id="5" name="Slide Number Placeholder 4">
             <a:extLst>
               <a:ext uri="{FF2B5EF4-FFF2-40B4-BE49-F238E27FC236}">
-                <a16:creationId xmlns:a16="http://schemas.microsoft.com/office/drawing/2014/main" xmlns="" id="{56465355-CCAC-4194-ABCD-BDDDBDA035D4}"/>
+                <a16:creationId xmlns:a16="http://schemas.microsoft.com/office/drawing/2014/main" id="{56465355-CCAC-4194-ABCD-BDDDBDA035D4}"/>
               </a:ext>
             </a:extLst>
           </p:cNvPr>
@@ -2086,7 +2086,7 @@
           <p:cNvPr id="2" name="Date Placeholder 1">
             <a:extLst>
               <a:ext uri="{FF2B5EF4-FFF2-40B4-BE49-F238E27FC236}">
-                <a16:creationId xmlns:a16="http://schemas.microsoft.com/office/drawing/2014/main" xmlns="" id="{C6119099-AB90-4F33-849E-5E3E1A47AA7E}"/>
+                <a16:creationId xmlns:a16="http://schemas.microsoft.com/office/drawing/2014/main" id="{C6119099-AB90-4F33-849E-5E3E1A47AA7E}"/>
               </a:ext>
             </a:extLst>
           </p:cNvPr>
@@ -2115,7 +2115,7 @@
           <p:cNvPr id="3" name="Footer Placeholder 2">
             <a:extLst>
               <a:ext uri="{FF2B5EF4-FFF2-40B4-BE49-F238E27FC236}">
-                <a16:creationId xmlns:a16="http://schemas.microsoft.com/office/drawing/2014/main" xmlns="" id="{C1C0865F-F553-4682-880F-360E0C916B3B}"/>
+                <a16:creationId xmlns:a16="http://schemas.microsoft.com/office/drawing/2014/main" id="{C1C0865F-F553-4682-880F-360E0C916B3B}"/>
               </a:ext>
             </a:extLst>
           </p:cNvPr>
@@ -2140,7 +2140,7 @@
           <p:cNvPr id="4" name="Slide Number Placeholder 3">
             <a:extLst>
               <a:ext uri="{FF2B5EF4-FFF2-40B4-BE49-F238E27FC236}">
-                <a16:creationId xmlns:a16="http://schemas.microsoft.com/office/drawing/2014/main" xmlns="" id="{A5E84BD3-5882-463A-923F-51B2C061DCEB}"/>
+                <a16:creationId xmlns:a16="http://schemas.microsoft.com/office/drawing/2014/main" id="{A5E84BD3-5882-463A-923F-51B2C061DCEB}"/>
               </a:ext>
             </a:extLst>
           </p:cNvPr>
@@ -2199,7 +2199,7 @@
           <p:cNvPr id="2" name="Title 1">
             <a:extLst>
               <a:ext uri="{FF2B5EF4-FFF2-40B4-BE49-F238E27FC236}">
-                <a16:creationId xmlns:a16="http://schemas.microsoft.com/office/drawing/2014/main" xmlns="" id="{9D4CA60D-4DEC-414B-B97B-98C26C89D5B4}"/>
+                <a16:creationId xmlns:a16="http://schemas.microsoft.com/office/drawing/2014/main" id="{9D4CA60D-4DEC-414B-B97B-98C26C89D5B4}"/>
               </a:ext>
             </a:extLst>
           </p:cNvPr>
@@ -2237,7 +2237,7 @@
           <p:cNvPr id="3" name="Content Placeholder 2">
             <a:extLst>
               <a:ext uri="{FF2B5EF4-FFF2-40B4-BE49-F238E27FC236}">
-                <a16:creationId xmlns:a16="http://schemas.microsoft.com/office/drawing/2014/main" xmlns="" id="{C14BF71D-C618-466B-927D-A7872C1F6DB7}"/>
+                <a16:creationId xmlns:a16="http://schemas.microsoft.com/office/drawing/2014/main" id="{C14BF71D-C618-466B-927D-A7872C1F6DB7}"/>
               </a:ext>
             </a:extLst>
           </p:cNvPr>
@@ -2328,7 +2328,7 @@
           <p:cNvPr id="4" name="Text Placeholder 3">
             <a:extLst>
               <a:ext uri="{FF2B5EF4-FFF2-40B4-BE49-F238E27FC236}">
-                <a16:creationId xmlns:a16="http://schemas.microsoft.com/office/drawing/2014/main" xmlns="" id="{B6ACA130-3818-40BE-8CF6-17A171B8AA8D}"/>
+                <a16:creationId xmlns:a16="http://schemas.microsoft.com/office/drawing/2014/main" id="{B6ACA130-3818-40BE-8CF6-17A171B8AA8D}"/>
               </a:ext>
             </a:extLst>
           </p:cNvPr>
@@ -2399,7 +2399,7 @@
           <p:cNvPr id="5" name="Date Placeholder 4">
             <a:extLst>
               <a:ext uri="{FF2B5EF4-FFF2-40B4-BE49-F238E27FC236}">
-                <a16:creationId xmlns:a16="http://schemas.microsoft.com/office/drawing/2014/main" xmlns="" id="{D2A30341-D5CE-4A0E-9DB4-3F8357908448}"/>
+                <a16:creationId xmlns:a16="http://schemas.microsoft.com/office/drawing/2014/main" id="{D2A30341-D5CE-4A0E-9DB4-3F8357908448}"/>
               </a:ext>
             </a:extLst>
           </p:cNvPr>
@@ -2428,7 +2428,7 @@
           <p:cNvPr id="6" name="Footer Placeholder 5">
             <a:extLst>
               <a:ext uri="{FF2B5EF4-FFF2-40B4-BE49-F238E27FC236}">
-                <a16:creationId xmlns:a16="http://schemas.microsoft.com/office/drawing/2014/main" xmlns="" id="{A3FD6969-CF92-450F-86F6-CF7F8CE01576}"/>
+                <a16:creationId xmlns:a16="http://schemas.microsoft.com/office/drawing/2014/main" id="{A3FD6969-CF92-450F-86F6-CF7F8CE01576}"/>
               </a:ext>
             </a:extLst>
           </p:cNvPr>
@@ -2453,7 +2453,7 @@
           <p:cNvPr id="7" name="Slide Number Placeholder 6">
             <a:extLst>
               <a:ext uri="{FF2B5EF4-FFF2-40B4-BE49-F238E27FC236}">
-                <a16:creationId xmlns:a16="http://schemas.microsoft.com/office/drawing/2014/main" xmlns="" id="{C2E7BE3C-2A06-467B-828C-0F65224B97C1}"/>
+                <a16:creationId xmlns:a16="http://schemas.microsoft.com/office/drawing/2014/main" id="{C2E7BE3C-2A06-467B-828C-0F65224B97C1}"/>
               </a:ext>
             </a:extLst>
           </p:cNvPr>
@@ -2512,7 +2512,7 @@
           <p:cNvPr id="2" name="Title 1">
             <a:extLst>
               <a:ext uri="{FF2B5EF4-FFF2-40B4-BE49-F238E27FC236}">
-                <a16:creationId xmlns:a16="http://schemas.microsoft.com/office/drawing/2014/main" xmlns="" id="{D838E20C-5455-4B8F-A32B-81ACC28D78F8}"/>
+                <a16:creationId xmlns:a16="http://schemas.microsoft.com/office/drawing/2014/main" id="{D838E20C-5455-4B8F-A32B-81ACC28D78F8}"/>
               </a:ext>
             </a:extLst>
           </p:cNvPr>
@@ -2550,7 +2550,7 @@
           <p:cNvPr id="3" name="Picture Placeholder 2">
             <a:extLst>
               <a:ext uri="{FF2B5EF4-FFF2-40B4-BE49-F238E27FC236}">
-                <a16:creationId xmlns:a16="http://schemas.microsoft.com/office/drawing/2014/main" xmlns="" id="{CD533A4B-EC00-4A37-8922-ECFD065E5DF5}"/>
+                <a16:creationId xmlns:a16="http://schemas.microsoft.com/office/drawing/2014/main" id="{CD533A4B-EC00-4A37-8922-ECFD065E5DF5}"/>
               </a:ext>
             </a:extLst>
           </p:cNvPr>
@@ -2617,7 +2617,7 @@
           <p:cNvPr id="4" name="Text Placeholder 3">
             <a:extLst>
               <a:ext uri="{FF2B5EF4-FFF2-40B4-BE49-F238E27FC236}">
-                <a16:creationId xmlns:a16="http://schemas.microsoft.com/office/drawing/2014/main" xmlns="" id="{63F9537A-C081-4EB3-9CBD-0F4AA06B0C3E}"/>
+                <a16:creationId xmlns:a16="http://schemas.microsoft.com/office/drawing/2014/main" id="{63F9537A-C081-4EB3-9CBD-0F4AA06B0C3E}"/>
               </a:ext>
             </a:extLst>
           </p:cNvPr>
@@ -2688,7 +2688,7 @@
           <p:cNvPr id="5" name="Date Placeholder 4">
             <a:extLst>
               <a:ext uri="{FF2B5EF4-FFF2-40B4-BE49-F238E27FC236}">
-                <a16:creationId xmlns:a16="http://schemas.microsoft.com/office/drawing/2014/main" xmlns="" id="{CA93C481-5BCE-4415-A53A-093EB06FED75}"/>
+                <a16:creationId xmlns:a16="http://schemas.microsoft.com/office/drawing/2014/main" id="{CA93C481-5BCE-4415-A53A-093EB06FED75}"/>
               </a:ext>
             </a:extLst>
           </p:cNvPr>
@@ -2717,7 +2717,7 @@
           <p:cNvPr id="6" name="Footer Placeholder 5">
             <a:extLst>
               <a:ext uri="{FF2B5EF4-FFF2-40B4-BE49-F238E27FC236}">
-                <a16:creationId xmlns:a16="http://schemas.microsoft.com/office/drawing/2014/main" xmlns="" id="{31F94D76-A933-4873-AE27-F9FB3B0E2821}"/>
+                <a16:creationId xmlns:a16="http://schemas.microsoft.com/office/drawing/2014/main" id="{31F94D76-A933-4873-AE27-F9FB3B0E2821}"/>
               </a:ext>
             </a:extLst>
           </p:cNvPr>
@@ -2742,7 +2742,7 @@
           <p:cNvPr id="7" name="Slide Number Placeholder 6">
             <a:extLst>
               <a:ext uri="{FF2B5EF4-FFF2-40B4-BE49-F238E27FC236}">
-                <a16:creationId xmlns:a16="http://schemas.microsoft.com/office/drawing/2014/main" xmlns="" id="{627989A9-321F-4E42-A3DF-12CB5603AD34}"/>
+                <a16:creationId xmlns:a16="http://schemas.microsoft.com/office/drawing/2014/main" id="{627989A9-321F-4E42-A3DF-12CB5603AD34}"/>
               </a:ext>
             </a:extLst>
           </p:cNvPr>
@@ -2806,7 +2806,7 @@
           <p:cNvPr id="2" name="Title Placeholder 1">
             <a:extLst>
               <a:ext uri="{FF2B5EF4-FFF2-40B4-BE49-F238E27FC236}">
-                <a16:creationId xmlns:a16="http://schemas.microsoft.com/office/drawing/2014/main" xmlns="" id="{E1A70B09-4260-4296-BB15-41506F601CAF}"/>
+                <a16:creationId xmlns:a16="http://schemas.microsoft.com/office/drawing/2014/main" id="{E1A70B09-4260-4296-BB15-41506F601CAF}"/>
               </a:ext>
             </a:extLst>
           </p:cNvPr>
@@ -2845,7 +2845,7 @@
           <p:cNvPr id="3" name="Text Placeholder 2">
             <a:extLst>
               <a:ext uri="{FF2B5EF4-FFF2-40B4-BE49-F238E27FC236}">
-                <a16:creationId xmlns:a16="http://schemas.microsoft.com/office/drawing/2014/main" xmlns="" id="{01B148C8-B3FE-4368-A05E-F08638163EE4}"/>
+                <a16:creationId xmlns:a16="http://schemas.microsoft.com/office/drawing/2014/main" id="{01B148C8-B3FE-4368-A05E-F08638163EE4}"/>
               </a:ext>
             </a:extLst>
           </p:cNvPr>
@@ -2913,7 +2913,7 @@
           <p:cNvPr id="4" name="Date Placeholder 3">
             <a:extLst>
               <a:ext uri="{FF2B5EF4-FFF2-40B4-BE49-F238E27FC236}">
-                <a16:creationId xmlns:a16="http://schemas.microsoft.com/office/drawing/2014/main" xmlns="" id="{FA38593E-B51B-4A8C-B64E-B1DA56F0218E}"/>
+                <a16:creationId xmlns:a16="http://schemas.microsoft.com/office/drawing/2014/main" id="{FA38593E-B51B-4A8C-B64E-B1DA56F0218E}"/>
               </a:ext>
             </a:extLst>
           </p:cNvPr>
@@ -2960,7 +2960,7 @@
           <p:cNvPr id="5" name="Footer Placeholder 4">
             <a:extLst>
               <a:ext uri="{FF2B5EF4-FFF2-40B4-BE49-F238E27FC236}">
-                <a16:creationId xmlns:a16="http://schemas.microsoft.com/office/drawing/2014/main" xmlns="" id="{0F07F653-1A53-42F6-A1DF-1BB761CDAAC6}"/>
+                <a16:creationId xmlns:a16="http://schemas.microsoft.com/office/drawing/2014/main" id="{0F07F653-1A53-42F6-A1DF-1BB761CDAAC6}"/>
               </a:ext>
             </a:extLst>
           </p:cNvPr>
@@ -3003,7 +3003,7 @@
           <p:cNvPr id="6" name="Slide Number Placeholder 5">
             <a:extLst>
               <a:ext uri="{FF2B5EF4-FFF2-40B4-BE49-F238E27FC236}">
-                <a16:creationId xmlns:a16="http://schemas.microsoft.com/office/drawing/2014/main" xmlns="" id="{D7C3A743-36B7-4DE1-902C-0CA132F97E63}"/>
+                <a16:creationId xmlns:a16="http://schemas.microsoft.com/office/drawing/2014/main" id="{D7C3A743-36B7-4DE1-902C-0CA132F97E63}"/>
               </a:ext>
             </a:extLst>
           </p:cNvPr>
@@ -3371,7 +3371,7 @@
           <p:cNvPr id="4" name="Rectangle 3">
             <a:extLst>
               <a:ext uri="{FF2B5EF4-FFF2-40B4-BE49-F238E27FC236}">
-                <a16:creationId xmlns:a16="http://schemas.microsoft.com/office/drawing/2014/main" xmlns="" id="{931935EF-4B24-4A4B-A0CE-717A116F8277}"/>
+                <a16:creationId xmlns:a16="http://schemas.microsoft.com/office/drawing/2014/main" id="{931935EF-4B24-4A4B-A0CE-717A116F8277}"/>
               </a:ext>
             </a:extLst>
           </p:cNvPr>
@@ -3419,7 +3419,7 @@
           <p:cNvPr id="5" name="Rectangle 4">
             <a:extLst>
               <a:ext uri="{FF2B5EF4-FFF2-40B4-BE49-F238E27FC236}">
-                <a16:creationId xmlns:a16="http://schemas.microsoft.com/office/drawing/2014/main" xmlns="" id="{FC799F79-4A3A-433C-8CE5-6B92E575C055}"/>
+                <a16:creationId xmlns:a16="http://schemas.microsoft.com/office/drawing/2014/main" id="{FC799F79-4A3A-433C-8CE5-6B92E575C055}"/>
               </a:ext>
             </a:extLst>
           </p:cNvPr>
@@ -3467,7 +3467,7 @@
           <p:cNvPr id="6" name="Rectangle 5">
             <a:extLst>
               <a:ext uri="{FF2B5EF4-FFF2-40B4-BE49-F238E27FC236}">
-                <a16:creationId xmlns:a16="http://schemas.microsoft.com/office/drawing/2014/main" xmlns="" id="{5B965750-0088-43BC-BFF5-C3BEAA1D0D5E}"/>
+                <a16:creationId xmlns:a16="http://schemas.microsoft.com/office/drawing/2014/main" id="{5B965750-0088-43BC-BFF5-C3BEAA1D0D5E}"/>
               </a:ext>
             </a:extLst>
           </p:cNvPr>
@@ -3515,7 +3515,7 @@
           <p:cNvPr id="8" name="Straight Arrow Connector 7">
             <a:extLst>
               <a:ext uri="{FF2B5EF4-FFF2-40B4-BE49-F238E27FC236}">
-                <a16:creationId xmlns:a16="http://schemas.microsoft.com/office/drawing/2014/main" xmlns="" id="{B694D694-4018-45D0-B814-957B58D95665}"/>
+                <a16:creationId xmlns:a16="http://schemas.microsoft.com/office/drawing/2014/main" id="{B694D694-4018-45D0-B814-957B58D95665}"/>
               </a:ext>
             </a:extLst>
           </p:cNvPr>
@@ -3556,7 +3556,7 @@
           <p:cNvPr id="10" name="Straight Arrow Connector 9">
             <a:extLst>
               <a:ext uri="{FF2B5EF4-FFF2-40B4-BE49-F238E27FC236}">
-                <a16:creationId xmlns:a16="http://schemas.microsoft.com/office/drawing/2014/main" xmlns="" id="{56B0F05E-F4DA-4B7E-8E79-88AEC209DA4D}"/>
+                <a16:creationId xmlns:a16="http://schemas.microsoft.com/office/drawing/2014/main" id="{56B0F05E-F4DA-4B7E-8E79-88AEC209DA4D}"/>
               </a:ext>
             </a:extLst>
           </p:cNvPr>
@@ -3597,7 +3597,7 @@
           <p:cNvPr id="11" name="Rectangle 10">
             <a:extLst>
               <a:ext uri="{FF2B5EF4-FFF2-40B4-BE49-F238E27FC236}">
-                <a16:creationId xmlns:a16="http://schemas.microsoft.com/office/drawing/2014/main" xmlns="" id="{219C2D64-FD9A-465C-A669-D67365709EE0}"/>
+                <a16:creationId xmlns:a16="http://schemas.microsoft.com/office/drawing/2014/main" id="{219C2D64-FD9A-465C-A669-D67365709EE0}"/>
               </a:ext>
             </a:extLst>
           </p:cNvPr>
@@ -3646,7 +3646,7 @@
           <p:cNvPr id="12" name="Picture 11">
             <a:extLst>
               <a:ext uri="{FF2B5EF4-FFF2-40B4-BE49-F238E27FC236}">
-                <a16:creationId xmlns:a16="http://schemas.microsoft.com/office/drawing/2014/main" xmlns="" id="{8A56AC2C-BA21-4780-B564-A0201D0306C8}"/>
+                <a16:creationId xmlns:a16="http://schemas.microsoft.com/office/drawing/2014/main" id="{8A56AC2C-BA21-4780-B564-A0201D0306C8}"/>
               </a:ext>
             </a:extLst>
           </p:cNvPr>
@@ -3706,7 +3706,7 @@
           <p:cNvPr id="6" name="TextBox 5">
             <a:extLst>
               <a:ext uri="{FF2B5EF4-FFF2-40B4-BE49-F238E27FC236}">
-                <a16:creationId xmlns:a16="http://schemas.microsoft.com/office/drawing/2014/main" xmlns="" id="{65F3C743-1BEA-4316-B336-118EC9FCDFC5}"/>
+                <a16:creationId xmlns:a16="http://schemas.microsoft.com/office/drawing/2014/main" id="{65F3C743-1BEA-4316-B336-118EC9FCDFC5}"/>
               </a:ext>
             </a:extLst>
           </p:cNvPr>
@@ -3749,7 +3749,7 @@
           <p:cNvPr id="8" name="Rectangle: Rounded Corners 7">
             <a:extLst>
               <a:ext uri="{FF2B5EF4-FFF2-40B4-BE49-F238E27FC236}">
-                <a16:creationId xmlns:a16="http://schemas.microsoft.com/office/drawing/2014/main" xmlns="" id="{2DB3A1D2-D500-446E-B822-8A5647ABA2EC}"/>
+                <a16:creationId xmlns:a16="http://schemas.microsoft.com/office/drawing/2014/main" id="{2DB3A1D2-D500-446E-B822-8A5647ABA2EC}"/>
               </a:ext>
             </a:extLst>
           </p:cNvPr>
@@ -3796,7 +3796,7 @@
           <p:cNvPr id="15" name="Rectangle 14">
             <a:extLst>
               <a:ext uri="{FF2B5EF4-FFF2-40B4-BE49-F238E27FC236}">
-                <a16:creationId xmlns:a16="http://schemas.microsoft.com/office/drawing/2014/main" xmlns="" id="{26137DFE-F287-42A8-BA3F-8332F1C4708A}"/>
+                <a16:creationId xmlns:a16="http://schemas.microsoft.com/office/drawing/2014/main" id="{26137DFE-F287-42A8-BA3F-8332F1C4708A}"/>
               </a:ext>
             </a:extLst>
           </p:cNvPr>
@@ -3845,7 +3845,7 @@
           <p:cNvPr id="17" name="Rectangle: Rounded Corners 16">
             <a:extLst>
               <a:ext uri="{FF2B5EF4-FFF2-40B4-BE49-F238E27FC236}">
-                <a16:creationId xmlns:a16="http://schemas.microsoft.com/office/drawing/2014/main" xmlns="" id="{28FDD41E-633D-44B5-8B3A-7ACF2D3F5969}"/>
+                <a16:creationId xmlns:a16="http://schemas.microsoft.com/office/drawing/2014/main" id="{28FDD41E-633D-44B5-8B3A-7ACF2D3F5969}"/>
               </a:ext>
             </a:extLst>
           </p:cNvPr>
@@ -3892,7 +3892,7 @@
           <p:cNvPr id="18" name="Rectangle: Rounded Corners 17">
             <a:extLst>
               <a:ext uri="{FF2B5EF4-FFF2-40B4-BE49-F238E27FC236}">
-                <a16:creationId xmlns:a16="http://schemas.microsoft.com/office/drawing/2014/main" xmlns="" id="{7BA1A1A9-A056-40C3-9C09-33D118C50748}"/>
+                <a16:creationId xmlns:a16="http://schemas.microsoft.com/office/drawing/2014/main" id="{7BA1A1A9-A056-40C3-9C09-33D118C50748}"/>
               </a:ext>
             </a:extLst>
           </p:cNvPr>
@@ -3939,7 +3939,7 @@
           <p:cNvPr id="20" name="Straight Arrow Connector 19">
             <a:extLst>
               <a:ext uri="{FF2B5EF4-FFF2-40B4-BE49-F238E27FC236}">
-                <a16:creationId xmlns:a16="http://schemas.microsoft.com/office/drawing/2014/main" xmlns="" id="{4D2C0868-56BA-4A0F-9A9D-A43A78E06DD2}"/>
+                <a16:creationId xmlns:a16="http://schemas.microsoft.com/office/drawing/2014/main" id="{4D2C0868-56BA-4A0F-9A9D-A43A78E06DD2}"/>
               </a:ext>
             </a:extLst>
           </p:cNvPr>
@@ -3980,7 +3980,7 @@
           <p:cNvPr id="22" name="Straight Arrow Connector 21">
             <a:extLst>
               <a:ext uri="{FF2B5EF4-FFF2-40B4-BE49-F238E27FC236}">
-                <a16:creationId xmlns:a16="http://schemas.microsoft.com/office/drawing/2014/main" xmlns="" id="{ADF0EA32-534F-44C1-9389-B9AB8DD50DA7}"/>
+                <a16:creationId xmlns:a16="http://schemas.microsoft.com/office/drawing/2014/main" id="{ADF0EA32-534F-44C1-9389-B9AB8DD50DA7}"/>
               </a:ext>
             </a:extLst>
           </p:cNvPr>
@@ -4021,7 +4021,7 @@
           <p:cNvPr id="24" name="Straight Arrow Connector 23">
             <a:extLst>
               <a:ext uri="{FF2B5EF4-FFF2-40B4-BE49-F238E27FC236}">
-                <a16:creationId xmlns:a16="http://schemas.microsoft.com/office/drawing/2014/main" xmlns="" id="{3E163DA6-E776-4EA3-9555-4BD9AA488812}"/>
+                <a16:creationId xmlns:a16="http://schemas.microsoft.com/office/drawing/2014/main" id="{3E163DA6-E776-4EA3-9555-4BD9AA488812}"/>
               </a:ext>
             </a:extLst>
           </p:cNvPr>
@@ -4062,7 +4062,7 @@
           <p:cNvPr id="25" name="Group 24">
             <a:extLst>
               <a:ext uri="{FF2B5EF4-FFF2-40B4-BE49-F238E27FC236}">
-                <a16:creationId xmlns:a16="http://schemas.microsoft.com/office/drawing/2014/main" xmlns="" id="{A311C16D-822C-4F3D-AF2F-AB9727283ABE}"/>
+                <a16:creationId xmlns:a16="http://schemas.microsoft.com/office/drawing/2014/main" id="{A311C16D-822C-4F3D-AF2F-AB9727283ABE}"/>
               </a:ext>
             </a:extLst>
           </p:cNvPr>
@@ -4082,7 +4082,7 @@
             <p:cNvPr id="26" name="Picture 25">
               <a:extLst>
                 <a:ext uri="{FF2B5EF4-FFF2-40B4-BE49-F238E27FC236}">
-                  <a16:creationId xmlns:a16="http://schemas.microsoft.com/office/drawing/2014/main" xmlns="" id="{A4999320-0AF4-429E-94E8-9C0ADA7B2F44}"/>
+                  <a16:creationId xmlns:a16="http://schemas.microsoft.com/office/drawing/2014/main" id="{A4999320-0AF4-429E-94E8-9C0ADA7B2F44}"/>
                 </a:ext>
               </a:extLst>
             </p:cNvPr>
@@ -4111,7 +4111,7 @@
             <p:cNvPr id="27" name="Picture 26">
               <a:extLst>
                 <a:ext uri="{FF2B5EF4-FFF2-40B4-BE49-F238E27FC236}">
-                  <a16:creationId xmlns:a16="http://schemas.microsoft.com/office/drawing/2014/main" xmlns="" id="{0CCB6AF2-2D54-44B0-9F13-C02E6DD3A1CE}"/>
+                  <a16:creationId xmlns:a16="http://schemas.microsoft.com/office/drawing/2014/main" id="{0CCB6AF2-2D54-44B0-9F13-C02E6DD3A1CE}"/>
                 </a:ext>
               </a:extLst>
             </p:cNvPr>
@@ -4141,7 +4141,7 @@
           <p:cNvPr id="28" name="TextBox 27">
             <a:extLst>
               <a:ext uri="{FF2B5EF4-FFF2-40B4-BE49-F238E27FC236}">
-                <a16:creationId xmlns:a16="http://schemas.microsoft.com/office/drawing/2014/main" xmlns="" id="{88DBBDAA-8A16-4638-9019-BAA435748B96}"/>
+                <a16:creationId xmlns:a16="http://schemas.microsoft.com/office/drawing/2014/main" id="{88DBBDAA-8A16-4638-9019-BAA435748B96}"/>
               </a:ext>
             </a:extLst>
           </p:cNvPr>
@@ -4176,7 +4176,7 @@
           <p:cNvPr id="29" name="Rectangle: Rounded Corners 28">
             <a:extLst>
               <a:ext uri="{FF2B5EF4-FFF2-40B4-BE49-F238E27FC236}">
-                <a16:creationId xmlns:a16="http://schemas.microsoft.com/office/drawing/2014/main" xmlns="" id="{5D8A2F5D-2E33-469D-A3D2-367579FC2FCE}"/>
+                <a16:creationId xmlns:a16="http://schemas.microsoft.com/office/drawing/2014/main" id="{5D8A2F5D-2E33-469D-A3D2-367579FC2FCE}"/>
               </a:ext>
             </a:extLst>
           </p:cNvPr>
@@ -4221,7 +4221,7 @@
           <p:cNvPr id="30" name="Rectangle: Rounded Corners 29">
             <a:extLst>
               <a:ext uri="{FF2B5EF4-FFF2-40B4-BE49-F238E27FC236}">
-                <a16:creationId xmlns:a16="http://schemas.microsoft.com/office/drawing/2014/main" xmlns="" id="{2593E276-8C04-4F00-93AF-21C7E4E33D1B}"/>
+                <a16:creationId xmlns:a16="http://schemas.microsoft.com/office/drawing/2014/main" id="{2593E276-8C04-4F00-93AF-21C7E4E33D1B}"/>
               </a:ext>
             </a:extLst>
           </p:cNvPr>
@@ -4266,7 +4266,7 @@
           <p:cNvPr id="31" name="Rectangle: Rounded Corners 30">
             <a:extLst>
               <a:ext uri="{FF2B5EF4-FFF2-40B4-BE49-F238E27FC236}">
-                <a16:creationId xmlns:a16="http://schemas.microsoft.com/office/drawing/2014/main" xmlns="" id="{64E78AF7-D3D2-46BB-AC06-DBB98CA4C533}"/>
+                <a16:creationId xmlns:a16="http://schemas.microsoft.com/office/drawing/2014/main" id="{64E78AF7-D3D2-46BB-AC06-DBB98CA4C533}"/>
               </a:ext>
             </a:extLst>
           </p:cNvPr>
@@ -4379,7 +4379,7 @@
           <p:cNvPr id="5" name="TextBox 4">
             <a:extLst>
               <a:ext uri="{FF2B5EF4-FFF2-40B4-BE49-F238E27FC236}">
-                <a16:creationId xmlns:a16="http://schemas.microsoft.com/office/drawing/2014/main" xmlns="" id="{A6FDDEFF-7CBC-4636-96BC-F2E97EB73F04}"/>
+                <a16:creationId xmlns:a16="http://schemas.microsoft.com/office/drawing/2014/main" id="{A6FDDEFF-7CBC-4636-96BC-F2E97EB73F04}"/>
               </a:ext>
             </a:extLst>
           </p:cNvPr>
@@ -4422,7 +4422,7 @@
           <p:cNvPr id="6" name="TextBox 5">
             <a:extLst>
               <a:ext uri="{FF2B5EF4-FFF2-40B4-BE49-F238E27FC236}">
-                <a16:creationId xmlns:a16="http://schemas.microsoft.com/office/drawing/2014/main" xmlns="" id="{65F3C743-1BEA-4316-B336-118EC9FCDFC5}"/>
+                <a16:creationId xmlns:a16="http://schemas.microsoft.com/office/drawing/2014/main" id="{65F3C743-1BEA-4316-B336-118EC9FCDFC5}"/>
               </a:ext>
             </a:extLst>
           </p:cNvPr>
@@ -4465,7 +4465,7 @@
           <p:cNvPr id="15" name="Rectangle 14">
             <a:extLst>
               <a:ext uri="{FF2B5EF4-FFF2-40B4-BE49-F238E27FC236}">
-                <a16:creationId xmlns:a16="http://schemas.microsoft.com/office/drawing/2014/main" xmlns="" id="{26137DFE-F287-42A8-BA3F-8332F1C4708A}"/>
+                <a16:creationId xmlns:a16="http://schemas.microsoft.com/office/drawing/2014/main" id="{26137DFE-F287-42A8-BA3F-8332F1C4708A}"/>
               </a:ext>
             </a:extLst>
           </p:cNvPr>
@@ -4514,7 +4514,7 @@
           <p:cNvPr id="17" name="Rectangle: Rounded Corners 16">
             <a:extLst>
               <a:ext uri="{FF2B5EF4-FFF2-40B4-BE49-F238E27FC236}">
-                <a16:creationId xmlns:a16="http://schemas.microsoft.com/office/drawing/2014/main" xmlns="" id="{56EBF5EC-2E10-4799-ADB5-A183AF811D01}"/>
+                <a16:creationId xmlns:a16="http://schemas.microsoft.com/office/drawing/2014/main" id="{56EBF5EC-2E10-4799-ADB5-A183AF811D01}"/>
               </a:ext>
             </a:extLst>
           </p:cNvPr>
@@ -4561,7 +4561,7 @@
           <p:cNvPr id="19" name="Rectangle: Rounded Corners 18">
             <a:extLst>
               <a:ext uri="{FF2B5EF4-FFF2-40B4-BE49-F238E27FC236}">
-                <a16:creationId xmlns:a16="http://schemas.microsoft.com/office/drawing/2014/main" xmlns="" id="{2AEE6840-29AE-4C50-819C-E290FB908BD1}"/>
+                <a16:creationId xmlns:a16="http://schemas.microsoft.com/office/drawing/2014/main" id="{2AEE6840-29AE-4C50-819C-E290FB908BD1}"/>
               </a:ext>
             </a:extLst>
           </p:cNvPr>
@@ -4608,7 +4608,7 @@
           <p:cNvPr id="20" name="Rectangle: Rounded Corners 19">
             <a:extLst>
               <a:ext uri="{FF2B5EF4-FFF2-40B4-BE49-F238E27FC236}">
-                <a16:creationId xmlns:a16="http://schemas.microsoft.com/office/drawing/2014/main" xmlns="" id="{DB508EB3-9462-44C6-AE59-8C9A0248EE55}"/>
+                <a16:creationId xmlns:a16="http://schemas.microsoft.com/office/drawing/2014/main" id="{DB508EB3-9462-44C6-AE59-8C9A0248EE55}"/>
               </a:ext>
             </a:extLst>
           </p:cNvPr>
@@ -4655,7 +4655,7 @@
           <p:cNvPr id="21" name="Rectangle: Rounded Corners 20">
             <a:extLst>
               <a:ext uri="{FF2B5EF4-FFF2-40B4-BE49-F238E27FC236}">
-                <a16:creationId xmlns:a16="http://schemas.microsoft.com/office/drawing/2014/main" xmlns="" id="{CE96D565-5EA7-4E67-B133-293D2FDA5E37}"/>
+                <a16:creationId xmlns:a16="http://schemas.microsoft.com/office/drawing/2014/main" id="{CE96D565-5EA7-4E67-B133-293D2FDA5E37}"/>
               </a:ext>
             </a:extLst>
           </p:cNvPr>
@@ -4702,7 +4702,7 @@
           <p:cNvPr id="22" name="Rectangle: Rounded Corners 21">
             <a:extLst>
               <a:ext uri="{FF2B5EF4-FFF2-40B4-BE49-F238E27FC236}">
-                <a16:creationId xmlns:a16="http://schemas.microsoft.com/office/drawing/2014/main" xmlns="" id="{A32A147D-9C02-4FAE-A19E-BDF7A300DAE2}"/>
+                <a16:creationId xmlns:a16="http://schemas.microsoft.com/office/drawing/2014/main" id="{A32A147D-9C02-4FAE-A19E-BDF7A300DAE2}"/>
               </a:ext>
             </a:extLst>
           </p:cNvPr>
@@ -4749,7 +4749,7 @@
           <p:cNvPr id="24" name="Cylinder 23">
             <a:extLst>
               <a:ext uri="{FF2B5EF4-FFF2-40B4-BE49-F238E27FC236}">
-                <a16:creationId xmlns:a16="http://schemas.microsoft.com/office/drawing/2014/main" xmlns="" id="{471E0036-001E-4715-A6A7-0F53DA07F5FF}"/>
+                <a16:creationId xmlns:a16="http://schemas.microsoft.com/office/drawing/2014/main" id="{471E0036-001E-4715-A6A7-0F53DA07F5FF}"/>
               </a:ext>
             </a:extLst>
           </p:cNvPr>
@@ -4796,7 +4796,7 @@
           <p:cNvPr id="25" name="Cylinder 24">
             <a:extLst>
               <a:ext uri="{FF2B5EF4-FFF2-40B4-BE49-F238E27FC236}">
-                <a16:creationId xmlns:a16="http://schemas.microsoft.com/office/drawing/2014/main" xmlns="" id="{3F1B1B22-8F91-45C0-804D-E2EE2B4A745B}"/>
+                <a16:creationId xmlns:a16="http://schemas.microsoft.com/office/drawing/2014/main" id="{3F1B1B22-8F91-45C0-804D-E2EE2B4A745B}"/>
               </a:ext>
             </a:extLst>
           </p:cNvPr>
@@ -4843,7 +4843,7 @@
           <p:cNvPr id="27" name="Rectangle: Rounded Corners 26">
             <a:extLst>
               <a:ext uri="{FF2B5EF4-FFF2-40B4-BE49-F238E27FC236}">
-                <a16:creationId xmlns:a16="http://schemas.microsoft.com/office/drawing/2014/main" xmlns="" id="{22CE1059-E877-4BED-B241-AA1333C5EA04}"/>
+                <a16:creationId xmlns:a16="http://schemas.microsoft.com/office/drawing/2014/main" id="{22CE1059-E877-4BED-B241-AA1333C5EA04}"/>
               </a:ext>
             </a:extLst>
           </p:cNvPr>
@@ -4890,7 +4890,7 @@
           <p:cNvPr id="30" name="Rectangle: Rounded Corners 29">
             <a:extLst>
               <a:ext uri="{FF2B5EF4-FFF2-40B4-BE49-F238E27FC236}">
-                <a16:creationId xmlns:a16="http://schemas.microsoft.com/office/drawing/2014/main" xmlns="" id="{3770DC01-95D6-49E1-AA81-337766233B8A}"/>
+                <a16:creationId xmlns:a16="http://schemas.microsoft.com/office/drawing/2014/main" id="{3770DC01-95D6-49E1-AA81-337766233B8A}"/>
               </a:ext>
             </a:extLst>
           </p:cNvPr>
@@ -4937,7 +4937,7 @@
           <p:cNvPr id="7" name="Rectangle: Rounded Corners 6">
             <a:extLst>
               <a:ext uri="{FF2B5EF4-FFF2-40B4-BE49-F238E27FC236}">
-                <a16:creationId xmlns:a16="http://schemas.microsoft.com/office/drawing/2014/main" xmlns="" id="{0A728332-88F1-4444-B78A-AC9AAD642A20}"/>
+                <a16:creationId xmlns:a16="http://schemas.microsoft.com/office/drawing/2014/main" id="{0A728332-88F1-4444-B78A-AC9AAD642A20}"/>
               </a:ext>
             </a:extLst>
           </p:cNvPr>
@@ -4982,7 +4982,7 @@
           <p:cNvPr id="51" name="Rectangle: Rounded Corners 50">
             <a:extLst>
               <a:ext uri="{FF2B5EF4-FFF2-40B4-BE49-F238E27FC236}">
-                <a16:creationId xmlns:a16="http://schemas.microsoft.com/office/drawing/2014/main" xmlns="" id="{F6468A72-DFEE-471C-8031-9E69F56BF132}"/>
+                <a16:creationId xmlns:a16="http://schemas.microsoft.com/office/drawing/2014/main" id="{F6468A72-DFEE-471C-8031-9E69F56BF132}"/>
               </a:ext>
             </a:extLst>
           </p:cNvPr>
@@ -5029,7 +5029,7 @@
           <p:cNvPr id="52" name="Rectangle: Rounded Corners 51">
             <a:extLst>
               <a:ext uri="{FF2B5EF4-FFF2-40B4-BE49-F238E27FC236}">
-                <a16:creationId xmlns:a16="http://schemas.microsoft.com/office/drawing/2014/main" xmlns="" id="{A7E794FA-DC36-4E66-9027-156E04102129}"/>
+                <a16:creationId xmlns:a16="http://schemas.microsoft.com/office/drawing/2014/main" id="{A7E794FA-DC36-4E66-9027-156E04102129}"/>
               </a:ext>
             </a:extLst>
           </p:cNvPr>
@@ -5074,7 +5074,7 @@
           <p:cNvPr id="53" name="Rectangle: Rounded Corners 52">
             <a:extLst>
               <a:ext uri="{FF2B5EF4-FFF2-40B4-BE49-F238E27FC236}">
-                <a16:creationId xmlns:a16="http://schemas.microsoft.com/office/drawing/2014/main" xmlns="" id="{067A43A6-A65F-422A-B957-64DF8665D0CF}"/>
+                <a16:creationId xmlns:a16="http://schemas.microsoft.com/office/drawing/2014/main" id="{067A43A6-A65F-422A-B957-64DF8665D0CF}"/>
               </a:ext>
             </a:extLst>
           </p:cNvPr>
@@ -5119,7 +5119,7 @@
           <p:cNvPr id="54" name="Rectangle: Rounded Corners 53">
             <a:extLst>
               <a:ext uri="{FF2B5EF4-FFF2-40B4-BE49-F238E27FC236}">
-                <a16:creationId xmlns:a16="http://schemas.microsoft.com/office/drawing/2014/main" xmlns="" id="{B38B3CDD-8B7F-43FB-A821-8A265B823F04}"/>
+                <a16:creationId xmlns:a16="http://schemas.microsoft.com/office/drawing/2014/main" id="{B38B3CDD-8B7F-43FB-A821-8A265B823F04}"/>
               </a:ext>
             </a:extLst>
           </p:cNvPr>
@@ -5164,7 +5164,7 @@
           <p:cNvPr id="56" name="Group 55">
             <a:extLst>
               <a:ext uri="{FF2B5EF4-FFF2-40B4-BE49-F238E27FC236}">
-                <a16:creationId xmlns:a16="http://schemas.microsoft.com/office/drawing/2014/main" xmlns="" id="{923DE395-7063-4280-9521-6A4BF0AEB89E}"/>
+                <a16:creationId xmlns:a16="http://schemas.microsoft.com/office/drawing/2014/main" id="{923DE395-7063-4280-9521-6A4BF0AEB89E}"/>
               </a:ext>
             </a:extLst>
           </p:cNvPr>
@@ -5184,7 +5184,7 @@
             <p:cNvPr id="9" name="Picture 8">
               <a:extLst>
                 <a:ext uri="{FF2B5EF4-FFF2-40B4-BE49-F238E27FC236}">
-                  <a16:creationId xmlns:a16="http://schemas.microsoft.com/office/drawing/2014/main" xmlns="" id="{4675EA4F-A73C-49EE-96B1-834326DF4BED}"/>
+                  <a16:creationId xmlns:a16="http://schemas.microsoft.com/office/drawing/2014/main" id="{4675EA4F-A73C-49EE-96B1-834326DF4BED}"/>
                 </a:ext>
               </a:extLst>
             </p:cNvPr>
@@ -5213,7 +5213,7 @@
             <p:cNvPr id="55" name="Picture 54">
               <a:extLst>
                 <a:ext uri="{FF2B5EF4-FFF2-40B4-BE49-F238E27FC236}">
-                  <a16:creationId xmlns:a16="http://schemas.microsoft.com/office/drawing/2014/main" xmlns="" id="{58BDC3F0-3249-40A2-868D-A31E42EBBA8B}"/>
+                  <a16:creationId xmlns:a16="http://schemas.microsoft.com/office/drawing/2014/main" id="{58BDC3F0-3249-40A2-868D-A31E42EBBA8B}"/>
                 </a:ext>
               </a:extLst>
             </p:cNvPr>
@@ -5243,7 +5243,7 @@
           <p:cNvPr id="57" name="TextBox 56">
             <a:extLst>
               <a:ext uri="{FF2B5EF4-FFF2-40B4-BE49-F238E27FC236}">
-                <a16:creationId xmlns:a16="http://schemas.microsoft.com/office/drawing/2014/main" xmlns="" id="{E0F686E4-EB15-498C-9601-BAC4B32493F5}"/>
+                <a16:creationId xmlns:a16="http://schemas.microsoft.com/office/drawing/2014/main" id="{E0F686E4-EB15-498C-9601-BAC4B32493F5}"/>
               </a:ext>
             </a:extLst>
           </p:cNvPr>
@@ -5278,7 +5278,7 @@
           <p:cNvPr id="58" name="Rectangle: Rounded Corners 57">
             <a:extLst>
               <a:ext uri="{FF2B5EF4-FFF2-40B4-BE49-F238E27FC236}">
-                <a16:creationId xmlns:a16="http://schemas.microsoft.com/office/drawing/2014/main" xmlns="" id="{08089FFB-7A17-4943-B6F7-DE15E9E43745}"/>
+                <a16:creationId xmlns:a16="http://schemas.microsoft.com/office/drawing/2014/main" id="{08089FFB-7A17-4943-B6F7-DE15E9E43745}"/>
               </a:ext>
             </a:extLst>
           </p:cNvPr>
@@ -5323,7 +5323,7 @@
           <p:cNvPr id="59" name="Cylinder 58">
             <a:extLst>
               <a:ext uri="{FF2B5EF4-FFF2-40B4-BE49-F238E27FC236}">
-                <a16:creationId xmlns:a16="http://schemas.microsoft.com/office/drawing/2014/main" xmlns="" id="{999622D0-9857-4298-A154-1501EAF1343C}"/>
+                <a16:creationId xmlns:a16="http://schemas.microsoft.com/office/drawing/2014/main" id="{999622D0-9857-4298-A154-1501EAF1343C}"/>
               </a:ext>
             </a:extLst>
           </p:cNvPr>
@@ -5370,7 +5370,7 @@
           <p:cNvPr id="62" name="Cylinder 61">
             <a:extLst>
               <a:ext uri="{FF2B5EF4-FFF2-40B4-BE49-F238E27FC236}">
-                <a16:creationId xmlns:a16="http://schemas.microsoft.com/office/drawing/2014/main" xmlns="" id="{5BE43B2C-AAD1-43EE-9E8B-5C129338DB28}"/>
+                <a16:creationId xmlns:a16="http://schemas.microsoft.com/office/drawing/2014/main" id="{5BE43B2C-AAD1-43EE-9E8B-5C129338DB28}"/>
               </a:ext>
             </a:extLst>
           </p:cNvPr>
@@ -5417,7 +5417,7 @@
           <p:cNvPr id="63" name="Cylinder 62">
             <a:extLst>
               <a:ext uri="{FF2B5EF4-FFF2-40B4-BE49-F238E27FC236}">
-                <a16:creationId xmlns:a16="http://schemas.microsoft.com/office/drawing/2014/main" xmlns="" id="{B7386CF8-6959-4C4C-B48C-40918CD25FF2}"/>
+                <a16:creationId xmlns:a16="http://schemas.microsoft.com/office/drawing/2014/main" id="{B7386CF8-6959-4C4C-B48C-40918CD25FF2}"/>
               </a:ext>
             </a:extLst>
           </p:cNvPr>
@@ -5464,7 +5464,7 @@
           <p:cNvPr id="64" name="TextBox 63">
             <a:extLst>
               <a:ext uri="{FF2B5EF4-FFF2-40B4-BE49-F238E27FC236}">
-                <a16:creationId xmlns:a16="http://schemas.microsoft.com/office/drawing/2014/main" xmlns="" id="{EA15A9C3-42AA-43C4-826A-B432969F7F48}"/>
+                <a16:creationId xmlns:a16="http://schemas.microsoft.com/office/drawing/2014/main" id="{EA15A9C3-42AA-43C4-826A-B432969F7F48}"/>
               </a:ext>
             </a:extLst>
           </p:cNvPr>
@@ -5499,7 +5499,7 @@
           <p:cNvPr id="65" name="TextBox 64">
             <a:extLst>
               <a:ext uri="{FF2B5EF4-FFF2-40B4-BE49-F238E27FC236}">
-                <a16:creationId xmlns:a16="http://schemas.microsoft.com/office/drawing/2014/main" xmlns="" id="{A2F39D78-ABAE-4CB5-BA5D-268937F85DC1}"/>
+                <a16:creationId xmlns:a16="http://schemas.microsoft.com/office/drawing/2014/main" id="{A2F39D78-ABAE-4CB5-BA5D-268937F85DC1}"/>
               </a:ext>
             </a:extLst>
           </p:cNvPr>
@@ -5534,7 +5534,7 @@
           <p:cNvPr id="66" name="TextBox 65">
             <a:extLst>
               <a:ext uri="{FF2B5EF4-FFF2-40B4-BE49-F238E27FC236}">
-                <a16:creationId xmlns:a16="http://schemas.microsoft.com/office/drawing/2014/main" xmlns="" id="{404CBD22-7F1A-4E37-B07A-A68E2A05744F}"/>
+                <a16:creationId xmlns:a16="http://schemas.microsoft.com/office/drawing/2014/main" id="{404CBD22-7F1A-4E37-B07A-A68E2A05744F}"/>
               </a:ext>
             </a:extLst>
           </p:cNvPr>
@@ -5569,7 +5569,7 @@
           <p:cNvPr id="67" name="TextBox 66">
             <a:extLst>
               <a:ext uri="{FF2B5EF4-FFF2-40B4-BE49-F238E27FC236}">
-                <a16:creationId xmlns:a16="http://schemas.microsoft.com/office/drawing/2014/main" xmlns="" id="{E936198F-9009-4054-ADD6-209F01CC1D0D}"/>
+                <a16:creationId xmlns:a16="http://schemas.microsoft.com/office/drawing/2014/main" id="{E936198F-9009-4054-ADD6-209F01CC1D0D}"/>
               </a:ext>
             </a:extLst>
           </p:cNvPr>
@@ -5604,7 +5604,7 @@
           <p:cNvPr id="69" name="Straight Arrow Connector 68">
             <a:extLst>
               <a:ext uri="{FF2B5EF4-FFF2-40B4-BE49-F238E27FC236}">
-                <a16:creationId xmlns:a16="http://schemas.microsoft.com/office/drawing/2014/main" xmlns="" id="{5293EAB7-A2EC-435A-8F9C-342621DB30E6}"/>
+                <a16:creationId xmlns:a16="http://schemas.microsoft.com/office/drawing/2014/main" id="{5293EAB7-A2EC-435A-8F9C-342621DB30E6}"/>
               </a:ext>
             </a:extLst>
           </p:cNvPr>
@@ -5647,7 +5647,7 @@
           <p:cNvPr id="76" name="Straight Arrow Connector 75">
             <a:extLst>
               <a:ext uri="{FF2B5EF4-FFF2-40B4-BE49-F238E27FC236}">
-                <a16:creationId xmlns:a16="http://schemas.microsoft.com/office/drawing/2014/main" xmlns="" id="{B8F1BF58-5B57-480A-8CF1-06A553124FBD}"/>
+                <a16:creationId xmlns:a16="http://schemas.microsoft.com/office/drawing/2014/main" id="{B8F1BF58-5B57-480A-8CF1-06A553124FBD}"/>
               </a:ext>
             </a:extLst>
           </p:cNvPr>
@@ -5689,7 +5689,7 @@
           <p:cNvPr id="78" name="Straight Arrow Connector 77">
             <a:extLst>
               <a:ext uri="{FF2B5EF4-FFF2-40B4-BE49-F238E27FC236}">
-                <a16:creationId xmlns:a16="http://schemas.microsoft.com/office/drawing/2014/main" xmlns="" id="{67A365AD-F72A-4A7E-B79D-997F818C4401}"/>
+                <a16:creationId xmlns:a16="http://schemas.microsoft.com/office/drawing/2014/main" id="{67A365AD-F72A-4A7E-B79D-997F818C4401}"/>
               </a:ext>
             </a:extLst>
           </p:cNvPr>
@@ -5729,7 +5729,7 @@
           <p:cNvPr id="80" name="Straight Arrow Connector 79">
             <a:extLst>
               <a:ext uri="{FF2B5EF4-FFF2-40B4-BE49-F238E27FC236}">
-                <a16:creationId xmlns:a16="http://schemas.microsoft.com/office/drawing/2014/main" xmlns="" id="{573D1C30-481F-4E5E-B102-68EFF3F1DF69}"/>
+                <a16:creationId xmlns:a16="http://schemas.microsoft.com/office/drawing/2014/main" id="{573D1C30-481F-4E5E-B102-68EFF3F1DF69}"/>
               </a:ext>
             </a:extLst>
           </p:cNvPr>
@@ -5771,7 +5771,7 @@
           <p:cNvPr id="82" name="Straight Arrow Connector 81">
             <a:extLst>
               <a:ext uri="{FF2B5EF4-FFF2-40B4-BE49-F238E27FC236}">
-                <a16:creationId xmlns:a16="http://schemas.microsoft.com/office/drawing/2014/main" xmlns="" id="{ED0F0F4C-E602-4BE9-842F-2E26A9270472}"/>
+                <a16:creationId xmlns:a16="http://schemas.microsoft.com/office/drawing/2014/main" id="{ED0F0F4C-E602-4BE9-842F-2E26A9270472}"/>
               </a:ext>
             </a:extLst>
           </p:cNvPr>
@@ -5813,7 +5813,7 @@
           <p:cNvPr id="84" name="Rectangle: Rounded Corners 83">
             <a:extLst>
               <a:ext uri="{FF2B5EF4-FFF2-40B4-BE49-F238E27FC236}">
-                <a16:creationId xmlns:a16="http://schemas.microsoft.com/office/drawing/2014/main" xmlns="" id="{08C78A88-1AA2-48AA-8B7A-8FFF7EDB2AD4}"/>
+                <a16:creationId xmlns:a16="http://schemas.microsoft.com/office/drawing/2014/main" id="{08C78A88-1AA2-48AA-8B7A-8FFF7EDB2AD4}"/>
               </a:ext>
             </a:extLst>
           </p:cNvPr>
@@ -5858,7 +5858,7 @@
           <p:cNvPr id="85" name="Rectangle: Rounded Corners 84">
             <a:extLst>
               <a:ext uri="{FF2B5EF4-FFF2-40B4-BE49-F238E27FC236}">
-                <a16:creationId xmlns:a16="http://schemas.microsoft.com/office/drawing/2014/main" xmlns="" id="{1F99CBDF-8DDA-48E9-98E1-36AFC3A29C29}"/>
+                <a16:creationId xmlns:a16="http://schemas.microsoft.com/office/drawing/2014/main" id="{1F99CBDF-8DDA-48E9-98E1-36AFC3A29C29}"/>
               </a:ext>
             </a:extLst>
           </p:cNvPr>
@@ -5903,7 +5903,7 @@
           <p:cNvPr id="86" name="Rectangle: Rounded Corners 85">
             <a:extLst>
               <a:ext uri="{FF2B5EF4-FFF2-40B4-BE49-F238E27FC236}">
-                <a16:creationId xmlns:a16="http://schemas.microsoft.com/office/drawing/2014/main" xmlns="" id="{22D3C9DD-D276-473F-8640-1930EB7242C7}"/>
+                <a16:creationId xmlns:a16="http://schemas.microsoft.com/office/drawing/2014/main" id="{22D3C9DD-D276-473F-8640-1930EB7242C7}"/>
               </a:ext>
             </a:extLst>
           </p:cNvPr>
@@ -5948,7 +5948,7 @@
           <p:cNvPr id="87" name="Rectangle: Rounded Corners 86">
             <a:extLst>
               <a:ext uri="{FF2B5EF4-FFF2-40B4-BE49-F238E27FC236}">
-                <a16:creationId xmlns:a16="http://schemas.microsoft.com/office/drawing/2014/main" xmlns="" id="{CC246FC3-3FD6-47A7-A41B-895A5BB7EDA5}"/>
+                <a16:creationId xmlns:a16="http://schemas.microsoft.com/office/drawing/2014/main" id="{CC246FC3-3FD6-47A7-A41B-895A5BB7EDA5}"/>
               </a:ext>
             </a:extLst>
           </p:cNvPr>
@@ -5993,7 +5993,7 @@
           <p:cNvPr id="88" name="TextBox 87">
             <a:extLst>
               <a:ext uri="{FF2B5EF4-FFF2-40B4-BE49-F238E27FC236}">
-                <a16:creationId xmlns:a16="http://schemas.microsoft.com/office/drawing/2014/main" xmlns="" id="{FB4092C1-F1D7-47B9-8E47-D751408253E1}"/>
+                <a16:creationId xmlns:a16="http://schemas.microsoft.com/office/drawing/2014/main" id="{FB4092C1-F1D7-47B9-8E47-D751408253E1}"/>
               </a:ext>
             </a:extLst>
           </p:cNvPr>
@@ -6028,7 +6028,7 @@
           <p:cNvPr id="89" name="TextBox 88">
             <a:extLst>
               <a:ext uri="{FF2B5EF4-FFF2-40B4-BE49-F238E27FC236}">
-                <a16:creationId xmlns:a16="http://schemas.microsoft.com/office/drawing/2014/main" xmlns="" id="{94413753-5287-46C3-96E5-6363D2BE5868}"/>
+                <a16:creationId xmlns:a16="http://schemas.microsoft.com/office/drawing/2014/main" id="{94413753-5287-46C3-96E5-6363D2BE5868}"/>
               </a:ext>
             </a:extLst>
           </p:cNvPr>
@@ -6063,7 +6063,7 @@
           <p:cNvPr id="90" name="TextBox 89">
             <a:extLst>
               <a:ext uri="{FF2B5EF4-FFF2-40B4-BE49-F238E27FC236}">
-                <a16:creationId xmlns:a16="http://schemas.microsoft.com/office/drawing/2014/main" xmlns="" id="{C8284FE6-6EA4-4452-BC4D-E4C088D9CEB6}"/>
+                <a16:creationId xmlns:a16="http://schemas.microsoft.com/office/drawing/2014/main" id="{C8284FE6-6EA4-4452-BC4D-E4C088D9CEB6}"/>
               </a:ext>
             </a:extLst>
           </p:cNvPr>
@@ -6098,7 +6098,7 @@
           <p:cNvPr id="91" name="TextBox 90">
             <a:extLst>
               <a:ext uri="{FF2B5EF4-FFF2-40B4-BE49-F238E27FC236}">
-                <a16:creationId xmlns:a16="http://schemas.microsoft.com/office/drawing/2014/main" xmlns="" id="{54B7BCF7-0DCC-4DB1-A8BA-477BF7DE46D8}"/>
+                <a16:creationId xmlns:a16="http://schemas.microsoft.com/office/drawing/2014/main" id="{54B7BCF7-0DCC-4DB1-A8BA-477BF7DE46D8}"/>
               </a:ext>
             </a:extLst>
           </p:cNvPr>
@@ -6133,7 +6133,7 @@
           <p:cNvPr id="93" name="Straight Arrow Connector 92">
             <a:extLst>
               <a:ext uri="{FF2B5EF4-FFF2-40B4-BE49-F238E27FC236}">
-                <a16:creationId xmlns:a16="http://schemas.microsoft.com/office/drawing/2014/main" xmlns="" id="{50A9C085-243E-460F-8160-1DDEF72FC13A}"/>
+                <a16:creationId xmlns:a16="http://schemas.microsoft.com/office/drawing/2014/main" id="{50A9C085-243E-460F-8160-1DDEF72FC13A}"/>
               </a:ext>
             </a:extLst>
           </p:cNvPr>
@@ -6173,7 +6173,7 @@
           <p:cNvPr id="95" name="Straight Arrow Connector 94">
             <a:extLst>
               <a:ext uri="{FF2B5EF4-FFF2-40B4-BE49-F238E27FC236}">
-                <a16:creationId xmlns:a16="http://schemas.microsoft.com/office/drawing/2014/main" xmlns="" id="{8ABEC0F9-B0B2-4E13-B0C6-918F7C382DDE}"/>
+                <a16:creationId xmlns:a16="http://schemas.microsoft.com/office/drawing/2014/main" id="{8ABEC0F9-B0B2-4E13-B0C6-918F7C382DDE}"/>
               </a:ext>
             </a:extLst>
           </p:cNvPr>
@@ -6213,7 +6213,7 @@
           <p:cNvPr id="97" name="Straight Arrow Connector 96">
             <a:extLst>
               <a:ext uri="{FF2B5EF4-FFF2-40B4-BE49-F238E27FC236}">
-                <a16:creationId xmlns:a16="http://schemas.microsoft.com/office/drawing/2014/main" xmlns="" id="{97CCF0BF-2EC5-494C-A835-ACE4983DF5E0}"/>
+                <a16:creationId xmlns:a16="http://schemas.microsoft.com/office/drawing/2014/main" id="{97CCF0BF-2EC5-494C-A835-ACE4983DF5E0}"/>
               </a:ext>
             </a:extLst>
           </p:cNvPr>
@@ -6255,7 +6255,7 @@
           <p:cNvPr id="99" name="Straight Arrow Connector 98">
             <a:extLst>
               <a:ext uri="{FF2B5EF4-FFF2-40B4-BE49-F238E27FC236}">
-                <a16:creationId xmlns:a16="http://schemas.microsoft.com/office/drawing/2014/main" xmlns="" id="{A91FF50D-5D3A-44D3-9BF1-81D420BA76D9}"/>
+                <a16:creationId xmlns:a16="http://schemas.microsoft.com/office/drawing/2014/main" id="{A91FF50D-5D3A-44D3-9BF1-81D420BA76D9}"/>
               </a:ext>
             </a:extLst>
           </p:cNvPr>
@@ -6327,7 +6327,7 @@
           <p:cNvPr id="6" name="TextBox 5">
             <a:extLst>
               <a:ext uri="{FF2B5EF4-FFF2-40B4-BE49-F238E27FC236}">
-                <a16:creationId xmlns:a16="http://schemas.microsoft.com/office/drawing/2014/main" xmlns="" id="{65F3C743-1BEA-4316-B336-118EC9FCDFC5}"/>
+                <a16:creationId xmlns:a16="http://schemas.microsoft.com/office/drawing/2014/main" id="{65F3C743-1BEA-4316-B336-118EC9FCDFC5}"/>
               </a:ext>
             </a:extLst>
           </p:cNvPr>
@@ -6370,7 +6370,7 @@
           <p:cNvPr id="8" name="Rectangle: Rounded Corners 7">
             <a:extLst>
               <a:ext uri="{FF2B5EF4-FFF2-40B4-BE49-F238E27FC236}">
-                <a16:creationId xmlns:a16="http://schemas.microsoft.com/office/drawing/2014/main" xmlns="" id="{2DB3A1D2-D500-446E-B822-8A5647ABA2EC}"/>
+                <a16:creationId xmlns:a16="http://schemas.microsoft.com/office/drawing/2014/main" id="{2DB3A1D2-D500-446E-B822-8A5647ABA2EC}"/>
               </a:ext>
             </a:extLst>
           </p:cNvPr>
@@ -6417,7 +6417,7 @@
           <p:cNvPr id="15" name="Rectangle 14">
             <a:extLst>
               <a:ext uri="{FF2B5EF4-FFF2-40B4-BE49-F238E27FC236}">
-                <a16:creationId xmlns:a16="http://schemas.microsoft.com/office/drawing/2014/main" xmlns="" id="{26137DFE-F287-42A8-BA3F-8332F1C4708A}"/>
+                <a16:creationId xmlns:a16="http://schemas.microsoft.com/office/drawing/2014/main" id="{26137DFE-F287-42A8-BA3F-8332F1C4708A}"/>
               </a:ext>
             </a:extLst>
           </p:cNvPr>
@@ -6466,7 +6466,7 @@
           <p:cNvPr id="17" name="Group 16">
             <a:extLst>
               <a:ext uri="{FF2B5EF4-FFF2-40B4-BE49-F238E27FC236}">
-                <a16:creationId xmlns:a16="http://schemas.microsoft.com/office/drawing/2014/main" xmlns="" id="{10C63D49-AF28-4AC8-92D9-52F6E53DA839}"/>
+                <a16:creationId xmlns:a16="http://schemas.microsoft.com/office/drawing/2014/main" id="{10C63D49-AF28-4AC8-92D9-52F6E53DA839}"/>
               </a:ext>
             </a:extLst>
           </p:cNvPr>
@@ -6486,7 +6486,7 @@
             <p:cNvPr id="18" name="Picture 17">
               <a:extLst>
                 <a:ext uri="{FF2B5EF4-FFF2-40B4-BE49-F238E27FC236}">
-                  <a16:creationId xmlns:a16="http://schemas.microsoft.com/office/drawing/2014/main" xmlns="" id="{B883AFE8-5D44-4E1B-A037-50BCC2E5B935}"/>
+                  <a16:creationId xmlns:a16="http://schemas.microsoft.com/office/drawing/2014/main" id="{B883AFE8-5D44-4E1B-A037-50BCC2E5B935}"/>
                 </a:ext>
               </a:extLst>
             </p:cNvPr>
@@ -6515,7 +6515,7 @@
             <p:cNvPr id="19" name="Picture 18">
               <a:extLst>
                 <a:ext uri="{FF2B5EF4-FFF2-40B4-BE49-F238E27FC236}">
-                  <a16:creationId xmlns:a16="http://schemas.microsoft.com/office/drawing/2014/main" xmlns="" id="{27415A50-EED7-4788-B54F-2100A43CD54E}"/>
+                  <a16:creationId xmlns:a16="http://schemas.microsoft.com/office/drawing/2014/main" id="{27415A50-EED7-4788-B54F-2100A43CD54E}"/>
                 </a:ext>
               </a:extLst>
             </p:cNvPr>
@@ -6545,7 +6545,7 @@
           <p:cNvPr id="2" name="Rectangle: Rounded Corners 1">
             <a:extLst>
               <a:ext uri="{FF2B5EF4-FFF2-40B4-BE49-F238E27FC236}">
-                <a16:creationId xmlns:a16="http://schemas.microsoft.com/office/drawing/2014/main" xmlns="" id="{22AABA45-FDC3-4EA9-96EF-8D92BD695518}"/>
+                <a16:creationId xmlns:a16="http://schemas.microsoft.com/office/drawing/2014/main" id="{22AABA45-FDC3-4EA9-96EF-8D92BD695518}"/>
               </a:ext>
             </a:extLst>
           </p:cNvPr>
@@ -6592,7 +6592,7 @@
           <p:cNvPr id="3" name="Rectangle: Rounded Corners 2">
             <a:extLst>
               <a:ext uri="{FF2B5EF4-FFF2-40B4-BE49-F238E27FC236}">
-                <a16:creationId xmlns:a16="http://schemas.microsoft.com/office/drawing/2014/main" xmlns="" id="{48792146-7DCA-4917-AFC2-32BB5CF84F44}"/>
+                <a16:creationId xmlns:a16="http://schemas.microsoft.com/office/drawing/2014/main" id="{48792146-7DCA-4917-AFC2-32BB5CF84F44}"/>
               </a:ext>
             </a:extLst>
           </p:cNvPr>
@@ -6637,7 +6637,7 @@
           <p:cNvPr id="4" name="TextBox 3">
             <a:extLst>
               <a:ext uri="{FF2B5EF4-FFF2-40B4-BE49-F238E27FC236}">
-                <a16:creationId xmlns:a16="http://schemas.microsoft.com/office/drawing/2014/main" xmlns="" id="{CF4C957F-6876-48A4-B315-60DBEEA24D16}"/>
+                <a16:creationId xmlns:a16="http://schemas.microsoft.com/office/drawing/2014/main" id="{CF4C957F-6876-48A4-B315-60DBEEA24D16}"/>
               </a:ext>
             </a:extLst>
           </p:cNvPr>
@@ -6672,7 +6672,7 @@
           <p:cNvPr id="20" name="Straight Arrow Connector 19">
             <a:extLst>
               <a:ext uri="{FF2B5EF4-FFF2-40B4-BE49-F238E27FC236}">
-                <a16:creationId xmlns:a16="http://schemas.microsoft.com/office/drawing/2014/main" xmlns="" id="{3282B31D-E072-4803-BFAA-854B0759E111}"/>
+                <a16:creationId xmlns:a16="http://schemas.microsoft.com/office/drawing/2014/main" id="{3282B31D-E072-4803-BFAA-854B0759E111}"/>
               </a:ext>
             </a:extLst>
           </p:cNvPr>
@@ -6715,7 +6715,7 @@
           <p:cNvPr id="22" name="Rectangle: Rounded Corners 21">
             <a:extLst>
               <a:ext uri="{FF2B5EF4-FFF2-40B4-BE49-F238E27FC236}">
-                <a16:creationId xmlns:a16="http://schemas.microsoft.com/office/drawing/2014/main" xmlns="" id="{9B0A8185-293D-44D3-A74D-663B05A8AF17}"/>
+                <a16:creationId xmlns:a16="http://schemas.microsoft.com/office/drawing/2014/main" id="{9B0A8185-293D-44D3-A74D-663B05A8AF17}"/>
               </a:ext>
             </a:extLst>
           </p:cNvPr>
@@ -6792,7 +6792,7 @@
           <p:cNvPr id="8" name="Rectangle 7">
             <a:extLst>
               <a:ext uri="{FF2B5EF4-FFF2-40B4-BE49-F238E27FC236}">
-                <a16:creationId xmlns:a16="http://schemas.microsoft.com/office/drawing/2014/main" xmlns="" id="{88493630-52E6-418A-B267-9C488F7B14FA}"/>
+                <a16:creationId xmlns:a16="http://schemas.microsoft.com/office/drawing/2014/main" id="{88493630-52E6-418A-B267-9C488F7B14FA}"/>
               </a:ext>
             </a:extLst>
           </p:cNvPr>
@@ -6839,7 +6839,7 @@
           <p:cNvPr id="9" name="Rectangle 8">
             <a:extLst>
               <a:ext uri="{FF2B5EF4-FFF2-40B4-BE49-F238E27FC236}">
-                <a16:creationId xmlns:a16="http://schemas.microsoft.com/office/drawing/2014/main" xmlns="" id="{5D585775-A82D-45BB-9D8B-B57008AAC708}"/>
+                <a16:creationId xmlns:a16="http://schemas.microsoft.com/office/drawing/2014/main" id="{5D585775-A82D-45BB-9D8B-B57008AAC708}"/>
               </a:ext>
             </a:extLst>
           </p:cNvPr>
@@ -6886,7 +6886,7 @@
           <p:cNvPr id="14" name="Straight Arrow Connector 13">
             <a:extLst>
               <a:ext uri="{FF2B5EF4-FFF2-40B4-BE49-F238E27FC236}">
-                <a16:creationId xmlns:a16="http://schemas.microsoft.com/office/drawing/2014/main" xmlns="" id="{E6BCD24F-EC77-4B54-A708-667C56F16B22}"/>
+                <a16:creationId xmlns:a16="http://schemas.microsoft.com/office/drawing/2014/main" id="{E6BCD24F-EC77-4B54-A708-667C56F16B22}"/>
               </a:ext>
             </a:extLst>
           </p:cNvPr>
@@ -6929,7 +6929,7 @@
           <p:cNvPr id="15" name="Rectangle 14">
             <a:extLst>
               <a:ext uri="{FF2B5EF4-FFF2-40B4-BE49-F238E27FC236}">
-                <a16:creationId xmlns:a16="http://schemas.microsoft.com/office/drawing/2014/main" xmlns="" id="{6E54F490-3D7A-468F-ACE5-9689707321D3}"/>
+                <a16:creationId xmlns:a16="http://schemas.microsoft.com/office/drawing/2014/main" id="{6E54F490-3D7A-468F-ACE5-9689707321D3}"/>
               </a:ext>
             </a:extLst>
           </p:cNvPr>
@@ -6976,7 +6976,7 @@
           <p:cNvPr id="16" name="Rectangle 15">
             <a:extLst>
               <a:ext uri="{FF2B5EF4-FFF2-40B4-BE49-F238E27FC236}">
-                <a16:creationId xmlns:a16="http://schemas.microsoft.com/office/drawing/2014/main" xmlns="" id="{B2932F0E-F733-4484-92D8-735895C8AEE6}"/>
+                <a16:creationId xmlns:a16="http://schemas.microsoft.com/office/drawing/2014/main" id="{B2932F0E-F733-4484-92D8-735895C8AEE6}"/>
               </a:ext>
             </a:extLst>
           </p:cNvPr>
@@ -7023,7 +7023,7 @@
           <p:cNvPr id="17" name="Straight Arrow Connector 16">
             <a:extLst>
               <a:ext uri="{FF2B5EF4-FFF2-40B4-BE49-F238E27FC236}">
-                <a16:creationId xmlns:a16="http://schemas.microsoft.com/office/drawing/2014/main" xmlns="" id="{77DC617A-7860-49EE-9FE5-B0DA83B84F50}"/>
+                <a16:creationId xmlns:a16="http://schemas.microsoft.com/office/drawing/2014/main" id="{77DC617A-7860-49EE-9FE5-B0DA83B84F50}"/>
               </a:ext>
             </a:extLst>
           </p:cNvPr>
@@ -7065,7 +7065,7 @@
           <p:cNvPr id="25" name="Rectangle 24">
             <a:extLst>
               <a:ext uri="{FF2B5EF4-FFF2-40B4-BE49-F238E27FC236}">
-                <a16:creationId xmlns:a16="http://schemas.microsoft.com/office/drawing/2014/main" xmlns="" id="{AFB73281-5B6E-42FD-90A9-86DF0FA98C05}"/>
+                <a16:creationId xmlns:a16="http://schemas.microsoft.com/office/drawing/2014/main" id="{AFB73281-5B6E-42FD-90A9-86DF0FA98C05}"/>
               </a:ext>
             </a:extLst>
           </p:cNvPr>
@@ -7112,7 +7112,7 @@
           <p:cNvPr id="34" name="Straight Arrow Connector 33">
             <a:extLst>
               <a:ext uri="{FF2B5EF4-FFF2-40B4-BE49-F238E27FC236}">
-                <a16:creationId xmlns:a16="http://schemas.microsoft.com/office/drawing/2014/main" xmlns="" id="{606BD95C-BB89-4AB1-9D38-DA72D2242F92}"/>
+                <a16:creationId xmlns:a16="http://schemas.microsoft.com/office/drawing/2014/main" id="{606BD95C-BB89-4AB1-9D38-DA72D2242F92}"/>
               </a:ext>
             </a:extLst>
           </p:cNvPr>
@@ -7154,7 +7154,7 @@
           <p:cNvPr id="19" name="Picture 18">
             <a:extLst>
               <a:ext uri="{FF2B5EF4-FFF2-40B4-BE49-F238E27FC236}">
-                <a16:creationId xmlns:a16="http://schemas.microsoft.com/office/drawing/2014/main" xmlns="" id="{2D8C98E1-A1C6-465E-AA98-365902B666B1}"/>
+                <a16:creationId xmlns:a16="http://schemas.microsoft.com/office/drawing/2014/main" id="{2D8C98E1-A1C6-465E-AA98-365902B666B1}"/>
               </a:ext>
             </a:extLst>
           </p:cNvPr>
@@ -7183,7 +7183,7 @@
           <p:cNvPr id="23" name="Rectangle: Rounded Corners 22">
             <a:extLst>
               <a:ext uri="{FF2B5EF4-FFF2-40B4-BE49-F238E27FC236}">
-                <a16:creationId xmlns:a16="http://schemas.microsoft.com/office/drawing/2014/main" xmlns="" id="{B200A882-C021-4A13-960E-8CBF31643DCB}"/>
+                <a16:creationId xmlns:a16="http://schemas.microsoft.com/office/drawing/2014/main" id="{B200A882-C021-4A13-960E-8CBF31643DCB}"/>
               </a:ext>
             </a:extLst>
           </p:cNvPr>
@@ -7230,7 +7230,7 @@
           <p:cNvPr id="24" name="Cylinder 23">
             <a:extLst>
               <a:ext uri="{FF2B5EF4-FFF2-40B4-BE49-F238E27FC236}">
-                <a16:creationId xmlns:a16="http://schemas.microsoft.com/office/drawing/2014/main" xmlns="" id="{1EF34CC6-1457-408B-A8BC-47EED9A6D408}"/>
+                <a16:creationId xmlns:a16="http://schemas.microsoft.com/office/drawing/2014/main" id="{1EF34CC6-1457-408B-A8BC-47EED9A6D408}"/>
               </a:ext>
             </a:extLst>
           </p:cNvPr>
@@ -7277,7 +7277,7 @@
           <p:cNvPr id="26" name="Straight Arrow Connector 25">
             <a:extLst>
               <a:ext uri="{FF2B5EF4-FFF2-40B4-BE49-F238E27FC236}">
-                <a16:creationId xmlns:a16="http://schemas.microsoft.com/office/drawing/2014/main" xmlns="" id="{DBE9AFDE-B272-42C7-A7E9-C589789D0FF3}"/>
+                <a16:creationId xmlns:a16="http://schemas.microsoft.com/office/drawing/2014/main" id="{DBE9AFDE-B272-42C7-A7E9-C589789D0FF3}"/>
               </a:ext>
             </a:extLst>
           </p:cNvPr>
@@ -7326,7 +7326,7 @@
           <p:cNvPr id="27" name="Rectangle: Rounded Corners 26">
             <a:extLst>
               <a:ext uri="{FF2B5EF4-FFF2-40B4-BE49-F238E27FC236}">
-                <a16:creationId xmlns:a16="http://schemas.microsoft.com/office/drawing/2014/main" xmlns="" id="{7B4D9E78-6828-47CC-B489-00022564425B}"/>
+                <a16:creationId xmlns:a16="http://schemas.microsoft.com/office/drawing/2014/main" id="{7B4D9E78-6828-47CC-B489-00022564425B}"/>
               </a:ext>
             </a:extLst>
           </p:cNvPr>
@@ -7373,7 +7373,7 @@
           <p:cNvPr id="28" name="Straight Arrow Connector 27">
             <a:extLst>
               <a:ext uri="{FF2B5EF4-FFF2-40B4-BE49-F238E27FC236}">
-                <a16:creationId xmlns:a16="http://schemas.microsoft.com/office/drawing/2014/main" xmlns="" id="{C51D89CD-F6CE-4C70-B006-4BCAF99D8C9A}"/>
+                <a16:creationId xmlns:a16="http://schemas.microsoft.com/office/drawing/2014/main" id="{C51D89CD-F6CE-4C70-B006-4BCAF99D8C9A}"/>
               </a:ext>
             </a:extLst>
           </p:cNvPr>
@@ -7416,7 +7416,7 @@
           <p:cNvPr id="31" name="Rectangle: Rounded Corners 30">
             <a:extLst>
               <a:ext uri="{FF2B5EF4-FFF2-40B4-BE49-F238E27FC236}">
-                <a16:creationId xmlns:a16="http://schemas.microsoft.com/office/drawing/2014/main" xmlns="" id="{7DFA8A7C-4C48-4FD0-B607-B2AE2E61D24F}"/>
+                <a16:creationId xmlns:a16="http://schemas.microsoft.com/office/drawing/2014/main" id="{7DFA8A7C-4C48-4FD0-B607-B2AE2E61D24F}"/>
               </a:ext>
             </a:extLst>
           </p:cNvPr>
@@ -7463,7 +7463,7 @@
           <p:cNvPr id="32" name="Straight Arrow Connector 31">
             <a:extLst>
               <a:ext uri="{FF2B5EF4-FFF2-40B4-BE49-F238E27FC236}">
-                <a16:creationId xmlns:a16="http://schemas.microsoft.com/office/drawing/2014/main" xmlns="" id="{9CC74386-38CB-4F72-8DFD-5F9B93804DF1}"/>
+                <a16:creationId xmlns:a16="http://schemas.microsoft.com/office/drawing/2014/main" id="{9CC74386-38CB-4F72-8DFD-5F9B93804DF1}"/>
               </a:ext>
             </a:extLst>
           </p:cNvPr>
@@ -7506,7 +7506,7 @@
           <p:cNvPr id="42" name="Cylinder 41">
             <a:extLst>
               <a:ext uri="{FF2B5EF4-FFF2-40B4-BE49-F238E27FC236}">
-                <a16:creationId xmlns:a16="http://schemas.microsoft.com/office/drawing/2014/main" xmlns="" id="{BC9346CC-B2C4-4077-BFB7-ECAB8A6C3421}"/>
+                <a16:creationId xmlns:a16="http://schemas.microsoft.com/office/drawing/2014/main" id="{BC9346CC-B2C4-4077-BFB7-ECAB8A6C3421}"/>
               </a:ext>
             </a:extLst>
           </p:cNvPr>
@@ -7553,7 +7553,7 @@
           <p:cNvPr id="7" name="Rectangle 6">
             <a:extLst>
               <a:ext uri="{FF2B5EF4-FFF2-40B4-BE49-F238E27FC236}">
-                <a16:creationId xmlns:a16="http://schemas.microsoft.com/office/drawing/2014/main" xmlns="" id="{3221EFBB-AC07-4527-A103-C1DFBC6F52C4}"/>
+                <a16:creationId xmlns:a16="http://schemas.microsoft.com/office/drawing/2014/main" id="{3221EFBB-AC07-4527-A103-C1DFBC6F52C4}"/>
               </a:ext>
             </a:extLst>
           </p:cNvPr>
@@ -7605,7 +7605,7 @@
           <p:cNvPr id="44" name="Straight Arrow Connector 43">
             <a:extLst>
               <a:ext uri="{FF2B5EF4-FFF2-40B4-BE49-F238E27FC236}">
-                <a16:creationId xmlns:a16="http://schemas.microsoft.com/office/drawing/2014/main" xmlns="" id="{0FD95203-F8F3-40D9-AF91-DC164EA7352C}"/>
+                <a16:creationId xmlns:a16="http://schemas.microsoft.com/office/drawing/2014/main" id="{0FD95203-F8F3-40D9-AF91-DC164EA7352C}"/>
               </a:ext>
             </a:extLst>
           </p:cNvPr>
@@ -7647,7 +7647,7 @@
           <p:cNvPr id="55" name="Rectangle 54">
             <a:extLst>
               <a:ext uri="{FF2B5EF4-FFF2-40B4-BE49-F238E27FC236}">
-                <a16:creationId xmlns:a16="http://schemas.microsoft.com/office/drawing/2014/main" xmlns="" id="{939F7218-9501-4A10-BC93-682553D94097}"/>
+                <a16:creationId xmlns:a16="http://schemas.microsoft.com/office/drawing/2014/main" id="{939F7218-9501-4A10-BC93-682553D94097}"/>
               </a:ext>
             </a:extLst>
           </p:cNvPr>
@@ -7699,7 +7699,7 @@
           <p:cNvPr id="56" name="Rectangle 55">
             <a:extLst>
               <a:ext uri="{FF2B5EF4-FFF2-40B4-BE49-F238E27FC236}">
-                <a16:creationId xmlns:a16="http://schemas.microsoft.com/office/drawing/2014/main" xmlns="" id="{81149532-57CB-4916-895E-F7683C27A900}"/>
+                <a16:creationId xmlns:a16="http://schemas.microsoft.com/office/drawing/2014/main" id="{81149532-57CB-4916-895E-F7683C27A900}"/>
               </a:ext>
             </a:extLst>
           </p:cNvPr>
@@ -7785,7 +7785,7 @@
           <p:cNvPr id="4" name="Rectangle 3">
             <a:extLst>
               <a:ext uri="{FF2B5EF4-FFF2-40B4-BE49-F238E27FC236}">
-                <a16:creationId xmlns:a16="http://schemas.microsoft.com/office/drawing/2014/main" xmlns="" id="{F22B98B2-98E5-4B43-A14D-CA9709A61CEF}"/>
+                <a16:creationId xmlns:a16="http://schemas.microsoft.com/office/drawing/2014/main" id="{F22B98B2-98E5-4B43-A14D-CA9709A61CEF}"/>
               </a:ext>
             </a:extLst>
           </p:cNvPr>
@@ -7834,7 +7834,7 @@
           <p:cNvPr id="6" name="Rectangle 5">
             <a:extLst>
               <a:ext uri="{FF2B5EF4-FFF2-40B4-BE49-F238E27FC236}">
-                <a16:creationId xmlns:a16="http://schemas.microsoft.com/office/drawing/2014/main" xmlns="" id="{1AF28848-0A27-4EFD-82D1-8DDA390D69E9}"/>
+                <a16:creationId xmlns:a16="http://schemas.microsoft.com/office/drawing/2014/main" id="{1AF28848-0A27-4EFD-82D1-8DDA390D69E9}"/>
               </a:ext>
             </a:extLst>
           </p:cNvPr>
@@ -7881,7 +7881,7 @@
           <p:cNvPr id="8" name="Rectangle 7">
             <a:extLst>
               <a:ext uri="{FF2B5EF4-FFF2-40B4-BE49-F238E27FC236}">
-                <a16:creationId xmlns:a16="http://schemas.microsoft.com/office/drawing/2014/main" xmlns="" id="{E2F4CF4F-FA29-400F-8321-2B0F7F31BC02}"/>
+                <a16:creationId xmlns:a16="http://schemas.microsoft.com/office/drawing/2014/main" id="{E2F4CF4F-FA29-400F-8321-2B0F7F31BC02}"/>
               </a:ext>
             </a:extLst>
           </p:cNvPr>
@@ -7928,7 +7928,7 @@
           <p:cNvPr id="9" name="Rectangle 8">
             <a:extLst>
               <a:ext uri="{FF2B5EF4-FFF2-40B4-BE49-F238E27FC236}">
-                <a16:creationId xmlns:a16="http://schemas.microsoft.com/office/drawing/2014/main" xmlns="" id="{C5963D9A-59F4-4AAE-A32D-873561FDC321}"/>
+                <a16:creationId xmlns:a16="http://schemas.microsoft.com/office/drawing/2014/main" id="{C5963D9A-59F4-4AAE-A32D-873561FDC321}"/>
               </a:ext>
             </a:extLst>
           </p:cNvPr>
@@ -7975,7 +7975,7 @@
           <p:cNvPr id="10" name="Rectangle 9">
             <a:extLst>
               <a:ext uri="{FF2B5EF4-FFF2-40B4-BE49-F238E27FC236}">
-                <a16:creationId xmlns:a16="http://schemas.microsoft.com/office/drawing/2014/main" xmlns="" id="{52CC055F-98F7-4C88-8C4B-7FFBDBF3DB92}"/>
+                <a16:creationId xmlns:a16="http://schemas.microsoft.com/office/drawing/2014/main" id="{52CC055F-98F7-4C88-8C4B-7FFBDBF3DB92}"/>
               </a:ext>
             </a:extLst>
           </p:cNvPr>
@@ -8027,7 +8027,7 @@
           <p:cNvPr id="11" name="Rectangle 10">
             <a:extLst>
               <a:ext uri="{FF2B5EF4-FFF2-40B4-BE49-F238E27FC236}">
-                <a16:creationId xmlns:a16="http://schemas.microsoft.com/office/drawing/2014/main" xmlns="" id="{076D7A2E-B05E-4097-B105-CDC8C282BDDF}"/>
+                <a16:creationId xmlns:a16="http://schemas.microsoft.com/office/drawing/2014/main" id="{076D7A2E-B05E-4097-B105-CDC8C282BDDF}"/>
               </a:ext>
             </a:extLst>
           </p:cNvPr>
@@ -8079,7 +8079,7 @@
           <p:cNvPr id="12" name="Rectangle 11">
             <a:extLst>
               <a:ext uri="{FF2B5EF4-FFF2-40B4-BE49-F238E27FC236}">
-                <a16:creationId xmlns:a16="http://schemas.microsoft.com/office/drawing/2014/main" xmlns="" id="{787C7FD7-5B0C-4569-AEE8-5C65FFB88A3A}"/>
+                <a16:creationId xmlns:a16="http://schemas.microsoft.com/office/drawing/2014/main" id="{787C7FD7-5B0C-4569-AEE8-5C65FFB88A3A}"/>
               </a:ext>
             </a:extLst>
           </p:cNvPr>
@@ -8131,7 +8131,7 @@
           <p:cNvPr id="14" name="Straight Arrow Connector 13">
             <a:extLst>
               <a:ext uri="{FF2B5EF4-FFF2-40B4-BE49-F238E27FC236}">
-                <a16:creationId xmlns:a16="http://schemas.microsoft.com/office/drawing/2014/main" xmlns="" id="{3BD33AF1-AC5A-493F-96CB-50AA85C80599}"/>
+                <a16:creationId xmlns:a16="http://schemas.microsoft.com/office/drawing/2014/main" id="{3BD33AF1-AC5A-493F-96CB-50AA85C80599}"/>
               </a:ext>
             </a:extLst>
           </p:cNvPr>
@@ -8170,7 +8170,7 @@
           <p:cNvPr id="15" name="Straight Arrow Connector 14">
             <a:extLst>
               <a:ext uri="{FF2B5EF4-FFF2-40B4-BE49-F238E27FC236}">
-                <a16:creationId xmlns:a16="http://schemas.microsoft.com/office/drawing/2014/main" xmlns="" id="{90DC8CD4-FBF4-46DF-86A1-B4ACCD760583}"/>
+                <a16:creationId xmlns:a16="http://schemas.microsoft.com/office/drawing/2014/main" id="{90DC8CD4-FBF4-46DF-86A1-B4ACCD760583}"/>
               </a:ext>
             </a:extLst>
           </p:cNvPr>
@@ -8209,7 +8209,7 @@
           <p:cNvPr id="17" name="Straight Arrow Connector 16">
             <a:extLst>
               <a:ext uri="{FF2B5EF4-FFF2-40B4-BE49-F238E27FC236}">
-                <a16:creationId xmlns:a16="http://schemas.microsoft.com/office/drawing/2014/main" xmlns="" id="{F7EBA086-EE8B-4CCA-998C-531ECDAEE69F}"/>
+                <a16:creationId xmlns:a16="http://schemas.microsoft.com/office/drawing/2014/main" id="{F7EBA086-EE8B-4CCA-998C-531ECDAEE69F}"/>
               </a:ext>
             </a:extLst>
           </p:cNvPr>
@@ -8248,7 +8248,7 @@
           <p:cNvPr id="18" name="Straight Arrow Connector 17">
             <a:extLst>
               <a:ext uri="{FF2B5EF4-FFF2-40B4-BE49-F238E27FC236}">
-                <a16:creationId xmlns:a16="http://schemas.microsoft.com/office/drawing/2014/main" xmlns="" id="{13376F8E-9C26-48C0-8C87-53B4FCBCF232}"/>
+                <a16:creationId xmlns:a16="http://schemas.microsoft.com/office/drawing/2014/main" id="{13376F8E-9C26-48C0-8C87-53B4FCBCF232}"/>
               </a:ext>
             </a:extLst>
           </p:cNvPr>
@@ -8317,7 +8317,7 @@
           <p:cNvPr id="4" name="Rectangle 3">
             <a:extLst>
               <a:ext uri="{FF2B5EF4-FFF2-40B4-BE49-F238E27FC236}">
-                <a16:creationId xmlns:a16="http://schemas.microsoft.com/office/drawing/2014/main" xmlns="" id="{9DFED244-52E8-4809-B75F-ED4400492005}"/>
+                <a16:creationId xmlns:a16="http://schemas.microsoft.com/office/drawing/2014/main" id="{9DFED244-52E8-4809-B75F-ED4400492005}"/>
               </a:ext>
             </a:extLst>
           </p:cNvPr>
@@ -8369,7 +8369,7 @@
           <p:cNvPr id="5" name="Rectangle 4">
             <a:extLst>
               <a:ext uri="{FF2B5EF4-FFF2-40B4-BE49-F238E27FC236}">
-                <a16:creationId xmlns:a16="http://schemas.microsoft.com/office/drawing/2014/main" xmlns="" id="{2E724CAF-1919-4FDE-B628-C276EA0D5039}"/>
+                <a16:creationId xmlns:a16="http://schemas.microsoft.com/office/drawing/2014/main" id="{2E724CAF-1919-4FDE-B628-C276EA0D5039}"/>
               </a:ext>
             </a:extLst>
           </p:cNvPr>
@@ -8448,7 +8448,7 @@
           <p:cNvPr id="5" name="Rectangle 4">
             <a:extLst>
               <a:ext uri="{FF2B5EF4-FFF2-40B4-BE49-F238E27FC236}">
-                <a16:creationId xmlns:a16="http://schemas.microsoft.com/office/drawing/2014/main" xmlns="" id="{6AE84395-9E2F-4466-95DA-2F166D693F73}"/>
+                <a16:creationId xmlns:a16="http://schemas.microsoft.com/office/drawing/2014/main" id="{6AE84395-9E2F-4466-95DA-2F166D693F73}"/>
               </a:ext>
             </a:extLst>
           </p:cNvPr>
@@ -8496,7 +8496,7 @@
           <p:cNvPr id="6" name="Rectangle 5">
             <a:extLst>
               <a:ext uri="{FF2B5EF4-FFF2-40B4-BE49-F238E27FC236}">
-                <a16:creationId xmlns:a16="http://schemas.microsoft.com/office/drawing/2014/main" xmlns="" id="{AF31A72F-2C5B-48DE-BAA1-27FC59D303D6}"/>
+                <a16:creationId xmlns:a16="http://schemas.microsoft.com/office/drawing/2014/main" id="{AF31A72F-2C5B-48DE-BAA1-27FC59D303D6}"/>
               </a:ext>
             </a:extLst>
           </p:cNvPr>
@@ -8544,7 +8544,7 @@
           <p:cNvPr id="7" name="Rectangle 6">
             <a:extLst>
               <a:ext uri="{FF2B5EF4-FFF2-40B4-BE49-F238E27FC236}">
-                <a16:creationId xmlns:a16="http://schemas.microsoft.com/office/drawing/2014/main" xmlns="" id="{11125080-5D0E-4130-80ED-18C09C6E2A2F}"/>
+                <a16:creationId xmlns:a16="http://schemas.microsoft.com/office/drawing/2014/main" id="{11125080-5D0E-4130-80ED-18C09C6E2A2F}"/>
               </a:ext>
             </a:extLst>
           </p:cNvPr>
@@ -8592,7 +8592,7 @@
           <p:cNvPr id="10" name="Rectangle 9">
             <a:extLst>
               <a:ext uri="{FF2B5EF4-FFF2-40B4-BE49-F238E27FC236}">
-                <a16:creationId xmlns:a16="http://schemas.microsoft.com/office/drawing/2014/main" xmlns="" id="{4136F3A3-96BE-4ED6-BFE6-5E9A772D7C9D}"/>
+                <a16:creationId xmlns:a16="http://schemas.microsoft.com/office/drawing/2014/main" id="{4136F3A3-96BE-4ED6-BFE6-5E9A772D7C9D}"/>
               </a:ext>
             </a:extLst>
           </p:cNvPr>
@@ -8640,7 +8640,7 @@
           <p:cNvPr id="11" name="Rectangle 10">
             <a:extLst>
               <a:ext uri="{FF2B5EF4-FFF2-40B4-BE49-F238E27FC236}">
-                <a16:creationId xmlns:a16="http://schemas.microsoft.com/office/drawing/2014/main" xmlns="" id="{7F49DE2B-F33A-4F5B-AAE2-F2570CFDE40F}"/>
+                <a16:creationId xmlns:a16="http://schemas.microsoft.com/office/drawing/2014/main" id="{7F49DE2B-F33A-4F5B-AAE2-F2570CFDE40F}"/>
               </a:ext>
             </a:extLst>
           </p:cNvPr>
@@ -8688,7 +8688,7 @@
           <p:cNvPr id="12" name="Rectangle 11">
             <a:extLst>
               <a:ext uri="{FF2B5EF4-FFF2-40B4-BE49-F238E27FC236}">
-                <a16:creationId xmlns:a16="http://schemas.microsoft.com/office/drawing/2014/main" xmlns="" id="{CD6F131F-B537-404E-A4E4-AB60BACF2041}"/>
+                <a16:creationId xmlns:a16="http://schemas.microsoft.com/office/drawing/2014/main" id="{CD6F131F-B537-404E-A4E4-AB60BACF2041}"/>
               </a:ext>
             </a:extLst>
           </p:cNvPr>
@@ -8736,7 +8736,7 @@
           <p:cNvPr id="13" name="Rectangle 12">
             <a:extLst>
               <a:ext uri="{FF2B5EF4-FFF2-40B4-BE49-F238E27FC236}">
-                <a16:creationId xmlns:a16="http://schemas.microsoft.com/office/drawing/2014/main" xmlns="" id="{C852239B-F64D-4652-8FE5-313EB262BFB3}"/>
+                <a16:creationId xmlns:a16="http://schemas.microsoft.com/office/drawing/2014/main" id="{C852239B-F64D-4652-8FE5-313EB262BFB3}"/>
               </a:ext>
             </a:extLst>
           </p:cNvPr>
@@ -8784,7 +8784,7 @@
           <p:cNvPr id="14" name="Rectangle 13">
             <a:extLst>
               <a:ext uri="{FF2B5EF4-FFF2-40B4-BE49-F238E27FC236}">
-                <a16:creationId xmlns:a16="http://schemas.microsoft.com/office/drawing/2014/main" xmlns="" id="{8FFD6D2B-77E3-467C-8B0D-89110084F184}"/>
+                <a16:creationId xmlns:a16="http://schemas.microsoft.com/office/drawing/2014/main" id="{8FFD6D2B-77E3-467C-8B0D-89110084F184}"/>
               </a:ext>
             </a:extLst>
           </p:cNvPr>
@@ -8832,7 +8832,7 @@
           <p:cNvPr id="15" name="Rectangle 14">
             <a:extLst>
               <a:ext uri="{FF2B5EF4-FFF2-40B4-BE49-F238E27FC236}">
-                <a16:creationId xmlns:a16="http://schemas.microsoft.com/office/drawing/2014/main" xmlns="" id="{A1F2DF11-1DA0-443F-96CB-69D385E857D2}"/>
+                <a16:creationId xmlns:a16="http://schemas.microsoft.com/office/drawing/2014/main" id="{A1F2DF11-1DA0-443F-96CB-69D385E857D2}"/>
               </a:ext>
             </a:extLst>
           </p:cNvPr>
@@ -8880,7 +8880,7 @@
           <p:cNvPr id="16" name="Rectangle 15">
             <a:extLst>
               <a:ext uri="{FF2B5EF4-FFF2-40B4-BE49-F238E27FC236}">
-                <a16:creationId xmlns:a16="http://schemas.microsoft.com/office/drawing/2014/main" xmlns="" id="{56E22539-2E7F-4E8D-B25A-605AC784A690}"/>
+                <a16:creationId xmlns:a16="http://schemas.microsoft.com/office/drawing/2014/main" id="{56E22539-2E7F-4E8D-B25A-605AC784A690}"/>
               </a:ext>
             </a:extLst>
           </p:cNvPr>
@@ -8928,7 +8928,7 @@
           <p:cNvPr id="17" name="Rectangle 16">
             <a:extLst>
               <a:ext uri="{FF2B5EF4-FFF2-40B4-BE49-F238E27FC236}">
-                <a16:creationId xmlns:a16="http://schemas.microsoft.com/office/drawing/2014/main" xmlns="" id="{5D7C57F6-5A47-47E2-84E5-DA748E5848BF}"/>
+                <a16:creationId xmlns:a16="http://schemas.microsoft.com/office/drawing/2014/main" id="{5D7C57F6-5A47-47E2-84E5-DA748E5848BF}"/>
               </a:ext>
             </a:extLst>
           </p:cNvPr>
@@ -8976,7 +8976,7 @@
           <p:cNvPr id="24" name="Group 23">
             <a:extLst>
               <a:ext uri="{FF2B5EF4-FFF2-40B4-BE49-F238E27FC236}">
-                <a16:creationId xmlns:a16="http://schemas.microsoft.com/office/drawing/2014/main" xmlns="" id="{BA746FBA-BA87-4F50-9D40-D58680EC9BDD}"/>
+                <a16:creationId xmlns:a16="http://schemas.microsoft.com/office/drawing/2014/main" id="{BA746FBA-BA87-4F50-9D40-D58680EC9BDD}"/>
               </a:ext>
             </a:extLst>
           </p:cNvPr>
@@ -8996,7 +8996,7 @@
             <p:cNvPr id="18" name="Rectangle 17">
               <a:extLst>
                 <a:ext uri="{FF2B5EF4-FFF2-40B4-BE49-F238E27FC236}">
-                  <a16:creationId xmlns:a16="http://schemas.microsoft.com/office/drawing/2014/main" xmlns="" id="{3DCAC392-FAD6-42EE-BA6B-97796588A9D5}"/>
+                  <a16:creationId xmlns:a16="http://schemas.microsoft.com/office/drawing/2014/main" id="{3DCAC392-FAD6-42EE-BA6B-97796588A9D5}"/>
                 </a:ext>
               </a:extLst>
             </p:cNvPr>
@@ -9043,7 +9043,7 @@
             <p:cNvPr id="19" name="Rectangle 18">
               <a:extLst>
                 <a:ext uri="{FF2B5EF4-FFF2-40B4-BE49-F238E27FC236}">
-                  <a16:creationId xmlns:a16="http://schemas.microsoft.com/office/drawing/2014/main" xmlns="" id="{8B1A79D1-CB26-4377-B757-4F1A2AD9487E}"/>
+                  <a16:creationId xmlns:a16="http://schemas.microsoft.com/office/drawing/2014/main" id="{8B1A79D1-CB26-4377-B757-4F1A2AD9487E}"/>
                 </a:ext>
               </a:extLst>
             </p:cNvPr>
@@ -9090,7 +9090,7 @@
             <p:cNvPr id="21" name="Straight Arrow Connector 20">
               <a:extLst>
                 <a:ext uri="{FF2B5EF4-FFF2-40B4-BE49-F238E27FC236}">
-                  <a16:creationId xmlns:a16="http://schemas.microsoft.com/office/drawing/2014/main" xmlns="" id="{C4DBA4D5-EB8C-45BB-8DFD-C2C5C640AE99}"/>
+                  <a16:creationId xmlns:a16="http://schemas.microsoft.com/office/drawing/2014/main" id="{C4DBA4D5-EB8C-45BB-8DFD-C2C5C640AE99}"/>
                 </a:ext>
               </a:extLst>
             </p:cNvPr>
@@ -9132,7 +9132,7 @@
           <p:cNvPr id="25" name="Rectangle 24">
             <a:extLst>
               <a:ext uri="{FF2B5EF4-FFF2-40B4-BE49-F238E27FC236}">
-                <a16:creationId xmlns:a16="http://schemas.microsoft.com/office/drawing/2014/main" xmlns="" id="{8CB168AC-3379-47CD-B0CC-5E2A16C8603F}"/>
+                <a16:creationId xmlns:a16="http://schemas.microsoft.com/office/drawing/2014/main" id="{8CB168AC-3379-47CD-B0CC-5E2A16C8603F}"/>
               </a:ext>
             </a:extLst>
           </p:cNvPr>
@@ -9180,7 +9180,7 @@
           <p:cNvPr id="28" name="Group 27">
             <a:extLst>
               <a:ext uri="{FF2B5EF4-FFF2-40B4-BE49-F238E27FC236}">
-                <a16:creationId xmlns:a16="http://schemas.microsoft.com/office/drawing/2014/main" xmlns="" id="{07904CE2-561B-446C-BDE0-A0163D867FCA}"/>
+                <a16:creationId xmlns:a16="http://schemas.microsoft.com/office/drawing/2014/main" id="{07904CE2-561B-446C-BDE0-A0163D867FCA}"/>
               </a:ext>
             </a:extLst>
           </p:cNvPr>
@@ -9200,7 +9200,7 @@
             <p:cNvPr id="8" name="Rectangle 7">
               <a:extLst>
                 <a:ext uri="{FF2B5EF4-FFF2-40B4-BE49-F238E27FC236}">
-                  <a16:creationId xmlns:a16="http://schemas.microsoft.com/office/drawing/2014/main" xmlns="" id="{EE0E5B91-1AE7-4061-B0D8-DD7E18A8B2FA}"/>
+                  <a16:creationId xmlns:a16="http://schemas.microsoft.com/office/drawing/2014/main" id="{EE0E5B91-1AE7-4061-B0D8-DD7E18A8B2FA}"/>
                 </a:ext>
               </a:extLst>
             </p:cNvPr>
@@ -9247,7 +9247,7 @@
             <p:cNvPr id="9" name="Rectangle 8">
               <a:extLst>
                 <a:ext uri="{FF2B5EF4-FFF2-40B4-BE49-F238E27FC236}">
-                  <a16:creationId xmlns:a16="http://schemas.microsoft.com/office/drawing/2014/main" xmlns="" id="{D431ED19-E433-44F5-9123-C18F427D8D51}"/>
+                  <a16:creationId xmlns:a16="http://schemas.microsoft.com/office/drawing/2014/main" id="{D431ED19-E433-44F5-9123-C18F427D8D51}"/>
                 </a:ext>
               </a:extLst>
             </p:cNvPr>
@@ -9294,7 +9294,7 @@
             <p:cNvPr id="27" name="Straight Arrow Connector 26">
               <a:extLst>
                 <a:ext uri="{FF2B5EF4-FFF2-40B4-BE49-F238E27FC236}">
-                  <a16:creationId xmlns:a16="http://schemas.microsoft.com/office/drawing/2014/main" xmlns="" id="{C3226F47-2AF0-40C9-91CB-279FD075AE2D}"/>
+                  <a16:creationId xmlns:a16="http://schemas.microsoft.com/office/drawing/2014/main" id="{C3226F47-2AF0-40C9-91CB-279FD075AE2D}"/>
                 </a:ext>
               </a:extLst>
             </p:cNvPr>
@@ -9336,7 +9336,7 @@
           <p:cNvPr id="29" name="Rectangle 28">
             <a:extLst>
               <a:ext uri="{FF2B5EF4-FFF2-40B4-BE49-F238E27FC236}">
-                <a16:creationId xmlns:a16="http://schemas.microsoft.com/office/drawing/2014/main" xmlns="" id="{82E9200D-15C3-4FCF-A37A-E78E92CCD17D}"/>
+                <a16:creationId xmlns:a16="http://schemas.microsoft.com/office/drawing/2014/main" id="{82E9200D-15C3-4FCF-A37A-E78E92CCD17D}"/>
               </a:ext>
             </a:extLst>
           </p:cNvPr>
@@ -9383,7 +9383,7 @@
           <p:cNvPr id="30" name="Rectangle 29">
             <a:extLst>
               <a:ext uri="{FF2B5EF4-FFF2-40B4-BE49-F238E27FC236}">
-                <a16:creationId xmlns:a16="http://schemas.microsoft.com/office/drawing/2014/main" xmlns="" id="{6FB50EB4-B43E-4888-9D7F-D90F69C68F9B}"/>
+                <a16:creationId xmlns:a16="http://schemas.microsoft.com/office/drawing/2014/main" id="{6FB50EB4-B43E-4888-9D7F-D90F69C68F9B}"/>
               </a:ext>
             </a:extLst>
           </p:cNvPr>
@@ -9430,7 +9430,7 @@
           <p:cNvPr id="32" name="Straight Arrow Connector 31">
             <a:extLst>
               <a:ext uri="{FF2B5EF4-FFF2-40B4-BE49-F238E27FC236}">
-                <a16:creationId xmlns:a16="http://schemas.microsoft.com/office/drawing/2014/main" xmlns="" id="{1DBCD218-F96C-4DA3-8D74-F1783FF896BA}"/>
+                <a16:creationId xmlns:a16="http://schemas.microsoft.com/office/drawing/2014/main" id="{1DBCD218-F96C-4DA3-8D74-F1783FF896BA}"/>
               </a:ext>
             </a:extLst>
           </p:cNvPr>
@@ -9472,7 +9472,7 @@
           <p:cNvPr id="34" name="Straight Arrow Connector 33">
             <a:extLst>
               <a:ext uri="{FF2B5EF4-FFF2-40B4-BE49-F238E27FC236}">
-                <a16:creationId xmlns:a16="http://schemas.microsoft.com/office/drawing/2014/main" xmlns="" id="{CEED8F22-E2D7-43B4-9ADB-F97BEEF1DD99}"/>
+                <a16:creationId xmlns:a16="http://schemas.microsoft.com/office/drawing/2014/main" id="{CEED8F22-E2D7-43B4-9ADB-F97BEEF1DD99}"/>
               </a:ext>
             </a:extLst>
           </p:cNvPr>
@@ -9514,7 +9514,7 @@
           <p:cNvPr id="35" name="Rectangle 34">
             <a:extLst>
               <a:ext uri="{FF2B5EF4-FFF2-40B4-BE49-F238E27FC236}">
-                <a16:creationId xmlns:a16="http://schemas.microsoft.com/office/drawing/2014/main" xmlns="" id="{1D2C3E1B-D49A-4414-AE6C-CC59355770EA}"/>
+                <a16:creationId xmlns:a16="http://schemas.microsoft.com/office/drawing/2014/main" id="{1D2C3E1B-D49A-4414-AE6C-CC59355770EA}"/>
               </a:ext>
             </a:extLst>
           </p:cNvPr>
@@ -9561,7 +9561,7 @@
           <p:cNvPr id="36" name="Rectangle 35">
             <a:extLst>
               <a:ext uri="{FF2B5EF4-FFF2-40B4-BE49-F238E27FC236}">
-                <a16:creationId xmlns:a16="http://schemas.microsoft.com/office/drawing/2014/main" xmlns="" id="{1E2916E3-0D00-42C5-AA53-A5658301C7D2}"/>
+                <a16:creationId xmlns:a16="http://schemas.microsoft.com/office/drawing/2014/main" id="{1E2916E3-0D00-42C5-AA53-A5658301C7D2}"/>
               </a:ext>
             </a:extLst>
           </p:cNvPr>
@@ -9608,7 +9608,7 @@
           <p:cNvPr id="37" name="Rectangle 36">
             <a:extLst>
               <a:ext uri="{FF2B5EF4-FFF2-40B4-BE49-F238E27FC236}">
-                <a16:creationId xmlns:a16="http://schemas.microsoft.com/office/drawing/2014/main" xmlns="" id="{0BC886AE-1E64-46C6-ABFF-55ED83AC8387}"/>
+                <a16:creationId xmlns:a16="http://schemas.microsoft.com/office/drawing/2014/main" id="{0BC886AE-1E64-46C6-ABFF-55ED83AC8387}"/>
               </a:ext>
             </a:extLst>
           </p:cNvPr>
@@ -9685,7 +9685,7 @@
           <p:cNvPr id="4" name="Rectangle 3">
             <a:extLst>
               <a:ext uri="{FF2B5EF4-FFF2-40B4-BE49-F238E27FC236}">
-                <a16:creationId xmlns:a16="http://schemas.microsoft.com/office/drawing/2014/main" xmlns="" id="{710A7AE3-C93C-4A46-9C89-0F7879DC197C}"/>
+                <a16:creationId xmlns:a16="http://schemas.microsoft.com/office/drawing/2014/main" id="{710A7AE3-C93C-4A46-9C89-0F7879DC197C}"/>
               </a:ext>
             </a:extLst>
           </p:cNvPr>
@@ -9734,7 +9734,7 @@
           <p:cNvPr id="5" name="Rectangle 4">
             <a:extLst>
               <a:ext uri="{FF2B5EF4-FFF2-40B4-BE49-F238E27FC236}">
-                <a16:creationId xmlns:a16="http://schemas.microsoft.com/office/drawing/2014/main" xmlns="" id="{F61738BE-4A34-405D-91C9-64C1146AB9C2}"/>
+                <a16:creationId xmlns:a16="http://schemas.microsoft.com/office/drawing/2014/main" id="{F61738BE-4A34-405D-91C9-64C1146AB9C2}"/>
               </a:ext>
             </a:extLst>
           </p:cNvPr>
@@ -9781,7 +9781,7 @@
           <p:cNvPr id="8" name="Rectangle 7">
             <a:extLst>
               <a:ext uri="{FF2B5EF4-FFF2-40B4-BE49-F238E27FC236}">
-                <a16:creationId xmlns:a16="http://schemas.microsoft.com/office/drawing/2014/main" xmlns="" id="{88493630-52E6-418A-B267-9C488F7B14FA}"/>
+                <a16:creationId xmlns:a16="http://schemas.microsoft.com/office/drawing/2014/main" id="{88493630-52E6-418A-B267-9C488F7B14FA}"/>
               </a:ext>
             </a:extLst>
           </p:cNvPr>
@@ -9828,7 +9828,7 @@
           <p:cNvPr id="9" name="Rectangle 8">
             <a:extLst>
               <a:ext uri="{FF2B5EF4-FFF2-40B4-BE49-F238E27FC236}">
-                <a16:creationId xmlns:a16="http://schemas.microsoft.com/office/drawing/2014/main" xmlns="" id="{5D585775-A82D-45BB-9D8B-B57008AAC708}"/>
+                <a16:creationId xmlns:a16="http://schemas.microsoft.com/office/drawing/2014/main" id="{5D585775-A82D-45BB-9D8B-B57008AAC708}"/>
               </a:ext>
             </a:extLst>
           </p:cNvPr>
@@ -9875,7 +9875,7 @@
           <p:cNvPr id="10" name="Rectangle 9">
             <a:extLst>
               <a:ext uri="{FF2B5EF4-FFF2-40B4-BE49-F238E27FC236}">
-                <a16:creationId xmlns:a16="http://schemas.microsoft.com/office/drawing/2014/main" xmlns="" id="{47F93004-B242-42DC-B0F2-FB09EC748570}"/>
+                <a16:creationId xmlns:a16="http://schemas.microsoft.com/office/drawing/2014/main" id="{47F93004-B242-42DC-B0F2-FB09EC748570}"/>
               </a:ext>
             </a:extLst>
           </p:cNvPr>
@@ -9922,7 +9922,7 @@
           <p:cNvPr id="12" name="Straight Arrow Connector 11">
             <a:extLst>
               <a:ext uri="{FF2B5EF4-FFF2-40B4-BE49-F238E27FC236}">
-                <a16:creationId xmlns:a16="http://schemas.microsoft.com/office/drawing/2014/main" xmlns="" id="{672D331D-DCB8-4DF8-9102-FB36CEB819D4}"/>
+                <a16:creationId xmlns:a16="http://schemas.microsoft.com/office/drawing/2014/main" id="{672D331D-DCB8-4DF8-9102-FB36CEB819D4}"/>
               </a:ext>
             </a:extLst>
           </p:cNvPr>
@@ -9964,7 +9964,7 @@
           <p:cNvPr id="14" name="Straight Arrow Connector 13">
             <a:extLst>
               <a:ext uri="{FF2B5EF4-FFF2-40B4-BE49-F238E27FC236}">
-                <a16:creationId xmlns:a16="http://schemas.microsoft.com/office/drawing/2014/main" xmlns="" id="{E6BCD24F-EC77-4B54-A708-667C56F16B22}"/>
+                <a16:creationId xmlns:a16="http://schemas.microsoft.com/office/drawing/2014/main" id="{E6BCD24F-EC77-4B54-A708-667C56F16B22}"/>
               </a:ext>
             </a:extLst>
           </p:cNvPr>
@@ -10007,7 +10007,7 @@
           <p:cNvPr id="15" name="Rectangle 14">
             <a:extLst>
               <a:ext uri="{FF2B5EF4-FFF2-40B4-BE49-F238E27FC236}">
-                <a16:creationId xmlns:a16="http://schemas.microsoft.com/office/drawing/2014/main" xmlns="" id="{6E54F490-3D7A-468F-ACE5-9689707321D3}"/>
+                <a16:creationId xmlns:a16="http://schemas.microsoft.com/office/drawing/2014/main" id="{6E54F490-3D7A-468F-ACE5-9689707321D3}"/>
               </a:ext>
             </a:extLst>
           </p:cNvPr>
@@ -10054,7 +10054,7 @@
           <p:cNvPr id="16" name="Rectangle 15">
             <a:extLst>
               <a:ext uri="{FF2B5EF4-FFF2-40B4-BE49-F238E27FC236}">
-                <a16:creationId xmlns:a16="http://schemas.microsoft.com/office/drawing/2014/main" xmlns="" id="{B2932F0E-F733-4484-92D8-735895C8AEE6}"/>
+                <a16:creationId xmlns:a16="http://schemas.microsoft.com/office/drawing/2014/main" id="{B2932F0E-F733-4484-92D8-735895C8AEE6}"/>
               </a:ext>
             </a:extLst>
           </p:cNvPr>
@@ -10101,7 +10101,7 @@
           <p:cNvPr id="17" name="Straight Arrow Connector 16">
             <a:extLst>
               <a:ext uri="{FF2B5EF4-FFF2-40B4-BE49-F238E27FC236}">
-                <a16:creationId xmlns:a16="http://schemas.microsoft.com/office/drawing/2014/main" xmlns="" id="{77DC617A-7860-49EE-9FE5-B0DA83B84F50}"/>
+                <a16:creationId xmlns:a16="http://schemas.microsoft.com/office/drawing/2014/main" id="{77DC617A-7860-49EE-9FE5-B0DA83B84F50}"/>
               </a:ext>
             </a:extLst>
           </p:cNvPr>
@@ -10143,7 +10143,7 @@
           <p:cNvPr id="25" name="Rectangle 24">
             <a:extLst>
               <a:ext uri="{FF2B5EF4-FFF2-40B4-BE49-F238E27FC236}">
-                <a16:creationId xmlns:a16="http://schemas.microsoft.com/office/drawing/2014/main" xmlns="" id="{AFB73281-5B6E-42FD-90A9-86DF0FA98C05}"/>
+                <a16:creationId xmlns:a16="http://schemas.microsoft.com/office/drawing/2014/main" id="{AFB73281-5B6E-42FD-90A9-86DF0FA98C05}"/>
               </a:ext>
             </a:extLst>
           </p:cNvPr>
@@ -10190,7 +10190,7 @@
           <p:cNvPr id="29" name="Rectangle 28">
             <a:extLst>
               <a:ext uri="{FF2B5EF4-FFF2-40B4-BE49-F238E27FC236}">
-                <a16:creationId xmlns:a16="http://schemas.microsoft.com/office/drawing/2014/main" xmlns="" id="{54DFB2FC-59F0-4067-A9CD-A8B2E41BB34A}"/>
+                <a16:creationId xmlns:a16="http://schemas.microsoft.com/office/drawing/2014/main" id="{54DFB2FC-59F0-4067-A9CD-A8B2E41BB34A}"/>
               </a:ext>
             </a:extLst>
           </p:cNvPr>
@@ -10237,7 +10237,7 @@
           <p:cNvPr id="30" name="Straight Arrow Connector 29">
             <a:extLst>
               <a:ext uri="{FF2B5EF4-FFF2-40B4-BE49-F238E27FC236}">
-                <a16:creationId xmlns:a16="http://schemas.microsoft.com/office/drawing/2014/main" xmlns="" id="{6FF46A77-40BF-4127-9BB1-5253FC9D9D88}"/>
+                <a16:creationId xmlns:a16="http://schemas.microsoft.com/office/drawing/2014/main" id="{6FF46A77-40BF-4127-9BB1-5253FC9D9D88}"/>
               </a:ext>
             </a:extLst>
           </p:cNvPr>
@@ -10279,7 +10279,7 @@
           <p:cNvPr id="39" name="Picture 38">
             <a:extLst>
               <a:ext uri="{FF2B5EF4-FFF2-40B4-BE49-F238E27FC236}">
-                <a16:creationId xmlns:a16="http://schemas.microsoft.com/office/drawing/2014/main" xmlns="" id="{F858A6A2-A4B7-4FC4-87F0-B62753B9436D}"/>
+                <a16:creationId xmlns:a16="http://schemas.microsoft.com/office/drawing/2014/main" id="{F858A6A2-A4B7-4FC4-87F0-B62753B9436D}"/>
               </a:ext>
             </a:extLst>
           </p:cNvPr>
@@ -10309,7 +10309,7 @@
           <p:cNvPr id="43" name="Straight Arrow Connector 42">
             <a:extLst>
               <a:ext uri="{FF2B5EF4-FFF2-40B4-BE49-F238E27FC236}">
-                <a16:creationId xmlns:a16="http://schemas.microsoft.com/office/drawing/2014/main" xmlns="" id="{E392701D-455A-40A7-B320-9DDD63C947FC}"/>
+                <a16:creationId xmlns:a16="http://schemas.microsoft.com/office/drawing/2014/main" id="{E392701D-455A-40A7-B320-9DDD63C947FC}"/>
               </a:ext>
             </a:extLst>
           </p:cNvPr>
@@ -10381,10 +10381,9 @@
           <a:p>
             <a:pPr algn="ctr"/>
             <a:r>
-              <a:rPr lang="en-NZ" sz="1000" dirty="0" smtClean="0"/>
+              <a:rPr lang="en-NZ" sz="1000" dirty="0"/>
               <a:t>Cache Manager</a:t>
             </a:r>
-            <a:endParaRPr lang="en-NZ" sz="1000" dirty="0"/>
           </a:p>
         </p:txBody>
       </p:sp>
@@ -10423,7 +10422,7 @@
           <p:cNvPr id="4" name="Rectangle 3">
             <a:extLst>
               <a:ext uri="{FF2B5EF4-FFF2-40B4-BE49-F238E27FC236}">
-                <a16:creationId xmlns:a16="http://schemas.microsoft.com/office/drawing/2014/main" xmlns="" id="{690D6A19-CEB7-43B0-B05E-BBBEBF4C19B8}"/>
+                <a16:creationId xmlns:a16="http://schemas.microsoft.com/office/drawing/2014/main" id="{690D6A19-CEB7-43B0-B05E-BBBEBF4C19B8}"/>
               </a:ext>
             </a:extLst>
           </p:cNvPr>
@@ -10472,7 +10471,7 @@
           <p:cNvPr id="5" name="Rectangle 4">
             <a:extLst>
               <a:ext uri="{FF2B5EF4-FFF2-40B4-BE49-F238E27FC236}">
-                <a16:creationId xmlns:a16="http://schemas.microsoft.com/office/drawing/2014/main" xmlns="" id="{545226B9-C268-46CE-822C-405454497BCD}"/>
+                <a16:creationId xmlns:a16="http://schemas.microsoft.com/office/drawing/2014/main" id="{545226B9-C268-46CE-822C-405454497BCD}"/>
               </a:ext>
             </a:extLst>
           </p:cNvPr>
@@ -10519,7 +10518,7 @@
           <p:cNvPr id="6" name="Rectangle 5">
             <a:extLst>
               <a:ext uri="{FF2B5EF4-FFF2-40B4-BE49-F238E27FC236}">
-                <a16:creationId xmlns:a16="http://schemas.microsoft.com/office/drawing/2014/main" xmlns="" id="{78A0A861-0082-454C-B336-0BD83B834DA9}"/>
+                <a16:creationId xmlns:a16="http://schemas.microsoft.com/office/drawing/2014/main" id="{78A0A861-0082-454C-B336-0BD83B834DA9}"/>
               </a:ext>
             </a:extLst>
           </p:cNvPr>
@@ -10566,7 +10565,7 @@
           <p:cNvPr id="8" name="Rectangle 7">
             <a:extLst>
               <a:ext uri="{FF2B5EF4-FFF2-40B4-BE49-F238E27FC236}">
-                <a16:creationId xmlns:a16="http://schemas.microsoft.com/office/drawing/2014/main" xmlns="" id="{60E37B3B-F418-4EAE-ADDD-13FBAD62AE6F}"/>
+                <a16:creationId xmlns:a16="http://schemas.microsoft.com/office/drawing/2014/main" id="{60E37B3B-F418-4EAE-ADDD-13FBAD62AE6F}"/>
               </a:ext>
             </a:extLst>
           </p:cNvPr>
@@ -10613,7 +10612,7 @@
           <p:cNvPr id="13" name="Rectangle 12">
             <a:extLst>
               <a:ext uri="{FF2B5EF4-FFF2-40B4-BE49-F238E27FC236}">
-                <a16:creationId xmlns:a16="http://schemas.microsoft.com/office/drawing/2014/main" xmlns="" id="{79BBD010-D2C1-42D5-8C4A-BBDE3B554FCF}"/>
+                <a16:creationId xmlns:a16="http://schemas.microsoft.com/office/drawing/2014/main" id="{79BBD010-D2C1-42D5-8C4A-BBDE3B554FCF}"/>
               </a:ext>
             </a:extLst>
           </p:cNvPr>
@@ -10660,7 +10659,7 @@
           <p:cNvPr id="15" name="Rectangle 14">
             <a:extLst>
               <a:ext uri="{FF2B5EF4-FFF2-40B4-BE49-F238E27FC236}">
-                <a16:creationId xmlns:a16="http://schemas.microsoft.com/office/drawing/2014/main" xmlns="" id="{F627AE2F-D2BF-435A-B6A0-615B40500CD2}"/>
+                <a16:creationId xmlns:a16="http://schemas.microsoft.com/office/drawing/2014/main" id="{F627AE2F-D2BF-435A-B6A0-615B40500CD2}"/>
               </a:ext>
             </a:extLst>
           </p:cNvPr>
@@ -10707,7 +10706,7 @@
           <p:cNvPr id="19" name="Straight Arrow Connector 18">
             <a:extLst>
               <a:ext uri="{FF2B5EF4-FFF2-40B4-BE49-F238E27FC236}">
-                <a16:creationId xmlns:a16="http://schemas.microsoft.com/office/drawing/2014/main" xmlns="" id="{84100A8D-05EA-46D3-842D-9461702F14A1}"/>
+                <a16:creationId xmlns:a16="http://schemas.microsoft.com/office/drawing/2014/main" id="{84100A8D-05EA-46D3-842D-9461702F14A1}"/>
               </a:ext>
             </a:extLst>
           </p:cNvPr>
@@ -10750,7 +10749,7 @@
           <p:cNvPr id="21" name="Straight Arrow Connector 20">
             <a:extLst>
               <a:ext uri="{FF2B5EF4-FFF2-40B4-BE49-F238E27FC236}">
-                <a16:creationId xmlns:a16="http://schemas.microsoft.com/office/drawing/2014/main" xmlns="" id="{7C660532-EC9F-4758-9C7B-8AC002CA0645}"/>
+                <a16:creationId xmlns:a16="http://schemas.microsoft.com/office/drawing/2014/main" id="{7C660532-EC9F-4758-9C7B-8AC002CA0645}"/>
               </a:ext>
             </a:extLst>
           </p:cNvPr>
@@ -10793,7 +10792,7 @@
           <p:cNvPr id="24" name="Rectangle 23">
             <a:extLst>
               <a:ext uri="{FF2B5EF4-FFF2-40B4-BE49-F238E27FC236}">
-                <a16:creationId xmlns:a16="http://schemas.microsoft.com/office/drawing/2014/main" xmlns="" id="{5744C055-7E85-43D8-828B-3434A6EE70F0}"/>
+                <a16:creationId xmlns:a16="http://schemas.microsoft.com/office/drawing/2014/main" id="{5744C055-7E85-43D8-828B-3434A6EE70F0}"/>
               </a:ext>
             </a:extLst>
           </p:cNvPr>
@@ -10840,7 +10839,7 @@
           <p:cNvPr id="34" name="Rectangle 33">
             <a:extLst>
               <a:ext uri="{FF2B5EF4-FFF2-40B4-BE49-F238E27FC236}">
-                <a16:creationId xmlns:a16="http://schemas.microsoft.com/office/drawing/2014/main" xmlns="" id="{9539F334-CDC4-453F-97F1-79096B395643}"/>
+                <a16:creationId xmlns:a16="http://schemas.microsoft.com/office/drawing/2014/main" id="{9539F334-CDC4-453F-97F1-79096B395643}"/>
               </a:ext>
             </a:extLst>
           </p:cNvPr>
@@ -10887,7 +10886,7 @@
           <p:cNvPr id="35" name="Rectangle 34">
             <a:extLst>
               <a:ext uri="{FF2B5EF4-FFF2-40B4-BE49-F238E27FC236}">
-                <a16:creationId xmlns:a16="http://schemas.microsoft.com/office/drawing/2014/main" xmlns="" id="{49413469-14BD-49E3-8763-AD48897A3286}"/>
+                <a16:creationId xmlns:a16="http://schemas.microsoft.com/office/drawing/2014/main" id="{49413469-14BD-49E3-8763-AD48897A3286}"/>
               </a:ext>
             </a:extLst>
           </p:cNvPr>
@@ -10934,7 +10933,7 @@
           <p:cNvPr id="36" name="Straight Arrow Connector 35">
             <a:extLst>
               <a:ext uri="{FF2B5EF4-FFF2-40B4-BE49-F238E27FC236}">
-                <a16:creationId xmlns:a16="http://schemas.microsoft.com/office/drawing/2014/main" xmlns="" id="{768A8FBC-1195-4DD2-9DE6-DAC0EFCFD37C}"/>
+                <a16:creationId xmlns:a16="http://schemas.microsoft.com/office/drawing/2014/main" id="{768A8FBC-1195-4DD2-9DE6-DAC0EFCFD37C}"/>
               </a:ext>
             </a:extLst>
           </p:cNvPr>
@@ -10977,7 +10976,7 @@
           <p:cNvPr id="41" name="Rectangle 40">
             <a:extLst>
               <a:ext uri="{FF2B5EF4-FFF2-40B4-BE49-F238E27FC236}">
-                <a16:creationId xmlns:a16="http://schemas.microsoft.com/office/drawing/2014/main" xmlns="" id="{10D1C808-788D-4DA6-BD87-FA8459FD8130}"/>
+                <a16:creationId xmlns:a16="http://schemas.microsoft.com/office/drawing/2014/main" id="{10D1C808-788D-4DA6-BD87-FA8459FD8130}"/>
               </a:ext>
             </a:extLst>
           </p:cNvPr>
@@ -11024,7 +11023,7 @@
           <p:cNvPr id="49" name="Rectangle 48">
             <a:extLst>
               <a:ext uri="{FF2B5EF4-FFF2-40B4-BE49-F238E27FC236}">
-                <a16:creationId xmlns:a16="http://schemas.microsoft.com/office/drawing/2014/main" xmlns="" id="{A4F9869B-CE2C-4F71-B34A-7ED1AAE213A5}"/>
+                <a16:creationId xmlns:a16="http://schemas.microsoft.com/office/drawing/2014/main" id="{A4F9869B-CE2C-4F71-B34A-7ED1AAE213A5}"/>
               </a:ext>
             </a:extLst>
           </p:cNvPr>
@@ -11071,7 +11070,7 @@
           <p:cNvPr id="51" name="Straight Arrow Connector 50">
             <a:extLst>
               <a:ext uri="{FF2B5EF4-FFF2-40B4-BE49-F238E27FC236}">
-                <a16:creationId xmlns:a16="http://schemas.microsoft.com/office/drawing/2014/main" xmlns="" id="{230FF7C6-DA94-4CEA-A9E7-C7E9FE0A5442}"/>
+                <a16:creationId xmlns:a16="http://schemas.microsoft.com/office/drawing/2014/main" id="{230FF7C6-DA94-4CEA-A9E7-C7E9FE0A5442}"/>
               </a:ext>
             </a:extLst>
           </p:cNvPr>
@@ -11113,7 +11112,7 @@
           <p:cNvPr id="80" name="Straight Arrow Connector 79">
             <a:extLst>
               <a:ext uri="{FF2B5EF4-FFF2-40B4-BE49-F238E27FC236}">
-                <a16:creationId xmlns:a16="http://schemas.microsoft.com/office/drawing/2014/main" xmlns="" id="{12FA2611-F7DD-4ED6-8237-6E55E041A25C}"/>
+                <a16:creationId xmlns:a16="http://schemas.microsoft.com/office/drawing/2014/main" id="{12FA2611-F7DD-4ED6-8237-6E55E041A25C}"/>
               </a:ext>
             </a:extLst>
           </p:cNvPr>
@@ -11156,7 +11155,7 @@
           <p:cNvPr id="83" name="Rectangle 82">
             <a:extLst>
               <a:ext uri="{FF2B5EF4-FFF2-40B4-BE49-F238E27FC236}">
-                <a16:creationId xmlns:a16="http://schemas.microsoft.com/office/drawing/2014/main" xmlns="" id="{E3166C37-9F6F-412F-8AC4-115C5793F2B6}"/>
+                <a16:creationId xmlns:a16="http://schemas.microsoft.com/office/drawing/2014/main" id="{E3166C37-9F6F-412F-8AC4-115C5793F2B6}"/>
               </a:ext>
             </a:extLst>
           </p:cNvPr>
@@ -11203,7 +11202,7 @@
           <p:cNvPr id="84" name="Rectangle 83">
             <a:extLst>
               <a:ext uri="{FF2B5EF4-FFF2-40B4-BE49-F238E27FC236}">
-                <a16:creationId xmlns:a16="http://schemas.microsoft.com/office/drawing/2014/main" xmlns="" id="{2C0872FC-9F84-4E06-B2C3-FD0D1E5C03F7}"/>
+                <a16:creationId xmlns:a16="http://schemas.microsoft.com/office/drawing/2014/main" id="{2C0872FC-9F84-4E06-B2C3-FD0D1E5C03F7}"/>
               </a:ext>
             </a:extLst>
           </p:cNvPr>
@@ -11257,7 +11256,7 @@
           <p:cNvPr id="85" name="Straight Arrow Connector 84">
             <a:extLst>
               <a:ext uri="{FF2B5EF4-FFF2-40B4-BE49-F238E27FC236}">
-                <a16:creationId xmlns:a16="http://schemas.microsoft.com/office/drawing/2014/main" xmlns="" id="{A91891EE-4372-4FAF-A11B-A899B6EE10B9}"/>
+                <a16:creationId xmlns:a16="http://schemas.microsoft.com/office/drawing/2014/main" id="{A91891EE-4372-4FAF-A11B-A899B6EE10B9}"/>
               </a:ext>
             </a:extLst>
           </p:cNvPr>
@@ -11299,7 +11298,7 @@
           <p:cNvPr id="86" name="Rectangle 85">
             <a:extLst>
               <a:ext uri="{FF2B5EF4-FFF2-40B4-BE49-F238E27FC236}">
-                <a16:creationId xmlns:a16="http://schemas.microsoft.com/office/drawing/2014/main" xmlns="" id="{81E22689-F6F1-4043-B7C6-1A01F4D2D596}"/>
+                <a16:creationId xmlns:a16="http://schemas.microsoft.com/office/drawing/2014/main" id="{81E22689-F6F1-4043-B7C6-1A01F4D2D596}"/>
               </a:ext>
             </a:extLst>
           </p:cNvPr>
@@ -11346,7 +11345,7 @@
           <p:cNvPr id="87" name="Straight Arrow Connector 86">
             <a:extLst>
               <a:ext uri="{FF2B5EF4-FFF2-40B4-BE49-F238E27FC236}">
-                <a16:creationId xmlns:a16="http://schemas.microsoft.com/office/drawing/2014/main" xmlns="" id="{9D7C3342-9E0E-4151-A474-5857C1F8EF3B}"/>
+                <a16:creationId xmlns:a16="http://schemas.microsoft.com/office/drawing/2014/main" id="{9D7C3342-9E0E-4151-A474-5857C1F8EF3B}"/>
               </a:ext>
             </a:extLst>
           </p:cNvPr>
@@ -11389,7 +11388,7 @@
           <p:cNvPr id="91" name="Picture 90">
             <a:extLst>
               <a:ext uri="{FF2B5EF4-FFF2-40B4-BE49-F238E27FC236}">
-                <a16:creationId xmlns:a16="http://schemas.microsoft.com/office/drawing/2014/main" xmlns="" id="{F725FE44-CAA3-465A-A084-FCA7C0A14313}"/>
+                <a16:creationId xmlns:a16="http://schemas.microsoft.com/office/drawing/2014/main" id="{F725FE44-CAA3-465A-A084-FCA7C0A14313}"/>
               </a:ext>
             </a:extLst>
           </p:cNvPr>
@@ -11419,7 +11418,7 @@
           <p:cNvPr id="92" name="Rectangle 91">
             <a:extLst>
               <a:ext uri="{FF2B5EF4-FFF2-40B4-BE49-F238E27FC236}">
-                <a16:creationId xmlns:a16="http://schemas.microsoft.com/office/drawing/2014/main" xmlns="" id="{E9AC27C7-13FD-434B-BD6B-43BE62472A7F}"/>
+                <a16:creationId xmlns:a16="http://schemas.microsoft.com/office/drawing/2014/main" id="{E9AC27C7-13FD-434B-BD6B-43BE62472A7F}"/>
               </a:ext>
             </a:extLst>
           </p:cNvPr>
@@ -11466,7 +11465,7 @@
           <p:cNvPr id="94" name="Straight Arrow Connector 93">
             <a:extLst>
               <a:ext uri="{FF2B5EF4-FFF2-40B4-BE49-F238E27FC236}">
-                <a16:creationId xmlns:a16="http://schemas.microsoft.com/office/drawing/2014/main" xmlns="" id="{AE84DEC6-7368-47E1-B8C2-879CB8F3FD4C}"/>
+                <a16:creationId xmlns:a16="http://schemas.microsoft.com/office/drawing/2014/main" id="{AE84DEC6-7368-47E1-B8C2-879CB8F3FD4C}"/>
               </a:ext>
             </a:extLst>
           </p:cNvPr>
@@ -11508,7 +11507,7 @@
           <p:cNvPr id="100" name="Rectangle 99">
             <a:extLst>
               <a:ext uri="{FF2B5EF4-FFF2-40B4-BE49-F238E27FC236}">
-                <a16:creationId xmlns:a16="http://schemas.microsoft.com/office/drawing/2014/main" xmlns="" id="{0C82660E-7094-4F6B-A157-295549452ECB}"/>
+                <a16:creationId xmlns:a16="http://schemas.microsoft.com/office/drawing/2014/main" id="{0C82660E-7094-4F6B-A157-295549452ECB}"/>
               </a:ext>
             </a:extLst>
           </p:cNvPr>
@@ -11555,7 +11554,7 @@
           <p:cNvPr id="102" name="Straight Arrow Connector 101">
             <a:extLst>
               <a:ext uri="{FF2B5EF4-FFF2-40B4-BE49-F238E27FC236}">
-                <a16:creationId xmlns:a16="http://schemas.microsoft.com/office/drawing/2014/main" xmlns="" id="{67227F41-CAD5-4D2D-933E-C4C8959EA940}"/>
+                <a16:creationId xmlns:a16="http://schemas.microsoft.com/office/drawing/2014/main" id="{67227F41-CAD5-4D2D-933E-C4C8959EA940}"/>
               </a:ext>
             </a:extLst>
           </p:cNvPr>
@@ -11598,7 +11597,7 @@
           <p:cNvPr id="104" name="Rectangle 103">
             <a:extLst>
               <a:ext uri="{FF2B5EF4-FFF2-40B4-BE49-F238E27FC236}">
-                <a16:creationId xmlns:a16="http://schemas.microsoft.com/office/drawing/2014/main" xmlns="" id="{A67CB307-BC20-4D85-A1C7-72C73EF0678D}"/>
+                <a16:creationId xmlns:a16="http://schemas.microsoft.com/office/drawing/2014/main" id="{A67CB307-BC20-4D85-A1C7-72C73EF0678D}"/>
               </a:ext>
             </a:extLst>
           </p:cNvPr>
@@ -11645,7 +11644,7 @@
           <p:cNvPr id="105" name="Rectangle 104">
             <a:extLst>
               <a:ext uri="{FF2B5EF4-FFF2-40B4-BE49-F238E27FC236}">
-                <a16:creationId xmlns:a16="http://schemas.microsoft.com/office/drawing/2014/main" xmlns="" id="{554F5C5C-A1D4-4F62-908A-556C109D77A8}"/>
+                <a16:creationId xmlns:a16="http://schemas.microsoft.com/office/drawing/2014/main" id="{554F5C5C-A1D4-4F62-908A-556C109D77A8}"/>
               </a:ext>
             </a:extLst>
           </p:cNvPr>
@@ -11692,7 +11691,7 @@
           <p:cNvPr id="106" name="Straight Arrow Connector 105">
             <a:extLst>
               <a:ext uri="{FF2B5EF4-FFF2-40B4-BE49-F238E27FC236}">
-                <a16:creationId xmlns:a16="http://schemas.microsoft.com/office/drawing/2014/main" xmlns="" id="{F5B62AF7-EF02-4F7F-9CAD-2644AFF72DA1}"/>
+                <a16:creationId xmlns:a16="http://schemas.microsoft.com/office/drawing/2014/main" id="{F5B62AF7-EF02-4F7F-9CAD-2644AFF72DA1}"/>
               </a:ext>
             </a:extLst>
           </p:cNvPr>
@@ -11735,7 +11734,7 @@
           <p:cNvPr id="118" name="Rectangle 117">
             <a:extLst>
               <a:ext uri="{FF2B5EF4-FFF2-40B4-BE49-F238E27FC236}">
-                <a16:creationId xmlns:a16="http://schemas.microsoft.com/office/drawing/2014/main" xmlns="" id="{3FF09E83-EA06-4534-A148-9BE55EF61B87}"/>
+                <a16:creationId xmlns:a16="http://schemas.microsoft.com/office/drawing/2014/main" id="{3FF09E83-EA06-4534-A148-9BE55EF61B87}"/>
               </a:ext>
             </a:extLst>
           </p:cNvPr>
@@ -11782,7 +11781,7 @@
           <p:cNvPr id="120" name="Straight Arrow Connector 119">
             <a:extLst>
               <a:ext uri="{FF2B5EF4-FFF2-40B4-BE49-F238E27FC236}">
-                <a16:creationId xmlns:a16="http://schemas.microsoft.com/office/drawing/2014/main" xmlns="" id="{F45F737D-7465-43A6-9EB4-119415B60B02}"/>
+                <a16:creationId xmlns:a16="http://schemas.microsoft.com/office/drawing/2014/main" id="{F45F737D-7465-43A6-9EB4-119415B60B02}"/>
               </a:ext>
             </a:extLst>
           </p:cNvPr>
@@ -11824,7 +11823,7 @@
           <p:cNvPr id="136" name="Straight Arrow Connector 135">
             <a:extLst>
               <a:ext uri="{FF2B5EF4-FFF2-40B4-BE49-F238E27FC236}">
-                <a16:creationId xmlns:a16="http://schemas.microsoft.com/office/drawing/2014/main" xmlns="" id="{FB560AE2-E8DC-45A6-9282-43E973823FFD}"/>
+                <a16:creationId xmlns:a16="http://schemas.microsoft.com/office/drawing/2014/main" id="{FB560AE2-E8DC-45A6-9282-43E973823FFD}"/>
               </a:ext>
             </a:extLst>
           </p:cNvPr>
@@ -11866,7 +11865,7 @@
           <p:cNvPr id="138" name="Straight Arrow Connector 137">
             <a:extLst>
               <a:ext uri="{FF2B5EF4-FFF2-40B4-BE49-F238E27FC236}">
-                <a16:creationId xmlns:a16="http://schemas.microsoft.com/office/drawing/2014/main" xmlns="" id="{821667DE-4BC4-4DC6-8A7D-9B912ABCC472}"/>
+                <a16:creationId xmlns:a16="http://schemas.microsoft.com/office/drawing/2014/main" id="{821667DE-4BC4-4DC6-8A7D-9B912ABCC472}"/>
               </a:ext>
             </a:extLst>
           </p:cNvPr>
@@ -11908,7 +11907,7 @@
           <p:cNvPr id="146" name="Straight Arrow Connector 145">
             <a:extLst>
               <a:ext uri="{FF2B5EF4-FFF2-40B4-BE49-F238E27FC236}">
-                <a16:creationId xmlns:a16="http://schemas.microsoft.com/office/drawing/2014/main" xmlns="" id="{A0FE399F-5BFA-4934-8B23-01BCFD125033}"/>
+                <a16:creationId xmlns:a16="http://schemas.microsoft.com/office/drawing/2014/main" id="{A0FE399F-5BFA-4934-8B23-01BCFD125033}"/>
               </a:ext>
             </a:extLst>
           </p:cNvPr>
@@ -11950,7 +11949,7 @@
           <p:cNvPr id="152" name="Rectangle 151">
             <a:extLst>
               <a:ext uri="{FF2B5EF4-FFF2-40B4-BE49-F238E27FC236}">
-                <a16:creationId xmlns:a16="http://schemas.microsoft.com/office/drawing/2014/main" xmlns="" id="{557DFE34-1A30-42C9-942E-EA4686500E42}"/>
+                <a16:creationId xmlns:a16="http://schemas.microsoft.com/office/drawing/2014/main" id="{557DFE34-1A30-42C9-942E-EA4686500E42}"/>
               </a:ext>
             </a:extLst>
           </p:cNvPr>
@@ -11997,7 +11996,7 @@
           <p:cNvPr id="154" name="Straight Arrow Connector 153">
             <a:extLst>
               <a:ext uri="{FF2B5EF4-FFF2-40B4-BE49-F238E27FC236}">
-                <a16:creationId xmlns:a16="http://schemas.microsoft.com/office/drawing/2014/main" xmlns="" id="{9910EE0A-A18C-4B92-8BED-A28838C1CC7E}"/>
+                <a16:creationId xmlns:a16="http://schemas.microsoft.com/office/drawing/2014/main" id="{9910EE0A-A18C-4B92-8BED-A28838C1CC7E}"/>
               </a:ext>
             </a:extLst>
           </p:cNvPr>
@@ -12039,7 +12038,7 @@
           <p:cNvPr id="157" name="Rectangle 156">
             <a:extLst>
               <a:ext uri="{FF2B5EF4-FFF2-40B4-BE49-F238E27FC236}">
-                <a16:creationId xmlns:a16="http://schemas.microsoft.com/office/drawing/2014/main" xmlns="" id="{59F5C2AC-56EB-45D5-B8A8-DC3BA186D7DE}"/>
+                <a16:creationId xmlns:a16="http://schemas.microsoft.com/office/drawing/2014/main" id="{59F5C2AC-56EB-45D5-B8A8-DC3BA186D7DE}"/>
               </a:ext>
             </a:extLst>
           </p:cNvPr>
@@ -12086,7 +12085,7 @@
           <p:cNvPr id="159" name="Straight Arrow Connector 158">
             <a:extLst>
               <a:ext uri="{FF2B5EF4-FFF2-40B4-BE49-F238E27FC236}">
-                <a16:creationId xmlns:a16="http://schemas.microsoft.com/office/drawing/2014/main" xmlns="" id="{80C15879-3D76-4259-A947-11850AFE9E9D}"/>
+                <a16:creationId xmlns:a16="http://schemas.microsoft.com/office/drawing/2014/main" id="{80C15879-3D76-4259-A947-11850AFE9E9D}"/>
               </a:ext>
             </a:extLst>
           </p:cNvPr>
@@ -12128,7 +12127,7 @@
           <p:cNvPr id="160" name="Rectangle 159">
             <a:extLst>
               <a:ext uri="{FF2B5EF4-FFF2-40B4-BE49-F238E27FC236}">
-                <a16:creationId xmlns:a16="http://schemas.microsoft.com/office/drawing/2014/main" xmlns="" id="{34DA3D03-4A00-4255-9698-CE31DF56E415}"/>
+                <a16:creationId xmlns:a16="http://schemas.microsoft.com/office/drawing/2014/main" id="{34DA3D03-4A00-4255-9698-CE31DF56E415}"/>
               </a:ext>
             </a:extLst>
           </p:cNvPr>
@@ -12175,7 +12174,7 @@
           <p:cNvPr id="161" name="Rectangle 160">
             <a:extLst>
               <a:ext uri="{FF2B5EF4-FFF2-40B4-BE49-F238E27FC236}">
-                <a16:creationId xmlns:a16="http://schemas.microsoft.com/office/drawing/2014/main" xmlns="" id="{195E1B74-F957-49FA-B1E6-3A676936F9D5}"/>
+                <a16:creationId xmlns:a16="http://schemas.microsoft.com/office/drawing/2014/main" id="{195E1B74-F957-49FA-B1E6-3A676936F9D5}"/>
               </a:ext>
             </a:extLst>
           </p:cNvPr>
@@ -12222,7 +12221,7 @@
           <p:cNvPr id="163" name="Straight Arrow Connector 162">
             <a:extLst>
               <a:ext uri="{FF2B5EF4-FFF2-40B4-BE49-F238E27FC236}">
-                <a16:creationId xmlns:a16="http://schemas.microsoft.com/office/drawing/2014/main" xmlns="" id="{0D557ACD-D865-4EBD-BFCE-47CE0D3C684C}"/>
+                <a16:creationId xmlns:a16="http://schemas.microsoft.com/office/drawing/2014/main" id="{0D557ACD-D865-4EBD-BFCE-47CE0D3C684C}"/>
               </a:ext>
             </a:extLst>
           </p:cNvPr>
@@ -12265,7 +12264,7 @@
           <p:cNvPr id="165" name="Straight Arrow Connector 164">
             <a:extLst>
               <a:ext uri="{FF2B5EF4-FFF2-40B4-BE49-F238E27FC236}">
-                <a16:creationId xmlns:a16="http://schemas.microsoft.com/office/drawing/2014/main" xmlns="" id="{7300F120-6AD3-4D8B-B752-38D4285B50E0}"/>
+                <a16:creationId xmlns:a16="http://schemas.microsoft.com/office/drawing/2014/main" id="{7300F120-6AD3-4D8B-B752-38D4285B50E0}"/>
               </a:ext>
             </a:extLst>
           </p:cNvPr>
@@ -12338,10 +12337,9 @@
           <a:p>
             <a:pPr algn="ctr"/>
             <a:r>
-              <a:rPr lang="en-NZ" sz="1000" dirty="0" smtClean="0"/>
+              <a:rPr lang="en-NZ" sz="1000" dirty="0"/>
               <a:t>Database Manager</a:t>
             </a:r>
-            <a:endParaRPr lang="en-NZ" sz="1000" dirty="0"/>
           </a:p>
         </p:txBody>
       </p:sp>
@@ -12380,10 +12378,9 @@
           <a:p>
             <a:pPr algn="ctr"/>
             <a:r>
-              <a:rPr lang="en-NZ" sz="1000" dirty="0" smtClean="0"/>
+              <a:rPr lang="en-NZ" sz="1000" dirty="0"/>
               <a:t>Operations on repositories*</a:t>
             </a:r>
-            <a:endParaRPr lang="en-NZ" sz="1000" dirty="0"/>
           </a:p>
         </p:txBody>
       </p:sp>
@@ -12458,10 +12455,9 @@
           <a:p>
             <a:pPr algn="ctr"/>
             <a:r>
-              <a:rPr lang="en-NZ" sz="1000" dirty="0" smtClean="0"/>
+              <a:rPr lang="en-NZ" sz="1000" dirty="0"/>
               <a:t>Repositories</a:t>
             </a:r>
-            <a:endParaRPr lang="en-NZ" sz="1000" dirty="0"/>
           </a:p>
         </p:txBody>
       </p:sp>
@@ -12536,10 +12532,9 @@
           <a:p>
             <a:pPr algn="ctr"/>
             <a:r>
-              <a:rPr lang="en-NZ" sz="1000" dirty="0" smtClean="0"/>
+              <a:rPr lang="en-NZ" sz="1000" dirty="0"/>
               <a:t>Searching</a:t>
             </a:r>
-            <a:endParaRPr lang="en-NZ" sz="1000" dirty="0"/>
           </a:p>
         </p:txBody>
       </p:sp>
@@ -12578,10 +12573,9 @@
           <a:p>
             <a:pPr algn="ctr"/>
             <a:r>
-              <a:rPr lang="en-NZ" sz="1000" dirty="0" smtClean="0"/>
+              <a:rPr lang="en-NZ" sz="1000" dirty="0"/>
               <a:t>Updating</a:t>
             </a:r>
-            <a:endParaRPr lang="en-NZ" sz="1000" dirty="0"/>
           </a:p>
         </p:txBody>
       </p:sp>
@@ -12620,17 +12614,16 @@
           <a:p>
             <a:pPr algn="ctr"/>
             <a:r>
-              <a:rPr lang="en-NZ" sz="1000" dirty="0" smtClean="0"/>
+              <a:rPr lang="en-NZ" sz="1000" dirty="0"/>
               <a:t>Broker Interface</a:t>
             </a:r>
           </a:p>
           <a:p>
             <a:pPr algn="ctr"/>
             <a:r>
-              <a:rPr lang="en-NZ" sz="1000" dirty="0" smtClean="0"/>
+              <a:rPr lang="en-NZ" sz="1000" dirty="0"/>
               <a:t>(entry point)</a:t>
             </a:r>
-            <a:endParaRPr lang="en-NZ" sz="1000" dirty="0"/>
           </a:p>
         </p:txBody>
       </p:sp>
@@ -12657,10 +12650,9 @@
           <a:lstStyle/>
           <a:p>
             <a:r>
-              <a:rPr lang="en-NZ" sz="1000" dirty="0" smtClean="0"/>
+              <a:rPr lang="en-NZ" sz="1000" dirty="0"/>
               <a:t>*</a:t>
             </a:r>
-            <a:endParaRPr lang="en-NZ" sz="1000" dirty="0"/>
           </a:p>
         </p:txBody>
       </p:sp>
@@ -12687,10 +12679,9 @@
           <a:lstStyle/>
           <a:p>
             <a:r>
-              <a:rPr lang="en-NZ" sz="1000" dirty="0" smtClean="0"/>
+              <a:rPr lang="en-NZ" sz="1000" dirty="0"/>
               <a:t>*</a:t>
             </a:r>
-            <a:endParaRPr lang="en-NZ" sz="1000" dirty="0"/>
           </a:p>
         </p:txBody>
       </p:sp>
@@ -12717,10 +12708,9 @@
           <a:lstStyle/>
           <a:p>
             <a:r>
-              <a:rPr lang="en-NZ" sz="1000" dirty="0" smtClean="0"/>
+              <a:rPr lang="en-NZ" sz="1000" dirty="0"/>
               <a:t>*</a:t>
             </a:r>
-            <a:endParaRPr lang="en-NZ" sz="1000" dirty="0"/>
           </a:p>
         </p:txBody>
       </p:sp>
@@ -12747,10 +12737,9 @@
           <a:lstStyle/>
           <a:p>
             <a:r>
-              <a:rPr lang="en-NZ" sz="1000" dirty="0" smtClean="0"/>
+              <a:rPr lang="en-NZ" sz="1000" dirty="0"/>
               <a:t>*</a:t>
             </a:r>
-            <a:endParaRPr lang="en-NZ" sz="1000" dirty="0"/>
           </a:p>
         </p:txBody>
       </p:sp>
@@ -12777,10 +12766,9 @@
           <a:lstStyle/>
           <a:p>
             <a:r>
-              <a:rPr lang="en-NZ" sz="1000" dirty="0" smtClean="0"/>
+              <a:rPr lang="en-NZ" sz="1000" dirty="0"/>
               <a:t>*</a:t>
             </a:r>
-            <a:endParaRPr lang="en-NZ" sz="1000" dirty="0"/>
           </a:p>
         </p:txBody>
       </p:sp>
@@ -12855,10 +12843,9 @@
           <a:lstStyle/>
           <a:p>
             <a:r>
-              <a:rPr lang="en-NZ" sz="1000" dirty="0" smtClean="0"/>
+              <a:rPr lang="en-NZ" sz="1000" dirty="0"/>
               <a:t>*The modules below:</a:t>
             </a:r>
-            <a:endParaRPr lang="en-NZ" sz="1000" dirty="0"/>
           </a:p>
         </p:txBody>
       </p:sp>
@@ -12897,10 +12884,9 @@
           <a:p>
             <a:pPr algn="ctr"/>
             <a:r>
-              <a:rPr lang="en-NZ" sz="1000" dirty="0" smtClean="0"/>
+              <a:rPr lang="en-NZ" sz="1000" dirty="0"/>
               <a:t>Ops Controller</a:t>
             </a:r>
-            <a:endParaRPr lang="en-NZ" sz="1000" dirty="0"/>
           </a:p>
         </p:txBody>
       </p:sp>
@@ -12975,7 +12961,7 @@
           <p:cNvPr id="4" name="Rectangle 3">
             <a:extLst>
               <a:ext uri="{FF2B5EF4-FFF2-40B4-BE49-F238E27FC236}">
-                <a16:creationId xmlns:a16="http://schemas.microsoft.com/office/drawing/2014/main" xmlns="" id="{70E43C83-12B1-4B8B-A146-450D559C0A91}"/>
+                <a16:creationId xmlns:a16="http://schemas.microsoft.com/office/drawing/2014/main" id="{70E43C83-12B1-4B8B-A146-450D559C0A91}"/>
               </a:ext>
             </a:extLst>
           </p:cNvPr>
@@ -13024,7 +13010,7 @@
           <p:cNvPr id="5" name="Rectangle 4">
             <a:extLst>
               <a:ext uri="{FF2B5EF4-FFF2-40B4-BE49-F238E27FC236}">
-                <a16:creationId xmlns:a16="http://schemas.microsoft.com/office/drawing/2014/main" xmlns="" id="{7B5B76F1-AF58-4223-AB8D-37CB9D2CBCF9}"/>
+                <a16:creationId xmlns:a16="http://schemas.microsoft.com/office/drawing/2014/main" id="{7B5B76F1-AF58-4223-AB8D-37CB9D2CBCF9}"/>
               </a:ext>
             </a:extLst>
           </p:cNvPr>
@@ -13071,7 +13057,7 @@
           <p:cNvPr id="6" name="Rectangle 5">
             <a:extLst>
               <a:ext uri="{FF2B5EF4-FFF2-40B4-BE49-F238E27FC236}">
-                <a16:creationId xmlns:a16="http://schemas.microsoft.com/office/drawing/2014/main" xmlns="" id="{4806DBB0-6DB1-490B-8DD1-0FC8E8A68877}"/>
+                <a16:creationId xmlns:a16="http://schemas.microsoft.com/office/drawing/2014/main" id="{4806DBB0-6DB1-490B-8DD1-0FC8E8A68877}"/>
               </a:ext>
             </a:extLst>
           </p:cNvPr>
@@ -13118,7 +13104,7 @@
           <p:cNvPr id="7" name="Straight Arrow Connector 6">
             <a:extLst>
               <a:ext uri="{FF2B5EF4-FFF2-40B4-BE49-F238E27FC236}">
-                <a16:creationId xmlns:a16="http://schemas.microsoft.com/office/drawing/2014/main" xmlns="" id="{FFFA2F66-448A-4EC4-AFC6-CDE0BA0F0952}"/>
+                <a16:creationId xmlns:a16="http://schemas.microsoft.com/office/drawing/2014/main" id="{FFFA2F66-448A-4EC4-AFC6-CDE0BA0F0952}"/>
               </a:ext>
             </a:extLst>
           </p:cNvPr>
@@ -13161,7 +13147,7 @@
           <p:cNvPr id="11" name="Rectangle 10">
             <a:extLst>
               <a:ext uri="{FF2B5EF4-FFF2-40B4-BE49-F238E27FC236}">
-                <a16:creationId xmlns:a16="http://schemas.microsoft.com/office/drawing/2014/main" xmlns="" id="{8C840B5E-8C90-4AF1-8941-3C4B2F9EB934}"/>
+                <a16:creationId xmlns:a16="http://schemas.microsoft.com/office/drawing/2014/main" id="{8C840B5E-8C90-4AF1-8941-3C4B2F9EB934}"/>
               </a:ext>
             </a:extLst>
           </p:cNvPr>
@@ -13208,7 +13194,7 @@
           <p:cNvPr id="12" name="Rectangle 11">
             <a:extLst>
               <a:ext uri="{FF2B5EF4-FFF2-40B4-BE49-F238E27FC236}">
-                <a16:creationId xmlns:a16="http://schemas.microsoft.com/office/drawing/2014/main" xmlns="" id="{AD9BBFD4-0EBB-4D69-8046-3B099D8D0173}"/>
+                <a16:creationId xmlns:a16="http://schemas.microsoft.com/office/drawing/2014/main" id="{AD9BBFD4-0EBB-4D69-8046-3B099D8D0173}"/>
               </a:ext>
             </a:extLst>
           </p:cNvPr>
@@ -13255,7 +13241,7 @@
           <p:cNvPr id="13" name="Straight Arrow Connector 12">
             <a:extLst>
               <a:ext uri="{FF2B5EF4-FFF2-40B4-BE49-F238E27FC236}">
-                <a16:creationId xmlns:a16="http://schemas.microsoft.com/office/drawing/2014/main" xmlns="" id="{A4B74519-D1E6-44BE-B63C-31983525E76F}"/>
+                <a16:creationId xmlns:a16="http://schemas.microsoft.com/office/drawing/2014/main" id="{A4B74519-D1E6-44BE-B63C-31983525E76F}"/>
               </a:ext>
             </a:extLst>
           </p:cNvPr>
@@ -13298,7 +13284,7 @@
           <p:cNvPr id="15" name="Rectangle 14">
             <a:extLst>
               <a:ext uri="{FF2B5EF4-FFF2-40B4-BE49-F238E27FC236}">
-                <a16:creationId xmlns:a16="http://schemas.microsoft.com/office/drawing/2014/main" xmlns="" id="{BF3044E7-A5B7-4A07-961E-E68CAB803975}"/>
+                <a16:creationId xmlns:a16="http://schemas.microsoft.com/office/drawing/2014/main" id="{BF3044E7-A5B7-4A07-961E-E68CAB803975}"/>
               </a:ext>
             </a:extLst>
           </p:cNvPr>
@@ -13345,7 +13331,7 @@
           <p:cNvPr id="17" name="Straight Arrow Connector 16">
             <a:extLst>
               <a:ext uri="{FF2B5EF4-FFF2-40B4-BE49-F238E27FC236}">
-                <a16:creationId xmlns:a16="http://schemas.microsoft.com/office/drawing/2014/main" xmlns="" id="{C33C07FC-3B05-4751-8311-C0BB8D401CF2}"/>
+                <a16:creationId xmlns:a16="http://schemas.microsoft.com/office/drawing/2014/main" id="{C33C07FC-3B05-4751-8311-C0BB8D401CF2}"/>
               </a:ext>
             </a:extLst>
           </p:cNvPr>
@@ -13387,7 +13373,7 @@
           <p:cNvPr id="24" name="Picture 23">
             <a:extLst>
               <a:ext uri="{FF2B5EF4-FFF2-40B4-BE49-F238E27FC236}">
-                <a16:creationId xmlns:a16="http://schemas.microsoft.com/office/drawing/2014/main" xmlns="" id="{D9020B09-C104-4E53-974D-69D8B7D4BE37}"/>
+                <a16:creationId xmlns:a16="http://schemas.microsoft.com/office/drawing/2014/main" id="{D9020B09-C104-4E53-974D-69D8B7D4BE37}"/>
               </a:ext>
             </a:extLst>
           </p:cNvPr>
@@ -13447,7 +13433,7 @@
           <p:cNvPr id="4" name="Rectangle: Rounded Corners 3">
             <a:extLst>
               <a:ext uri="{FF2B5EF4-FFF2-40B4-BE49-F238E27FC236}">
-                <a16:creationId xmlns:a16="http://schemas.microsoft.com/office/drawing/2014/main" xmlns="" id="{931935EF-4B24-4A4B-A0CE-717A116F8277}"/>
+                <a16:creationId xmlns:a16="http://schemas.microsoft.com/office/drawing/2014/main" id="{931935EF-4B24-4A4B-A0CE-717A116F8277}"/>
               </a:ext>
             </a:extLst>
           </p:cNvPr>
@@ -13514,7 +13500,7 @@
           <p:cNvPr id="5" name="Rectangle: Rounded Corners 4">
             <a:extLst>
               <a:ext uri="{FF2B5EF4-FFF2-40B4-BE49-F238E27FC236}">
-                <a16:creationId xmlns:a16="http://schemas.microsoft.com/office/drawing/2014/main" xmlns="" id="{FC799F79-4A3A-433C-8CE5-6B92E575C055}"/>
+                <a16:creationId xmlns:a16="http://schemas.microsoft.com/office/drawing/2014/main" id="{FC799F79-4A3A-433C-8CE5-6B92E575C055}"/>
               </a:ext>
             </a:extLst>
           </p:cNvPr>
@@ -13587,7 +13573,7 @@
           <p:cNvPr id="6" name="Cylinder 5">
             <a:extLst>
               <a:ext uri="{FF2B5EF4-FFF2-40B4-BE49-F238E27FC236}">
-                <a16:creationId xmlns:a16="http://schemas.microsoft.com/office/drawing/2014/main" xmlns="" id="{5B965750-0088-43BC-BFF5-C3BEAA1D0D5E}"/>
+                <a16:creationId xmlns:a16="http://schemas.microsoft.com/office/drawing/2014/main" id="{5B965750-0088-43BC-BFF5-C3BEAA1D0D5E}"/>
               </a:ext>
             </a:extLst>
           </p:cNvPr>
@@ -13695,7 +13681,7 @@
           <p:cNvPr id="11" name="Rectangle 10">
             <a:extLst>
               <a:ext uri="{FF2B5EF4-FFF2-40B4-BE49-F238E27FC236}">
-                <a16:creationId xmlns:a16="http://schemas.microsoft.com/office/drawing/2014/main" xmlns="" id="{219C2D64-FD9A-465C-A669-D67365709EE0}"/>
+                <a16:creationId xmlns:a16="http://schemas.microsoft.com/office/drawing/2014/main" id="{219C2D64-FD9A-465C-A669-D67365709EE0}"/>
               </a:ext>
             </a:extLst>
           </p:cNvPr>
@@ -13744,7 +13730,7 @@
           <p:cNvPr id="3" name="Straight Arrow Connector 2">
             <a:extLst>
               <a:ext uri="{FF2B5EF4-FFF2-40B4-BE49-F238E27FC236}">
-                <a16:creationId xmlns:a16="http://schemas.microsoft.com/office/drawing/2014/main" xmlns="" id="{DF8F3A29-758B-476C-8C42-DE565A01CAEF}"/>
+                <a16:creationId xmlns:a16="http://schemas.microsoft.com/office/drawing/2014/main" id="{DF8F3A29-758B-476C-8C42-DE565A01CAEF}"/>
               </a:ext>
             </a:extLst>
           </p:cNvPr>
@@ -13784,7 +13770,7 @@
           <p:cNvPr id="9" name="Straight Arrow Connector 8">
             <a:extLst>
               <a:ext uri="{FF2B5EF4-FFF2-40B4-BE49-F238E27FC236}">
-                <a16:creationId xmlns:a16="http://schemas.microsoft.com/office/drawing/2014/main" xmlns="" id="{269CD424-34DA-409C-9C85-4FAD10A8D38E}"/>
+                <a16:creationId xmlns:a16="http://schemas.microsoft.com/office/drawing/2014/main" id="{269CD424-34DA-409C-9C85-4FAD10A8D38E}"/>
               </a:ext>
             </a:extLst>
           </p:cNvPr>
@@ -13824,7 +13810,7 @@
           <p:cNvPr id="13" name="Picture 12">
             <a:extLst>
               <a:ext uri="{FF2B5EF4-FFF2-40B4-BE49-F238E27FC236}">
-                <a16:creationId xmlns:a16="http://schemas.microsoft.com/office/drawing/2014/main" xmlns="" id="{15E67021-0F30-482C-9912-38D476FC940C}"/>
+                <a16:creationId xmlns:a16="http://schemas.microsoft.com/office/drawing/2014/main" id="{15E67021-0F30-482C-9912-38D476FC940C}"/>
               </a:ext>
             </a:extLst>
           </p:cNvPr>
@@ -13853,7 +13839,7 @@
           <p:cNvPr id="14" name="TextBox 13">
             <a:extLst>
               <a:ext uri="{FF2B5EF4-FFF2-40B4-BE49-F238E27FC236}">
-                <a16:creationId xmlns:a16="http://schemas.microsoft.com/office/drawing/2014/main" xmlns="" id="{78636269-4EB7-46E4-A072-A44B12FF49DF}"/>
+                <a16:creationId xmlns:a16="http://schemas.microsoft.com/office/drawing/2014/main" id="{78636269-4EB7-46E4-A072-A44B12FF49DF}"/>
               </a:ext>
             </a:extLst>
           </p:cNvPr>
@@ -13888,7 +13874,7 @@
           <p:cNvPr id="17" name="TextBox 16">
             <a:extLst>
               <a:ext uri="{FF2B5EF4-FFF2-40B4-BE49-F238E27FC236}">
-                <a16:creationId xmlns:a16="http://schemas.microsoft.com/office/drawing/2014/main" xmlns="" id="{328306F1-4026-4673-9E96-E8E7BFE7A04E}"/>
+                <a16:creationId xmlns:a16="http://schemas.microsoft.com/office/drawing/2014/main" id="{328306F1-4026-4673-9E96-E8E7BFE7A04E}"/>
               </a:ext>
             </a:extLst>
           </p:cNvPr>
@@ -13923,7 +13909,7 @@
           <p:cNvPr id="18" name="TextBox 17">
             <a:extLst>
               <a:ext uri="{FF2B5EF4-FFF2-40B4-BE49-F238E27FC236}">
-                <a16:creationId xmlns:a16="http://schemas.microsoft.com/office/drawing/2014/main" xmlns="" id="{395C4944-8975-4AC3-9757-20A982B00B8A}"/>
+                <a16:creationId xmlns:a16="http://schemas.microsoft.com/office/drawing/2014/main" id="{395C4944-8975-4AC3-9757-20A982B00B8A}"/>
               </a:ext>
             </a:extLst>
           </p:cNvPr>
@@ -13958,7 +13944,7 @@
           <p:cNvPr id="20" name="TextBox 19">
             <a:extLst>
               <a:ext uri="{FF2B5EF4-FFF2-40B4-BE49-F238E27FC236}">
-                <a16:creationId xmlns:a16="http://schemas.microsoft.com/office/drawing/2014/main" xmlns="" id="{AE379B20-B903-40D4-A590-E9E8FDD3AC63}"/>
+                <a16:creationId xmlns:a16="http://schemas.microsoft.com/office/drawing/2014/main" id="{AE379B20-B903-40D4-A590-E9E8FDD3AC63}"/>
               </a:ext>
             </a:extLst>
           </p:cNvPr>
@@ -14023,7 +14009,7 @@
           <p:cNvPr id="4" name="Rectangle 3">
             <a:extLst>
               <a:ext uri="{FF2B5EF4-FFF2-40B4-BE49-F238E27FC236}">
-                <a16:creationId xmlns:a16="http://schemas.microsoft.com/office/drawing/2014/main" xmlns="" id="{9DFED244-52E8-4809-B75F-ED4400492005}"/>
+                <a16:creationId xmlns:a16="http://schemas.microsoft.com/office/drawing/2014/main" id="{9DFED244-52E8-4809-B75F-ED4400492005}"/>
               </a:ext>
             </a:extLst>
           </p:cNvPr>
@@ -14061,32 +14047,14 @@
           <a:p>
             <a:pPr algn="ctr"/>
             <a:r>
-              <a:rPr lang="en-NZ" sz="1000" dirty="0" smtClean="0"/>
+              <a:rPr lang="en-NZ" sz="1000" dirty="0"/>
               <a:t>BBD-V </a:t>
             </a:r>
             <a:r>
               <a:rPr lang="en-NZ" sz="1000" dirty="0">
                 <a:latin typeface="Times New Roman" panose="02020603050405020304" pitchFamily="18" charset="0"/>
               </a:rPr>
-              <a:t>P</a:t>
-            </a:r>
-            <a:r>
-              <a:rPr lang="en-NZ" sz="1000" dirty="0" smtClean="0">
-                <a:latin typeface="Times New Roman" panose="02020603050405020304" pitchFamily="18" charset="0"/>
-              </a:rPr>
-              <a:t>rocess </a:t>
-            </a:r>
-            <a:r>
-              <a:rPr lang="en-NZ" sz="1000" dirty="0">
-                <a:latin typeface="Times New Roman" panose="02020603050405020304" pitchFamily="18" charset="0"/>
-              </a:rPr>
-              <a:t>S</a:t>
-            </a:r>
-            <a:r>
-              <a:rPr lang="en-NZ" sz="1000" dirty="0" smtClean="0">
-                <a:latin typeface="Times New Roman" panose="02020603050405020304" pitchFamily="18" charset="0"/>
-              </a:rPr>
-              <a:t>tructure</a:t>
+              <a:t>Process Structure</a:t>
             </a:r>
             <a:endParaRPr lang="en-NZ" sz="1000" dirty="0"/>
           </a:p>
@@ -14097,7 +14065,7 @@
           <p:cNvPr id="7" name="Rectangle: Rounded Corners 6">
             <a:extLst>
               <a:ext uri="{FF2B5EF4-FFF2-40B4-BE49-F238E27FC236}">
-                <a16:creationId xmlns:a16="http://schemas.microsoft.com/office/drawing/2014/main" xmlns="" id="{7C08A71B-1411-4EE3-AE4B-8D5DD347F769}"/>
+                <a16:creationId xmlns:a16="http://schemas.microsoft.com/office/drawing/2014/main" id="{7C08A71B-1411-4EE3-AE4B-8D5DD347F769}"/>
               </a:ext>
             </a:extLst>
           </p:cNvPr>
@@ -14144,7 +14112,7 @@
           <p:cNvPr id="8" name="Rectangle: Rounded Corners 7">
             <a:extLst>
               <a:ext uri="{FF2B5EF4-FFF2-40B4-BE49-F238E27FC236}">
-                <a16:creationId xmlns:a16="http://schemas.microsoft.com/office/drawing/2014/main" xmlns="" id="{D5374CF4-929F-4CAB-9B5D-10B67F40CE8D}"/>
+                <a16:creationId xmlns:a16="http://schemas.microsoft.com/office/drawing/2014/main" id="{D5374CF4-929F-4CAB-9B5D-10B67F40CE8D}"/>
               </a:ext>
             </a:extLst>
           </p:cNvPr>
@@ -14191,7 +14159,7 @@
           <p:cNvPr id="9" name="Cylinder 8">
             <a:extLst>
               <a:ext uri="{FF2B5EF4-FFF2-40B4-BE49-F238E27FC236}">
-                <a16:creationId xmlns:a16="http://schemas.microsoft.com/office/drawing/2014/main" xmlns="" id="{A551F6D2-674D-4E92-8914-BF9E951E92E8}"/>
+                <a16:creationId xmlns:a16="http://schemas.microsoft.com/office/drawing/2014/main" id="{A551F6D2-674D-4E92-8914-BF9E951E92E8}"/>
               </a:ext>
             </a:extLst>
           </p:cNvPr>
@@ -14238,7 +14206,7 @@
           <p:cNvPr id="11" name="Cylinder 10">
             <a:extLst>
               <a:ext uri="{FF2B5EF4-FFF2-40B4-BE49-F238E27FC236}">
-                <a16:creationId xmlns:a16="http://schemas.microsoft.com/office/drawing/2014/main" xmlns="" id="{CE816A97-1EE5-4F37-8493-BA6499C37947}"/>
+                <a16:creationId xmlns:a16="http://schemas.microsoft.com/office/drawing/2014/main" id="{CE816A97-1EE5-4F37-8493-BA6499C37947}"/>
               </a:ext>
             </a:extLst>
           </p:cNvPr>
@@ -14285,7 +14253,7 @@
           <p:cNvPr id="2" name="Rectangle: Rounded Corners 1">
             <a:extLst>
               <a:ext uri="{FF2B5EF4-FFF2-40B4-BE49-F238E27FC236}">
-                <a16:creationId xmlns:a16="http://schemas.microsoft.com/office/drawing/2014/main" xmlns="" id="{4866540B-DD02-4DF0-8DF0-C8EAA4991E68}"/>
+                <a16:creationId xmlns:a16="http://schemas.microsoft.com/office/drawing/2014/main" id="{4866540B-DD02-4DF0-8DF0-C8EAA4991E68}"/>
               </a:ext>
             </a:extLst>
           </p:cNvPr>
@@ -14321,10 +14289,9 @@
           <a:p>
             <a:pPr algn="ctr"/>
             <a:r>
-              <a:rPr lang="en-NZ" sz="1000" dirty="0" smtClean="0"/>
+              <a:rPr lang="en-NZ" sz="1000" dirty="0"/>
               <a:t>Cache manager</a:t>
             </a:r>
-            <a:endParaRPr lang="en-NZ" sz="1000" dirty="0"/>
           </a:p>
         </p:txBody>
       </p:sp>
@@ -14333,7 +14300,7 @@
           <p:cNvPr id="3" name="Cylinder 2">
             <a:extLst>
               <a:ext uri="{FF2B5EF4-FFF2-40B4-BE49-F238E27FC236}">
-                <a16:creationId xmlns:a16="http://schemas.microsoft.com/office/drawing/2014/main" xmlns="" id="{C223BCDC-BFA1-4DEE-B06A-9E1307B8712B}"/>
+                <a16:creationId xmlns:a16="http://schemas.microsoft.com/office/drawing/2014/main" id="{C223BCDC-BFA1-4DEE-B06A-9E1307B8712B}"/>
               </a:ext>
             </a:extLst>
           </p:cNvPr>
@@ -14380,7 +14347,7 @@
           <p:cNvPr id="18" name="Straight Arrow Connector 17">
             <a:extLst>
               <a:ext uri="{FF2B5EF4-FFF2-40B4-BE49-F238E27FC236}">
-                <a16:creationId xmlns:a16="http://schemas.microsoft.com/office/drawing/2014/main" xmlns="" id="{DF6B1600-238F-4E19-A8EB-B7E9A5C9CD9B}"/>
+                <a16:creationId xmlns:a16="http://schemas.microsoft.com/office/drawing/2014/main" id="{DF6B1600-238F-4E19-A8EB-B7E9A5C9CD9B}"/>
               </a:ext>
             </a:extLst>
           </p:cNvPr>
@@ -14420,7 +14387,7 @@
           <p:cNvPr id="21" name="Straight Arrow Connector 20">
             <a:extLst>
               <a:ext uri="{FF2B5EF4-FFF2-40B4-BE49-F238E27FC236}">
-                <a16:creationId xmlns:a16="http://schemas.microsoft.com/office/drawing/2014/main" xmlns="" id="{3D464D1C-5383-495B-9BA5-9B5C2991E05C}"/>
+                <a16:creationId xmlns:a16="http://schemas.microsoft.com/office/drawing/2014/main" id="{3D464D1C-5383-495B-9BA5-9B5C2991E05C}"/>
               </a:ext>
             </a:extLst>
           </p:cNvPr>
@@ -14460,7 +14427,7 @@
           <p:cNvPr id="23" name="Straight Arrow Connector 22">
             <a:extLst>
               <a:ext uri="{FF2B5EF4-FFF2-40B4-BE49-F238E27FC236}">
-                <a16:creationId xmlns:a16="http://schemas.microsoft.com/office/drawing/2014/main" xmlns="" id="{0C25ED3A-F864-4BF5-B145-CFF7B25DA952}"/>
+                <a16:creationId xmlns:a16="http://schemas.microsoft.com/office/drawing/2014/main" id="{0C25ED3A-F864-4BF5-B145-CFF7B25DA952}"/>
               </a:ext>
             </a:extLst>
           </p:cNvPr>
@@ -14500,7 +14467,7 @@
           <p:cNvPr id="25" name="Straight Arrow Connector 24">
             <a:extLst>
               <a:ext uri="{FF2B5EF4-FFF2-40B4-BE49-F238E27FC236}">
-                <a16:creationId xmlns:a16="http://schemas.microsoft.com/office/drawing/2014/main" xmlns="" id="{C30EDF9A-086E-4AAA-92EF-791A5D8DAAB4}"/>
+                <a16:creationId xmlns:a16="http://schemas.microsoft.com/office/drawing/2014/main" id="{C30EDF9A-086E-4AAA-92EF-791A5D8DAAB4}"/>
               </a:ext>
             </a:extLst>
           </p:cNvPr>
@@ -14540,7 +14507,7 @@
           <p:cNvPr id="27" name="Straight Arrow Connector 26">
             <a:extLst>
               <a:ext uri="{FF2B5EF4-FFF2-40B4-BE49-F238E27FC236}">
-                <a16:creationId xmlns:a16="http://schemas.microsoft.com/office/drawing/2014/main" xmlns="" id="{7880FB81-D807-4D75-AFC3-6DDFECF0B992}"/>
+                <a16:creationId xmlns:a16="http://schemas.microsoft.com/office/drawing/2014/main" id="{7880FB81-D807-4D75-AFC3-6DDFECF0B992}"/>
               </a:ext>
             </a:extLst>
           </p:cNvPr>
@@ -14582,7 +14549,7 @@
           <p:cNvPr id="30" name="Straight Arrow Connector 29">
             <a:extLst>
               <a:ext uri="{FF2B5EF4-FFF2-40B4-BE49-F238E27FC236}">
-                <a16:creationId xmlns:a16="http://schemas.microsoft.com/office/drawing/2014/main" xmlns="" id="{F2B18459-5D9E-4492-A855-F828ACA9AB3D}"/>
+                <a16:creationId xmlns:a16="http://schemas.microsoft.com/office/drawing/2014/main" id="{F2B18459-5D9E-4492-A855-F828ACA9AB3D}"/>
               </a:ext>
             </a:extLst>
           </p:cNvPr>
@@ -14622,7 +14589,7 @@
           <p:cNvPr id="32" name="Straight Arrow Connector 31">
             <a:extLst>
               <a:ext uri="{FF2B5EF4-FFF2-40B4-BE49-F238E27FC236}">
-                <a16:creationId xmlns:a16="http://schemas.microsoft.com/office/drawing/2014/main" xmlns="" id="{0F5352B0-3860-40D3-907E-5377DA0BD6C6}"/>
+                <a16:creationId xmlns:a16="http://schemas.microsoft.com/office/drawing/2014/main" id="{0F5352B0-3860-40D3-907E-5377DA0BD6C6}"/>
               </a:ext>
             </a:extLst>
           </p:cNvPr>
@@ -14662,7 +14629,7 @@
           <p:cNvPr id="34" name="Straight Arrow Connector 33">
             <a:extLst>
               <a:ext uri="{FF2B5EF4-FFF2-40B4-BE49-F238E27FC236}">
-                <a16:creationId xmlns:a16="http://schemas.microsoft.com/office/drawing/2014/main" xmlns="" id="{826D8979-EC75-446E-B6F7-2E1AF58CE4F5}"/>
+                <a16:creationId xmlns:a16="http://schemas.microsoft.com/office/drawing/2014/main" id="{826D8979-EC75-446E-B6F7-2E1AF58CE4F5}"/>
               </a:ext>
             </a:extLst>
           </p:cNvPr>
@@ -14702,7 +14669,7 @@
           <p:cNvPr id="36" name="Straight Arrow Connector 35">
             <a:extLst>
               <a:ext uri="{FF2B5EF4-FFF2-40B4-BE49-F238E27FC236}">
-                <a16:creationId xmlns:a16="http://schemas.microsoft.com/office/drawing/2014/main" xmlns="" id="{A8E6970C-77C4-49F3-B6C0-0898CD1E7510}"/>
+                <a16:creationId xmlns:a16="http://schemas.microsoft.com/office/drawing/2014/main" id="{A8E6970C-77C4-49F3-B6C0-0898CD1E7510}"/>
               </a:ext>
             </a:extLst>
           </p:cNvPr>
@@ -14742,7 +14709,7 @@
           <p:cNvPr id="38" name="Straight Arrow Connector 37">
             <a:extLst>
               <a:ext uri="{FF2B5EF4-FFF2-40B4-BE49-F238E27FC236}">
-                <a16:creationId xmlns:a16="http://schemas.microsoft.com/office/drawing/2014/main" xmlns="" id="{79D43142-ACDD-449E-9613-05F86547ADCE}"/>
+                <a16:creationId xmlns:a16="http://schemas.microsoft.com/office/drawing/2014/main" id="{79D43142-ACDD-449E-9613-05F86547ADCE}"/>
               </a:ext>
             </a:extLst>
           </p:cNvPr>
@@ -14782,7 +14749,7 @@
           <p:cNvPr id="40" name="Straight Arrow Connector 39">
             <a:extLst>
               <a:ext uri="{FF2B5EF4-FFF2-40B4-BE49-F238E27FC236}">
-                <a16:creationId xmlns:a16="http://schemas.microsoft.com/office/drawing/2014/main" xmlns="" id="{3AF73AAE-F56E-4190-9545-99F14F990A53}"/>
+                <a16:creationId xmlns:a16="http://schemas.microsoft.com/office/drawing/2014/main" id="{3AF73AAE-F56E-4190-9545-99F14F990A53}"/>
               </a:ext>
             </a:extLst>
           </p:cNvPr>
@@ -14822,7 +14789,7 @@
           <p:cNvPr id="41" name="Picture 40">
             <a:extLst>
               <a:ext uri="{FF2B5EF4-FFF2-40B4-BE49-F238E27FC236}">
-                <a16:creationId xmlns:a16="http://schemas.microsoft.com/office/drawing/2014/main" xmlns="" id="{2CAE1DC4-B1BC-4C1F-8974-800534BF0A4E}"/>
+                <a16:creationId xmlns:a16="http://schemas.microsoft.com/office/drawing/2014/main" id="{2CAE1DC4-B1BC-4C1F-8974-800534BF0A4E}"/>
               </a:ext>
             </a:extLst>
           </p:cNvPr>
@@ -14851,7 +14818,7 @@
           <p:cNvPr id="45" name="TextBox 44">
             <a:extLst>
               <a:ext uri="{FF2B5EF4-FFF2-40B4-BE49-F238E27FC236}">
-                <a16:creationId xmlns:a16="http://schemas.microsoft.com/office/drawing/2014/main" xmlns="" id="{29102D08-6BCB-4548-BB84-0AF5F7EA522B}"/>
+                <a16:creationId xmlns:a16="http://schemas.microsoft.com/office/drawing/2014/main" id="{29102D08-6BCB-4548-BB84-0AF5F7EA522B}"/>
               </a:ext>
             </a:extLst>
           </p:cNvPr>
@@ -14886,7 +14853,7 @@
           <p:cNvPr id="46" name="Rectangle 45">
             <a:extLst>
               <a:ext uri="{FF2B5EF4-FFF2-40B4-BE49-F238E27FC236}">
-                <a16:creationId xmlns:a16="http://schemas.microsoft.com/office/drawing/2014/main" xmlns="" id="{7B5DAA12-0D24-4AD9-8181-48E283594CEB}"/>
+                <a16:creationId xmlns:a16="http://schemas.microsoft.com/office/drawing/2014/main" id="{7B5DAA12-0D24-4AD9-8181-48E283594CEB}"/>
               </a:ext>
             </a:extLst>
           </p:cNvPr>
@@ -14937,7 +14904,7 @@
           <p:cNvPr id="47" name="Rectangle 46">
             <a:extLst>
               <a:ext uri="{FF2B5EF4-FFF2-40B4-BE49-F238E27FC236}">
-                <a16:creationId xmlns:a16="http://schemas.microsoft.com/office/drawing/2014/main" xmlns="" id="{BEA5E0F7-BA7F-4C7E-847E-8CE35241D860}"/>
+                <a16:creationId xmlns:a16="http://schemas.microsoft.com/office/drawing/2014/main" id="{BEA5E0F7-BA7F-4C7E-847E-8CE35241D860}"/>
               </a:ext>
             </a:extLst>
           </p:cNvPr>
@@ -14988,7 +14955,7 @@
           <p:cNvPr id="48" name="Rectangle 47">
             <a:extLst>
               <a:ext uri="{FF2B5EF4-FFF2-40B4-BE49-F238E27FC236}">
-                <a16:creationId xmlns:a16="http://schemas.microsoft.com/office/drawing/2014/main" xmlns="" id="{F869EA7D-FFCC-43DD-B255-3295D95C7CA3}"/>
+                <a16:creationId xmlns:a16="http://schemas.microsoft.com/office/drawing/2014/main" id="{F869EA7D-FFCC-43DD-B255-3295D95C7CA3}"/>
               </a:ext>
             </a:extLst>
           </p:cNvPr>
@@ -15039,7 +15006,7 @@
           <p:cNvPr id="49" name="Rectangle 48">
             <a:extLst>
               <a:ext uri="{FF2B5EF4-FFF2-40B4-BE49-F238E27FC236}">
-                <a16:creationId xmlns:a16="http://schemas.microsoft.com/office/drawing/2014/main" xmlns="" id="{396A49E8-66AB-41A1-BF12-4E2EE0C979B3}"/>
+                <a16:creationId xmlns:a16="http://schemas.microsoft.com/office/drawing/2014/main" id="{396A49E8-66AB-41A1-BF12-4E2EE0C979B3}"/>
               </a:ext>
             </a:extLst>
           </p:cNvPr>
@@ -15120,7 +15087,7 @@
           <p:cNvPr id="4" name="Rectangle 3">
             <a:extLst>
               <a:ext uri="{FF2B5EF4-FFF2-40B4-BE49-F238E27FC236}">
-                <a16:creationId xmlns:a16="http://schemas.microsoft.com/office/drawing/2014/main" xmlns="" id="{9DFED244-52E8-4809-B75F-ED4400492005}"/>
+                <a16:creationId xmlns:a16="http://schemas.microsoft.com/office/drawing/2014/main" id="{9DFED244-52E8-4809-B75F-ED4400492005}"/>
               </a:ext>
             </a:extLst>
           </p:cNvPr>
@@ -15158,20 +15125,14 @@
           <a:p>
             <a:pPr algn="ctr"/>
             <a:r>
-              <a:rPr lang="en-NZ" sz="1000" dirty="0" smtClean="0"/>
+              <a:rPr lang="en-NZ" sz="1000" dirty="0"/>
               <a:t>BBD-Ops </a:t>
-            </a:r>
-            <a:r>
-              <a:rPr lang="en-NZ" sz="1000" dirty="0" smtClean="0">
-                <a:latin typeface="Times New Roman" panose="02020603050405020304" pitchFamily="18" charset="0"/>
-              </a:rPr>
-              <a:t>Process </a:t>
             </a:r>
             <a:r>
               <a:rPr lang="en-NZ" sz="1000" dirty="0">
                 <a:latin typeface="Times New Roman" panose="02020603050405020304" pitchFamily="18" charset="0"/>
               </a:rPr>
-              <a:t>Structure</a:t>
+              <a:t>Process Structure</a:t>
             </a:r>
             <a:endParaRPr lang="en-NZ" sz="1000" dirty="0"/>
           </a:p>
@@ -15182,7 +15143,7 @@
           <p:cNvPr id="9" name="Cylinder 8">
             <a:extLst>
               <a:ext uri="{FF2B5EF4-FFF2-40B4-BE49-F238E27FC236}">
-                <a16:creationId xmlns:a16="http://schemas.microsoft.com/office/drawing/2014/main" xmlns="" id="{A551F6D2-674D-4E92-8914-BF9E951E92E8}"/>
+                <a16:creationId xmlns:a16="http://schemas.microsoft.com/office/drawing/2014/main" id="{A551F6D2-674D-4E92-8914-BF9E951E92E8}"/>
               </a:ext>
             </a:extLst>
           </p:cNvPr>
@@ -15229,7 +15190,7 @@
           <p:cNvPr id="13" name="Cylinder 12">
             <a:extLst>
               <a:ext uri="{FF2B5EF4-FFF2-40B4-BE49-F238E27FC236}">
-                <a16:creationId xmlns:a16="http://schemas.microsoft.com/office/drawing/2014/main" xmlns="" id="{93B56DEC-DB97-41F2-996F-46147BF59DE1}"/>
+                <a16:creationId xmlns:a16="http://schemas.microsoft.com/office/drawing/2014/main" id="{93B56DEC-DB97-41F2-996F-46147BF59DE1}"/>
               </a:ext>
             </a:extLst>
           </p:cNvPr>
@@ -15276,7 +15237,7 @@
           <p:cNvPr id="15" name="Rectangle: Rounded Corners 14">
             <a:extLst>
               <a:ext uri="{FF2B5EF4-FFF2-40B4-BE49-F238E27FC236}">
-                <a16:creationId xmlns:a16="http://schemas.microsoft.com/office/drawing/2014/main" xmlns="" id="{74F8FC9F-7A40-4DCC-A5A1-86B7F03AE06A}"/>
+                <a16:creationId xmlns:a16="http://schemas.microsoft.com/office/drawing/2014/main" id="{74F8FC9F-7A40-4DCC-A5A1-86B7F03AE06A}"/>
               </a:ext>
             </a:extLst>
           </p:cNvPr>
@@ -15323,7 +15284,7 @@
           <p:cNvPr id="16" name="Rectangle: Rounded Corners 15">
             <a:extLst>
               <a:ext uri="{FF2B5EF4-FFF2-40B4-BE49-F238E27FC236}">
-                <a16:creationId xmlns:a16="http://schemas.microsoft.com/office/drawing/2014/main" xmlns="" id="{62B78257-3AF6-401B-89D4-D5E298E6D255}"/>
+                <a16:creationId xmlns:a16="http://schemas.microsoft.com/office/drawing/2014/main" id="{62B78257-3AF6-401B-89D4-D5E298E6D255}"/>
               </a:ext>
             </a:extLst>
           </p:cNvPr>
@@ -15370,7 +15331,7 @@
           <p:cNvPr id="17" name="Rectangle: Rounded Corners 16">
             <a:extLst>
               <a:ext uri="{FF2B5EF4-FFF2-40B4-BE49-F238E27FC236}">
-                <a16:creationId xmlns:a16="http://schemas.microsoft.com/office/drawing/2014/main" xmlns="" id="{44F76A74-1D9E-4356-AC28-F5500A72C4BF}"/>
+                <a16:creationId xmlns:a16="http://schemas.microsoft.com/office/drawing/2014/main" id="{44F76A74-1D9E-4356-AC28-F5500A72C4BF}"/>
               </a:ext>
             </a:extLst>
           </p:cNvPr>
@@ -15417,7 +15378,7 @@
           <p:cNvPr id="18" name="Cylinder 17">
             <a:extLst>
               <a:ext uri="{FF2B5EF4-FFF2-40B4-BE49-F238E27FC236}">
-                <a16:creationId xmlns:a16="http://schemas.microsoft.com/office/drawing/2014/main" xmlns="" id="{29E1480B-5734-44AE-AD89-D3AE39D6DF74}"/>
+                <a16:creationId xmlns:a16="http://schemas.microsoft.com/office/drawing/2014/main" id="{29E1480B-5734-44AE-AD89-D3AE39D6DF74}"/>
               </a:ext>
             </a:extLst>
           </p:cNvPr>
@@ -15464,7 +15425,7 @@
           <p:cNvPr id="20" name="Cylinder 19">
             <a:extLst>
               <a:ext uri="{FF2B5EF4-FFF2-40B4-BE49-F238E27FC236}">
-                <a16:creationId xmlns:a16="http://schemas.microsoft.com/office/drawing/2014/main" xmlns="" id="{5B6DD37E-1AA2-4D23-8091-9A2CFB35D1CC}"/>
+                <a16:creationId xmlns:a16="http://schemas.microsoft.com/office/drawing/2014/main" id="{5B6DD37E-1AA2-4D23-8091-9A2CFB35D1CC}"/>
               </a:ext>
             </a:extLst>
           </p:cNvPr>
@@ -15511,7 +15472,7 @@
           <p:cNvPr id="21" name="Cylinder 20">
             <a:extLst>
               <a:ext uri="{FF2B5EF4-FFF2-40B4-BE49-F238E27FC236}">
-                <a16:creationId xmlns:a16="http://schemas.microsoft.com/office/drawing/2014/main" xmlns="" id="{D63384A5-4478-499E-BDE0-7FB159EA3ACE}"/>
+                <a16:creationId xmlns:a16="http://schemas.microsoft.com/office/drawing/2014/main" id="{D63384A5-4478-499E-BDE0-7FB159EA3ACE}"/>
               </a:ext>
             </a:extLst>
           </p:cNvPr>
@@ -15558,7 +15519,7 @@
           <p:cNvPr id="22" name="Cylinder 21">
             <a:extLst>
               <a:ext uri="{FF2B5EF4-FFF2-40B4-BE49-F238E27FC236}">
-                <a16:creationId xmlns:a16="http://schemas.microsoft.com/office/drawing/2014/main" xmlns="" id="{F0F0E39A-E02D-4116-982A-76847EEA575F}"/>
+                <a16:creationId xmlns:a16="http://schemas.microsoft.com/office/drawing/2014/main" id="{F0F0E39A-E02D-4116-982A-76847EEA575F}"/>
               </a:ext>
             </a:extLst>
           </p:cNvPr>
@@ -15605,7 +15566,7 @@
           <p:cNvPr id="24" name="Straight Arrow Connector 23">
             <a:extLst>
               <a:ext uri="{FF2B5EF4-FFF2-40B4-BE49-F238E27FC236}">
-                <a16:creationId xmlns:a16="http://schemas.microsoft.com/office/drawing/2014/main" xmlns="" id="{673D19CF-EC23-4A07-8751-88F893732E35}"/>
+                <a16:creationId xmlns:a16="http://schemas.microsoft.com/office/drawing/2014/main" id="{673D19CF-EC23-4A07-8751-88F893732E35}"/>
               </a:ext>
             </a:extLst>
           </p:cNvPr>
@@ -15645,7 +15606,7 @@
           <p:cNvPr id="11" name="Cylinder 10">
             <a:extLst>
               <a:ext uri="{FF2B5EF4-FFF2-40B4-BE49-F238E27FC236}">
-                <a16:creationId xmlns:a16="http://schemas.microsoft.com/office/drawing/2014/main" xmlns="" id="{CE816A97-1EE5-4F37-8493-BA6499C37947}"/>
+                <a16:creationId xmlns:a16="http://schemas.microsoft.com/office/drawing/2014/main" id="{CE816A97-1EE5-4F37-8493-BA6499C37947}"/>
               </a:ext>
             </a:extLst>
           </p:cNvPr>
@@ -15692,7 +15653,7 @@
           <p:cNvPr id="14" name="Cylinder 13">
             <a:extLst>
               <a:ext uri="{FF2B5EF4-FFF2-40B4-BE49-F238E27FC236}">
-                <a16:creationId xmlns:a16="http://schemas.microsoft.com/office/drawing/2014/main" xmlns="" id="{DDD8AEEE-C02C-47C8-8A0F-428030F5B21A}"/>
+                <a16:creationId xmlns:a16="http://schemas.microsoft.com/office/drawing/2014/main" id="{DDD8AEEE-C02C-47C8-8A0F-428030F5B21A}"/>
               </a:ext>
             </a:extLst>
           </p:cNvPr>
@@ -15739,7 +15700,7 @@
           <p:cNvPr id="26" name="Straight Arrow Connector 25">
             <a:extLst>
               <a:ext uri="{FF2B5EF4-FFF2-40B4-BE49-F238E27FC236}">
-                <a16:creationId xmlns:a16="http://schemas.microsoft.com/office/drawing/2014/main" xmlns="" id="{87417CD4-9C70-4786-ABDE-BC79569BD2AC}"/>
+                <a16:creationId xmlns:a16="http://schemas.microsoft.com/office/drawing/2014/main" id="{87417CD4-9C70-4786-ABDE-BC79569BD2AC}"/>
               </a:ext>
             </a:extLst>
           </p:cNvPr>
@@ -15779,7 +15740,7 @@
           <p:cNvPr id="8" name="Rectangle: Rounded Corners 7">
             <a:extLst>
               <a:ext uri="{FF2B5EF4-FFF2-40B4-BE49-F238E27FC236}">
-                <a16:creationId xmlns:a16="http://schemas.microsoft.com/office/drawing/2014/main" xmlns="" id="{D5374CF4-929F-4CAB-9B5D-10B67F40CE8D}"/>
+                <a16:creationId xmlns:a16="http://schemas.microsoft.com/office/drawing/2014/main" id="{D5374CF4-929F-4CAB-9B5D-10B67F40CE8D}"/>
               </a:ext>
             </a:extLst>
           </p:cNvPr>
@@ -15826,7 +15787,7 @@
           <p:cNvPr id="19" name="Cylinder 18">
             <a:extLst>
               <a:ext uri="{FF2B5EF4-FFF2-40B4-BE49-F238E27FC236}">
-                <a16:creationId xmlns:a16="http://schemas.microsoft.com/office/drawing/2014/main" xmlns="" id="{DE55A987-340B-41C3-80C0-F5DEE2383E48}"/>
+                <a16:creationId xmlns:a16="http://schemas.microsoft.com/office/drawing/2014/main" id="{DE55A987-340B-41C3-80C0-F5DEE2383E48}"/>
               </a:ext>
             </a:extLst>
           </p:cNvPr>
@@ -15873,7 +15834,7 @@
           <p:cNvPr id="28" name="Straight Arrow Connector 27">
             <a:extLst>
               <a:ext uri="{FF2B5EF4-FFF2-40B4-BE49-F238E27FC236}">
-                <a16:creationId xmlns:a16="http://schemas.microsoft.com/office/drawing/2014/main" xmlns="" id="{187657F3-E420-45CE-867D-4DDE8FC760F2}"/>
+                <a16:creationId xmlns:a16="http://schemas.microsoft.com/office/drawing/2014/main" id="{187657F3-E420-45CE-867D-4DDE8FC760F2}"/>
               </a:ext>
             </a:extLst>
           </p:cNvPr>
@@ -15913,7 +15874,7 @@
           <p:cNvPr id="30" name="Straight Arrow Connector 29">
             <a:extLst>
               <a:ext uri="{FF2B5EF4-FFF2-40B4-BE49-F238E27FC236}">
-                <a16:creationId xmlns:a16="http://schemas.microsoft.com/office/drawing/2014/main" xmlns="" id="{E564999F-8184-4473-B374-993D5F5FDD1C}"/>
+                <a16:creationId xmlns:a16="http://schemas.microsoft.com/office/drawing/2014/main" id="{E564999F-8184-4473-B374-993D5F5FDD1C}"/>
               </a:ext>
             </a:extLst>
           </p:cNvPr>
@@ -15953,7 +15914,7 @@
           <p:cNvPr id="32" name="Straight Arrow Connector 31">
             <a:extLst>
               <a:ext uri="{FF2B5EF4-FFF2-40B4-BE49-F238E27FC236}">
-                <a16:creationId xmlns:a16="http://schemas.microsoft.com/office/drawing/2014/main" xmlns="" id="{08087081-86F3-42BE-B268-B0A170F2CFF5}"/>
+                <a16:creationId xmlns:a16="http://schemas.microsoft.com/office/drawing/2014/main" id="{08087081-86F3-42BE-B268-B0A170F2CFF5}"/>
               </a:ext>
             </a:extLst>
           </p:cNvPr>
@@ -15993,7 +15954,7 @@
           <p:cNvPr id="34" name="Straight Arrow Connector 33">
             <a:extLst>
               <a:ext uri="{FF2B5EF4-FFF2-40B4-BE49-F238E27FC236}">
-                <a16:creationId xmlns:a16="http://schemas.microsoft.com/office/drawing/2014/main" xmlns="" id="{F1A86E70-CE0F-48E6-B1F4-AA36D3631FCD}"/>
+                <a16:creationId xmlns:a16="http://schemas.microsoft.com/office/drawing/2014/main" id="{F1A86E70-CE0F-48E6-B1F4-AA36D3631FCD}"/>
               </a:ext>
             </a:extLst>
           </p:cNvPr>
@@ -16033,7 +15994,7 @@
           <p:cNvPr id="36" name="Straight Arrow Connector 35">
             <a:extLst>
               <a:ext uri="{FF2B5EF4-FFF2-40B4-BE49-F238E27FC236}">
-                <a16:creationId xmlns:a16="http://schemas.microsoft.com/office/drawing/2014/main" xmlns="" id="{8F5D5F97-BF3C-45D1-A07E-E91C6AA550F8}"/>
+                <a16:creationId xmlns:a16="http://schemas.microsoft.com/office/drawing/2014/main" id="{8F5D5F97-BF3C-45D1-A07E-E91C6AA550F8}"/>
               </a:ext>
             </a:extLst>
           </p:cNvPr>
@@ -16073,7 +16034,7 @@
           <p:cNvPr id="44" name="Cylinder 43">
             <a:extLst>
               <a:ext uri="{FF2B5EF4-FFF2-40B4-BE49-F238E27FC236}">
-                <a16:creationId xmlns:a16="http://schemas.microsoft.com/office/drawing/2014/main" xmlns="" id="{12156F7A-D6A4-4594-875F-62BF389121B9}"/>
+                <a16:creationId xmlns:a16="http://schemas.microsoft.com/office/drawing/2014/main" id="{12156F7A-D6A4-4594-875F-62BF389121B9}"/>
               </a:ext>
             </a:extLst>
           </p:cNvPr>
@@ -16120,7 +16081,7 @@
           <p:cNvPr id="47" name="Picture 46">
             <a:extLst>
               <a:ext uri="{FF2B5EF4-FFF2-40B4-BE49-F238E27FC236}">
-                <a16:creationId xmlns:a16="http://schemas.microsoft.com/office/drawing/2014/main" xmlns="" id="{06C09045-DF67-4F69-911D-221C532ED211}"/>
+                <a16:creationId xmlns:a16="http://schemas.microsoft.com/office/drawing/2014/main" id="{06C09045-DF67-4F69-911D-221C532ED211}"/>
               </a:ext>
             </a:extLst>
           </p:cNvPr>
@@ -16136,8 +16097,8 @@
         </p:blipFill>
         <p:spPr>
           <a:xfrm>
-            <a:off x="0" y="6085111"/>
-            <a:ext cx="1260000" cy="772889"/>
+            <a:off x="182487" y="5751371"/>
+            <a:ext cx="1798559" cy="1103243"/>
           </a:xfrm>
           <a:prstGeom prst="rect">
             <a:avLst/>
@@ -16149,7 +16110,7 @@
           <p:cNvPr id="49" name="Straight Arrow Connector 48">
             <a:extLst>
               <a:ext uri="{FF2B5EF4-FFF2-40B4-BE49-F238E27FC236}">
-                <a16:creationId xmlns:a16="http://schemas.microsoft.com/office/drawing/2014/main" xmlns="" id="{5A5352B8-62A2-4D53-ADD6-7EFAB1AD9E33}"/>
+                <a16:creationId xmlns:a16="http://schemas.microsoft.com/office/drawing/2014/main" id="{5A5352B8-62A2-4D53-ADD6-7EFAB1AD9E33}"/>
               </a:ext>
             </a:extLst>
           </p:cNvPr>
@@ -16189,7 +16150,7 @@
           <p:cNvPr id="50" name="Rectangle: Rounded Corners 49">
             <a:extLst>
               <a:ext uri="{FF2B5EF4-FFF2-40B4-BE49-F238E27FC236}">
-                <a16:creationId xmlns:a16="http://schemas.microsoft.com/office/drawing/2014/main" xmlns="" id="{F708FD0A-E5FB-4657-86D4-243B96733E77}"/>
+                <a16:creationId xmlns:a16="http://schemas.microsoft.com/office/drawing/2014/main" id="{F708FD0A-E5FB-4657-86D4-243B96733E77}"/>
               </a:ext>
             </a:extLst>
           </p:cNvPr>
@@ -16237,7 +16198,7 @@
           <p:cNvPr id="52" name="Straight Arrow Connector 51">
             <a:extLst>
               <a:ext uri="{FF2B5EF4-FFF2-40B4-BE49-F238E27FC236}">
-                <a16:creationId xmlns:a16="http://schemas.microsoft.com/office/drawing/2014/main" xmlns="" id="{E170022A-F8F8-4E39-96B5-14F460D83A59}"/>
+                <a16:creationId xmlns:a16="http://schemas.microsoft.com/office/drawing/2014/main" id="{E170022A-F8F8-4E39-96B5-14F460D83A59}"/>
               </a:ext>
             </a:extLst>
           </p:cNvPr>
@@ -16279,7 +16240,7 @@
           <p:cNvPr id="54" name="TextBox 53">
             <a:extLst>
               <a:ext uri="{FF2B5EF4-FFF2-40B4-BE49-F238E27FC236}">
-                <a16:creationId xmlns:a16="http://schemas.microsoft.com/office/drawing/2014/main" xmlns="" id="{8E6463D2-54F0-4E03-98D8-064FAD492325}"/>
+                <a16:creationId xmlns:a16="http://schemas.microsoft.com/office/drawing/2014/main" id="{8E6463D2-54F0-4E03-98D8-064FAD492325}"/>
               </a:ext>
             </a:extLst>
           </p:cNvPr>
@@ -16314,7 +16275,7 @@
           <p:cNvPr id="56" name="TextBox 55">
             <a:extLst>
               <a:ext uri="{FF2B5EF4-FFF2-40B4-BE49-F238E27FC236}">
-                <a16:creationId xmlns:a16="http://schemas.microsoft.com/office/drawing/2014/main" xmlns="" id="{46ECC4B4-EBEE-430D-8A60-43B517E6BDFC}"/>
+                <a16:creationId xmlns:a16="http://schemas.microsoft.com/office/drawing/2014/main" id="{46ECC4B4-EBEE-430D-8A60-43B517E6BDFC}"/>
               </a:ext>
             </a:extLst>
           </p:cNvPr>
@@ -16349,7 +16310,7 @@
           <p:cNvPr id="60" name="Straight Arrow Connector 59">
             <a:extLst>
               <a:ext uri="{FF2B5EF4-FFF2-40B4-BE49-F238E27FC236}">
-                <a16:creationId xmlns:a16="http://schemas.microsoft.com/office/drawing/2014/main" xmlns="" id="{11794D5F-3EF2-4066-9460-E71AB51355E5}"/>
+                <a16:creationId xmlns:a16="http://schemas.microsoft.com/office/drawing/2014/main" id="{11794D5F-3EF2-4066-9460-E71AB51355E5}"/>
               </a:ext>
             </a:extLst>
           </p:cNvPr>
@@ -16391,7 +16352,7 @@
           <p:cNvPr id="64" name="Straight Arrow Connector 63">
             <a:extLst>
               <a:ext uri="{FF2B5EF4-FFF2-40B4-BE49-F238E27FC236}">
-                <a16:creationId xmlns:a16="http://schemas.microsoft.com/office/drawing/2014/main" xmlns="" id="{4128FACC-4F96-4B7D-9F90-57FF8D7A59D3}"/>
+                <a16:creationId xmlns:a16="http://schemas.microsoft.com/office/drawing/2014/main" id="{4128FACC-4F96-4B7D-9F90-57FF8D7A59D3}"/>
               </a:ext>
             </a:extLst>
           </p:cNvPr>
@@ -16434,7 +16395,7 @@
           <p:cNvPr id="67" name="TextBox 66">
             <a:extLst>
               <a:ext uri="{FF2B5EF4-FFF2-40B4-BE49-F238E27FC236}">
-                <a16:creationId xmlns:a16="http://schemas.microsoft.com/office/drawing/2014/main" xmlns="" id="{AAE63017-3046-461D-86DD-A44D27003216}"/>
+                <a16:creationId xmlns:a16="http://schemas.microsoft.com/office/drawing/2014/main" id="{AAE63017-3046-461D-86DD-A44D27003216}"/>
               </a:ext>
             </a:extLst>
           </p:cNvPr>
@@ -16469,7 +16430,7 @@
           <p:cNvPr id="68" name="TextBox 67">
             <a:extLst>
               <a:ext uri="{FF2B5EF4-FFF2-40B4-BE49-F238E27FC236}">
-                <a16:creationId xmlns:a16="http://schemas.microsoft.com/office/drawing/2014/main" xmlns="" id="{2B591D8D-63AA-40AA-89CE-40007B2C4D39}"/>
+                <a16:creationId xmlns:a16="http://schemas.microsoft.com/office/drawing/2014/main" id="{2B591D8D-63AA-40AA-89CE-40007B2C4D39}"/>
               </a:ext>
             </a:extLst>
           </p:cNvPr>
@@ -16504,7 +16465,7 @@
           <p:cNvPr id="69" name="TextBox 68">
             <a:extLst>
               <a:ext uri="{FF2B5EF4-FFF2-40B4-BE49-F238E27FC236}">
-                <a16:creationId xmlns:a16="http://schemas.microsoft.com/office/drawing/2014/main" xmlns="" id="{83F3ABCC-4CBD-4550-B363-299E0850B0CA}"/>
+                <a16:creationId xmlns:a16="http://schemas.microsoft.com/office/drawing/2014/main" id="{83F3ABCC-4CBD-4550-B363-299E0850B0CA}"/>
               </a:ext>
             </a:extLst>
           </p:cNvPr>
@@ -16539,7 +16500,7 @@
           <p:cNvPr id="70" name="TextBox 69">
             <a:extLst>
               <a:ext uri="{FF2B5EF4-FFF2-40B4-BE49-F238E27FC236}">
-                <a16:creationId xmlns:a16="http://schemas.microsoft.com/office/drawing/2014/main" xmlns="" id="{5D5E89A2-3322-417A-AEB1-BA6E7D78B230}"/>
+                <a16:creationId xmlns:a16="http://schemas.microsoft.com/office/drawing/2014/main" id="{5D5E89A2-3322-417A-AEB1-BA6E7D78B230}"/>
               </a:ext>
             </a:extLst>
           </p:cNvPr>
@@ -16574,7 +16535,7 @@
           <p:cNvPr id="71" name="TextBox 70">
             <a:extLst>
               <a:ext uri="{FF2B5EF4-FFF2-40B4-BE49-F238E27FC236}">
-                <a16:creationId xmlns:a16="http://schemas.microsoft.com/office/drawing/2014/main" xmlns="" id="{FEB621EB-8640-4509-93EC-63E46CBF5FCB}"/>
+                <a16:creationId xmlns:a16="http://schemas.microsoft.com/office/drawing/2014/main" id="{FEB621EB-8640-4509-93EC-63E46CBF5FCB}"/>
               </a:ext>
             </a:extLst>
           </p:cNvPr>
@@ -16639,7 +16600,7 @@
           <p:cNvPr id="4" name="Rectangle 3">
             <a:extLst>
               <a:ext uri="{FF2B5EF4-FFF2-40B4-BE49-F238E27FC236}">
-                <a16:creationId xmlns:a16="http://schemas.microsoft.com/office/drawing/2014/main" xmlns="" id="{9DFED244-52E8-4809-B75F-ED4400492005}"/>
+                <a16:creationId xmlns:a16="http://schemas.microsoft.com/office/drawing/2014/main" id="{9DFED244-52E8-4809-B75F-ED4400492005}"/>
               </a:ext>
             </a:extLst>
           </p:cNvPr>
@@ -16677,16 +16638,10 @@
           <a:p>
             <a:pPr algn="ctr"/>
             <a:r>
-              <a:rPr lang="en-NZ" sz="1000" dirty="0" smtClean="0">
-                <a:latin typeface="Times New Roman" panose="02020603050405020304" pitchFamily="18" charset="0"/>
-              </a:rPr>
-              <a:t>BBD-M Process </a:t>
-            </a:r>
-            <a:r>
               <a:rPr lang="en-NZ" sz="1000" dirty="0">
                 <a:latin typeface="Times New Roman" panose="02020603050405020304" pitchFamily="18" charset="0"/>
               </a:rPr>
-              <a:t>Structure</a:t>
+              <a:t>BBD-M Process Structure</a:t>
             </a:r>
             <a:endParaRPr lang="en-NZ" sz="1000" dirty="0"/>
           </a:p>
@@ -16697,7 +16652,7 @@
           <p:cNvPr id="2" name="Cylinder 1">
             <a:extLst>
               <a:ext uri="{FF2B5EF4-FFF2-40B4-BE49-F238E27FC236}">
-                <a16:creationId xmlns:a16="http://schemas.microsoft.com/office/drawing/2014/main" xmlns="" id="{90C62F60-C796-4853-802D-40050DE253A8}"/>
+                <a16:creationId xmlns:a16="http://schemas.microsoft.com/office/drawing/2014/main" id="{90C62F60-C796-4853-802D-40050DE253A8}"/>
               </a:ext>
             </a:extLst>
           </p:cNvPr>
@@ -16744,7 +16699,7 @@
           <p:cNvPr id="23" name="Rectangle: Rounded Corners 22">
             <a:extLst>
               <a:ext uri="{FF2B5EF4-FFF2-40B4-BE49-F238E27FC236}">
-                <a16:creationId xmlns:a16="http://schemas.microsoft.com/office/drawing/2014/main" xmlns="" id="{A0AC5872-CD7A-4374-924D-8689BE2BBC03}"/>
+                <a16:creationId xmlns:a16="http://schemas.microsoft.com/office/drawing/2014/main" id="{A0AC5872-CD7A-4374-924D-8689BE2BBC03}"/>
               </a:ext>
             </a:extLst>
           </p:cNvPr>
@@ -16780,10 +16735,9 @@
           <a:p>
             <a:pPr algn="ctr"/>
             <a:r>
-              <a:rPr lang="en-NZ" sz="1000" dirty="0" smtClean="0"/>
+              <a:rPr lang="en-NZ" sz="1000" dirty="0"/>
               <a:t>Cache manager</a:t>
             </a:r>
-            <a:endParaRPr lang="en-NZ" sz="1000" dirty="0"/>
           </a:p>
         </p:txBody>
       </p:sp>
@@ -16792,7 +16746,7 @@
           <p:cNvPr id="24" name="Cylinder 23">
             <a:extLst>
               <a:ext uri="{FF2B5EF4-FFF2-40B4-BE49-F238E27FC236}">
-                <a16:creationId xmlns:a16="http://schemas.microsoft.com/office/drawing/2014/main" xmlns="" id="{05683995-73A7-4577-8836-4FA369B5A99D}"/>
+                <a16:creationId xmlns:a16="http://schemas.microsoft.com/office/drawing/2014/main" id="{05683995-73A7-4577-8836-4FA369B5A99D}"/>
               </a:ext>
             </a:extLst>
           </p:cNvPr>
@@ -16839,7 +16793,7 @@
           <p:cNvPr id="7" name="Rectangle: Rounded Corners 6">
             <a:extLst>
               <a:ext uri="{FF2B5EF4-FFF2-40B4-BE49-F238E27FC236}">
-                <a16:creationId xmlns:a16="http://schemas.microsoft.com/office/drawing/2014/main" xmlns="" id="{EF71E0C3-61DF-4F78-83A4-334753EC8830}"/>
+                <a16:creationId xmlns:a16="http://schemas.microsoft.com/office/drawing/2014/main" id="{EF71E0C3-61DF-4F78-83A4-334753EC8830}"/>
               </a:ext>
             </a:extLst>
           </p:cNvPr>
@@ -16886,7 +16840,7 @@
           <p:cNvPr id="12" name="Straight Arrow Connector 11">
             <a:extLst>
               <a:ext uri="{FF2B5EF4-FFF2-40B4-BE49-F238E27FC236}">
-                <a16:creationId xmlns:a16="http://schemas.microsoft.com/office/drawing/2014/main" xmlns="" id="{FDDBC6B1-7A72-477D-8965-839625E8339C}"/>
+                <a16:creationId xmlns:a16="http://schemas.microsoft.com/office/drawing/2014/main" id="{FDDBC6B1-7A72-477D-8965-839625E8339C}"/>
               </a:ext>
             </a:extLst>
           </p:cNvPr>
@@ -16928,7 +16882,7 @@
           <p:cNvPr id="28" name="Straight Arrow Connector 27">
             <a:extLst>
               <a:ext uri="{FF2B5EF4-FFF2-40B4-BE49-F238E27FC236}">
-                <a16:creationId xmlns:a16="http://schemas.microsoft.com/office/drawing/2014/main" xmlns="" id="{52728858-119E-4ABC-8BB3-1C2C5F1A5B0D}"/>
+                <a16:creationId xmlns:a16="http://schemas.microsoft.com/office/drawing/2014/main" id="{52728858-119E-4ABC-8BB3-1C2C5F1A5B0D}"/>
               </a:ext>
             </a:extLst>
           </p:cNvPr>
@@ -16968,7 +16922,7 @@
           <p:cNvPr id="30" name="Straight Arrow Connector 29">
             <a:extLst>
               <a:ext uri="{FF2B5EF4-FFF2-40B4-BE49-F238E27FC236}">
-                <a16:creationId xmlns:a16="http://schemas.microsoft.com/office/drawing/2014/main" xmlns="" id="{8A8D2F55-E947-4CD7-B7E4-20CE3916C3C1}"/>
+                <a16:creationId xmlns:a16="http://schemas.microsoft.com/office/drawing/2014/main" id="{8A8D2F55-E947-4CD7-B7E4-20CE3916C3C1}"/>
               </a:ext>
             </a:extLst>
           </p:cNvPr>
@@ -17008,7 +16962,7 @@
           <p:cNvPr id="32" name="Straight Arrow Connector 31">
             <a:extLst>
               <a:ext uri="{FF2B5EF4-FFF2-40B4-BE49-F238E27FC236}">
-                <a16:creationId xmlns:a16="http://schemas.microsoft.com/office/drawing/2014/main" xmlns="" id="{A131F861-D2E3-48A1-8C34-3AAEE1E96657}"/>
+                <a16:creationId xmlns:a16="http://schemas.microsoft.com/office/drawing/2014/main" id="{A131F861-D2E3-48A1-8C34-3AAEE1E96657}"/>
               </a:ext>
             </a:extLst>
           </p:cNvPr>
@@ -17048,7 +17002,7 @@
           <p:cNvPr id="33" name="Picture 32">
             <a:extLst>
               <a:ext uri="{FF2B5EF4-FFF2-40B4-BE49-F238E27FC236}">
-                <a16:creationId xmlns:a16="http://schemas.microsoft.com/office/drawing/2014/main" xmlns="" id="{36DFB2CD-9568-4B1A-8898-B95D5A8DBBBE}"/>
+                <a16:creationId xmlns:a16="http://schemas.microsoft.com/office/drawing/2014/main" id="{36DFB2CD-9568-4B1A-8898-B95D5A8DBBBE}"/>
               </a:ext>
             </a:extLst>
           </p:cNvPr>
@@ -17077,7 +17031,7 @@
           <p:cNvPr id="37" name="Cylinder 36">
             <a:extLst>
               <a:ext uri="{FF2B5EF4-FFF2-40B4-BE49-F238E27FC236}">
-                <a16:creationId xmlns:a16="http://schemas.microsoft.com/office/drawing/2014/main" xmlns="" id="{5D7E2D57-87A1-4527-955A-1206F25C5166}"/>
+                <a16:creationId xmlns:a16="http://schemas.microsoft.com/office/drawing/2014/main" id="{5D7E2D57-87A1-4527-955A-1206F25C5166}"/>
               </a:ext>
             </a:extLst>
           </p:cNvPr>
@@ -17125,7 +17079,7 @@
           <p:cNvPr id="39" name="Straight Arrow Connector 38">
             <a:extLst>
               <a:ext uri="{FF2B5EF4-FFF2-40B4-BE49-F238E27FC236}">
-                <a16:creationId xmlns:a16="http://schemas.microsoft.com/office/drawing/2014/main" xmlns="" id="{D99AED31-73E5-491C-8586-29F497BBEF73}"/>
+                <a16:creationId xmlns:a16="http://schemas.microsoft.com/office/drawing/2014/main" id="{D99AED31-73E5-491C-8586-29F497BBEF73}"/>
               </a:ext>
             </a:extLst>
           </p:cNvPr>
@@ -17165,7 +17119,7 @@
           <p:cNvPr id="41" name="Straight Arrow Connector 40">
             <a:extLst>
               <a:ext uri="{FF2B5EF4-FFF2-40B4-BE49-F238E27FC236}">
-                <a16:creationId xmlns:a16="http://schemas.microsoft.com/office/drawing/2014/main" xmlns="" id="{E4BE72B3-3965-49CE-B032-CC219CBB3433}"/>
+                <a16:creationId xmlns:a16="http://schemas.microsoft.com/office/drawing/2014/main" id="{E4BE72B3-3965-49CE-B032-CC219CBB3433}"/>
               </a:ext>
             </a:extLst>
           </p:cNvPr>
@@ -17205,7 +17159,7 @@
           <p:cNvPr id="42" name="TextBox 41">
             <a:extLst>
               <a:ext uri="{FF2B5EF4-FFF2-40B4-BE49-F238E27FC236}">
-                <a16:creationId xmlns:a16="http://schemas.microsoft.com/office/drawing/2014/main" xmlns="" id="{40DA87AF-6EEB-4843-B5D3-74C3CEAB424F}"/>
+                <a16:creationId xmlns:a16="http://schemas.microsoft.com/office/drawing/2014/main" id="{40DA87AF-6EEB-4843-B5D3-74C3CEAB424F}"/>
               </a:ext>
             </a:extLst>
           </p:cNvPr>
@@ -17240,7 +17194,7 @@
           <p:cNvPr id="43" name="TextBox 42">
             <a:extLst>
               <a:ext uri="{FF2B5EF4-FFF2-40B4-BE49-F238E27FC236}">
-                <a16:creationId xmlns:a16="http://schemas.microsoft.com/office/drawing/2014/main" xmlns="" id="{E1EE2D42-F3CE-4F1E-8B30-487F63D93AEA}"/>
+                <a16:creationId xmlns:a16="http://schemas.microsoft.com/office/drawing/2014/main" id="{E1EE2D42-F3CE-4F1E-8B30-487F63D93AEA}"/>
               </a:ext>
             </a:extLst>
           </p:cNvPr>
@@ -17305,7 +17259,7 @@
           <p:cNvPr id="6" name="TextBox 5">
             <a:extLst>
               <a:ext uri="{FF2B5EF4-FFF2-40B4-BE49-F238E27FC236}">
-                <a16:creationId xmlns:a16="http://schemas.microsoft.com/office/drawing/2014/main" xmlns="" id="{65F3C743-1BEA-4316-B336-118EC9FCDFC5}"/>
+                <a16:creationId xmlns:a16="http://schemas.microsoft.com/office/drawing/2014/main" id="{65F3C743-1BEA-4316-B336-118EC9FCDFC5}"/>
               </a:ext>
             </a:extLst>
           </p:cNvPr>
@@ -17348,7 +17302,7 @@
           <p:cNvPr id="8" name="Rectangle: Rounded Corners 7">
             <a:extLst>
               <a:ext uri="{FF2B5EF4-FFF2-40B4-BE49-F238E27FC236}">
-                <a16:creationId xmlns:a16="http://schemas.microsoft.com/office/drawing/2014/main" xmlns="" id="{2DB3A1D2-D500-446E-B822-8A5647ABA2EC}"/>
+                <a16:creationId xmlns:a16="http://schemas.microsoft.com/office/drawing/2014/main" id="{2DB3A1D2-D500-446E-B822-8A5647ABA2EC}"/>
               </a:ext>
             </a:extLst>
           </p:cNvPr>
@@ -17395,7 +17349,7 @@
           <p:cNvPr id="15" name="Rectangle 14">
             <a:extLst>
               <a:ext uri="{FF2B5EF4-FFF2-40B4-BE49-F238E27FC236}">
-                <a16:creationId xmlns:a16="http://schemas.microsoft.com/office/drawing/2014/main" xmlns="" id="{26137DFE-F287-42A8-BA3F-8332F1C4708A}"/>
+                <a16:creationId xmlns:a16="http://schemas.microsoft.com/office/drawing/2014/main" id="{26137DFE-F287-42A8-BA3F-8332F1C4708A}"/>
               </a:ext>
             </a:extLst>
           </p:cNvPr>
@@ -17444,7 +17398,7 @@
           <p:cNvPr id="20" name="Straight Arrow Connector 19">
             <a:extLst>
               <a:ext uri="{FF2B5EF4-FFF2-40B4-BE49-F238E27FC236}">
-                <a16:creationId xmlns:a16="http://schemas.microsoft.com/office/drawing/2014/main" xmlns="" id="{4D2C0868-56BA-4A0F-9A9D-A43A78E06DD2}"/>
+                <a16:creationId xmlns:a16="http://schemas.microsoft.com/office/drawing/2014/main" id="{4D2C0868-56BA-4A0F-9A9D-A43A78E06DD2}"/>
               </a:ext>
             </a:extLst>
           </p:cNvPr>
@@ -17485,7 +17439,7 @@
           <p:cNvPr id="12" name="Rectangle: Rounded Corners 11">
             <a:extLst>
               <a:ext uri="{FF2B5EF4-FFF2-40B4-BE49-F238E27FC236}">
-                <a16:creationId xmlns:a16="http://schemas.microsoft.com/office/drawing/2014/main" xmlns="" id="{1514B06E-27F9-4FD3-85A8-B51FAFD14FEA}"/>
+                <a16:creationId xmlns:a16="http://schemas.microsoft.com/office/drawing/2014/main" id="{1514B06E-27F9-4FD3-85A8-B51FAFD14FEA}"/>
               </a:ext>
             </a:extLst>
           </p:cNvPr>
@@ -17552,7 +17506,7 @@
           <p:cNvPr id="13" name="Rectangle: Rounded Corners 12">
             <a:extLst>
               <a:ext uri="{FF2B5EF4-FFF2-40B4-BE49-F238E27FC236}">
-                <a16:creationId xmlns:a16="http://schemas.microsoft.com/office/drawing/2014/main" xmlns="" id="{66E4B55B-7FDE-4E5B-8DBF-3953E9CAB17C}"/>
+                <a16:creationId xmlns:a16="http://schemas.microsoft.com/office/drawing/2014/main" id="{66E4B55B-7FDE-4E5B-8DBF-3953E9CAB17C}"/>
               </a:ext>
             </a:extLst>
           </p:cNvPr>
@@ -17625,7 +17579,7 @@
           <p:cNvPr id="16" name="Cylinder 15">
             <a:extLst>
               <a:ext uri="{FF2B5EF4-FFF2-40B4-BE49-F238E27FC236}">
-                <a16:creationId xmlns:a16="http://schemas.microsoft.com/office/drawing/2014/main" xmlns="" id="{E469A5B0-066A-413E-8AD6-2556D2E14F78}"/>
+                <a16:creationId xmlns:a16="http://schemas.microsoft.com/office/drawing/2014/main" id="{E469A5B0-066A-413E-8AD6-2556D2E14F78}"/>
               </a:ext>
             </a:extLst>
           </p:cNvPr>
@@ -17733,7 +17687,7 @@
           <p:cNvPr id="23" name="TextBox 22">
             <a:extLst>
               <a:ext uri="{FF2B5EF4-FFF2-40B4-BE49-F238E27FC236}">
-                <a16:creationId xmlns:a16="http://schemas.microsoft.com/office/drawing/2014/main" xmlns="" id="{74F2DCA3-8E93-4D35-873A-99C528472089}"/>
+                <a16:creationId xmlns:a16="http://schemas.microsoft.com/office/drawing/2014/main" id="{74F2DCA3-8E93-4D35-873A-99C528472089}"/>
               </a:ext>
             </a:extLst>
           </p:cNvPr>
@@ -17776,7 +17730,7 @@
           <p:cNvPr id="7" name="Cylinder 6">
             <a:extLst>
               <a:ext uri="{FF2B5EF4-FFF2-40B4-BE49-F238E27FC236}">
-                <a16:creationId xmlns:a16="http://schemas.microsoft.com/office/drawing/2014/main" xmlns="" id="{2D73A529-DF05-4D02-B438-CD7F478A9ED0}"/>
+                <a16:creationId xmlns:a16="http://schemas.microsoft.com/office/drawing/2014/main" id="{2D73A529-DF05-4D02-B438-CD7F478A9ED0}"/>
               </a:ext>
             </a:extLst>
           </p:cNvPr>
@@ -17823,7 +17777,7 @@
           <p:cNvPr id="11" name="Straight Arrow Connector 10">
             <a:extLst>
               <a:ext uri="{FF2B5EF4-FFF2-40B4-BE49-F238E27FC236}">
-                <a16:creationId xmlns:a16="http://schemas.microsoft.com/office/drawing/2014/main" xmlns="" id="{C9DF2FEF-6F70-4490-8394-24C0B154961D}"/>
+                <a16:creationId xmlns:a16="http://schemas.microsoft.com/office/drawing/2014/main" id="{C9DF2FEF-6F70-4490-8394-24C0B154961D}"/>
               </a:ext>
             </a:extLst>
           </p:cNvPr>
@@ -17865,7 +17819,7 @@
           <p:cNvPr id="26" name="Straight Arrow Connector 25">
             <a:extLst>
               <a:ext uri="{FF2B5EF4-FFF2-40B4-BE49-F238E27FC236}">
-                <a16:creationId xmlns:a16="http://schemas.microsoft.com/office/drawing/2014/main" xmlns="" id="{30D1C34E-6D58-4E6D-8623-CFB67F21A2A6}"/>
+                <a16:creationId xmlns:a16="http://schemas.microsoft.com/office/drawing/2014/main" id="{30D1C34E-6D58-4E6D-8623-CFB67F21A2A6}"/>
               </a:ext>
             </a:extLst>
           </p:cNvPr>
@@ -17907,7 +17861,7 @@
           <p:cNvPr id="28" name="Straight Arrow Connector 27">
             <a:extLst>
               <a:ext uri="{FF2B5EF4-FFF2-40B4-BE49-F238E27FC236}">
-                <a16:creationId xmlns:a16="http://schemas.microsoft.com/office/drawing/2014/main" xmlns="" id="{FD8DE7B5-2499-4F30-8ED9-FB9E4ADFACF1}"/>
+                <a16:creationId xmlns:a16="http://schemas.microsoft.com/office/drawing/2014/main" id="{FD8DE7B5-2499-4F30-8ED9-FB9E4ADFACF1}"/>
               </a:ext>
             </a:extLst>
           </p:cNvPr>
@@ -17949,7 +17903,7 @@
           <p:cNvPr id="30" name="Group 29">
             <a:extLst>
               <a:ext uri="{FF2B5EF4-FFF2-40B4-BE49-F238E27FC236}">
-                <a16:creationId xmlns:a16="http://schemas.microsoft.com/office/drawing/2014/main" xmlns="" id="{97ADD765-5A17-4181-9803-E0DF64322919}"/>
+                <a16:creationId xmlns:a16="http://schemas.microsoft.com/office/drawing/2014/main" id="{97ADD765-5A17-4181-9803-E0DF64322919}"/>
               </a:ext>
             </a:extLst>
           </p:cNvPr>
@@ -17969,7 +17923,7 @@
             <p:cNvPr id="31" name="Picture 30">
               <a:extLst>
                 <a:ext uri="{FF2B5EF4-FFF2-40B4-BE49-F238E27FC236}">
-                  <a16:creationId xmlns:a16="http://schemas.microsoft.com/office/drawing/2014/main" xmlns="" id="{2434FF4C-4E70-4D16-863F-A59FF195FFF1}"/>
+                  <a16:creationId xmlns:a16="http://schemas.microsoft.com/office/drawing/2014/main" id="{2434FF4C-4E70-4D16-863F-A59FF195FFF1}"/>
                 </a:ext>
               </a:extLst>
             </p:cNvPr>
@@ -17998,7 +17952,7 @@
             <p:cNvPr id="32" name="Picture 31">
               <a:extLst>
                 <a:ext uri="{FF2B5EF4-FFF2-40B4-BE49-F238E27FC236}">
-                  <a16:creationId xmlns:a16="http://schemas.microsoft.com/office/drawing/2014/main" xmlns="" id="{EFBAEA50-616D-4548-98C4-7FD31FE86931}"/>
+                  <a16:creationId xmlns:a16="http://schemas.microsoft.com/office/drawing/2014/main" id="{EFBAEA50-616D-4548-98C4-7FD31FE86931}"/>
                 </a:ext>
               </a:extLst>
             </p:cNvPr>

</xml_diff>